<commit_message>
Changes in the documentation. Changes in the presentation. Cleaned the code.
</commit_message>
<xml_diff>
--- a/qMIPS/doc/Presentacion PFC.pptx
+++ b/qMIPS/doc/Presentacion PFC.pptx
@@ -5,7 +5,7 @@
     <p:sldMasterId id="2147483684" r:id="rId1"/>
   </p:sldMasterIdLst>
   <p:notesMasterIdLst>
-    <p:notesMasterId r:id="rId19"/>
+    <p:notesMasterId r:id="rId22"/>
   </p:notesMasterIdLst>
   <p:sldIdLst>
     <p:sldId id="256" r:id="rId2"/>
@@ -21,10 +21,13 @@
     <p:sldId id="266" r:id="rId12"/>
     <p:sldId id="267" r:id="rId13"/>
     <p:sldId id="268" r:id="rId14"/>
-    <p:sldId id="269" r:id="rId15"/>
-    <p:sldId id="270" r:id="rId16"/>
-    <p:sldId id="271" r:id="rId17"/>
-    <p:sldId id="272" r:id="rId18"/>
+    <p:sldId id="273" r:id="rId15"/>
+    <p:sldId id="269" r:id="rId16"/>
+    <p:sldId id="270" r:id="rId17"/>
+    <p:sldId id="271" r:id="rId18"/>
+    <p:sldId id="272" r:id="rId19"/>
+    <p:sldId id="274" r:id="rId20"/>
+    <p:sldId id="275" r:id="rId21"/>
   </p:sldIdLst>
   <p:sldSz cx="9144000" cy="6858000" type="screen4x3"/>
   <p:notesSz cx="6858000" cy="9144000"/>
@@ -208,7 +211,7 @@
           <a:p>
             <a:fld id="{AB13600B-983D-4584-B53F-0B1CEA54138F}" type="datetimeFigureOut">
               <a:rPr lang="es-ES" smtClean="0"/>
-              <a:t>20/06/2013</a:t>
+              <a:t>23/06/2013</a:t>
             </a:fld>
             <a:endParaRPr lang="es-ES"/>
           </a:p>
@@ -748,7 +751,7 @@
           <a:p>
             <a:fld id="{7A847CFC-816F-41D0-AAC0-9BF4FEBC753E}" type="datetimeFigureOut">
               <a:rPr lang="es-ES" smtClean="0"/>
-              <a:t>20/06/2013</a:t>
+              <a:t>23/06/2013</a:t>
             </a:fld>
             <a:endParaRPr lang="es-ES"/>
           </a:p>
@@ -948,7 +951,7 @@
           <a:p>
             <a:fld id="{7A847CFC-816F-41D0-AAC0-9BF4FEBC753E}" type="datetimeFigureOut">
               <a:rPr lang="es-ES" smtClean="0"/>
-              <a:t>20/06/2013</a:t>
+              <a:t>23/06/2013</a:t>
             </a:fld>
             <a:endParaRPr lang="es-ES"/>
           </a:p>
@@ -1123,7 +1126,7 @@
           <a:p>
             <a:fld id="{7A847CFC-816F-41D0-AAC0-9BF4FEBC753E}" type="datetimeFigureOut">
               <a:rPr lang="es-ES" smtClean="0"/>
-              <a:t>20/06/2013</a:t>
+              <a:t>23/06/2013</a:t>
             </a:fld>
             <a:endParaRPr lang="es-ES"/>
           </a:p>
@@ -1288,7 +1291,7 @@
           <a:p>
             <a:fld id="{7A847CFC-816F-41D0-AAC0-9BF4FEBC753E}" type="datetimeFigureOut">
               <a:rPr lang="es-ES" smtClean="0"/>
-              <a:t>20/06/2013</a:t>
+              <a:t>23/06/2013</a:t>
             </a:fld>
             <a:endParaRPr lang="es-ES"/>
           </a:p>
@@ -1536,7 +1539,7 @@
           <a:p>
             <a:fld id="{7A847CFC-816F-41D0-AAC0-9BF4FEBC753E}" type="datetimeFigureOut">
               <a:rPr lang="es-ES" smtClean="0"/>
-              <a:t>20/06/2013</a:t>
+              <a:t>23/06/2013</a:t>
             </a:fld>
             <a:endParaRPr lang="es-ES"/>
           </a:p>
@@ -1854,7 +1857,7 @@
           <a:p>
             <a:fld id="{7A847CFC-816F-41D0-AAC0-9BF4FEBC753E}" type="datetimeFigureOut">
               <a:rPr lang="es-ES" smtClean="0"/>
-              <a:t>20/06/2013</a:t>
+              <a:t>23/06/2013</a:t>
             </a:fld>
             <a:endParaRPr lang="es-ES"/>
           </a:p>
@@ -2320,7 +2323,7 @@
           <a:p>
             <a:fld id="{7A847CFC-816F-41D0-AAC0-9BF4FEBC753E}" type="datetimeFigureOut">
               <a:rPr lang="es-ES" smtClean="0"/>
-              <a:t>20/06/2013</a:t>
+              <a:t>23/06/2013</a:t>
             </a:fld>
             <a:endParaRPr lang="es-ES"/>
           </a:p>
@@ -2468,7 +2471,7 @@
           <a:p>
             <a:fld id="{7A847CFC-816F-41D0-AAC0-9BF4FEBC753E}" type="datetimeFigureOut">
               <a:rPr lang="es-ES" smtClean="0"/>
-              <a:t>20/06/2013</a:t>
+              <a:t>23/06/2013</a:t>
             </a:fld>
             <a:endParaRPr lang="es-ES"/>
           </a:p>
@@ -2558,7 +2561,7 @@
           <a:p>
             <a:fld id="{7A847CFC-816F-41D0-AAC0-9BF4FEBC753E}" type="datetimeFigureOut">
               <a:rPr lang="es-ES" smtClean="0"/>
-              <a:t>20/06/2013</a:t>
+              <a:t>23/06/2013</a:t>
             </a:fld>
             <a:endParaRPr lang="es-ES"/>
           </a:p>
@@ -2832,7 +2835,7 @@
           <a:p>
             <a:fld id="{7A847CFC-816F-41D0-AAC0-9BF4FEBC753E}" type="datetimeFigureOut">
               <a:rPr lang="es-ES" smtClean="0"/>
-              <a:t>20/06/2013</a:t>
+              <a:t>23/06/2013</a:t>
             </a:fld>
             <a:endParaRPr lang="es-ES"/>
           </a:p>
@@ -3137,7 +3140,7 @@
           <a:p>
             <a:fld id="{7A847CFC-816F-41D0-AAC0-9BF4FEBC753E}" type="datetimeFigureOut">
               <a:rPr lang="es-ES" smtClean="0"/>
-              <a:t>20/06/2013</a:t>
+              <a:t>23/06/2013</a:t>
             </a:fld>
             <a:endParaRPr lang="es-ES"/>
           </a:p>
@@ -3435,7 +3438,7 @@
           <a:p>
             <a:fld id="{7A847CFC-816F-41D0-AAC0-9BF4FEBC753E}" type="datetimeFigureOut">
               <a:rPr lang="es-ES" smtClean="0"/>
-              <a:t>20/06/2013</a:t>
+              <a:t>23/06/2013</a:t>
             </a:fld>
             <a:endParaRPr lang="es-ES"/>
           </a:p>
@@ -8542,17 +8545,846 @@
           </a:p>
         </p:txBody>
       </p:sp>
+      <p:sp>
+        <p:nvSpPr>
+          <p:cNvPr id="2" name="1 Triángulo isósceles"/>
+          <p:cNvSpPr/>
+          <p:nvPr/>
+        </p:nvSpPr>
+        <p:spPr>
+          <a:xfrm rot="5400000">
+            <a:off x="1979712" y="3789040"/>
+            <a:ext cx="792088" cy="1080120"/>
+          </a:xfrm>
+          <a:prstGeom prst="triangle">
+            <a:avLst/>
+          </a:prstGeom>
+          <a:solidFill>
+            <a:schemeClr val="bg1"/>
+          </a:solidFill>
+        </p:spPr>
+        <p:style>
+          <a:lnRef idx="2">
+            <a:schemeClr val="dk1">
+              <a:shade val="50000"/>
+            </a:schemeClr>
+          </a:lnRef>
+          <a:fillRef idx="1">
+            <a:schemeClr val="dk1"/>
+          </a:fillRef>
+          <a:effectRef idx="0">
+            <a:schemeClr val="dk1"/>
+          </a:effectRef>
+          <a:fontRef idx="minor">
+            <a:schemeClr val="lt1"/>
+          </a:fontRef>
+        </p:style>
+        <p:txBody>
+          <a:bodyPr rtlCol="0" anchor="ctr"/>
+          <a:lstStyle/>
+          <a:p>
+            <a:pPr algn="ctr"/>
+            <a:endParaRPr lang="es-ES"/>
+          </a:p>
+        </p:txBody>
+      </p:sp>
+      <p:cxnSp>
+        <p:nvCxnSpPr>
+          <p:cNvPr id="10" name="9 Conector recto"/>
+          <p:cNvCxnSpPr>
+            <a:stCxn id="2" idx="3"/>
+          </p:cNvCxnSpPr>
+          <p:nvPr/>
+        </p:nvCxnSpPr>
+        <p:spPr>
+          <a:xfrm flipH="1">
+            <a:off x="1187624" y="4329100"/>
+            <a:ext cx="648072" cy="0"/>
+          </a:xfrm>
+          <a:prstGeom prst="line">
+            <a:avLst/>
+          </a:prstGeom>
+          <a:ln w="28575">
+            <a:solidFill>
+              <a:schemeClr val="tx1"/>
+            </a:solidFill>
+          </a:ln>
+        </p:spPr>
+        <p:style>
+          <a:lnRef idx="1">
+            <a:schemeClr val="accent1"/>
+          </a:lnRef>
+          <a:fillRef idx="0">
+            <a:schemeClr val="accent1"/>
+          </a:fillRef>
+          <a:effectRef idx="0">
+            <a:schemeClr val="accent1"/>
+          </a:effectRef>
+          <a:fontRef idx="minor">
+            <a:schemeClr val="tx1"/>
+          </a:fontRef>
+        </p:style>
+      </p:cxnSp>
+      <p:cxnSp>
+        <p:nvCxnSpPr>
+          <p:cNvPr id="13" name="12 Conector recto"/>
+          <p:cNvCxnSpPr>
+            <a:stCxn id="2" idx="0"/>
+          </p:cNvCxnSpPr>
+          <p:nvPr/>
+        </p:nvCxnSpPr>
+        <p:spPr>
+          <a:xfrm>
+            <a:off x="2915816" y="4329100"/>
+            <a:ext cx="648072" cy="0"/>
+          </a:xfrm>
+          <a:prstGeom prst="line">
+            <a:avLst/>
+          </a:prstGeom>
+          <a:ln w="28575">
+            <a:solidFill>
+              <a:schemeClr val="tx1"/>
+            </a:solidFill>
+          </a:ln>
+        </p:spPr>
+        <p:style>
+          <a:lnRef idx="1">
+            <a:schemeClr val="accent1"/>
+          </a:lnRef>
+          <a:fillRef idx="0">
+            <a:schemeClr val="accent1"/>
+          </a:fillRef>
+          <a:effectRef idx="0">
+            <a:schemeClr val="accent1"/>
+          </a:effectRef>
+          <a:fontRef idx="minor">
+            <a:schemeClr val="tx1"/>
+          </a:fontRef>
+        </p:style>
+      </p:cxnSp>
+      <p:sp>
+        <p:nvSpPr>
+          <p:cNvPr id="19" name="18 CuadroTexto"/>
+          <p:cNvSpPr txBox="1"/>
+          <p:nvPr/>
+        </p:nvSpPr>
+        <p:spPr>
+          <a:xfrm>
+            <a:off x="746559" y="3284984"/>
+            <a:ext cx="3258393" cy="400110"/>
+          </a:xfrm>
+          <a:prstGeom prst="rect">
+            <a:avLst/>
+          </a:prstGeom>
+          <a:noFill/>
+        </p:spPr>
+        <p:txBody>
+          <a:bodyPr wrap="none" rtlCol="0">
+            <a:spAutoFit/>
+          </a:bodyPr>
+          <a:lstStyle/>
+          <a:p>
+            <a:r>
+              <a:rPr lang="es-ES" sz="2000" dirty="0" smtClean="0"/>
+              <a:t>Puerta clásica: inversor lógico</a:t>
+            </a:r>
+            <a:endParaRPr lang="es-ES" sz="2000" dirty="0"/>
+          </a:p>
+        </p:txBody>
+      </p:sp>
+      <p:sp>
+        <p:nvSpPr>
+          <p:cNvPr id="28" name="27 Triángulo isósceles"/>
+          <p:cNvSpPr/>
+          <p:nvPr/>
+        </p:nvSpPr>
+        <p:spPr>
+          <a:xfrm rot="5400000">
+            <a:off x="1977361" y="5013176"/>
+            <a:ext cx="792088" cy="1080120"/>
+          </a:xfrm>
+          <a:prstGeom prst="triangle">
+            <a:avLst/>
+          </a:prstGeom>
+          <a:solidFill>
+            <a:schemeClr val="bg1"/>
+          </a:solidFill>
+        </p:spPr>
+        <p:style>
+          <a:lnRef idx="2">
+            <a:schemeClr val="dk1">
+              <a:shade val="50000"/>
+            </a:schemeClr>
+          </a:lnRef>
+          <a:fillRef idx="1">
+            <a:schemeClr val="dk1"/>
+          </a:fillRef>
+          <a:effectRef idx="0">
+            <a:schemeClr val="dk1"/>
+          </a:effectRef>
+          <a:fontRef idx="minor">
+            <a:schemeClr val="lt1"/>
+          </a:fontRef>
+        </p:style>
+        <p:txBody>
+          <a:bodyPr rtlCol="0" anchor="ctr"/>
+          <a:lstStyle/>
+          <a:p>
+            <a:pPr algn="ctr"/>
+            <a:endParaRPr lang="es-ES"/>
+          </a:p>
+        </p:txBody>
+      </p:sp>
+      <p:cxnSp>
+        <p:nvCxnSpPr>
+          <p:cNvPr id="29" name="28 Conector recto"/>
+          <p:cNvCxnSpPr>
+            <a:stCxn id="28" idx="3"/>
+          </p:cNvCxnSpPr>
+          <p:nvPr/>
+        </p:nvCxnSpPr>
+        <p:spPr>
+          <a:xfrm flipH="1">
+            <a:off x="1185273" y="5553236"/>
+            <a:ext cx="648072" cy="0"/>
+          </a:xfrm>
+          <a:prstGeom prst="line">
+            <a:avLst/>
+          </a:prstGeom>
+          <a:ln w="28575">
+            <a:solidFill>
+              <a:schemeClr val="tx1"/>
+            </a:solidFill>
+          </a:ln>
+        </p:spPr>
+        <p:style>
+          <a:lnRef idx="1">
+            <a:schemeClr val="accent1"/>
+          </a:lnRef>
+          <a:fillRef idx="0">
+            <a:schemeClr val="accent1"/>
+          </a:fillRef>
+          <a:effectRef idx="0">
+            <a:schemeClr val="accent1"/>
+          </a:effectRef>
+          <a:fontRef idx="minor">
+            <a:schemeClr val="tx1"/>
+          </a:fontRef>
+        </p:style>
+      </p:cxnSp>
+      <p:cxnSp>
+        <p:nvCxnSpPr>
+          <p:cNvPr id="30" name="29 Conector recto"/>
+          <p:cNvCxnSpPr>
+            <a:stCxn id="28" idx="0"/>
+          </p:cNvCxnSpPr>
+          <p:nvPr/>
+        </p:nvCxnSpPr>
+        <p:spPr>
+          <a:xfrm>
+            <a:off x="2913465" y="5553236"/>
+            <a:ext cx="648072" cy="0"/>
+          </a:xfrm>
+          <a:prstGeom prst="line">
+            <a:avLst/>
+          </a:prstGeom>
+          <a:ln w="28575">
+            <a:solidFill>
+              <a:schemeClr val="tx1"/>
+            </a:solidFill>
+          </a:ln>
+        </p:spPr>
+        <p:style>
+          <a:lnRef idx="1">
+            <a:schemeClr val="accent1"/>
+          </a:lnRef>
+          <a:fillRef idx="0">
+            <a:schemeClr val="accent1"/>
+          </a:fillRef>
+          <a:effectRef idx="0">
+            <a:schemeClr val="accent1"/>
+          </a:effectRef>
+          <a:fontRef idx="minor">
+            <a:schemeClr val="tx1"/>
+          </a:fontRef>
+        </p:style>
+      </p:cxnSp>
+      <p:sp>
+        <p:nvSpPr>
+          <p:cNvPr id="20" name="19 Flecha derecha"/>
+          <p:cNvSpPr/>
+          <p:nvPr/>
+        </p:nvSpPr>
+        <p:spPr>
+          <a:xfrm>
+            <a:off x="4561737" y="4509120"/>
+            <a:ext cx="936104" cy="648072"/>
+          </a:xfrm>
+          <a:prstGeom prst="rightArrow">
+            <a:avLst/>
+          </a:prstGeom>
+        </p:spPr>
+        <p:style>
+          <a:lnRef idx="2">
+            <a:schemeClr val="dk1">
+              <a:shade val="50000"/>
+            </a:schemeClr>
+          </a:lnRef>
+          <a:fillRef idx="1">
+            <a:schemeClr val="dk1"/>
+          </a:fillRef>
+          <a:effectRef idx="0">
+            <a:schemeClr val="dk1"/>
+          </a:effectRef>
+          <a:fontRef idx="minor">
+            <a:schemeClr val="lt1"/>
+          </a:fontRef>
+        </p:style>
+        <p:txBody>
+          <a:bodyPr rtlCol="0" anchor="ctr"/>
+          <a:lstStyle/>
+          <a:p>
+            <a:pPr algn="ctr"/>
+            <a:endParaRPr lang="es-ES"/>
+          </a:p>
+        </p:txBody>
+      </p:sp>
+      <p:sp>
+        <p:nvSpPr>
+          <p:cNvPr id="31" name="30 CuadroTexto"/>
+          <p:cNvSpPr txBox="1"/>
+          <p:nvPr/>
+        </p:nvSpPr>
+        <p:spPr>
+          <a:xfrm>
+            <a:off x="6012160" y="3284984"/>
+            <a:ext cx="2070182" cy="400110"/>
+          </a:xfrm>
+          <a:prstGeom prst="rect">
+            <a:avLst/>
+          </a:prstGeom>
+          <a:noFill/>
+        </p:spPr>
+        <p:txBody>
+          <a:bodyPr wrap="none" rtlCol="0">
+            <a:spAutoFit/>
+          </a:bodyPr>
+          <a:lstStyle/>
+          <a:p>
+            <a:r>
+              <a:rPr lang="es-ES" sz="2000" dirty="0" smtClean="0"/>
+              <a:t>Puerta cuántica: X</a:t>
+            </a:r>
+            <a:endParaRPr lang="es-ES" sz="2000" dirty="0"/>
+          </a:p>
+        </p:txBody>
+      </p:sp>
+      <p:sp>
+        <p:nvSpPr>
+          <p:cNvPr id="32" name="31 CuadroTexto"/>
+          <p:cNvSpPr txBox="1"/>
+          <p:nvPr/>
+        </p:nvSpPr>
+        <p:spPr>
+          <a:xfrm>
+            <a:off x="755576" y="4129045"/>
+            <a:ext cx="314510" cy="400110"/>
+          </a:xfrm>
+          <a:prstGeom prst="rect">
+            <a:avLst/>
+          </a:prstGeom>
+          <a:noFill/>
+        </p:spPr>
+        <p:txBody>
+          <a:bodyPr wrap="none" rtlCol="0">
+            <a:spAutoFit/>
+          </a:bodyPr>
+          <a:lstStyle/>
+          <a:p>
+            <a:r>
+              <a:rPr lang="es-ES" sz="2000" dirty="0" smtClean="0"/>
+              <a:t>0</a:t>
+            </a:r>
+            <a:endParaRPr lang="es-ES" sz="2000" dirty="0"/>
+          </a:p>
+        </p:txBody>
+      </p:sp>
+      <p:sp>
+        <p:nvSpPr>
+          <p:cNvPr id="33" name="32 CuadroTexto"/>
+          <p:cNvSpPr txBox="1"/>
+          <p:nvPr/>
+        </p:nvSpPr>
+        <p:spPr>
+          <a:xfrm>
+            <a:off x="3637475" y="4129045"/>
+            <a:ext cx="314510" cy="400110"/>
+          </a:xfrm>
+          <a:prstGeom prst="rect">
+            <a:avLst/>
+          </a:prstGeom>
+          <a:noFill/>
+        </p:spPr>
+        <p:txBody>
+          <a:bodyPr wrap="none" rtlCol="0">
+            <a:spAutoFit/>
+          </a:bodyPr>
+          <a:lstStyle/>
+          <a:p>
+            <a:r>
+              <a:rPr lang="es-ES" sz="2000" dirty="0"/>
+              <a:t>1</a:t>
+            </a:r>
+          </a:p>
+        </p:txBody>
+      </p:sp>
+      <p:sp>
+        <p:nvSpPr>
+          <p:cNvPr id="34" name="33 CuadroTexto"/>
+          <p:cNvSpPr txBox="1"/>
+          <p:nvPr/>
+        </p:nvSpPr>
+        <p:spPr>
+          <a:xfrm>
+            <a:off x="768424" y="5353181"/>
+            <a:ext cx="314510" cy="400110"/>
+          </a:xfrm>
+          <a:prstGeom prst="rect">
+            <a:avLst/>
+          </a:prstGeom>
+          <a:noFill/>
+        </p:spPr>
+        <p:txBody>
+          <a:bodyPr wrap="none" rtlCol="0">
+            <a:spAutoFit/>
+          </a:bodyPr>
+          <a:lstStyle/>
+          <a:p>
+            <a:r>
+              <a:rPr lang="es-ES" sz="2000" dirty="0"/>
+              <a:t>1</a:t>
+            </a:r>
+          </a:p>
+        </p:txBody>
+      </p:sp>
+      <p:sp>
+        <p:nvSpPr>
+          <p:cNvPr id="35" name="34 CuadroTexto"/>
+          <p:cNvSpPr txBox="1"/>
+          <p:nvPr/>
+        </p:nvSpPr>
+        <p:spPr>
+          <a:xfrm>
+            <a:off x="3637475" y="5353181"/>
+            <a:ext cx="314510" cy="400110"/>
+          </a:xfrm>
+          <a:prstGeom prst="rect">
+            <a:avLst/>
+          </a:prstGeom>
+          <a:noFill/>
+        </p:spPr>
+        <p:txBody>
+          <a:bodyPr wrap="none" rtlCol="0">
+            <a:spAutoFit/>
+          </a:bodyPr>
+          <a:lstStyle/>
+          <a:p>
+            <a:r>
+              <a:rPr lang="es-ES" sz="2000" dirty="0" smtClean="0"/>
+              <a:t>0</a:t>
+            </a:r>
+            <a:endParaRPr lang="es-ES" sz="2000" dirty="0"/>
+          </a:p>
+        </p:txBody>
+      </p:sp>
       <mc:AlternateContent xmlns:mc="http://schemas.openxmlformats.org/markup-compatibility/2006" xmlns:a14="http://schemas.microsoft.com/office/drawing/2010/main">
         <mc:Choice Requires="a14">
           <p:sp>
             <p:nvSpPr>
-              <p:cNvPr id="12" name="11 CuadroTexto"/>
+              <p:cNvPr id="36" name="35 CuadroTexto"/>
               <p:cNvSpPr txBox="1"/>
               <p:nvPr/>
             </p:nvSpPr>
             <p:spPr>
               <a:xfrm>
-                <a:off x="1200011" y="4077072"/>
+                <a:off x="6118951" y="4067490"/>
+                <a:ext cx="1856598" cy="523220"/>
+              </a:xfrm>
+              <a:prstGeom prst="rect">
+                <a:avLst/>
+              </a:prstGeom>
+              <a:noFill/>
+            </p:spPr>
+            <p:txBody>
+              <a:bodyPr wrap="none" rtlCol="0">
+                <a:spAutoFit/>
+              </a:bodyPr>
+              <a:lstStyle/>
+              <a:p>
+                <a:pPr/>
+                <a14:m>
+                  <m:oMathPara xmlns:m="http://schemas.openxmlformats.org/officeDocument/2006/math">
+                    <m:oMathParaPr>
+                      <m:jc m:val="centerGroup"/>
+                    </m:oMathParaPr>
+                    <m:oMath xmlns:m="http://schemas.openxmlformats.org/officeDocument/2006/math">
+                      <m:r>
+                        <a:rPr lang="es-ES" sz="2800" b="0" i="1" smtClean="0">
+                          <a:latin typeface="Cambria Math"/>
+                        </a:rPr>
+                        <m:t>𝑋</m:t>
+                      </m:r>
+                      <m:r>
+                        <a:rPr lang="es-ES" sz="2800" i="1">
+                          <a:latin typeface="Cambria Math"/>
+                        </a:rPr>
+                        <m:t>|</m:t>
+                      </m:r>
+                      <m:d>
+                        <m:dPr>
+                          <m:begChr m:val=""/>
+                          <m:endChr m:val="⟩"/>
+                          <m:ctrlPr>
+                            <a:rPr lang="es-ES" sz="2800" i="1">
+                              <a:latin typeface="Cambria Math"/>
+                            </a:rPr>
+                          </m:ctrlPr>
+                        </m:dPr>
+                        <m:e>
+                          <m:r>
+                            <a:rPr lang="es-ES" sz="2800" i="1">
+                              <a:latin typeface="Cambria Math"/>
+                            </a:rPr>
+                            <m:t>0</m:t>
+                          </m:r>
+                        </m:e>
+                      </m:d>
+                      <m:r>
+                        <a:rPr lang="es-ES" sz="2800" b="0" i="1" smtClean="0">
+                          <a:latin typeface="Cambria Math"/>
+                        </a:rPr>
+                        <m:t>=</m:t>
+                      </m:r>
+                      <m:r>
+                        <a:rPr lang="es-ES" sz="2800" i="1">
+                          <a:latin typeface="Cambria Math"/>
+                        </a:rPr>
+                        <m:t>|</m:t>
+                      </m:r>
+                      <m:d>
+                        <m:dPr>
+                          <m:begChr m:val=""/>
+                          <m:endChr m:val="⟩"/>
+                          <m:ctrlPr>
+                            <a:rPr lang="es-ES" sz="2800" i="1">
+                              <a:latin typeface="Cambria Math"/>
+                            </a:rPr>
+                          </m:ctrlPr>
+                        </m:dPr>
+                        <m:e>
+                          <m:r>
+                            <a:rPr lang="es-ES" sz="2800" b="0" i="1" smtClean="0">
+                              <a:latin typeface="Cambria Math"/>
+                            </a:rPr>
+                            <m:t>1</m:t>
+                          </m:r>
+                        </m:e>
+                      </m:d>
+                    </m:oMath>
+                  </m:oMathPara>
+                </a14:m>
+                <a:endParaRPr lang="es-ES" sz="2800" dirty="0"/>
+              </a:p>
+            </p:txBody>
+          </p:sp>
+        </mc:Choice>
+        <mc:Fallback xmlns="">
+          <p:sp>
+            <p:nvSpPr>
+              <p:cNvPr id="36" name="35 CuadroTexto"/>
+              <p:cNvSpPr txBox="1">
+                <a:spLocks noRot="1" noChangeAspect="1" noMove="1" noResize="1" noEditPoints="1" noAdjustHandles="1" noChangeArrowheads="1" noChangeShapeType="1" noTextEdit="1"/>
+              </p:cNvSpPr>
+              <p:nvPr/>
+            </p:nvSpPr>
+            <p:spPr>
+              <a:xfrm>
+                <a:off x="6118951" y="4067490"/>
+                <a:ext cx="1856598" cy="523220"/>
+              </a:xfrm>
+              <a:prstGeom prst="rect">
+                <a:avLst/>
+              </a:prstGeom>
+              <a:blipFill rotWithShape="1">
+                <a:blip r:embed="rId2"/>
+                <a:stretch>
+                  <a:fillRect/>
+                </a:stretch>
+              </a:blipFill>
+            </p:spPr>
+            <p:txBody>
+              <a:bodyPr/>
+              <a:lstStyle/>
+              <a:p>
+                <a:r>
+                  <a:rPr lang="es-ES">
+                    <a:noFill/>
+                  </a:rPr>
+                  <a:t> </a:t>
+                </a:r>
+              </a:p>
+            </p:txBody>
+          </p:sp>
+        </mc:Fallback>
+      </mc:AlternateContent>
+      <mc:AlternateContent xmlns:mc="http://schemas.openxmlformats.org/markup-compatibility/2006" xmlns:a14="http://schemas.microsoft.com/office/drawing/2010/main">
+        <mc:Choice Requires="a14">
+          <p:sp>
+            <p:nvSpPr>
+              <p:cNvPr id="37" name="36 CuadroTexto"/>
+              <p:cNvSpPr txBox="1"/>
+              <p:nvPr/>
+            </p:nvSpPr>
+            <p:spPr>
+              <a:xfrm>
+                <a:off x="6118952" y="5291626"/>
+                <a:ext cx="1856598" cy="523220"/>
+              </a:xfrm>
+              <a:prstGeom prst="rect">
+                <a:avLst/>
+              </a:prstGeom>
+              <a:noFill/>
+            </p:spPr>
+            <p:txBody>
+              <a:bodyPr wrap="none" rtlCol="0">
+                <a:spAutoFit/>
+              </a:bodyPr>
+              <a:lstStyle/>
+              <a:p>
+                <a:pPr/>
+                <a14:m>
+                  <m:oMathPara xmlns:m="http://schemas.openxmlformats.org/officeDocument/2006/math">
+                    <m:oMathParaPr>
+                      <m:jc m:val="centerGroup"/>
+                    </m:oMathParaPr>
+                    <m:oMath xmlns:m="http://schemas.openxmlformats.org/officeDocument/2006/math">
+                      <m:r>
+                        <a:rPr lang="es-ES" sz="2800" b="0" i="1" smtClean="0">
+                          <a:latin typeface="Cambria Math"/>
+                        </a:rPr>
+                        <m:t>𝑋</m:t>
+                      </m:r>
+                      <m:r>
+                        <a:rPr lang="es-ES" sz="2800" i="1">
+                          <a:latin typeface="Cambria Math"/>
+                        </a:rPr>
+                        <m:t>|</m:t>
+                      </m:r>
+                      <m:d>
+                        <m:dPr>
+                          <m:begChr m:val=""/>
+                          <m:endChr m:val="⟩"/>
+                          <m:ctrlPr>
+                            <a:rPr lang="es-ES" sz="2800" i="1">
+                              <a:latin typeface="Cambria Math"/>
+                            </a:rPr>
+                          </m:ctrlPr>
+                        </m:dPr>
+                        <m:e>
+                          <m:r>
+                            <a:rPr lang="es-ES" sz="2800" b="0" i="1" smtClean="0">
+                              <a:latin typeface="Cambria Math"/>
+                            </a:rPr>
+                            <m:t>1</m:t>
+                          </m:r>
+                        </m:e>
+                      </m:d>
+                      <m:r>
+                        <a:rPr lang="es-ES" sz="2800" b="0" i="1" smtClean="0">
+                          <a:latin typeface="Cambria Math"/>
+                        </a:rPr>
+                        <m:t>=</m:t>
+                      </m:r>
+                      <m:r>
+                        <a:rPr lang="es-ES" sz="2800" i="1">
+                          <a:latin typeface="Cambria Math"/>
+                        </a:rPr>
+                        <m:t>|</m:t>
+                      </m:r>
+                      <m:d>
+                        <m:dPr>
+                          <m:begChr m:val=""/>
+                          <m:endChr m:val="⟩"/>
+                          <m:ctrlPr>
+                            <a:rPr lang="es-ES" sz="2800" i="1">
+                              <a:latin typeface="Cambria Math"/>
+                            </a:rPr>
+                          </m:ctrlPr>
+                        </m:dPr>
+                        <m:e>
+                          <m:r>
+                            <a:rPr lang="es-ES" sz="2800" b="0" i="1" smtClean="0">
+                              <a:latin typeface="Cambria Math"/>
+                            </a:rPr>
+                            <m:t>0</m:t>
+                          </m:r>
+                        </m:e>
+                      </m:d>
+                    </m:oMath>
+                  </m:oMathPara>
+                </a14:m>
+                <a:endParaRPr lang="es-ES" sz="2800" dirty="0"/>
+              </a:p>
+            </p:txBody>
+          </p:sp>
+        </mc:Choice>
+        <mc:Fallback xmlns="">
+          <p:sp>
+            <p:nvSpPr>
+              <p:cNvPr id="37" name="36 CuadroTexto"/>
+              <p:cNvSpPr txBox="1">
+                <a:spLocks noRot="1" noChangeAspect="1" noMove="1" noResize="1" noEditPoints="1" noAdjustHandles="1" noChangeArrowheads="1" noChangeShapeType="1" noTextEdit="1"/>
+              </p:cNvSpPr>
+              <p:nvPr/>
+            </p:nvSpPr>
+            <p:spPr>
+              <a:xfrm>
+                <a:off x="6118952" y="5291626"/>
+                <a:ext cx="1856598" cy="523220"/>
+              </a:xfrm>
+              <a:prstGeom prst="rect">
+                <a:avLst/>
+              </a:prstGeom>
+              <a:blipFill rotWithShape="1">
+                <a:blip r:embed="rId3"/>
+                <a:stretch>
+                  <a:fillRect/>
+                </a:stretch>
+              </a:blipFill>
+            </p:spPr>
+            <p:txBody>
+              <a:bodyPr/>
+              <a:lstStyle/>
+              <a:p>
+                <a:r>
+                  <a:rPr lang="es-ES">
+                    <a:noFill/>
+                  </a:rPr>
+                  <a:t> </a:t>
+                </a:r>
+              </a:p>
+            </p:txBody>
+          </p:sp>
+        </mc:Fallback>
+      </mc:AlternateContent>
+    </p:spTree>
+    <p:extLst>
+      <p:ext uri="{BB962C8B-B14F-4D97-AF65-F5344CB8AC3E}">
+        <p14:creationId xmlns:p14="http://schemas.microsoft.com/office/powerpoint/2010/main" val="1227579415"/>
+      </p:ext>
+    </p:extLst>
+  </p:cSld>
+  <p:clrMapOvr>
+    <a:masterClrMapping/>
+  </p:clrMapOvr>
+  <p:timing>
+    <p:tnLst>
+      <p:par>
+        <p:cTn id="1" dur="indefinite" restart="never" nodeType="tmRoot"/>
+      </p:par>
+    </p:tnLst>
+  </p:timing>
+</p:sld>
+</file>
+
+<file path=ppt/slides/slide14.xml><?xml version="1.0" encoding="utf-8"?>
+<p:sld xmlns:a="http://schemas.openxmlformats.org/drawingml/2006/main" xmlns:r="http://schemas.openxmlformats.org/officeDocument/2006/relationships" xmlns:p="http://schemas.openxmlformats.org/presentationml/2006/main">
+  <p:cSld>
+    <p:spTree>
+      <p:nvGrpSpPr>
+        <p:cNvPr id="1" name=""/>
+        <p:cNvGrpSpPr/>
+        <p:nvPr/>
+      </p:nvGrpSpPr>
+      <p:grpSpPr>
+        <a:xfrm>
+          <a:off x="0" y="0"/>
+          <a:ext cx="0" cy="0"/>
+          <a:chOff x="0" y="0"/>
+          <a:chExt cx="0" cy="0"/>
+        </a:xfrm>
+      </p:grpSpPr>
+      <p:sp>
+        <p:nvSpPr>
+          <p:cNvPr id="4" name="3 CuadroTexto"/>
+          <p:cNvSpPr txBox="1"/>
+          <p:nvPr/>
+        </p:nvSpPr>
+        <p:spPr>
+          <a:xfrm>
+            <a:off x="400566" y="398910"/>
+            <a:ext cx="8322343" cy="707886"/>
+          </a:xfrm>
+          <a:prstGeom prst="rect">
+            <a:avLst/>
+          </a:prstGeom>
+          <a:noFill/>
+        </p:spPr>
+        <p:txBody>
+          <a:bodyPr wrap="none" rtlCol="0">
+            <a:spAutoFit/>
+          </a:bodyPr>
+          <a:lstStyle/>
+          <a:p>
+            <a:r>
+              <a:rPr lang="es-ES" sz="4000" dirty="0" smtClean="0"/>
+              <a:t>Los postulados de la mecánica cuántica</a:t>
+            </a:r>
+            <a:endParaRPr lang="es-ES" sz="4000" dirty="0"/>
+          </a:p>
+        </p:txBody>
+      </p:sp>
+      <p:sp>
+        <p:nvSpPr>
+          <p:cNvPr id="5" name="4 CuadroTexto"/>
+          <p:cNvSpPr txBox="1"/>
+          <p:nvPr/>
+        </p:nvSpPr>
+        <p:spPr>
+          <a:xfrm>
+            <a:off x="2913465" y="1109453"/>
+            <a:ext cx="3296543" cy="523220"/>
+          </a:xfrm>
+          <a:prstGeom prst="rect">
+            <a:avLst/>
+          </a:prstGeom>
+          <a:noFill/>
+        </p:spPr>
+        <p:txBody>
+          <a:bodyPr wrap="none" rtlCol="0">
+            <a:spAutoFit/>
+          </a:bodyPr>
+          <a:lstStyle/>
+          <a:p>
+            <a:r>
+              <a:rPr lang="es-ES" sz="2800" i="1" dirty="0" smtClean="0"/>
+              <a:t>Las puertas cuánticas</a:t>
+            </a:r>
+            <a:endParaRPr lang="es-ES" sz="2800" i="1" dirty="0"/>
+          </a:p>
+        </p:txBody>
+      </p:sp>
+      <mc:AlternateContent xmlns:mc="http://schemas.openxmlformats.org/markup-compatibility/2006" xmlns:a14="http://schemas.microsoft.com/office/drawing/2010/main">
+        <mc:Choice Requires="a14">
+          <p:sp>
+            <p:nvSpPr>
+              <p:cNvPr id="6" name="5 CuadroTexto"/>
+              <p:cNvSpPr txBox="1"/>
+              <p:nvPr/>
+            </p:nvSpPr>
+            <p:spPr>
+              <a:xfrm>
+                <a:off x="1200011" y="2641897"/>
                 <a:ext cx="1263551" cy="369332"/>
               </a:xfrm>
               <a:prstGeom prst="rect">
@@ -8646,7 +9478,7 @@
         <mc:Fallback xmlns="">
           <p:sp>
             <p:nvSpPr>
-              <p:cNvPr id="12" name="11 CuadroTexto"/>
+              <p:cNvPr id="6" name="5 CuadroTexto"/>
               <p:cNvSpPr txBox="1">
                 <a:spLocks noRot="1" noChangeAspect="1" noMove="1" noResize="1" noEditPoints="1" noAdjustHandles="1" noChangeArrowheads="1" noChangeShapeType="1" noTextEdit="1"/>
               </p:cNvSpPr>
@@ -8654,7 +9486,7 @@
             </p:nvSpPr>
             <p:spPr>
               <a:xfrm>
-                <a:off x="1200011" y="4077072"/>
+                <a:off x="1200011" y="2641897"/>
                 <a:ext cx="1263551" cy="369332"/>
               </a:xfrm>
               <a:prstGeom prst="rect">
@@ -8663,7 +9495,7 @@
               <a:blipFill rotWithShape="1">
                 <a:blip r:embed="rId2"/>
                 <a:stretch>
-                  <a:fillRect t="-121667" r="-37198" b="-188333"/>
+                  <a:fillRect t="-119672" r="-37198" b="-183607"/>
                 </a:stretch>
               </a:blipFill>
             </p:spPr>
@@ -8686,13 +9518,13 @@
         <mc:Choice Requires="a14">
           <p:sp>
             <p:nvSpPr>
-              <p:cNvPr id="14" name="13 CuadroTexto"/>
+              <p:cNvPr id="7" name="6 CuadroTexto"/>
               <p:cNvSpPr txBox="1"/>
               <p:nvPr/>
             </p:nvSpPr>
             <p:spPr>
               <a:xfrm>
-                <a:off x="1200011" y="4446404"/>
+                <a:off x="1200011" y="3011229"/>
                 <a:ext cx="1263551" cy="369332"/>
               </a:xfrm>
               <a:prstGeom prst="rect">
@@ -8786,7 +9618,7 @@
         <mc:Fallback xmlns="">
           <p:sp>
             <p:nvSpPr>
-              <p:cNvPr id="14" name="13 CuadroTexto"/>
+              <p:cNvPr id="7" name="6 CuadroTexto"/>
               <p:cNvSpPr txBox="1">
                 <a:spLocks noRot="1" noChangeAspect="1" noMove="1" noResize="1" noEditPoints="1" noAdjustHandles="1" noChangeArrowheads="1" noChangeShapeType="1" noTextEdit="1"/>
               </p:cNvSpPr>
@@ -8794,7 +9626,7 @@
             </p:nvSpPr>
             <p:spPr>
               <a:xfrm>
-                <a:off x="1200011" y="4446404"/>
+                <a:off x="1200011" y="3011229"/>
                 <a:ext cx="1263551" cy="369332"/>
               </a:xfrm>
               <a:prstGeom prst="rect">
@@ -8826,13 +9658,13 @@
         <mc:Choice Requires="a14">
           <p:sp>
             <p:nvSpPr>
-              <p:cNvPr id="15" name="14 CuadroTexto"/>
+              <p:cNvPr id="8" name="7 CuadroTexto"/>
               <p:cNvSpPr txBox="1"/>
               <p:nvPr/>
             </p:nvSpPr>
             <p:spPr>
               <a:xfrm>
-                <a:off x="323528" y="5013176"/>
+                <a:off x="323528" y="3578001"/>
                 <a:ext cx="1334981" cy="369332"/>
               </a:xfrm>
               <a:prstGeom prst="rect">
@@ -8932,7 +9764,7 @@
         <mc:Fallback xmlns="">
           <p:sp>
             <p:nvSpPr>
-              <p:cNvPr id="15" name="14 CuadroTexto"/>
+              <p:cNvPr id="8" name="7 CuadroTexto"/>
               <p:cNvSpPr txBox="1">
                 <a:spLocks noRot="1" noChangeAspect="1" noMove="1" noResize="1" noEditPoints="1" noAdjustHandles="1" noChangeArrowheads="1" noChangeShapeType="1" noTextEdit="1"/>
               </p:cNvSpPr>
@@ -8940,7 +9772,7 @@
             </p:nvSpPr>
             <p:spPr>
               <a:xfrm>
-                <a:off x="323528" y="5013176"/>
+                <a:off x="323528" y="3578001"/>
                 <a:ext cx="1334981" cy="369332"/>
               </a:xfrm>
               <a:prstGeom prst="rect">
@@ -8972,13 +9804,13 @@
         <mc:Choice Requires="a14">
           <p:sp>
             <p:nvSpPr>
-              <p:cNvPr id="16" name="15 CuadroTexto"/>
+              <p:cNvPr id="9" name="8 CuadroTexto"/>
               <p:cNvSpPr txBox="1"/>
               <p:nvPr/>
             </p:nvSpPr>
             <p:spPr>
               <a:xfrm>
-                <a:off x="323528" y="5382508"/>
+                <a:off x="323528" y="3947333"/>
                 <a:ext cx="1508105" cy="369332"/>
               </a:xfrm>
               <a:prstGeom prst="rect">
@@ -9078,7 +9910,7 @@
         <mc:Fallback xmlns="">
           <p:sp>
             <p:nvSpPr>
-              <p:cNvPr id="16" name="15 CuadroTexto"/>
+              <p:cNvPr id="9" name="8 CuadroTexto"/>
               <p:cNvSpPr txBox="1">
                 <a:spLocks noRot="1" noChangeAspect="1" noMove="1" noResize="1" noEditPoints="1" noAdjustHandles="1" noChangeArrowheads="1" noChangeShapeType="1" noTextEdit="1"/>
               </p:cNvSpPr>
@@ -9086,7 +9918,7 @@
             </p:nvSpPr>
             <p:spPr>
               <a:xfrm>
-                <a:off x="323528" y="5382508"/>
+                <a:off x="323528" y="3947333"/>
                 <a:ext cx="1508105" cy="369332"/>
               </a:xfrm>
               <a:prstGeom prst="rect">
@@ -9095,7 +9927,7 @@
               <a:blipFill rotWithShape="1">
                 <a:blip r:embed="rId5"/>
                 <a:stretch>
-                  <a:fillRect t="-119672" r="-31579" b="-183607"/>
+                  <a:fillRect t="-121667" r="-31579" b="-188333"/>
                 </a:stretch>
               </a:blipFill>
             </p:spPr>
@@ -9118,13 +9950,13 @@
         <mc:Choice Requires="a14">
           <p:sp>
             <p:nvSpPr>
-              <p:cNvPr id="17" name="16 CuadroTexto"/>
+              <p:cNvPr id="10" name="9 CuadroTexto"/>
               <p:cNvSpPr txBox="1"/>
               <p:nvPr/>
             </p:nvSpPr>
             <p:spPr>
               <a:xfrm>
-                <a:off x="1980620" y="5013176"/>
+                <a:off x="1980620" y="3578001"/>
                 <a:ext cx="1263551" cy="369332"/>
               </a:xfrm>
               <a:prstGeom prst="rect">
@@ -9218,7 +10050,7 @@
         <mc:Fallback xmlns="">
           <p:sp>
             <p:nvSpPr>
-              <p:cNvPr id="17" name="16 CuadroTexto"/>
+              <p:cNvPr id="10" name="9 CuadroTexto"/>
               <p:cNvSpPr txBox="1">
                 <a:spLocks noRot="1" noChangeAspect="1" noMove="1" noResize="1" noEditPoints="1" noAdjustHandles="1" noChangeArrowheads="1" noChangeShapeType="1" noTextEdit="1"/>
               </p:cNvSpPr>
@@ -9226,7 +10058,7 @@
             </p:nvSpPr>
             <p:spPr>
               <a:xfrm>
-                <a:off x="1980620" y="5013176"/>
+                <a:off x="1980620" y="3578001"/>
                 <a:ext cx="1263551" cy="369332"/>
               </a:xfrm>
               <a:prstGeom prst="rect">
@@ -9258,13 +10090,13 @@
         <mc:Choice Requires="a14">
           <p:sp>
             <p:nvSpPr>
-              <p:cNvPr id="18" name="17 CuadroTexto"/>
+              <p:cNvPr id="11" name="10 CuadroTexto"/>
               <p:cNvSpPr txBox="1"/>
               <p:nvPr/>
             </p:nvSpPr>
             <p:spPr>
               <a:xfrm>
-                <a:off x="1980620" y="5382508"/>
+                <a:off x="1980620" y="3947333"/>
                 <a:ext cx="1423851" cy="369332"/>
               </a:xfrm>
               <a:prstGeom prst="rect">
@@ -9358,7 +10190,7 @@
         <mc:Fallback xmlns="">
           <p:sp>
             <p:nvSpPr>
-              <p:cNvPr id="18" name="17 CuadroTexto"/>
+              <p:cNvPr id="11" name="10 CuadroTexto"/>
               <p:cNvSpPr txBox="1">
                 <a:spLocks noRot="1" noChangeAspect="1" noMove="1" noResize="1" noEditPoints="1" noAdjustHandles="1" noChangeArrowheads="1" noChangeShapeType="1" noTextEdit="1"/>
               </p:cNvSpPr>
@@ -9366,7 +10198,7 @@
             </p:nvSpPr>
             <p:spPr>
               <a:xfrm>
-                <a:off x="1980620" y="5382508"/>
+                <a:off x="1980620" y="3947333"/>
                 <a:ext cx="1423851" cy="369332"/>
               </a:xfrm>
               <a:prstGeom prst="rect">
@@ -9375,7 +10207,7 @@
               <a:blipFill rotWithShape="1">
                 <a:blip r:embed="rId7"/>
                 <a:stretch>
-                  <a:fillRect t="-119672" r="-33047" b="-183607"/>
+                  <a:fillRect t="-121667" r="-33047" b="-188333"/>
                 </a:stretch>
               </a:blipFill>
             </p:spPr>
@@ -9396,13 +10228,13 @@
       </mc:AlternateContent>
       <p:sp>
         <p:nvSpPr>
-          <p:cNvPr id="21" name="20 CuadroTexto"/>
+          <p:cNvPr id="12" name="11 CuadroTexto"/>
           <p:cNvSpPr txBox="1"/>
           <p:nvPr/>
         </p:nvSpPr>
         <p:spPr>
           <a:xfrm>
-            <a:off x="901404" y="3573016"/>
+            <a:off x="901404" y="2137841"/>
             <a:ext cx="1860766" cy="400110"/>
           </a:xfrm>
           <a:prstGeom prst="rect">
@@ -9426,13 +10258,13 @@
       </p:sp>
       <p:sp>
         <p:nvSpPr>
-          <p:cNvPr id="22" name="21 CuadroTexto"/>
+          <p:cNvPr id="13" name="12 CuadroTexto"/>
           <p:cNvSpPr txBox="1"/>
           <p:nvPr/>
         </p:nvSpPr>
         <p:spPr>
           <a:xfrm>
-            <a:off x="3635896" y="3568031"/>
+            <a:off x="3635896" y="2132856"/>
             <a:ext cx="1773306" cy="400110"/>
           </a:xfrm>
           <a:prstGeom prst="rect">
@@ -9458,13 +10290,13 @@
         <mc:Choice Requires="a14">
           <p:sp>
             <p:nvSpPr>
-              <p:cNvPr id="23" name="22 CuadroTexto"/>
+              <p:cNvPr id="14" name="13 CuadroTexto"/>
               <p:cNvSpPr txBox="1"/>
               <p:nvPr/>
             </p:nvSpPr>
             <p:spPr>
               <a:xfrm>
-                <a:off x="3635897" y="4068159"/>
+                <a:off x="3635897" y="2632984"/>
                 <a:ext cx="1594347" cy="369332"/>
               </a:xfrm>
               <a:prstGeom prst="rect">
@@ -9572,7 +10404,7 @@
         <mc:Fallback xmlns="">
           <p:sp>
             <p:nvSpPr>
-              <p:cNvPr id="23" name="22 CuadroTexto"/>
+              <p:cNvPr id="14" name="13 CuadroTexto"/>
               <p:cNvSpPr txBox="1">
                 <a:spLocks noRot="1" noChangeAspect="1" noMove="1" noResize="1" noEditPoints="1" noAdjustHandles="1" noChangeArrowheads="1" noChangeShapeType="1" noTextEdit="1"/>
               </p:cNvSpPr>
@@ -9580,7 +10412,7 @@
             </p:nvSpPr>
             <p:spPr>
               <a:xfrm>
-                <a:off x="3635897" y="4068159"/>
+                <a:off x="3635897" y="2632984"/>
                 <a:ext cx="1594347" cy="369332"/>
               </a:xfrm>
               <a:prstGeom prst="rect">
@@ -9612,13 +10444,13 @@
         <mc:Choice Requires="a14">
           <p:sp>
             <p:nvSpPr>
-              <p:cNvPr id="24" name="23 CuadroTexto"/>
+              <p:cNvPr id="15" name="14 CuadroTexto"/>
               <p:cNvSpPr txBox="1"/>
               <p:nvPr/>
             </p:nvSpPr>
             <p:spPr>
               <a:xfrm>
-                <a:off x="3635896" y="4437491"/>
+                <a:off x="3635896" y="3002316"/>
                 <a:ext cx="1906676" cy="378245"/>
               </a:xfrm>
               <a:prstGeom prst="rect">
@@ -9758,7 +10590,7 @@
         <mc:Fallback xmlns="">
           <p:sp>
             <p:nvSpPr>
-              <p:cNvPr id="24" name="23 CuadroTexto"/>
+              <p:cNvPr id="15" name="14 CuadroTexto"/>
               <p:cNvSpPr txBox="1">
                 <a:spLocks noRot="1" noChangeAspect="1" noMove="1" noResize="1" noEditPoints="1" noAdjustHandles="1" noChangeArrowheads="1" noChangeShapeType="1" noTextEdit="1"/>
               </p:cNvSpPr>
@@ -9766,7 +10598,7 @@
             </p:nvSpPr>
             <p:spPr>
               <a:xfrm>
-                <a:off x="3635896" y="4437491"/>
+                <a:off x="3635896" y="3002316"/>
                 <a:ext cx="1906676" cy="378245"/>
               </a:xfrm>
               <a:prstGeom prst="rect">
@@ -9796,13 +10628,13 @@
       </mc:AlternateContent>
       <p:sp>
         <p:nvSpPr>
-          <p:cNvPr id="25" name="24 CuadroTexto"/>
+          <p:cNvPr id="16" name="15 CuadroTexto"/>
           <p:cNvSpPr txBox="1"/>
           <p:nvPr/>
         </p:nvSpPr>
         <p:spPr>
           <a:xfrm>
-            <a:off x="6084168" y="3573016"/>
+            <a:off x="6084168" y="2137841"/>
             <a:ext cx="2351606" cy="400110"/>
           </a:xfrm>
           <a:prstGeom prst="rect">
@@ -9832,13 +10664,13 @@
         <mc:Choice Requires="a14">
           <p:sp>
             <p:nvSpPr>
-              <p:cNvPr id="26" name="25 CuadroTexto"/>
+              <p:cNvPr id="17" name="16 CuadroTexto"/>
               <p:cNvSpPr txBox="1"/>
               <p:nvPr/>
             </p:nvSpPr>
             <p:spPr>
               <a:xfrm>
-                <a:off x="6084168" y="4151130"/>
+                <a:off x="6084168" y="2715955"/>
                 <a:ext cx="2481128" cy="664606"/>
               </a:xfrm>
               <a:prstGeom prst="rect">
@@ -10039,7 +10871,7 @@
         <mc:Fallback xmlns="">
           <p:sp>
             <p:nvSpPr>
-              <p:cNvPr id="26" name="25 CuadroTexto"/>
+              <p:cNvPr id="17" name="16 CuadroTexto"/>
               <p:cNvSpPr txBox="1">
                 <a:spLocks noRot="1" noChangeAspect="1" noMove="1" noResize="1" noEditPoints="1" noAdjustHandles="1" noChangeArrowheads="1" noChangeShapeType="1" noTextEdit="1"/>
               </p:cNvSpPr>
@@ -10047,7 +10879,7 @@
             </p:nvSpPr>
             <p:spPr>
               <a:xfrm>
-                <a:off x="6084168" y="4151130"/>
+                <a:off x="6084168" y="2715955"/>
                 <a:ext cx="2481128" cy="664606"/>
               </a:xfrm>
               <a:prstGeom prst="rect">
@@ -10079,13 +10911,13 @@
         <mc:Choice Requires="a14">
           <p:sp>
             <p:nvSpPr>
-              <p:cNvPr id="27" name="26 CuadroTexto"/>
+              <p:cNvPr id="18" name="17 CuadroTexto"/>
               <p:cNvSpPr txBox="1"/>
               <p:nvPr/>
             </p:nvSpPr>
             <p:spPr>
               <a:xfrm>
-                <a:off x="6084168" y="5104204"/>
+                <a:off x="6084168" y="3669029"/>
                 <a:ext cx="2481127" cy="664606"/>
               </a:xfrm>
               <a:prstGeom prst="rect">
@@ -10280,7 +11112,7 @@
         <mc:Fallback xmlns="">
           <p:sp>
             <p:nvSpPr>
-              <p:cNvPr id="27" name="26 CuadroTexto"/>
+              <p:cNvPr id="18" name="17 CuadroTexto"/>
               <p:cNvSpPr txBox="1">
                 <a:spLocks noRot="1" noChangeAspect="1" noMove="1" noResize="1" noEditPoints="1" noAdjustHandles="1" noChangeArrowheads="1" noChangeShapeType="1" noTextEdit="1"/>
               </p:cNvSpPr>
@@ -10288,7 +11120,7 @@
             </p:nvSpPr>
             <p:spPr>
               <a:xfrm>
-                <a:off x="6084168" y="5104204"/>
+                <a:off x="6084168" y="3669029"/>
                 <a:ext cx="2481127" cy="664606"/>
               </a:xfrm>
               <a:prstGeom prst="rect">
@@ -10316,27 +11148,469 @@
           </p:sp>
         </mc:Fallback>
       </mc:AlternateContent>
+      <mc:AlternateContent xmlns:mc="http://schemas.openxmlformats.org/markup-compatibility/2006">
+        <mc:Choice xmlns:a14="http://schemas.microsoft.com/office/drawing/2010/main" Requires="a14">
+          <p:sp>
+            <p:nvSpPr>
+              <p:cNvPr id="19" name="18 CuadroTexto"/>
+              <p:cNvSpPr txBox="1"/>
+              <p:nvPr/>
+            </p:nvSpPr>
+            <p:spPr>
+              <a:xfrm>
+                <a:off x="1456870" y="5525451"/>
+                <a:ext cx="5952399" cy="783869"/>
+              </a:xfrm>
+              <a:prstGeom prst="rect">
+                <a:avLst/>
+              </a:prstGeom>
+              <a:noFill/>
+            </p:spPr>
+            <p:txBody>
+              <a:bodyPr wrap="none" rtlCol="0">
+                <a:spAutoFit/>
+              </a:bodyPr>
+              <a:lstStyle/>
+              <a:p>
+                <a:pPr/>
+                <a14:m>
+                  <m:oMathPara xmlns:m="http://schemas.openxmlformats.org/officeDocument/2006/math">
+                    <m:oMathParaPr>
+                      <m:jc m:val="centerGroup"/>
+                    </m:oMathParaPr>
+                    <m:oMath xmlns:m="http://schemas.openxmlformats.org/officeDocument/2006/math">
+                      <m:r>
+                        <a:rPr lang="es-ES" sz="2000" b="0" i="1" smtClean="0">
+                          <a:latin typeface="Cambria Math"/>
+                        </a:rPr>
+                        <m:t>𝑋</m:t>
+                      </m:r>
+                      <m:d>
+                        <m:dPr>
+                          <m:ctrlPr>
+                            <a:rPr lang="es-ES" sz="2000" b="0" i="1" smtClean="0">
+                              <a:latin typeface="Cambria Math"/>
+                            </a:rPr>
+                          </m:ctrlPr>
+                        </m:dPr>
+                        <m:e>
+                          <m:r>
+                            <a:rPr lang="es-ES" sz="2000" b="0" i="1" smtClean="0">
+                              <a:latin typeface="Cambria Math"/>
+                            </a:rPr>
+                            <m:t>𝐻</m:t>
+                          </m:r>
+                          <m:d>
+                            <m:dPr>
+                              <m:begChr m:val=""/>
+                              <m:endChr m:val="⟩"/>
+                              <m:ctrlPr>
+                                <a:rPr lang="es-ES" sz="2000" i="1">
+                                  <a:latin typeface="Cambria Math"/>
+                                </a:rPr>
+                              </m:ctrlPr>
+                            </m:dPr>
+                            <m:e>
+                              <m:r>
+                                <a:rPr lang="es-ES" sz="2000" b="0" i="1" smtClean="0">
+                                  <a:latin typeface="Cambria Math"/>
+                                </a:rPr>
+                                <m:t>|1</m:t>
+                              </m:r>
+                            </m:e>
+                          </m:d>
+                        </m:e>
+                      </m:d>
+                      <m:r>
+                        <a:rPr lang="es-ES" sz="2000" b="0" i="1" smtClean="0">
+                          <a:latin typeface="Cambria Math"/>
+                        </a:rPr>
+                        <m:t>=</m:t>
+                      </m:r>
+                      <m:r>
+                        <a:rPr lang="es-ES" sz="2000" b="0" i="1" smtClean="0">
+                          <a:latin typeface="Cambria Math"/>
+                        </a:rPr>
+                        <m:t>𝑋</m:t>
+                      </m:r>
+                      <m:d>
+                        <m:dPr>
+                          <m:ctrlPr>
+                            <a:rPr lang="es-ES" sz="2000" i="1" smtClean="0">
+                              <a:latin typeface="Cambria Math"/>
+                            </a:rPr>
+                          </m:ctrlPr>
+                        </m:dPr>
+                        <m:e>
+                          <m:f>
+                            <m:fPr>
+                              <m:ctrlPr>
+                                <a:rPr lang="es-ES" sz="2000" i="1">
+                                  <a:latin typeface="Cambria Math"/>
+                                </a:rPr>
+                              </m:ctrlPr>
+                            </m:fPr>
+                            <m:num>
+                              <m:r>
+                                <a:rPr lang="es-ES" sz="2000" i="1">
+                                  <a:latin typeface="Cambria Math"/>
+                                </a:rPr>
+                                <m:t>1</m:t>
+                              </m:r>
+                            </m:num>
+                            <m:den>
+                              <m:rad>
+                                <m:radPr>
+                                  <m:degHide m:val="on"/>
+                                  <m:ctrlPr>
+                                    <a:rPr lang="es-ES" sz="2000" i="1">
+                                      <a:latin typeface="Cambria Math"/>
+                                    </a:rPr>
+                                  </m:ctrlPr>
+                                </m:radPr>
+                                <m:deg/>
+                                <m:e>
+                                  <m:r>
+                                    <a:rPr lang="es-ES" sz="2000" i="1">
+                                      <a:latin typeface="Cambria Math"/>
+                                    </a:rPr>
+                                    <m:t>2</m:t>
+                                  </m:r>
+                                </m:e>
+                              </m:rad>
+                            </m:den>
+                          </m:f>
+                          <m:d>
+                            <m:dPr>
+                              <m:begChr m:val=""/>
+                              <m:endChr m:val="⟩"/>
+                              <m:ctrlPr>
+                                <a:rPr lang="es-ES" sz="2000" i="1">
+                                  <a:latin typeface="Cambria Math"/>
+                                </a:rPr>
+                              </m:ctrlPr>
+                            </m:dPr>
+                            <m:e>
+                              <m:r>
+                                <a:rPr lang="es-ES" sz="2000" b="0" i="1" smtClean="0">
+                                  <a:latin typeface="Cambria Math"/>
+                                </a:rPr>
+                                <m:t>|</m:t>
+                              </m:r>
+                              <m:r>
+                                <a:rPr lang="es-ES" sz="2000" i="1">
+                                  <a:latin typeface="Cambria Math"/>
+                                </a:rPr>
+                                <m:t>0</m:t>
+                              </m:r>
+                            </m:e>
+                          </m:d>
+                          <m:r>
+                            <a:rPr lang="es-ES" sz="2000" i="1">
+                              <a:latin typeface="Cambria Math"/>
+                            </a:rPr>
+                            <m:t>−</m:t>
+                          </m:r>
+                          <m:f>
+                            <m:fPr>
+                              <m:ctrlPr>
+                                <a:rPr lang="es-ES" sz="2000" i="1">
+                                  <a:latin typeface="Cambria Math"/>
+                                </a:rPr>
+                              </m:ctrlPr>
+                            </m:fPr>
+                            <m:num>
+                              <m:r>
+                                <a:rPr lang="es-ES" sz="2000" i="1">
+                                  <a:latin typeface="Cambria Math"/>
+                                </a:rPr>
+                                <m:t>1</m:t>
+                              </m:r>
+                            </m:num>
+                            <m:den>
+                              <m:rad>
+                                <m:radPr>
+                                  <m:degHide m:val="on"/>
+                                  <m:ctrlPr>
+                                    <a:rPr lang="es-ES" sz="2000" i="1">
+                                      <a:latin typeface="Cambria Math"/>
+                                    </a:rPr>
+                                  </m:ctrlPr>
+                                </m:radPr>
+                                <m:deg/>
+                                <m:e>
+                                  <m:r>
+                                    <a:rPr lang="es-ES" sz="2000" i="1">
+                                      <a:latin typeface="Cambria Math"/>
+                                    </a:rPr>
+                                    <m:t>2</m:t>
+                                  </m:r>
+                                </m:e>
+                              </m:rad>
+                            </m:den>
+                          </m:f>
+                          <m:r>
+                            <a:rPr lang="es-ES" sz="2000">
+                              <a:latin typeface="Cambria Math"/>
+                            </a:rPr>
+                            <m:t>|</m:t>
+                          </m:r>
+                          <m:d>
+                            <m:dPr>
+                              <m:begChr m:val=""/>
+                              <m:endChr m:val="⟩"/>
+                              <m:ctrlPr>
+                                <a:rPr lang="es-ES" sz="2000" i="1">
+                                  <a:latin typeface="Cambria Math"/>
+                                </a:rPr>
+                              </m:ctrlPr>
+                            </m:dPr>
+                            <m:e>
+                              <m:r>
+                                <a:rPr lang="es-ES" sz="2000" i="1">
+                                  <a:latin typeface="Cambria Math"/>
+                                </a:rPr>
+                                <m:t>1</m:t>
+                              </m:r>
+                            </m:e>
+                          </m:d>
+                        </m:e>
+                      </m:d>
+                      <m:r>
+                        <a:rPr lang="es-ES" sz="2000" b="0" i="1" smtClean="0">
+                          <a:latin typeface="Cambria Math"/>
+                        </a:rPr>
+                        <m:t>=</m:t>
+                      </m:r>
+                      <m:f>
+                        <m:fPr>
+                          <m:ctrlPr>
+                            <a:rPr lang="es-ES" sz="2000" i="1">
+                              <a:latin typeface="Cambria Math"/>
+                            </a:rPr>
+                          </m:ctrlPr>
+                        </m:fPr>
+                        <m:num>
+                          <m:r>
+                            <a:rPr lang="es-ES" sz="2000" i="1">
+                              <a:latin typeface="Cambria Math"/>
+                            </a:rPr>
+                            <m:t>1</m:t>
+                          </m:r>
+                        </m:num>
+                        <m:den>
+                          <m:rad>
+                            <m:radPr>
+                              <m:degHide m:val="on"/>
+                              <m:ctrlPr>
+                                <a:rPr lang="es-ES" sz="2000" i="1">
+                                  <a:latin typeface="Cambria Math"/>
+                                </a:rPr>
+                              </m:ctrlPr>
+                            </m:radPr>
+                            <m:deg/>
+                            <m:e>
+                              <m:r>
+                                <a:rPr lang="es-ES" sz="2000" i="1">
+                                  <a:latin typeface="Cambria Math"/>
+                                </a:rPr>
+                                <m:t>2</m:t>
+                              </m:r>
+                            </m:e>
+                          </m:rad>
+                        </m:den>
+                      </m:f>
+                      <m:d>
+                        <m:dPr>
+                          <m:begChr m:val=""/>
+                          <m:endChr m:val="⟩"/>
+                          <m:ctrlPr>
+                            <a:rPr lang="es-ES" sz="2000" i="1">
+                              <a:latin typeface="Cambria Math"/>
+                            </a:rPr>
+                          </m:ctrlPr>
+                        </m:dPr>
+                        <m:e>
+                          <m:r>
+                            <a:rPr lang="es-ES" sz="2000" b="0" i="1" smtClean="0">
+                              <a:latin typeface="Cambria Math"/>
+                            </a:rPr>
+                            <m:t>𝑋</m:t>
+                          </m:r>
+                          <m:r>
+                            <a:rPr lang="es-ES" sz="2000" b="0" i="1" smtClean="0">
+                              <a:latin typeface="Cambria Math"/>
+                            </a:rPr>
+                            <m:t>|0</m:t>
+                          </m:r>
+                        </m:e>
+                      </m:d>
+                      <m:r>
+                        <a:rPr lang="es-ES" sz="2000" i="1">
+                          <a:latin typeface="Cambria Math"/>
+                        </a:rPr>
+                        <m:t>−</m:t>
+                      </m:r>
+                      <m:f>
+                        <m:fPr>
+                          <m:ctrlPr>
+                            <a:rPr lang="es-ES" sz="2000" i="1">
+                              <a:latin typeface="Cambria Math"/>
+                            </a:rPr>
+                          </m:ctrlPr>
+                        </m:fPr>
+                        <m:num>
+                          <m:r>
+                            <a:rPr lang="es-ES" sz="2000" i="1">
+                              <a:latin typeface="Cambria Math"/>
+                            </a:rPr>
+                            <m:t>1</m:t>
+                          </m:r>
+                        </m:num>
+                        <m:den>
+                          <m:rad>
+                            <m:radPr>
+                              <m:degHide m:val="on"/>
+                              <m:ctrlPr>
+                                <a:rPr lang="es-ES" sz="2000" i="1">
+                                  <a:latin typeface="Cambria Math"/>
+                                </a:rPr>
+                              </m:ctrlPr>
+                            </m:radPr>
+                            <m:deg/>
+                            <m:e>
+                              <m:r>
+                                <a:rPr lang="es-ES" sz="2000" i="1">
+                                  <a:latin typeface="Cambria Math"/>
+                                </a:rPr>
+                                <m:t>2</m:t>
+                              </m:r>
+                            </m:e>
+                          </m:rad>
+                        </m:den>
+                      </m:f>
+                      <m:r>
+                        <a:rPr lang="es-ES" sz="2000" b="0" i="1" smtClean="0">
+                          <a:latin typeface="Cambria Math"/>
+                        </a:rPr>
+                        <m:t>𝑋</m:t>
+                      </m:r>
+                      <m:r>
+                        <a:rPr lang="es-ES" sz="2000">
+                          <a:latin typeface="Cambria Math"/>
+                        </a:rPr>
+                        <m:t>|</m:t>
+                      </m:r>
+                      <m:d>
+                        <m:dPr>
+                          <m:begChr m:val=""/>
+                          <m:endChr m:val="⟩"/>
+                          <m:ctrlPr>
+                            <a:rPr lang="es-ES" sz="2000" i="1">
+                              <a:latin typeface="Cambria Math"/>
+                            </a:rPr>
+                          </m:ctrlPr>
+                        </m:dPr>
+                        <m:e>
+                          <m:r>
+                            <a:rPr lang="es-ES" sz="2000" i="1">
+                              <a:latin typeface="Cambria Math"/>
+                            </a:rPr>
+                            <m:t>1</m:t>
+                          </m:r>
+                        </m:e>
+                      </m:d>
+                    </m:oMath>
+                  </m:oMathPara>
+                </a14:m>
+                <a:endParaRPr lang="es-ES" sz="2000" dirty="0"/>
+              </a:p>
+            </p:txBody>
+          </p:sp>
+        </mc:Choice>
+        <mc:Fallback>
+          <p:sp>
+            <p:nvSpPr>
+              <p:cNvPr id="19" name="18 CuadroTexto"/>
+              <p:cNvSpPr txBox="1">
+                <a:spLocks noRot="1" noChangeAspect="1" noMove="1" noResize="1" noEditPoints="1" noAdjustHandles="1" noChangeArrowheads="1" noChangeShapeType="1" noTextEdit="1"/>
+              </p:cNvSpPr>
+              <p:nvPr/>
+            </p:nvSpPr>
+            <p:spPr>
+              <a:xfrm>
+                <a:off x="1456870" y="5525451"/>
+                <a:ext cx="5952399" cy="783869"/>
+              </a:xfrm>
+              <a:prstGeom prst="rect">
+                <a:avLst/>
+              </a:prstGeom>
+              <a:blipFill rotWithShape="1">
+                <a:blip r:embed="rId12"/>
+                <a:stretch>
+                  <a:fillRect/>
+                </a:stretch>
+              </a:blipFill>
+            </p:spPr>
+            <p:txBody>
+              <a:bodyPr/>
+              <a:lstStyle/>
+              <a:p>
+                <a:r>
+                  <a:rPr lang="es-ES">
+                    <a:noFill/>
+                  </a:rPr>
+                  <a:t> </a:t>
+                </a:r>
+              </a:p>
+            </p:txBody>
+          </p:sp>
+        </mc:Fallback>
+      </mc:AlternateContent>
+      <p:sp>
+        <p:nvSpPr>
+          <p:cNvPr id="20" name="19 CuadroTexto"/>
+          <p:cNvSpPr txBox="1"/>
+          <p:nvPr/>
+        </p:nvSpPr>
+        <p:spPr>
+          <a:xfrm>
+            <a:off x="3151478" y="4854351"/>
+            <a:ext cx="2820516" cy="461665"/>
+          </a:xfrm>
+          <a:prstGeom prst="rect">
+            <a:avLst/>
+          </a:prstGeom>
+          <a:noFill/>
+        </p:spPr>
+        <p:txBody>
+          <a:bodyPr wrap="none" rtlCol="0">
+            <a:spAutoFit/>
+          </a:bodyPr>
+          <a:lstStyle/>
+          <a:p>
+            <a:r>
+              <a:rPr lang="es-ES" sz="2400" b="1" dirty="0" smtClean="0"/>
+              <a:t>Paralelismo cuántico</a:t>
+            </a:r>
+            <a:endParaRPr lang="es-ES" sz="2400" b="1" dirty="0"/>
+          </a:p>
+        </p:txBody>
+      </p:sp>
     </p:spTree>
     <p:extLst>
       <p:ext uri="{BB962C8B-B14F-4D97-AF65-F5344CB8AC3E}">
-        <p14:creationId xmlns:p14="http://schemas.microsoft.com/office/powerpoint/2010/main" val="1227579415"/>
+        <p14:creationId xmlns:p14="http://schemas.microsoft.com/office/powerpoint/2010/main" val="4243969720"/>
       </p:ext>
     </p:extLst>
   </p:cSld>
   <p:clrMapOvr>
     <a:masterClrMapping/>
   </p:clrMapOvr>
-  <p:timing>
-    <p:tnLst>
-      <p:par>
-        <p:cTn id="1" dur="indefinite" restart="never" nodeType="tmRoot"/>
-      </p:par>
-    </p:tnLst>
-  </p:timing>
 </p:sld>
 </file>
 
-<file path=ppt/slides/slide14.xml><?xml version="1.0" encoding="utf-8"?>
+<file path=ppt/slides/slide15.xml><?xml version="1.0" encoding="utf-8"?>
 <p:sld xmlns:a="http://schemas.openxmlformats.org/drawingml/2006/main" xmlns:r="http://schemas.openxmlformats.org/officeDocument/2006/relationships" xmlns:p="http://schemas.openxmlformats.org/presentationml/2006/main">
   <p:cSld>
     <p:spTree>
@@ -11992,7 +13266,7 @@
 </p:sld>
 </file>
 
-<file path=ppt/slides/slide15.xml><?xml version="1.0" encoding="utf-8"?>
+<file path=ppt/slides/slide16.xml><?xml version="1.0" encoding="utf-8"?>
 <p:sld xmlns:a="http://schemas.openxmlformats.org/drawingml/2006/main" xmlns:r="http://schemas.openxmlformats.org/officeDocument/2006/relationships" xmlns:p="http://schemas.openxmlformats.org/presentationml/2006/main">
   <p:cSld>
     <p:spTree>
@@ -13665,7 +14939,7 @@
 </p:sld>
 </file>
 
-<file path=ppt/slides/slide16.xml><?xml version="1.0" encoding="utf-8"?>
+<file path=ppt/slides/slide17.xml><?xml version="1.0" encoding="utf-8"?>
 <p:sld xmlns:a="http://schemas.openxmlformats.org/drawingml/2006/main" xmlns:r="http://schemas.openxmlformats.org/officeDocument/2006/relationships" xmlns:p="http://schemas.openxmlformats.org/presentationml/2006/main">
   <p:cSld>
     <p:spTree>
@@ -16641,7 +17915,7 @@
 </p:sld>
 </file>
 
-<file path=ppt/slides/slide17.xml><?xml version="1.0" encoding="utf-8"?>
+<file path=ppt/slides/slide18.xml><?xml version="1.0" encoding="utf-8"?>
 <p:sld xmlns:a="http://schemas.openxmlformats.org/drawingml/2006/main" xmlns:r="http://schemas.openxmlformats.org/officeDocument/2006/relationships" xmlns:p="http://schemas.openxmlformats.org/presentationml/2006/main">
   <p:cSld>
     <p:spTree>
@@ -16658,6 +17932,44 @@
           <a:chExt cx="0" cy="0"/>
         </a:xfrm>
       </p:grpSpPr>
+      <p:sp>
+        <p:nvSpPr>
+          <p:cNvPr id="2" name="1 CuadroTexto"/>
+          <p:cNvSpPr txBox="1"/>
+          <p:nvPr/>
+        </p:nvSpPr>
+        <p:spPr>
+          <a:xfrm>
+            <a:off x="3245651" y="1124744"/>
+            <a:ext cx="2685352" cy="1446550"/>
+          </a:xfrm>
+          <a:prstGeom prst="rect">
+            <a:avLst/>
+          </a:prstGeom>
+          <a:noFill/>
+        </p:spPr>
+        <p:txBody>
+          <a:bodyPr wrap="none" rtlCol="0">
+            <a:spAutoFit/>
+          </a:bodyPr>
+          <a:lstStyle/>
+          <a:p>
+            <a:pPr algn="ctr"/>
+            <a:r>
+              <a:rPr lang="es-ES" sz="4400" dirty="0" smtClean="0"/>
+              <a:t>3</a:t>
+            </a:r>
+          </a:p>
+          <a:p>
+            <a:pPr algn="ctr"/>
+            <a:r>
+              <a:rPr lang="es-ES" sz="4400" dirty="0" smtClean="0"/>
+              <a:t>Simulación</a:t>
+            </a:r>
+            <a:endParaRPr lang="es-ES" sz="4400" dirty="0"/>
+          </a:p>
+        </p:txBody>
+      </p:sp>
     </p:spTree>
     <p:extLst>
       <p:ext uri="{BB962C8B-B14F-4D97-AF65-F5344CB8AC3E}">
@@ -16675,6 +17987,496 @@
       </p:par>
     </p:tnLst>
   </p:timing>
+</p:sld>
+</file>
+
+<file path=ppt/slides/slide19.xml><?xml version="1.0" encoding="utf-8"?>
+<p:sld xmlns:a="http://schemas.openxmlformats.org/drawingml/2006/main" xmlns:r="http://schemas.openxmlformats.org/officeDocument/2006/relationships" xmlns:p="http://schemas.openxmlformats.org/presentationml/2006/main">
+  <p:cSld>
+    <p:spTree>
+      <p:nvGrpSpPr>
+        <p:cNvPr id="1" name=""/>
+        <p:cNvGrpSpPr/>
+        <p:nvPr/>
+      </p:nvGrpSpPr>
+      <p:grpSpPr>
+        <a:xfrm>
+          <a:off x="0" y="0"/>
+          <a:ext cx="0" cy="0"/>
+          <a:chOff x="0" y="0"/>
+          <a:chExt cx="0" cy="0"/>
+        </a:xfrm>
+      </p:grpSpPr>
+      <p:sp>
+        <p:nvSpPr>
+          <p:cNvPr id="9" name="8 Rectángulo"/>
+          <p:cNvSpPr/>
+          <p:nvPr/>
+        </p:nvSpPr>
+        <p:spPr>
+          <a:xfrm>
+            <a:off x="4572000" y="2420888"/>
+            <a:ext cx="4320480" cy="3672408"/>
+          </a:xfrm>
+          <a:prstGeom prst="rect">
+            <a:avLst/>
+          </a:prstGeom>
+          <a:noFill/>
+          <a:ln>
+            <a:solidFill>
+              <a:schemeClr val="tx1"/>
+            </a:solidFill>
+          </a:ln>
+        </p:spPr>
+        <p:style>
+          <a:lnRef idx="2">
+            <a:schemeClr val="dk1">
+              <a:shade val="50000"/>
+            </a:schemeClr>
+          </a:lnRef>
+          <a:fillRef idx="1">
+            <a:schemeClr val="dk1"/>
+          </a:fillRef>
+          <a:effectRef idx="0">
+            <a:schemeClr val="dk1"/>
+          </a:effectRef>
+          <a:fontRef idx="minor">
+            <a:schemeClr val="lt1"/>
+          </a:fontRef>
+        </p:style>
+        <p:txBody>
+          <a:bodyPr rtlCol="0" anchor="ctr"/>
+          <a:lstStyle/>
+          <a:p>
+            <a:pPr algn="ctr"/>
+            <a:endParaRPr lang="es-ES" sz="2400" dirty="0">
+              <a:solidFill>
+                <a:schemeClr val="tx1"/>
+              </a:solidFill>
+            </a:endParaRPr>
+          </a:p>
+        </p:txBody>
+      </p:sp>
+      <p:sp>
+        <p:nvSpPr>
+          <p:cNvPr id="8" name="7 Rectángulo"/>
+          <p:cNvSpPr/>
+          <p:nvPr/>
+        </p:nvSpPr>
+        <p:spPr>
+          <a:xfrm>
+            <a:off x="309577" y="2420888"/>
+            <a:ext cx="4262423" cy="3672408"/>
+          </a:xfrm>
+          <a:prstGeom prst="rect">
+            <a:avLst/>
+          </a:prstGeom>
+          <a:noFill/>
+          <a:ln>
+            <a:solidFill>
+              <a:schemeClr val="tx1"/>
+            </a:solidFill>
+          </a:ln>
+        </p:spPr>
+        <p:style>
+          <a:lnRef idx="2">
+            <a:schemeClr val="dk1">
+              <a:shade val="50000"/>
+            </a:schemeClr>
+          </a:lnRef>
+          <a:fillRef idx="1">
+            <a:schemeClr val="dk1"/>
+          </a:fillRef>
+          <a:effectRef idx="0">
+            <a:schemeClr val="dk1"/>
+          </a:effectRef>
+          <a:fontRef idx="minor">
+            <a:schemeClr val="lt1"/>
+          </a:fontRef>
+        </p:style>
+        <p:txBody>
+          <a:bodyPr rtlCol="0" anchor="ctr"/>
+          <a:lstStyle/>
+          <a:p>
+            <a:pPr algn="ctr"/>
+            <a:endParaRPr lang="es-ES" sz="2400" dirty="0">
+              <a:solidFill>
+                <a:schemeClr val="tx1"/>
+              </a:solidFill>
+            </a:endParaRPr>
+          </a:p>
+        </p:txBody>
+      </p:sp>
+      <p:sp>
+        <p:nvSpPr>
+          <p:cNvPr id="4" name="3 Rectángulo"/>
+          <p:cNvSpPr/>
+          <p:nvPr/>
+        </p:nvSpPr>
+        <p:spPr>
+          <a:xfrm>
+            <a:off x="467544" y="4797152"/>
+            <a:ext cx="5688632" cy="1008112"/>
+          </a:xfrm>
+          <a:prstGeom prst="rect">
+            <a:avLst/>
+          </a:prstGeom>
+          <a:solidFill>
+            <a:schemeClr val="bg1"/>
+          </a:solidFill>
+          <a:ln>
+            <a:solidFill>
+              <a:schemeClr val="tx1"/>
+            </a:solidFill>
+          </a:ln>
+        </p:spPr>
+        <p:style>
+          <a:lnRef idx="2">
+            <a:schemeClr val="dk1">
+              <a:shade val="50000"/>
+            </a:schemeClr>
+          </a:lnRef>
+          <a:fillRef idx="1">
+            <a:schemeClr val="dk1"/>
+          </a:fillRef>
+          <a:effectRef idx="0">
+            <a:schemeClr val="dk1"/>
+          </a:effectRef>
+          <a:fontRef idx="minor">
+            <a:schemeClr val="lt1"/>
+          </a:fontRef>
+        </p:style>
+        <p:txBody>
+          <a:bodyPr rtlCol="0" anchor="ctr"/>
+          <a:lstStyle/>
+          <a:p>
+            <a:pPr algn="ctr"/>
+            <a:r>
+              <a:rPr lang="es-ES" sz="2400" dirty="0" smtClean="0">
+                <a:solidFill>
+                  <a:schemeClr val="tx1"/>
+                </a:solidFill>
+              </a:rPr>
+              <a:t>Simulación de estados cuánticos</a:t>
+            </a:r>
+            <a:endParaRPr lang="es-ES" sz="2400" dirty="0">
+              <a:solidFill>
+                <a:schemeClr val="tx1"/>
+              </a:solidFill>
+            </a:endParaRPr>
+          </a:p>
+        </p:txBody>
+      </p:sp>
+      <p:sp>
+        <p:nvSpPr>
+          <p:cNvPr id="5" name="4 Rectángulo"/>
+          <p:cNvSpPr/>
+          <p:nvPr/>
+        </p:nvSpPr>
+        <p:spPr>
+          <a:xfrm>
+            <a:off x="6372200" y="4797152"/>
+            <a:ext cx="2304256" cy="1008112"/>
+          </a:xfrm>
+          <a:prstGeom prst="rect">
+            <a:avLst/>
+          </a:prstGeom>
+          <a:solidFill>
+            <a:schemeClr val="bg1"/>
+          </a:solidFill>
+          <a:ln>
+            <a:solidFill>
+              <a:schemeClr val="tx1"/>
+            </a:solidFill>
+          </a:ln>
+        </p:spPr>
+        <p:style>
+          <a:lnRef idx="2">
+            <a:schemeClr val="dk1">
+              <a:shade val="50000"/>
+            </a:schemeClr>
+          </a:lnRef>
+          <a:fillRef idx="1">
+            <a:schemeClr val="dk1"/>
+          </a:fillRef>
+          <a:effectRef idx="0">
+            <a:schemeClr val="dk1"/>
+          </a:effectRef>
+          <a:fontRef idx="minor">
+            <a:schemeClr val="lt1"/>
+          </a:fontRef>
+        </p:style>
+        <p:txBody>
+          <a:bodyPr rtlCol="0" anchor="ctr"/>
+          <a:lstStyle/>
+          <a:p>
+            <a:pPr algn="ctr"/>
+            <a:r>
+              <a:rPr lang="es-ES" sz="2400" dirty="0" smtClean="0">
+                <a:solidFill>
+                  <a:schemeClr val="tx1"/>
+                </a:solidFill>
+              </a:rPr>
+              <a:t>Simulación de hardware</a:t>
+            </a:r>
+            <a:endParaRPr lang="es-ES" sz="2400" dirty="0">
+              <a:solidFill>
+                <a:schemeClr val="tx1"/>
+              </a:solidFill>
+            </a:endParaRPr>
+          </a:p>
+        </p:txBody>
+      </p:sp>
+      <p:sp>
+        <p:nvSpPr>
+          <p:cNvPr id="6" name="5 Rectángulo"/>
+          <p:cNvSpPr/>
+          <p:nvPr/>
+        </p:nvSpPr>
+        <p:spPr>
+          <a:xfrm>
+            <a:off x="467544" y="3429000"/>
+            <a:ext cx="4032448" cy="1008112"/>
+          </a:xfrm>
+          <a:prstGeom prst="rect">
+            <a:avLst/>
+          </a:prstGeom>
+          <a:solidFill>
+            <a:schemeClr val="bg1"/>
+          </a:solidFill>
+          <a:ln>
+            <a:solidFill>
+              <a:schemeClr val="tx1"/>
+            </a:solidFill>
+          </a:ln>
+        </p:spPr>
+        <p:style>
+          <a:lnRef idx="2">
+            <a:schemeClr val="dk1">
+              <a:shade val="50000"/>
+            </a:schemeClr>
+          </a:lnRef>
+          <a:fillRef idx="1">
+            <a:schemeClr val="dk1"/>
+          </a:fillRef>
+          <a:effectRef idx="0">
+            <a:schemeClr val="dk1"/>
+          </a:effectRef>
+          <a:fontRef idx="minor">
+            <a:schemeClr val="lt1"/>
+          </a:fontRef>
+        </p:style>
+        <p:txBody>
+          <a:bodyPr rtlCol="0" anchor="ctr"/>
+          <a:lstStyle/>
+          <a:p>
+            <a:pPr algn="ctr"/>
+            <a:r>
+              <a:rPr lang="es-ES" sz="2400" dirty="0" smtClean="0">
+                <a:solidFill>
+                  <a:schemeClr val="tx1"/>
+                </a:solidFill>
+              </a:rPr>
+              <a:t>Simulación de circuitos cuánticos</a:t>
+            </a:r>
+            <a:endParaRPr lang="es-ES" sz="2400" dirty="0">
+              <a:solidFill>
+                <a:schemeClr val="tx1"/>
+              </a:solidFill>
+            </a:endParaRPr>
+          </a:p>
+        </p:txBody>
+      </p:sp>
+      <p:sp>
+        <p:nvSpPr>
+          <p:cNvPr id="7" name="6 Rectángulo"/>
+          <p:cNvSpPr/>
+          <p:nvPr/>
+        </p:nvSpPr>
+        <p:spPr>
+          <a:xfrm>
+            <a:off x="4644008" y="3429000"/>
+            <a:ext cx="4032448" cy="1008112"/>
+          </a:xfrm>
+          <a:prstGeom prst="rect">
+            <a:avLst/>
+          </a:prstGeom>
+          <a:solidFill>
+            <a:schemeClr val="bg1"/>
+          </a:solidFill>
+          <a:ln>
+            <a:solidFill>
+              <a:schemeClr val="tx1"/>
+            </a:solidFill>
+          </a:ln>
+        </p:spPr>
+        <p:style>
+          <a:lnRef idx="2">
+            <a:schemeClr val="dk1">
+              <a:shade val="50000"/>
+            </a:schemeClr>
+          </a:lnRef>
+          <a:fillRef idx="1">
+            <a:schemeClr val="dk1"/>
+          </a:fillRef>
+          <a:effectRef idx="0">
+            <a:schemeClr val="dk1"/>
+          </a:effectRef>
+          <a:fontRef idx="minor">
+            <a:schemeClr val="lt1"/>
+          </a:fontRef>
+        </p:style>
+        <p:txBody>
+          <a:bodyPr rtlCol="0" anchor="ctr"/>
+          <a:lstStyle/>
+          <a:p>
+            <a:pPr algn="ctr"/>
+            <a:r>
+              <a:rPr lang="es-ES" sz="2400" dirty="0" smtClean="0">
+                <a:solidFill>
+                  <a:schemeClr val="tx1"/>
+                </a:solidFill>
+              </a:rPr>
+              <a:t>Simulación del procesador cuántico</a:t>
+            </a:r>
+            <a:endParaRPr lang="es-ES" sz="2400" dirty="0">
+              <a:solidFill>
+                <a:schemeClr val="tx1"/>
+              </a:solidFill>
+            </a:endParaRPr>
+          </a:p>
+        </p:txBody>
+      </p:sp>
+      <p:sp>
+        <p:nvSpPr>
+          <p:cNvPr id="10" name="9 CuadroTexto"/>
+          <p:cNvSpPr txBox="1"/>
+          <p:nvPr/>
+        </p:nvSpPr>
+        <p:spPr>
+          <a:xfrm>
+            <a:off x="1752939" y="2651621"/>
+            <a:ext cx="1375698" cy="461665"/>
+          </a:xfrm>
+          <a:prstGeom prst="rect">
+            <a:avLst/>
+          </a:prstGeom>
+          <a:noFill/>
+        </p:spPr>
+        <p:txBody>
+          <a:bodyPr wrap="none" rtlCol="0">
+            <a:spAutoFit/>
+          </a:bodyPr>
+          <a:lstStyle/>
+          <a:p>
+            <a:r>
+              <a:rPr lang="es-ES" sz="2400" b="1" dirty="0" smtClean="0"/>
+              <a:t>Qubit101</a:t>
+            </a:r>
+            <a:endParaRPr lang="es-ES" b="1" dirty="0"/>
+          </a:p>
+        </p:txBody>
+      </p:sp>
+      <p:sp>
+        <p:nvSpPr>
+          <p:cNvPr id="12" name="11 CuadroTexto"/>
+          <p:cNvSpPr txBox="1"/>
+          <p:nvPr/>
+        </p:nvSpPr>
+        <p:spPr>
+          <a:xfrm>
+            <a:off x="6227133" y="2651224"/>
+            <a:ext cx="1010213" cy="461665"/>
+          </a:xfrm>
+          <a:prstGeom prst="rect">
+            <a:avLst/>
+          </a:prstGeom>
+          <a:noFill/>
+        </p:spPr>
+        <p:txBody>
+          <a:bodyPr wrap="none" rtlCol="0">
+            <a:spAutoFit/>
+          </a:bodyPr>
+          <a:lstStyle/>
+          <a:p>
+            <a:r>
+              <a:rPr lang="es-ES" sz="2400" b="1" dirty="0" err="1" smtClean="0"/>
+              <a:t>qMIPS</a:t>
+            </a:r>
+            <a:endParaRPr lang="es-ES" b="1" dirty="0"/>
+          </a:p>
+        </p:txBody>
+      </p:sp>
+      <p:sp>
+        <p:nvSpPr>
+          <p:cNvPr id="13" name="12 CuadroTexto"/>
+          <p:cNvSpPr txBox="1"/>
+          <p:nvPr/>
+        </p:nvSpPr>
+        <p:spPr>
+          <a:xfrm>
+            <a:off x="3335279" y="398910"/>
+            <a:ext cx="2452916" cy="707886"/>
+          </a:xfrm>
+          <a:prstGeom prst="rect">
+            <a:avLst/>
+          </a:prstGeom>
+          <a:noFill/>
+        </p:spPr>
+        <p:txBody>
+          <a:bodyPr wrap="none" rtlCol="0">
+            <a:spAutoFit/>
+          </a:bodyPr>
+          <a:lstStyle/>
+          <a:p>
+            <a:r>
+              <a:rPr lang="es-ES" sz="4000" dirty="0" smtClean="0"/>
+              <a:t>Simulación</a:t>
+            </a:r>
+            <a:endParaRPr lang="es-ES" sz="4000" dirty="0"/>
+          </a:p>
+        </p:txBody>
+      </p:sp>
+      <p:sp>
+        <p:nvSpPr>
+          <p:cNvPr id="14" name="13 CuadroTexto"/>
+          <p:cNvSpPr txBox="1"/>
+          <p:nvPr/>
+        </p:nvSpPr>
+        <p:spPr>
+          <a:xfrm>
+            <a:off x="3288793" y="1106796"/>
+            <a:ext cx="2499402" cy="523220"/>
+          </a:xfrm>
+          <a:prstGeom prst="rect">
+            <a:avLst/>
+          </a:prstGeom>
+          <a:noFill/>
+        </p:spPr>
+        <p:txBody>
+          <a:bodyPr wrap="none" rtlCol="0">
+            <a:spAutoFit/>
+          </a:bodyPr>
+          <a:lstStyle/>
+          <a:p>
+            <a:r>
+              <a:rPr lang="es-ES" sz="2800" i="1" dirty="0" smtClean="0"/>
+              <a:t>Los simuladores</a:t>
+            </a:r>
+            <a:endParaRPr lang="es-ES" sz="2800" i="1" dirty="0"/>
+          </a:p>
+        </p:txBody>
+      </p:sp>
+    </p:spTree>
+    <p:extLst>
+      <p:ext uri="{BB962C8B-B14F-4D97-AF65-F5344CB8AC3E}">
+        <p14:creationId xmlns:p14="http://schemas.microsoft.com/office/powerpoint/2010/main" val="2585783467"/>
+      </p:ext>
+    </p:extLst>
+  </p:cSld>
+  <p:clrMapOvr>
+    <a:masterClrMapping/>
+  </p:clrMapOvr>
 </p:sld>
 </file>
 
@@ -16780,6 +18582,96 @@
       </p:par>
     </p:tnLst>
   </p:timing>
+</p:sld>
+</file>
+
+<file path=ppt/slides/slide20.xml><?xml version="1.0" encoding="utf-8"?>
+<p:sld xmlns:a="http://schemas.openxmlformats.org/drawingml/2006/main" xmlns:r="http://schemas.openxmlformats.org/officeDocument/2006/relationships" xmlns:p="http://schemas.openxmlformats.org/presentationml/2006/main">
+  <p:cSld>
+    <p:spTree>
+      <p:nvGrpSpPr>
+        <p:cNvPr id="1" name=""/>
+        <p:cNvGrpSpPr/>
+        <p:nvPr/>
+      </p:nvGrpSpPr>
+      <p:grpSpPr>
+        <a:xfrm>
+          <a:off x="0" y="0"/>
+          <a:ext cx="0" cy="0"/>
+          <a:chOff x="0" y="0"/>
+          <a:chExt cx="0" cy="0"/>
+        </a:xfrm>
+      </p:grpSpPr>
+      <p:sp>
+        <p:nvSpPr>
+          <p:cNvPr id="4" name="3 CuadroTexto"/>
+          <p:cNvSpPr txBox="1"/>
+          <p:nvPr/>
+        </p:nvSpPr>
+        <p:spPr>
+          <a:xfrm>
+            <a:off x="3335279" y="398910"/>
+            <a:ext cx="2452916" cy="707886"/>
+          </a:xfrm>
+          <a:prstGeom prst="rect">
+            <a:avLst/>
+          </a:prstGeom>
+          <a:noFill/>
+        </p:spPr>
+        <p:txBody>
+          <a:bodyPr wrap="none" rtlCol="0">
+            <a:spAutoFit/>
+          </a:bodyPr>
+          <a:lstStyle/>
+          <a:p>
+            <a:r>
+              <a:rPr lang="es-ES" sz="4000" dirty="0" smtClean="0"/>
+              <a:t>Simulación</a:t>
+            </a:r>
+            <a:endParaRPr lang="es-ES" sz="4000" dirty="0"/>
+          </a:p>
+        </p:txBody>
+      </p:sp>
+      <p:sp>
+        <p:nvSpPr>
+          <p:cNvPr id="5" name="4 CuadroTexto"/>
+          <p:cNvSpPr txBox="1"/>
+          <p:nvPr/>
+        </p:nvSpPr>
+        <p:spPr>
+          <a:xfrm>
+            <a:off x="1431200" y="1106796"/>
+            <a:ext cx="6261073" cy="523220"/>
+          </a:xfrm>
+          <a:prstGeom prst="rect">
+            <a:avLst/>
+          </a:prstGeom>
+          <a:noFill/>
+        </p:spPr>
+        <p:txBody>
+          <a:bodyPr wrap="none" rtlCol="0">
+            <a:spAutoFit/>
+          </a:bodyPr>
+          <a:lstStyle/>
+          <a:p>
+            <a:r>
+              <a:rPr lang="es-ES" sz="2800" i="1" dirty="0" smtClean="0"/>
+              <a:t>Motor de simulación de estados cuánticos</a:t>
+            </a:r>
+            <a:endParaRPr lang="es-ES" sz="2800" i="1" dirty="0"/>
+          </a:p>
+        </p:txBody>
+      </p:sp>
+    </p:spTree>
+    <p:extLst>
+      <p:ext uri="{BB962C8B-B14F-4D97-AF65-F5344CB8AC3E}">
+        <p14:creationId xmlns:p14="http://schemas.microsoft.com/office/powerpoint/2010/main" val="1830164503"/>
+      </p:ext>
+    </p:extLst>
+  </p:cSld>
+  <p:clrMapOvr>
+    <a:masterClrMapping/>
+  </p:clrMapOvr>
 </p:sld>
 </file>
 

</xml_diff>

<commit_message>
Changes in the documentation: added the projects source code. Source cleaned.
</commit_message>
<xml_diff>
--- a/qMIPS/doc/Presentacion PFC.pptx
+++ b/qMIPS/doc/Presentacion PFC.pptx
@@ -211,7 +211,7 @@
           <a:p>
             <a:fld id="{AB13600B-983D-4584-B53F-0B1CEA54138F}" type="datetimeFigureOut">
               <a:rPr lang="es-ES" smtClean="0"/>
-              <a:t>23/06/2013</a:t>
+              <a:t>24/06/2013</a:t>
             </a:fld>
             <a:endParaRPr lang="es-ES"/>
           </a:p>
@@ -751,7 +751,7 @@
           <a:p>
             <a:fld id="{7A847CFC-816F-41D0-AAC0-9BF4FEBC753E}" type="datetimeFigureOut">
               <a:rPr lang="es-ES" smtClean="0"/>
-              <a:t>23/06/2013</a:t>
+              <a:t>24/06/2013</a:t>
             </a:fld>
             <a:endParaRPr lang="es-ES"/>
           </a:p>
@@ -951,7 +951,7 @@
           <a:p>
             <a:fld id="{7A847CFC-816F-41D0-AAC0-9BF4FEBC753E}" type="datetimeFigureOut">
               <a:rPr lang="es-ES" smtClean="0"/>
-              <a:t>23/06/2013</a:t>
+              <a:t>24/06/2013</a:t>
             </a:fld>
             <a:endParaRPr lang="es-ES"/>
           </a:p>
@@ -1126,7 +1126,7 @@
           <a:p>
             <a:fld id="{7A847CFC-816F-41D0-AAC0-9BF4FEBC753E}" type="datetimeFigureOut">
               <a:rPr lang="es-ES" smtClean="0"/>
-              <a:t>23/06/2013</a:t>
+              <a:t>24/06/2013</a:t>
             </a:fld>
             <a:endParaRPr lang="es-ES"/>
           </a:p>
@@ -1291,7 +1291,7 @@
           <a:p>
             <a:fld id="{7A847CFC-816F-41D0-AAC0-9BF4FEBC753E}" type="datetimeFigureOut">
               <a:rPr lang="es-ES" smtClean="0"/>
-              <a:t>23/06/2013</a:t>
+              <a:t>24/06/2013</a:t>
             </a:fld>
             <a:endParaRPr lang="es-ES"/>
           </a:p>
@@ -1539,7 +1539,7 @@
           <a:p>
             <a:fld id="{7A847CFC-816F-41D0-AAC0-9BF4FEBC753E}" type="datetimeFigureOut">
               <a:rPr lang="es-ES" smtClean="0"/>
-              <a:t>23/06/2013</a:t>
+              <a:t>24/06/2013</a:t>
             </a:fld>
             <a:endParaRPr lang="es-ES"/>
           </a:p>
@@ -1857,7 +1857,7 @@
           <a:p>
             <a:fld id="{7A847CFC-816F-41D0-AAC0-9BF4FEBC753E}" type="datetimeFigureOut">
               <a:rPr lang="es-ES" smtClean="0"/>
-              <a:t>23/06/2013</a:t>
+              <a:t>24/06/2013</a:t>
             </a:fld>
             <a:endParaRPr lang="es-ES"/>
           </a:p>
@@ -2323,7 +2323,7 @@
           <a:p>
             <a:fld id="{7A847CFC-816F-41D0-AAC0-9BF4FEBC753E}" type="datetimeFigureOut">
               <a:rPr lang="es-ES" smtClean="0"/>
-              <a:t>23/06/2013</a:t>
+              <a:t>24/06/2013</a:t>
             </a:fld>
             <a:endParaRPr lang="es-ES"/>
           </a:p>
@@ -2471,7 +2471,7 @@
           <a:p>
             <a:fld id="{7A847CFC-816F-41D0-AAC0-9BF4FEBC753E}" type="datetimeFigureOut">
               <a:rPr lang="es-ES" smtClean="0"/>
-              <a:t>23/06/2013</a:t>
+              <a:t>24/06/2013</a:t>
             </a:fld>
             <a:endParaRPr lang="es-ES"/>
           </a:p>
@@ -2561,7 +2561,7 @@
           <a:p>
             <a:fld id="{7A847CFC-816F-41D0-AAC0-9BF4FEBC753E}" type="datetimeFigureOut">
               <a:rPr lang="es-ES" smtClean="0"/>
-              <a:t>23/06/2013</a:t>
+              <a:t>24/06/2013</a:t>
             </a:fld>
             <a:endParaRPr lang="es-ES"/>
           </a:p>
@@ -2835,7 +2835,7 @@
           <a:p>
             <a:fld id="{7A847CFC-816F-41D0-AAC0-9BF4FEBC753E}" type="datetimeFigureOut">
               <a:rPr lang="es-ES" smtClean="0"/>
-              <a:t>23/06/2013</a:t>
+              <a:t>24/06/2013</a:t>
             </a:fld>
             <a:endParaRPr lang="es-ES"/>
           </a:p>
@@ -3140,7 +3140,7 @@
           <a:p>
             <a:fld id="{7A847CFC-816F-41D0-AAC0-9BF4FEBC753E}" type="datetimeFigureOut">
               <a:rPr lang="es-ES" smtClean="0"/>
-              <a:t>23/06/2013</a:t>
+              <a:t>24/06/2013</a:t>
             </a:fld>
             <a:endParaRPr lang="es-ES"/>
           </a:p>
@@ -3438,7 +3438,7 @@
           <a:p>
             <a:fld id="{7A847CFC-816F-41D0-AAC0-9BF4FEBC753E}" type="datetimeFigureOut">
               <a:rPr lang="es-ES" smtClean="0"/>
-              <a:t>23/06/2013</a:t>
+              <a:t>24/06/2013</a:t>
             </a:fld>
             <a:endParaRPr lang="es-ES"/>
           </a:p>
@@ -11148,8 +11148,8 @@
           </p:sp>
         </mc:Fallback>
       </mc:AlternateContent>
-      <mc:AlternateContent xmlns:mc="http://schemas.openxmlformats.org/markup-compatibility/2006">
-        <mc:Choice xmlns:a14="http://schemas.microsoft.com/office/drawing/2010/main" Requires="a14">
+      <mc:AlternateContent xmlns:mc="http://schemas.openxmlformats.org/markup-compatibility/2006" xmlns:a14="http://schemas.microsoft.com/office/drawing/2010/main">
+        <mc:Choice Requires="a14">
           <p:sp>
             <p:nvSpPr>
               <p:cNvPr id="19" name="18 CuadroTexto"/>
@@ -11528,7 +11528,7 @@
             </p:txBody>
           </p:sp>
         </mc:Choice>
-        <mc:Fallback>
+        <mc:Fallback xmlns="">
           <p:sp>
             <p:nvSpPr>
               <p:cNvPr id="19" name="18 CuadroTexto"/>
@@ -13013,8 +13013,8 @@
           </p:sp>
         </mc:Fallback>
       </mc:AlternateContent>
-      <mc:AlternateContent xmlns:mc="http://schemas.openxmlformats.org/markup-compatibility/2006" xmlns:a14="http://schemas.microsoft.com/office/drawing/2010/main">
-        <mc:Choice Requires="a14">
+      <mc:AlternateContent xmlns:mc="http://schemas.openxmlformats.org/markup-compatibility/2006">
+        <mc:Choice xmlns:a14="http://schemas.microsoft.com/office/drawing/2010/main" Requires="a14">
           <p:sp>
             <p:nvSpPr>
               <p:cNvPr id="26" name="25 CuadroTexto"/>
@@ -13024,7 +13024,7 @@
             <p:spPr>
               <a:xfrm>
                 <a:off x="5735269" y="4968012"/>
-                <a:ext cx="3157211" cy="798873"/>
+                <a:ext cx="3285451" cy="798873"/>
               </a:xfrm>
               <a:prstGeom prst="rect">
                 <a:avLst/>
@@ -13088,6 +13088,12 @@
                               </m:ctrlPr>
                             </m:dPr>
                             <m:e>
+                              <m:r>
+                                <a:rPr lang="es-ES" b="0" i="1" smtClean="0">
+                                  <a:latin typeface="Cambria Math"/>
+                                </a:rPr>
+                                <m:t>−</m:t>
+                              </m:r>
                               <m:f>
                                 <m:fPr>
                                   <m:ctrlPr>
@@ -13177,7 +13183,7 @@
             </p:txBody>
           </p:sp>
         </mc:Choice>
-        <mc:Fallback xmlns="">
+        <mc:Fallback>
           <p:sp>
             <p:nvSpPr>
               <p:cNvPr id="26" name="25 CuadroTexto"/>
@@ -13189,7 +13195,7 @@
             <p:spPr>
               <a:xfrm>
                 <a:off x="5735269" y="4968012"/>
-                <a:ext cx="3157211" cy="798873"/>
+                <a:ext cx="3285451" cy="798873"/>
               </a:xfrm>
               <a:prstGeom prst="rect">
                 <a:avLst/>
@@ -18662,6 +18668,298 @@
           </a:p>
         </p:txBody>
       </p:sp>
+      <mc:AlternateContent xmlns:mc="http://schemas.openxmlformats.org/markup-compatibility/2006">
+        <mc:Choice xmlns:a14="http://schemas.microsoft.com/office/drawing/2010/main" Requires="a14">
+          <p:sp>
+            <p:nvSpPr>
+              <p:cNvPr id="6" name="5 Rectángulo"/>
+              <p:cNvSpPr/>
+              <p:nvPr/>
+            </p:nvSpPr>
+            <p:spPr>
+              <a:xfrm>
+                <a:off x="2424997" y="2996952"/>
+                <a:ext cx="4273478" cy="461665"/>
+              </a:xfrm>
+              <a:prstGeom prst="rect">
+                <a:avLst/>
+              </a:prstGeom>
+            </p:spPr>
+            <p:txBody>
+              <a:bodyPr wrap="none">
+                <a:spAutoFit/>
+              </a:bodyPr>
+              <a:lstStyle/>
+              <a:p>
+                <a:pPr/>
+                <a14:m>
+                  <m:oMathPara xmlns:m="http://schemas.openxmlformats.org/officeDocument/2006/math">
+                    <m:oMathParaPr>
+                      <m:jc m:val="centerGroup"/>
+                    </m:oMathParaPr>
+                    <m:oMath xmlns:m="http://schemas.openxmlformats.org/officeDocument/2006/math">
+                      <m:r>
+                        <a:rPr lang="es-ES" sz="2400" b="0" i="1" smtClean="0">
+                          <a:latin typeface="Cambria Math"/>
+                          <a:ea typeface="Cambria Math"/>
+                        </a:rPr>
+                        <m:t>𝛼</m:t>
+                      </m:r>
+                      <m:d>
+                        <m:dPr>
+                          <m:begChr m:val="|"/>
+                          <m:endChr m:val="|"/>
+                          <m:ctrlPr>
+                            <a:rPr lang="es-ES" sz="2400" b="0" i="1" smtClean="0">
+                              <a:latin typeface="Cambria Math"/>
+                            </a:rPr>
+                          </m:ctrlPr>
+                        </m:dPr>
+                        <m:e>
+                          <m:d>
+                            <m:dPr>
+                              <m:begChr m:val=""/>
+                              <m:endChr m:val="⟩"/>
+                              <m:ctrlPr>
+                                <a:rPr lang="es-ES" sz="2400" i="1">
+                                  <a:latin typeface="Cambria Math"/>
+                                </a:rPr>
+                              </m:ctrlPr>
+                            </m:dPr>
+                            <m:e>
+                              <m:r>
+                                <a:rPr lang="es-ES" sz="2400" i="1">
+                                  <a:latin typeface="Cambria Math"/>
+                                </a:rPr>
+                                <m:t>0</m:t>
+                              </m:r>
+                              <m:r>
+                                <a:rPr lang="es-ES" sz="2400" b="0" i="1" smtClean="0">
+                                  <a:latin typeface="Cambria Math"/>
+                                </a:rPr>
+                                <m:t>0</m:t>
+                              </m:r>
+                            </m:e>
+                          </m:d>
+                          <m:r>
+                            <a:rPr lang="es-ES" sz="2400" b="0" i="1" smtClean="0">
+                              <a:latin typeface="Cambria Math"/>
+                            </a:rPr>
+                            <m:t>+</m:t>
+                          </m:r>
+                          <m:r>
+                            <m:rPr>
+                              <m:sty m:val="p"/>
+                            </m:rPr>
+                            <a:rPr lang="el-GR" sz="2400" b="0" i="1" smtClean="0">
+                              <a:latin typeface="Cambria Math"/>
+                              <a:ea typeface="Cambria Math"/>
+                            </a:rPr>
+                            <m:t>β</m:t>
+                          </m:r>
+                        </m:e>
+                      </m:d>
+                      <m:d>
+                        <m:dPr>
+                          <m:begChr m:val=""/>
+                          <m:endChr m:val="⟩"/>
+                          <m:ctrlPr>
+                            <a:rPr lang="es-ES" sz="2400" i="1">
+                              <a:latin typeface="Cambria Math"/>
+                            </a:rPr>
+                          </m:ctrlPr>
+                        </m:dPr>
+                        <m:e>
+                          <m:r>
+                            <a:rPr lang="es-ES" sz="2400" b="0" i="1" smtClean="0">
+                              <a:latin typeface="Cambria Math"/>
+                            </a:rPr>
+                            <m:t>0</m:t>
+                          </m:r>
+                          <m:r>
+                            <a:rPr lang="es-ES" sz="2400" i="1">
+                              <a:latin typeface="Cambria Math"/>
+                            </a:rPr>
+                            <m:t>1</m:t>
+                          </m:r>
+                        </m:e>
+                      </m:d>
+                      <m:r>
+                        <a:rPr lang="es-ES" sz="2400" b="0" i="1" smtClean="0">
+                          <a:latin typeface="Cambria Math"/>
+                        </a:rPr>
+                        <m:t>+</m:t>
+                      </m:r>
+                      <m:r>
+                        <a:rPr lang="es-ES" sz="2400" i="1" smtClean="0">
+                          <a:latin typeface="Cambria Math"/>
+                          <a:ea typeface="Cambria Math"/>
+                        </a:rPr>
+                        <m:t>𝛾</m:t>
+                      </m:r>
+                      <m:d>
+                        <m:dPr>
+                          <m:begChr m:val="|"/>
+                          <m:endChr m:val="|"/>
+                          <m:ctrlPr>
+                            <a:rPr lang="es-ES" sz="2400" i="1">
+                              <a:latin typeface="Cambria Math"/>
+                            </a:rPr>
+                          </m:ctrlPr>
+                        </m:dPr>
+                        <m:e>
+                          <m:d>
+                            <m:dPr>
+                              <m:begChr m:val=""/>
+                              <m:endChr m:val="⟩"/>
+                              <m:ctrlPr>
+                                <a:rPr lang="es-ES" sz="2400" i="1">
+                                  <a:latin typeface="Cambria Math"/>
+                                </a:rPr>
+                              </m:ctrlPr>
+                            </m:dPr>
+                            <m:e>
+                              <m:r>
+                                <a:rPr lang="es-ES" sz="2400" b="0" i="1" smtClean="0">
+                                  <a:latin typeface="Cambria Math"/>
+                                </a:rPr>
+                                <m:t>1</m:t>
+                              </m:r>
+                              <m:r>
+                                <a:rPr lang="es-ES" sz="2400" i="1">
+                                  <a:latin typeface="Cambria Math"/>
+                                </a:rPr>
+                                <m:t>0</m:t>
+                              </m:r>
+                            </m:e>
+                          </m:d>
+                          <m:r>
+                            <a:rPr lang="es-ES" sz="2400" i="1">
+                              <a:latin typeface="Cambria Math"/>
+                            </a:rPr>
+                            <m:t>+</m:t>
+                          </m:r>
+                          <m:r>
+                            <a:rPr lang="el-GR" sz="2400" i="1" smtClean="0">
+                              <a:latin typeface="Cambria Math"/>
+                              <a:ea typeface="Cambria Math"/>
+                            </a:rPr>
+                            <m:t>𝛿</m:t>
+                          </m:r>
+                        </m:e>
+                      </m:d>
+                      <m:d>
+                        <m:dPr>
+                          <m:begChr m:val=""/>
+                          <m:endChr m:val="⟩"/>
+                          <m:ctrlPr>
+                            <a:rPr lang="es-ES" sz="2400" i="1">
+                              <a:latin typeface="Cambria Math"/>
+                            </a:rPr>
+                          </m:ctrlPr>
+                        </m:dPr>
+                        <m:e>
+                          <m:r>
+                            <a:rPr lang="es-ES" sz="2400" b="0" i="1" smtClean="0">
+                              <a:latin typeface="Cambria Math"/>
+                            </a:rPr>
+                            <m:t>1</m:t>
+                          </m:r>
+                          <m:r>
+                            <a:rPr lang="es-ES" sz="2400" i="1">
+                              <a:latin typeface="Cambria Math"/>
+                            </a:rPr>
+                            <m:t>1</m:t>
+                          </m:r>
+                        </m:e>
+                      </m:d>
+                    </m:oMath>
+                  </m:oMathPara>
+                </a14:m>
+                <a:endParaRPr lang="es-ES" sz="2400" dirty="0"/>
+              </a:p>
+            </p:txBody>
+          </p:sp>
+        </mc:Choice>
+        <mc:Fallback>
+          <p:sp>
+            <p:nvSpPr>
+              <p:cNvPr id="6" name="5 Rectángulo"/>
+              <p:cNvSpPr>
+                <a:spLocks noRot="1" noChangeAspect="1" noMove="1" noResize="1" noEditPoints="1" noAdjustHandles="1" noChangeArrowheads="1" noChangeShapeType="1" noTextEdit="1"/>
+              </p:cNvSpPr>
+              <p:nvPr/>
+            </p:nvSpPr>
+            <p:spPr>
+              <a:xfrm>
+                <a:off x="2424997" y="2996952"/>
+                <a:ext cx="4273478" cy="461665"/>
+              </a:xfrm>
+              <a:prstGeom prst="rect">
+                <a:avLst/>
+              </a:prstGeom>
+              <a:blipFill rotWithShape="1">
+                <a:blip r:embed="rId2"/>
+                <a:stretch>
+                  <a:fillRect t="-132000" r="-13980" b="-198667"/>
+                </a:stretch>
+              </a:blipFill>
+            </p:spPr>
+            <p:txBody>
+              <a:bodyPr/>
+              <a:lstStyle/>
+              <a:p>
+                <a:r>
+                  <a:rPr lang="es-ES">
+                    <a:noFill/>
+                  </a:rPr>
+                  <a:t> </a:t>
+                </a:r>
+              </a:p>
+            </p:txBody>
+          </p:sp>
+        </mc:Fallback>
+      </mc:AlternateContent>
+      <p:sp>
+        <p:nvSpPr>
+          <p:cNvPr id="3" name="2 Flecha a la derecha con bandas"/>
+          <p:cNvSpPr/>
+          <p:nvPr/>
+        </p:nvSpPr>
+        <p:spPr>
+          <a:xfrm rot="5400000">
+            <a:off x="4093685" y="3501008"/>
+            <a:ext cx="936104" cy="1368152"/>
+          </a:xfrm>
+          <a:prstGeom prst="stripedRightArrow">
+            <a:avLst/>
+          </a:prstGeom>
+        </p:spPr>
+        <p:style>
+          <a:lnRef idx="2">
+            <a:schemeClr val="dk1">
+              <a:shade val="50000"/>
+            </a:schemeClr>
+          </a:lnRef>
+          <a:fillRef idx="1">
+            <a:schemeClr val="dk1"/>
+          </a:fillRef>
+          <a:effectRef idx="0">
+            <a:schemeClr val="dk1"/>
+          </a:effectRef>
+          <a:fontRef idx="minor">
+            <a:schemeClr val="lt1"/>
+          </a:fontRef>
+        </p:style>
+        <p:txBody>
+          <a:bodyPr rtlCol="0" anchor="ctr"/>
+          <a:lstStyle/>
+          <a:p>
+            <a:pPr algn="ctr"/>
+            <a:endParaRPr lang="es-ES"/>
+          </a:p>
+        </p:txBody>
+      </p:sp>
     </p:spTree>
     <p:extLst>
       <p:ext uri="{BB962C8B-B14F-4D97-AF65-F5344CB8AC3E}">

</xml_diff>

<commit_message>
Changes in the documentation and presentation.
</commit_message>
<xml_diff>
--- a/qMIPS/doc/Presentacion PFC.pptx
+++ b/qMIPS/doc/Presentacion PFC.pptx
@@ -5,7 +5,7 @@
     <p:sldMasterId id="2147483684" r:id="rId1"/>
   </p:sldMasterIdLst>
   <p:notesMasterIdLst>
-    <p:notesMasterId r:id="rId22"/>
+    <p:notesMasterId r:id="rId27"/>
   </p:notesMasterIdLst>
   <p:sldIdLst>
     <p:sldId id="256" r:id="rId2"/>
@@ -28,6 +28,11 @@
     <p:sldId id="272" r:id="rId19"/>
     <p:sldId id="274" r:id="rId20"/>
     <p:sldId id="275" r:id="rId21"/>
+    <p:sldId id="276" r:id="rId22"/>
+    <p:sldId id="277" r:id="rId23"/>
+    <p:sldId id="278" r:id="rId24"/>
+    <p:sldId id="279" r:id="rId25"/>
+    <p:sldId id="280" r:id="rId26"/>
   </p:sldIdLst>
   <p:sldSz cx="9144000" cy="6858000" type="screen4x3"/>
   <p:notesSz cx="6858000" cy="9144000"/>
@@ -211,7 +216,7 @@
           <a:p>
             <a:fld id="{AB13600B-983D-4584-B53F-0B1CEA54138F}" type="datetimeFigureOut">
               <a:rPr lang="es-ES" smtClean="0"/>
-              <a:t>24/06/2013</a:t>
+              <a:t>25/06/2013</a:t>
             </a:fld>
             <a:endParaRPr lang="es-ES"/>
           </a:p>
@@ -751,7 +756,7 @@
           <a:p>
             <a:fld id="{7A847CFC-816F-41D0-AAC0-9BF4FEBC753E}" type="datetimeFigureOut">
               <a:rPr lang="es-ES" smtClean="0"/>
-              <a:t>24/06/2013</a:t>
+              <a:t>25/06/2013</a:t>
             </a:fld>
             <a:endParaRPr lang="es-ES"/>
           </a:p>
@@ -951,7 +956,7 @@
           <a:p>
             <a:fld id="{7A847CFC-816F-41D0-AAC0-9BF4FEBC753E}" type="datetimeFigureOut">
               <a:rPr lang="es-ES" smtClean="0"/>
-              <a:t>24/06/2013</a:t>
+              <a:t>25/06/2013</a:t>
             </a:fld>
             <a:endParaRPr lang="es-ES"/>
           </a:p>
@@ -1126,7 +1131,7 @@
           <a:p>
             <a:fld id="{7A847CFC-816F-41D0-AAC0-9BF4FEBC753E}" type="datetimeFigureOut">
               <a:rPr lang="es-ES" smtClean="0"/>
-              <a:t>24/06/2013</a:t>
+              <a:t>25/06/2013</a:t>
             </a:fld>
             <a:endParaRPr lang="es-ES"/>
           </a:p>
@@ -1291,7 +1296,7 @@
           <a:p>
             <a:fld id="{7A847CFC-816F-41D0-AAC0-9BF4FEBC753E}" type="datetimeFigureOut">
               <a:rPr lang="es-ES" smtClean="0"/>
-              <a:t>24/06/2013</a:t>
+              <a:t>25/06/2013</a:t>
             </a:fld>
             <a:endParaRPr lang="es-ES"/>
           </a:p>
@@ -1539,7 +1544,7 @@
           <a:p>
             <a:fld id="{7A847CFC-816F-41D0-AAC0-9BF4FEBC753E}" type="datetimeFigureOut">
               <a:rPr lang="es-ES" smtClean="0"/>
-              <a:t>24/06/2013</a:t>
+              <a:t>25/06/2013</a:t>
             </a:fld>
             <a:endParaRPr lang="es-ES"/>
           </a:p>
@@ -1857,7 +1862,7 @@
           <a:p>
             <a:fld id="{7A847CFC-816F-41D0-AAC0-9BF4FEBC753E}" type="datetimeFigureOut">
               <a:rPr lang="es-ES" smtClean="0"/>
-              <a:t>24/06/2013</a:t>
+              <a:t>25/06/2013</a:t>
             </a:fld>
             <a:endParaRPr lang="es-ES"/>
           </a:p>
@@ -2323,7 +2328,7 @@
           <a:p>
             <a:fld id="{7A847CFC-816F-41D0-AAC0-9BF4FEBC753E}" type="datetimeFigureOut">
               <a:rPr lang="es-ES" smtClean="0"/>
-              <a:t>24/06/2013</a:t>
+              <a:t>25/06/2013</a:t>
             </a:fld>
             <a:endParaRPr lang="es-ES"/>
           </a:p>
@@ -2471,7 +2476,7 @@
           <a:p>
             <a:fld id="{7A847CFC-816F-41D0-AAC0-9BF4FEBC753E}" type="datetimeFigureOut">
               <a:rPr lang="es-ES" smtClean="0"/>
-              <a:t>24/06/2013</a:t>
+              <a:t>25/06/2013</a:t>
             </a:fld>
             <a:endParaRPr lang="es-ES"/>
           </a:p>
@@ -2561,7 +2566,7 @@
           <a:p>
             <a:fld id="{7A847CFC-816F-41D0-AAC0-9BF4FEBC753E}" type="datetimeFigureOut">
               <a:rPr lang="es-ES" smtClean="0"/>
-              <a:t>24/06/2013</a:t>
+              <a:t>25/06/2013</a:t>
             </a:fld>
             <a:endParaRPr lang="es-ES"/>
           </a:p>
@@ -2835,7 +2840,7 @@
           <a:p>
             <a:fld id="{7A847CFC-816F-41D0-AAC0-9BF4FEBC753E}" type="datetimeFigureOut">
               <a:rPr lang="es-ES" smtClean="0"/>
-              <a:t>24/06/2013</a:t>
+              <a:t>25/06/2013</a:t>
             </a:fld>
             <a:endParaRPr lang="es-ES"/>
           </a:p>
@@ -3140,7 +3145,7 @@
           <a:p>
             <a:fld id="{7A847CFC-816F-41D0-AAC0-9BF4FEBC753E}" type="datetimeFigureOut">
               <a:rPr lang="es-ES" smtClean="0"/>
-              <a:t>24/06/2013</a:t>
+              <a:t>25/06/2013</a:t>
             </a:fld>
             <a:endParaRPr lang="es-ES"/>
           </a:p>
@@ -3438,7 +3443,7 @@
           <a:p>
             <a:fld id="{7A847CFC-816F-41D0-AAC0-9BF4FEBC753E}" type="datetimeFigureOut">
               <a:rPr lang="es-ES" smtClean="0"/>
-              <a:t>24/06/2013</a:t>
+              <a:t>25/06/2013</a:t>
             </a:fld>
             <a:endParaRPr lang="es-ES"/>
           </a:p>
@@ -13013,8 +13018,8 @@
           </p:sp>
         </mc:Fallback>
       </mc:AlternateContent>
-      <mc:AlternateContent xmlns:mc="http://schemas.openxmlformats.org/markup-compatibility/2006">
-        <mc:Choice xmlns:a14="http://schemas.microsoft.com/office/drawing/2010/main" Requires="a14">
+      <mc:AlternateContent xmlns:mc="http://schemas.openxmlformats.org/markup-compatibility/2006" xmlns:a14="http://schemas.microsoft.com/office/drawing/2010/main">
+        <mc:Choice Requires="a14">
           <p:sp>
             <p:nvSpPr>
               <p:cNvPr id="26" name="25 CuadroTexto"/>
@@ -13183,7 +13188,7 @@
             </p:txBody>
           </p:sp>
         </mc:Choice>
-        <mc:Fallback>
+        <mc:Fallback xmlns="">
           <p:sp>
             <p:nvSpPr>
               <p:cNvPr id="26" name="25 CuadroTexto"/>
@@ -18483,6 +18488,13 @@
   <p:clrMapOvr>
     <a:masterClrMapping/>
   </p:clrMapOvr>
+  <p:timing>
+    <p:tnLst>
+      <p:par>
+        <p:cTn id="1" dur="indefinite" restart="never" nodeType="tmRoot"/>
+      </p:par>
+    </p:tnLst>
+  </p:timing>
 </p:sld>
 </file>
 
@@ -18678,7 +18690,7 @@
             </p:nvSpPr>
             <p:spPr>
               <a:xfrm>
-                <a:off x="2424997" y="2996952"/>
+                <a:off x="2444170" y="1988840"/>
                 <a:ext cx="4273478" cy="461665"/>
               </a:xfrm>
               <a:prstGeom prst="rect">
@@ -18892,7 +18904,7 @@
             </p:nvSpPr>
             <p:spPr>
               <a:xfrm>
-                <a:off x="2424997" y="2996952"/>
+                <a:off x="2444170" y="1988840"/>
                 <a:ext cx="4273478" cy="461665"/>
               </a:xfrm>
               <a:prstGeom prst="rect">
@@ -18901,7 +18913,765 @@
               <a:blipFill rotWithShape="1">
                 <a:blip r:embed="rId2"/>
                 <a:stretch>
-                  <a:fillRect t="-132000" r="-13980" b="-198667"/>
+                  <a:fillRect t="-130263" r="-13980" b="-194737"/>
+                </a:stretch>
+              </a:blipFill>
+            </p:spPr>
+            <p:txBody>
+              <a:bodyPr/>
+              <a:lstStyle/>
+              <a:p>
+                <a:r>
+                  <a:rPr lang="es-ES">
+                    <a:noFill/>
+                  </a:rPr>
+                  <a:t> </a:t>
+                </a:r>
+              </a:p>
+            </p:txBody>
+          </p:sp>
+        </mc:Fallback>
+      </mc:AlternateContent>
+      <mc:AlternateContent xmlns:mc="http://schemas.openxmlformats.org/markup-compatibility/2006">
+        <mc:Choice xmlns:a14="http://schemas.microsoft.com/office/drawing/2010/main" Requires="a14">
+          <p:sp>
+            <p:nvSpPr>
+              <p:cNvPr id="2" name="1 CuadroTexto"/>
+              <p:cNvSpPr txBox="1"/>
+              <p:nvPr/>
+            </p:nvSpPr>
+            <p:spPr>
+              <a:xfrm>
+                <a:off x="1808291" y="2810321"/>
+                <a:ext cx="5506892" cy="461665"/>
+              </a:xfrm>
+              <a:prstGeom prst="rect">
+                <a:avLst/>
+              </a:prstGeom>
+              <a:noFill/>
+            </p:spPr>
+            <p:txBody>
+              <a:bodyPr wrap="none" rtlCol="0">
+                <a:spAutoFit/>
+              </a:bodyPr>
+              <a:lstStyle/>
+              <a:p>
+                <a14:m>
+                  <m:oMathPara xmlns:m="http://schemas.openxmlformats.org/officeDocument/2006/math">
+                    <m:oMathParaPr>
+                      <m:jc m:val="centerGroup"/>
+                    </m:oMathParaPr>
+                    <m:oMath xmlns:m="http://schemas.openxmlformats.org/officeDocument/2006/math">
+                      <m:d>
+                        <m:dPr>
+                          <m:begChr m:val="{"/>
+                          <m:endChr m:val="}"/>
+                          <m:ctrlPr>
+                            <a:rPr lang="es-ES" sz="2400" i="1" smtClean="0">
+                              <a:latin typeface="Cambria Math"/>
+                            </a:rPr>
+                          </m:ctrlPr>
+                        </m:dPr>
+                        <m:e>
+                          <m:d>
+                            <m:dPr>
+                              <m:begChr m:val="["/>
+                              <m:endChr m:val="]"/>
+                              <m:ctrlPr>
+                                <a:rPr lang="es-ES" sz="2400" i="1" smtClean="0">
+                                  <a:latin typeface="Cambria Math"/>
+                                </a:rPr>
+                              </m:ctrlPr>
+                            </m:dPr>
+                            <m:e>
+                              <m:r>
+                                <a:rPr lang="es-ES" sz="2400" b="0" i="1" smtClean="0">
+                                  <a:latin typeface="Cambria Math"/>
+                                </a:rPr>
+                                <m:t>00</m:t>
+                              </m:r>
+                              <m:r>
+                                <a:rPr lang="es-ES" sz="2400" b="0" i="1" smtClean="0">
+                                  <a:latin typeface="Cambria Math"/>
+                                  <a:ea typeface="Cambria Math"/>
+                                </a:rPr>
+                                <m:t>→</m:t>
+                              </m:r>
+                              <m:r>
+                                <a:rPr lang="es-ES" sz="2400" b="0" i="1" smtClean="0">
+                                  <a:latin typeface="Cambria Math"/>
+                                  <a:ea typeface="Cambria Math"/>
+                                </a:rPr>
+                                <m:t>𝛼</m:t>
+                              </m:r>
+                            </m:e>
+                          </m:d>
+                          <m:r>
+                            <a:rPr lang="es-ES" sz="2400" b="0" i="1" smtClean="0">
+                              <a:latin typeface="Cambria Math"/>
+                            </a:rPr>
+                            <m:t>,</m:t>
+                          </m:r>
+                          <m:d>
+                            <m:dPr>
+                              <m:begChr m:val="["/>
+                              <m:endChr m:val="]"/>
+                              <m:ctrlPr>
+                                <a:rPr lang="es-ES" sz="2400" i="1">
+                                  <a:latin typeface="Cambria Math"/>
+                                </a:rPr>
+                              </m:ctrlPr>
+                            </m:dPr>
+                            <m:e>
+                              <m:r>
+                                <a:rPr lang="es-ES" sz="2400" i="1">
+                                  <a:latin typeface="Cambria Math"/>
+                                </a:rPr>
+                                <m:t>0</m:t>
+                              </m:r>
+                              <m:r>
+                                <a:rPr lang="es-ES" sz="2400" b="0" i="1" smtClean="0">
+                                  <a:latin typeface="Cambria Math"/>
+                                </a:rPr>
+                                <m:t>1</m:t>
+                              </m:r>
+                              <m:r>
+                                <a:rPr lang="es-ES" sz="2400" i="1">
+                                  <a:latin typeface="Cambria Math"/>
+                                  <a:ea typeface="Cambria Math"/>
+                                </a:rPr>
+                                <m:t>→</m:t>
+                              </m:r>
+                              <m:r>
+                                <a:rPr lang="es-ES" sz="2400" i="1" smtClean="0">
+                                  <a:latin typeface="Cambria Math"/>
+                                  <a:ea typeface="Cambria Math"/>
+                                </a:rPr>
+                                <m:t>𝛽</m:t>
+                              </m:r>
+                            </m:e>
+                          </m:d>
+                          <m:r>
+                            <a:rPr lang="es-ES" sz="2400" b="0" i="1" smtClean="0">
+                              <a:latin typeface="Cambria Math"/>
+                              <a:ea typeface="Cambria Math"/>
+                            </a:rPr>
+                            <m:t>,</m:t>
+                          </m:r>
+                          <m:d>
+                            <m:dPr>
+                              <m:begChr m:val="["/>
+                              <m:endChr m:val="]"/>
+                              <m:ctrlPr>
+                                <a:rPr lang="es-ES" sz="2400" i="1">
+                                  <a:latin typeface="Cambria Math"/>
+                                </a:rPr>
+                              </m:ctrlPr>
+                            </m:dPr>
+                            <m:e>
+                              <m:r>
+                                <a:rPr lang="es-ES" sz="2400" b="0" i="1" smtClean="0">
+                                  <a:latin typeface="Cambria Math"/>
+                                </a:rPr>
+                                <m:t>1</m:t>
+                              </m:r>
+                              <m:r>
+                                <a:rPr lang="es-ES" sz="2400" i="1">
+                                  <a:latin typeface="Cambria Math"/>
+                                </a:rPr>
+                                <m:t>0</m:t>
+                              </m:r>
+                              <m:r>
+                                <a:rPr lang="es-ES" sz="2400" i="1">
+                                  <a:latin typeface="Cambria Math"/>
+                                  <a:ea typeface="Cambria Math"/>
+                                </a:rPr>
+                                <m:t>→</m:t>
+                              </m:r>
+                              <m:r>
+                                <a:rPr lang="es-ES" sz="2400" i="1" smtClean="0">
+                                  <a:latin typeface="Cambria Math"/>
+                                  <a:ea typeface="Cambria Math"/>
+                                </a:rPr>
+                                <m:t>𝛾</m:t>
+                              </m:r>
+                            </m:e>
+                          </m:d>
+                          <m:r>
+                            <a:rPr lang="es-ES" sz="2400" b="0" i="1" smtClean="0">
+                              <a:latin typeface="Cambria Math"/>
+                              <a:ea typeface="Cambria Math"/>
+                            </a:rPr>
+                            <m:t>,</m:t>
+                          </m:r>
+                          <m:d>
+                            <m:dPr>
+                              <m:begChr m:val="["/>
+                              <m:endChr m:val="]"/>
+                              <m:ctrlPr>
+                                <a:rPr lang="es-ES" sz="2400" i="1">
+                                  <a:latin typeface="Cambria Math"/>
+                                </a:rPr>
+                              </m:ctrlPr>
+                            </m:dPr>
+                            <m:e>
+                              <m:r>
+                                <a:rPr lang="es-ES" sz="2400" b="0" i="1" smtClean="0">
+                                  <a:latin typeface="Cambria Math"/>
+                                </a:rPr>
+                                <m:t>11</m:t>
+                              </m:r>
+                              <m:r>
+                                <a:rPr lang="es-ES" sz="2400" i="1">
+                                  <a:latin typeface="Cambria Math"/>
+                                  <a:ea typeface="Cambria Math"/>
+                                </a:rPr>
+                                <m:t>→</m:t>
+                              </m:r>
+                              <m:r>
+                                <a:rPr lang="es-ES" sz="2400" i="1" smtClean="0">
+                                  <a:latin typeface="Cambria Math"/>
+                                  <a:ea typeface="Cambria Math"/>
+                                </a:rPr>
+                                <m:t>𝛿</m:t>
+                              </m:r>
+                            </m:e>
+                          </m:d>
+                        </m:e>
+                      </m:d>
+                    </m:oMath>
+                  </m:oMathPara>
+                </a14:m>
+                <a:endParaRPr lang="es-ES" sz="2400" dirty="0"/>
+              </a:p>
+            </p:txBody>
+          </p:sp>
+        </mc:Choice>
+        <mc:Fallback>
+          <p:sp>
+            <p:nvSpPr>
+              <p:cNvPr id="2" name="1 CuadroTexto"/>
+              <p:cNvSpPr txBox="1">
+                <a:spLocks noRot="1" noChangeAspect="1" noMove="1" noResize="1" noEditPoints="1" noAdjustHandles="1" noChangeArrowheads="1" noChangeShapeType="1" noTextEdit="1"/>
+              </p:cNvSpPr>
+              <p:nvPr/>
+            </p:nvSpPr>
+            <p:spPr>
+              <a:xfrm>
+                <a:off x="1808291" y="2810321"/>
+                <a:ext cx="5506892" cy="461665"/>
+              </a:xfrm>
+              <a:prstGeom prst="rect">
+                <a:avLst/>
+              </a:prstGeom>
+              <a:blipFill rotWithShape="1">
+                <a:blip r:embed="rId3"/>
+                <a:stretch>
+                  <a:fillRect b="-17105"/>
+                </a:stretch>
+              </a:blipFill>
+            </p:spPr>
+            <p:txBody>
+              <a:bodyPr/>
+              <a:lstStyle/>
+              <a:p>
+                <a:r>
+                  <a:rPr lang="es-ES">
+                    <a:noFill/>
+                  </a:rPr>
+                  <a:t> </a:t>
+                </a:r>
+              </a:p>
+            </p:txBody>
+          </p:sp>
+        </mc:Fallback>
+      </mc:AlternateContent>
+      <p:pic>
+        <p:nvPicPr>
+          <p:cNvPr id="10" name="9 Imagen"/>
+          <p:cNvPicPr/>
+          <p:nvPr/>
+        </p:nvPicPr>
+        <p:blipFill>
+          <a:blip r:embed="rId4" cstate="print">
+            <a:extLst>
+              <a:ext uri="{28A0092B-C50C-407E-A947-70E740481C1C}">
+                <a14:useLocalDpi xmlns:a14="http://schemas.microsoft.com/office/drawing/2010/main" val="0"/>
+              </a:ext>
+            </a:extLst>
+          </a:blip>
+          <a:srcRect/>
+          <a:stretch>
+            <a:fillRect/>
+          </a:stretch>
+        </p:blipFill>
+        <p:spPr bwMode="auto">
+          <a:xfrm>
+            <a:off x="2730960" y="3752532"/>
+            <a:ext cx="3681317" cy="2988836"/>
+          </a:xfrm>
+          <a:prstGeom prst="rect">
+            <a:avLst/>
+          </a:prstGeom>
+          <a:noFill/>
+        </p:spPr>
+      </p:pic>
+      <mc:AlternateContent xmlns:mc="http://schemas.openxmlformats.org/markup-compatibility/2006">
+        <mc:Choice xmlns:a14="http://schemas.microsoft.com/office/drawing/2010/main" Requires="a14">
+          <p:sp>
+            <p:nvSpPr>
+              <p:cNvPr id="11" name="10 Rectángulo"/>
+              <p:cNvSpPr/>
+              <p:nvPr/>
+            </p:nvSpPr>
+            <p:spPr>
+              <a:xfrm>
+                <a:off x="179512" y="4832652"/>
+                <a:ext cx="2460417" cy="728084"/>
+              </a:xfrm>
+              <a:prstGeom prst="rect">
+                <a:avLst/>
+              </a:prstGeom>
+            </p:spPr>
+            <p:txBody>
+              <a:bodyPr wrap="none">
+                <a:spAutoFit/>
+              </a:bodyPr>
+              <a:lstStyle/>
+              <a:p>
+                <a14:m>
+                  <m:oMathPara xmlns:m="http://schemas.openxmlformats.org/officeDocument/2006/math">
+                    <m:oMathParaPr>
+                      <m:jc m:val="centerGroup"/>
+                    </m:oMathParaPr>
+                    <m:oMath xmlns:m="http://schemas.openxmlformats.org/officeDocument/2006/math">
+                      <m:f>
+                        <m:fPr>
+                          <m:ctrlPr>
+                            <a:rPr lang="es-ES" sz="2000" i="1" smtClean="0">
+                              <a:latin typeface="Cambria Math"/>
+                            </a:rPr>
+                          </m:ctrlPr>
+                        </m:fPr>
+                        <m:num>
+                          <m:r>
+                            <a:rPr lang="es-ES" sz="2000" b="0" i="1" smtClean="0">
+                              <a:latin typeface="Cambria Math"/>
+                            </a:rPr>
+                            <m:t>1</m:t>
+                          </m:r>
+                        </m:num>
+                        <m:den>
+                          <m:rad>
+                            <m:radPr>
+                              <m:degHide m:val="on"/>
+                              <m:ctrlPr>
+                                <a:rPr lang="es-ES" sz="2000" i="1" smtClean="0">
+                                  <a:latin typeface="Cambria Math"/>
+                                </a:rPr>
+                              </m:ctrlPr>
+                            </m:radPr>
+                            <m:deg/>
+                            <m:e>
+                              <m:r>
+                                <a:rPr lang="es-ES" sz="2000" b="0" i="1" smtClean="0">
+                                  <a:latin typeface="Cambria Math"/>
+                                </a:rPr>
+                                <m:t>2</m:t>
+                              </m:r>
+                            </m:e>
+                          </m:rad>
+                        </m:den>
+                      </m:f>
+                      <m:d>
+                        <m:dPr>
+                          <m:begChr m:val=""/>
+                          <m:endChr m:val="⟩"/>
+                          <m:ctrlPr>
+                            <a:rPr lang="es-ES" sz="2000" i="1">
+                              <a:latin typeface="Cambria Math"/>
+                            </a:rPr>
+                          </m:ctrlPr>
+                        </m:dPr>
+                        <m:e>
+                          <m:r>
+                            <a:rPr lang="es-ES" sz="2000" b="0" i="1" smtClean="0">
+                              <a:latin typeface="Cambria Math"/>
+                            </a:rPr>
+                            <m:t>|</m:t>
+                          </m:r>
+                          <m:r>
+                            <a:rPr lang="es-ES" sz="2000" i="1">
+                              <a:latin typeface="Cambria Math"/>
+                            </a:rPr>
+                            <m:t>0</m:t>
+                          </m:r>
+                          <m:r>
+                            <a:rPr lang="es-ES" sz="2000" i="1">
+                              <a:latin typeface="Cambria Math"/>
+                            </a:rPr>
+                            <m:t>0</m:t>
+                          </m:r>
+                          <m:r>
+                            <a:rPr lang="es-ES" sz="2000" b="0" i="1" smtClean="0">
+                              <a:latin typeface="Cambria Math"/>
+                            </a:rPr>
+                            <m:t>0</m:t>
+                          </m:r>
+                        </m:e>
+                      </m:d>
+                      <m:r>
+                        <a:rPr lang="es-ES" sz="2000" b="0" i="1" smtClean="0">
+                          <a:latin typeface="Cambria Math"/>
+                        </a:rPr>
+                        <m:t>+</m:t>
+                      </m:r>
+                      <m:f>
+                        <m:fPr>
+                          <m:ctrlPr>
+                            <a:rPr lang="es-ES" sz="2000" i="1">
+                              <a:latin typeface="Cambria Math"/>
+                            </a:rPr>
+                          </m:ctrlPr>
+                        </m:fPr>
+                        <m:num>
+                          <m:r>
+                            <a:rPr lang="es-ES" sz="2000" i="1">
+                              <a:latin typeface="Cambria Math"/>
+                            </a:rPr>
+                            <m:t>1</m:t>
+                          </m:r>
+                        </m:num>
+                        <m:den>
+                          <m:rad>
+                            <m:radPr>
+                              <m:degHide m:val="on"/>
+                              <m:ctrlPr>
+                                <a:rPr lang="es-ES" sz="2000" i="1">
+                                  <a:latin typeface="Cambria Math"/>
+                                </a:rPr>
+                              </m:ctrlPr>
+                            </m:radPr>
+                            <m:deg/>
+                            <m:e>
+                              <m:r>
+                                <a:rPr lang="es-ES" sz="2000" i="1">
+                                  <a:latin typeface="Cambria Math"/>
+                                </a:rPr>
+                                <m:t>2</m:t>
+                              </m:r>
+                            </m:e>
+                          </m:rad>
+                        </m:den>
+                      </m:f>
+                      <m:d>
+                        <m:dPr>
+                          <m:begChr m:val=""/>
+                          <m:endChr m:val="⟩"/>
+                          <m:ctrlPr>
+                            <a:rPr lang="es-ES" sz="2000" i="1">
+                              <a:latin typeface="Cambria Math"/>
+                            </a:rPr>
+                          </m:ctrlPr>
+                        </m:dPr>
+                        <m:e>
+                          <m:r>
+                            <a:rPr lang="es-ES" sz="2000" i="1">
+                              <a:latin typeface="Cambria Math"/>
+                            </a:rPr>
+                            <m:t>|</m:t>
+                          </m:r>
+                          <m:r>
+                            <a:rPr lang="es-ES" sz="2000" b="0" i="1" smtClean="0">
+                              <a:latin typeface="Cambria Math"/>
+                            </a:rPr>
+                            <m:t>1</m:t>
+                          </m:r>
+                          <m:r>
+                            <a:rPr lang="es-ES" sz="2000" i="1">
+                              <a:latin typeface="Cambria Math"/>
+                            </a:rPr>
+                            <m:t>0</m:t>
+                          </m:r>
+                          <m:r>
+                            <a:rPr lang="es-ES" sz="2000" b="0" i="1" smtClean="0">
+                              <a:latin typeface="Cambria Math"/>
+                            </a:rPr>
+                            <m:t>1</m:t>
+                          </m:r>
+                        </m:e>
+                      </m:d>
+                    </m:oMath>
+                  </m:oMathPara>
+                </a14:m>
+                <a:endParaRPr lang="es-ES" sz="2000" dirty="0"/>
+              </a:p>
+            </p:txBody>
+          </p:sp>
+        </mc:Choice>
+        <mc:Fallback>
+          <p:sp>
+            <p:nvSpPr>
+              <p:cNvPr id="11" name="10 Rectángulo"/>
+              <p:cNvSpPr>
+                <a:spLocks noRot="1" noChangeAspect="1" noMove="1" noResize="1" noEditPoints="1" noAdjustHandles="1" noChangeArrowheads="1" noChangeShapeType="1" noTextEdit="1"/>
+              </p:cNvSpPr>
+              <p:nvPr/>
+            </p:nvSpPr>
+            <p:spPr>
+              <a:xfrm>
+                <a:off x="179512" y="4832652"/>
+                <a:ext cx="2460417" cy="728084"/>
+              </a:xfrm>
+              <a:prstGeom prst="rect">
+                <a:avLst/>
+              </a:prstGeom>
+              <a:blipFill rotWithShape="1">
+                <a:blip r:embed="rId5"/>
+                <a:stretch>
+                  <a:fillRect/>
+                </a:stretch>
+              </a:blipFill>
+            </p:spPr>
+            <p:txBody>
+              <a:bodyPr/>
+              <a:lstStyle/>
+              <a:p>
+                <a:r>
+                  <a:rPr lang="es-ES">
+                    <a:noFill/>
+                  </a:rPr>
+                  <a:t> </a:t>
+                </a:r>
+              </a:p>
+            </p:txBody>
+          </p:sp>
+        </mc:Fallback>
+      </mc:AlternateContent>
+      <mc:AlternateContent xmlns:mc="http://schemas.openxmlformats.org/markup-compatibility/2006">
+        <mc:Choice xmlns:a14="http://schemas.microsoft.com/office/drawing/2010/main" Requires="a14">
+          <p:sp>
+            <p:nvSpPr>
+              <p:cNvPr id="13" name="12 CuadroTexto"/>
+              <p:cNvSpPr txBox="1"/>
+              <p:nvPr/>
+            </p:nvSpPr>
+            <p:spPr>
+              <a:xfrm>
+                <a:off x="6300192" y="4869160"/>
+                <a:ext cx="2822247" cy="622606"/>
+              </a:xfrm>
+              <a:prstGeom prst="rect">
+                <a:avLst/>
+              </a:prstGeom>
+              <a:noFill/>
+            </p:spPr>
+            <p:txBody>
+              <a:bodyPr wrap="none" rtlCol="0">
+                <a:spAutoFit/>
+              </a:bodyPr>
+              <a:lstStyle/>
+              <a:p>
+                <a14:m>
+                  <m:oMathPara xmlns:m="http://schemas.openxmlformats.org/officeDocument/2006/math">
+                    <m:oMathParaPr>
+                      <m:jc m:val="centerGroup"/>
+                    </m:oMathParaPr>
+                    <m:oMath xmlns:m="http://schemas.openxmlformats.org/officeDocument/2006/math">
+                      <m:d>
+                        <m:dPr>
+                          <m:begChr m:val="{"/>
+                          <m:endChr m:val="}"/>
+                          <m:ctrlPr>
+                            <a:rPr lang="es-ES" i="1" smtClean="0">
+                              <a:latin typeface="Cambria Math"/>
+                            </a:rPr>
+                          </m:ctrlPr>
+                        </m:dPr>
+                        <m:e>
+                          <m:d>
+                            <m:dPr>
+                              <m:begChr m:val="["/>
+                              <m:endChr m:val="]"/>
+                              <m:ctrlPr>
+                                <a:rPr lang="es-ES" i="1" smtClean="0">
+                                  <a:latin typeface="Cambria Math"/>
+                                </a:rPr>
+                              </m:ctrlPr>
+                            </m:dPr>
+                            <m:e>
+                              <m:r>
+                                <a:rPr lang="es-ES" b="0" i="1" smtClean="0">
+                                  <a:latin typeface="Cambria Math"/>
+                                </a:rPr>
+                                <m:t>000</m:t>
+                              </m:r>
+                              <m:r>
+                                <a:rPr lang="es-ES" b="0" i="1" smtClean="0">
+                                  <a:latin typeface="Cambria Math"/>
+                                  <a:ea typeface="Cambria Math"/>
+                                </a:rPr>
+                                <m:t>→</m:t>
+                              </m:r>
+                              <m:f>
+                                <m:fPr>
+                                  <m:ctrlPr>
+                                    <a:rPr lang="es-ES" sz="1600" i="1">
+                                      <a:latin typeface="Cambria Math"/>
+                                    </a:rPr>
+                                  </m:ctrlPr>
+                                </m:fPr>
+                                <m:num>
+                                  <m:r>
+                                    <a:rPr lang="es-ES" sz="1600" i="1">
+                                      <a:latin typeface="Cambria Math"/>
+                                    </a:rPr>
+                                    <m:t>1</m:t>
+                                  </m:r>
+                                </m:num>
+                                <m:den>
+                                  <m:rad>
+                                    <m:radPr>
+                                      <m:degHide m:val="on"/>
+                                      <m:ctrlPr>
+                                        <a:rPr lang="es-ES" sz="1600" i="1">
+                                          <a:latin typeface="Cambria Math"/>
+                                        </a:rPr>
+                                      </m:ctrlPr>
+                                    </m:radPr>
+                                    <m:deg/>
+                                    <m:e>
+                                      <m:r>
+                                        <a:rPr lang="es-ES" sz="1600" i="1">
+                                          <a:latin typeface="Cambria Math"/>
+                                        </a:rPr>
+                                        <m:t>2</m:t>
+                                      </m:r>
+                                    </m:e>
+                                  </m:rad>
+                                </m:den>
+                              </m:f>
+                            </m:e>
+                          </m:d>
+                          <m:r>
+                            <a:rPr lang="es-ES" b="0" i="1" smtClean="0">
+                              <a:latin typeface="Cambria Math"/>
+                            </a:rPr>
+                            <m:t>,</m:t>
+                          </m:r>
+                          <m:d>
+                            <m:dPr>
+                              <m:begChr m:val="["/>
+                              <m:endChr m:val="]"/>
+                              <m:ctrlPr>
+                                <a:rPr lang="es-ES" i="1">
+                                  <a:latin typeface="Cambria Math"/>
+                                </a:rPr>
+                              </m:ctrlPr>
+                            </m:dPr>
+                            <m:e>
+                              <m:r>
+                                <a:rPr lang="es-ES" b="0" i="1" smtClean="0">
+                                  <a:latin typeface="Cambria Math"/>
+                                </a:rPr>
+                                <m:t>1</m:t>
+                              </m:r>
+                              <m:r>
+                                <a:rPr lang="es-ES" i="1">
+                                  <a:latin typeface="Cambria Math"/>
+                                </a:rPr>
+                                <m:t>0</m:t>
+                              </m:r>
+                              <m:r>
+                                <a:rPr lang="es-ES" b="0" i="1" smtClean="0">
+                                  <a:latin typeface="Cambria Math"/>
+                                </a:rPr>
+                                <m:t>1</m:t>
+                              </m:r>
+                              <m:r>
+                                <a:rPr lang="es-ES" i="1">
+                                  <a:latin typeface="Cambria Math"/>
+                                  <a:ea typeface="Cambria Math"/>
+                                </a:rPr>
+                                <m:t>→</m:t>
+                              </m:r>
+                              <m:f>
+                                <m:fPr>
+                                  <m:ctrlPr>
+                                    <a:rPr lang="es-ES" sz="1400" i="1">
+                                      <a:latin typeface="Cambria Math"/>
+                                    </a:rPr>
+                                  </m:ctrlPr>
+                                </m:fPr>
+                                <m:num>
+                                  <m:r>
+                                    <a:rPr lang="es-ES" sz="1400" i="1">
+                                      <a:latin typeface="Cambria Math"/>
+                                    </a:rPr>
+                                    <m:t>1</m:t>
+                                  </m:r>
+                                </m:num>
+                                <m:den>
+                                  <m:rad>
+                                    <m:radPr>
+                                      <m:degHide m:val="on"/>
+                                      <m:ctrlPr>
+                                        <a:rPr lang="es-ES" sz="1400" i="1">
+                                          <a:latin typeface="Cambria Math"/>
+                                        </a:rPr>
+                                      </m:ctrlPr>
+                                    </m:radPr>
+                                    <m:deg/>
+                                    <m:e>
+                                      <m:r>
+                                        <a:rPr lang="es-ES" sz="1400" i="1">
+                                          <a:latin typeface="Cambria Math"/>
+                                        </a:rPr>
+                                        <m:t>2</m:t>
+                                      </m:r>
+                                    </m:e>
+                                  </m:rad>
+                                </m:den>
+                              </m:f>
+                            </m:e>
+                          </m:d>
+                          <m:r>
+                            <a:rPr lang="es-ES" i="1" smtClean="0">
+                              <a:latin typeface="Cambria Math"/>
+                            </a:rPr>
+                            <m:t> </m:t>
+                          </m:r>
+                        </m:e>
+                      </m:d>
+                    </m:oMath>
+                  </m:oMathPara>
+                </a14:m>
+                <a:endParaRPr lang="es-ES" sz="1200" dirty="0"/>
+              </a:p>
+            </p:txBody>
+          </p:sp>
+        </mc:Choice>
+        <mc:Fallback>
+          <p:sp>
+            <p:nvSpPr>
+              <p:cNvPr id="13" name="12 CuadroTexto"/>
+              <p:cNvSpPr txBox="1">
+                <a:spLocks noRot="1" noChangeAspect="1" noMove="1" noResize="1" noEditPoints="1" noAdjustHandles="1" noChangeArrowheads="1" noChangeShapeType="1" noTextEdit="1"/>
+              </p:cNvSpPr>
+              <p:nvPr/>
+            </p:nvSpPr>
+            <p:spPr>
+              <a:xfrm>
+                <a:off x="6300192" y="4869160"/>
+                <a:ext cx="2822247" cy="622606"/>
+              </a:xfrm>
+              <a:prstGeom prst="rect">
+                <a:avLst/>
+              </a:prstGeom>
+              <a:blipFill rotWithShape="1">
+                <a:blip r:embed="rId6"/>
+                <a:stretch>
+                  <a:fillRect/>
                 </a:stretch>
               </a:blipFill>
             </p:spPr>
@@ -18922,16 +19692,16 @@
       </mc:AlternateContent>
       <p:sp>
         <p:nvSpPr>
-          <p:cNvPr id="3" name="2 Flecha a la derecha con bandas"/>
+          <p:cNvPr id="14" name="13 Flecha derecha"/>
           <p:cNvSpPr/>
           <p:nvPr/>
         </p:nvSpPr>
         <p:spPr>
-          <a:xfrm rot="5400000">
-            <a:off x="4093685" y="3501008"/>
-            <a:ext cx="936104" cy="1368152"/>
+          <a:xfrm>
+            <a:off x="2655189" y="4890408"/>
+            <a:ext cx="188619" cy="612572"/>
           </a:xfrm>
-          <a:prstGeom prst="stripedRightArrow">
+          <a:prstGeom prst="rightArrow">
             <a:avLst/>
           </a:prstGeom>
         </p:spPr>
@@ -18960,6 +19730,46 @@
           </a:p>
         </p:txBody>
       </p:sp>
+      <p:sp>
+        <p:nvSpPr>
+          <p:cNvPr id="15" name="14 Flecha derecha"/>
+          <p:cNvSpPr/>
+          <p:nvPr/>
+        </p:nvSpPr>
+        <p:spPr>
+          <a:xfrm>
+            <a:off x="6156176" y="4890408"/>
+            <a:ext cx="188619" cy="612572"/>
+          </a:xfrm>
+          <a:prstGeom prst="rightArrow">
+            <a:avLst/>
+          </a:prstGeom>
+        </p:spPr>
+        <p:style>
+          <a:lnRef idx="2">
+            <a:schemeClr val="dk1">
+              <a:shade val="50000"/>
+            </a:schemeClr>
+          </a:lnRef>
+          <a:fillRef idx="1">
+            <a:schemeClr val="dk1"/>
+          </a:fillRef>
+          <a:effectRef idx="0">
+            <a:schemeClr val="dk1"/>
+          </a:effectRef>
+          <a:fontRef idx="minor">
+            <a:schemeClr val="lt1"/>
+          </a:fontRef>
+        </p:style>
+        <p:txBody>
+          <a:bodyPr rtlCol="0" anchor="ctr"/>
+          <a:lstStyle/>
+          <a:p>
+            <a:pPr algn="ctr"/>
+            <a:endParaRPr lang="es-ES"/>
+          </a:p>
+        </p:txBody>
+      </p:sp>
     </p:spTree>
     <p:extLst>
       <p:ext uri="{BB962C8B-B14F-4D97-AF65-F5344CB8AC3E}">
@@ -18970,6 +19780,2701 @@
   <p:clrMapOvr>
     <a:masterClrMapping/>
   </p:clrMapOvr>
+  <p:timing>
+    <p:tnLst>
+      <p:par>
+        <p:cTn id="1" dur="indefinite" restart="never" nodeType="tmRoot"/>
+      </p:par>
+    </p:tnLst>
+  </p:timing>
+</p:sld>
+</file>
+
+<file path=ppt/slides/slide21.xml><?xml version="1.0" encoding="utf-8"?>
+<p:sld xmlns:a="http://schemas.openxmlformats.org/drawingml/2006/main" xmlns:r="http://schemas.openxmlformats.org/officeDocument/2006/relationships" xmlns:p="http://schemas.openxmlformats.org/presentationml/2006/main">
+  <p:cSld>
+    <p:spTree>
+      <p:nvGrpSpPr>
+        <p:cNvPr id="1" name=""/>
+        <p:cNvGrpSpPr/>
+        <p:nvPr/>
+      </p:nvGrpSpPr>
+      <p:grpSpPr>
+        <a:xfrm>
+          <a:off x="0" y="0"/>
+          <a:ext cx="0" cy="0"/>
+          <a:chOff x="0" y="0"/>
+          <a:chExt cx="0" cy="0"/>
+        </a:xfrm>
+      </p:grpSpPr>
+      <p:sp>
+        <p:nvSpPr>
+          <p:cNvPr id="4" name="3 CuadroTexto"/>
+          <p:cNvSpPr txBox="1"/>
+          <p:nvPr/>
+        </p:nvSpPr>
+        <p:spPr>
+          <a:xfrm>
+            <a:off x="3335279" y="398910"/>
+            <a:ext cx="2452916" cy="707886"/>
+          </a:xfrm>
+          <a:prstGeom prst="rect">
+            <a:avLst/>
+          </a:prstGeom>
+          <a:noFill/>
+        </p:spPr>
+        <p:txBody>
+          <a:bodyPr wrap="none" rtlCol="0">
+            <a:spAutoFit/>
+          </a:bodyPr>
+          <a:lstStyle/>
+          <a:p>
+            <a:r>
+              <a:rPr lang="es-ES" sz="4000" dirty="0" smtClean="0"/>
+              <a:t>Simulación</a:t>
+            </a:r>
+            <a:endParaRPr lang="es-ES" sz="4000" dirty="0"/>
+          </a:p>
+        </p:txBody>
+      </p:sp>
+      <p:sp>
+        <p:nvSpPr>
+          <p:cNvPr id="5" name="4 CuadroTexto"/>
+          <p:cNvSpPr txBox="1"/>
+          <p:nvPr/>
+        </p:nvSpPr>
+        <p:spPr>
+          <a:xfrm>
+            <a:off x="1431200" y="1106796"/>
+            <a:ext cx="6261073" cy="523220"/>
+          </a:xfrm>
+          <a:prstGeom prst="rect">
+            <a:avLst/>
+          </a:prstGeom>
+          <a:noFill/>
+        </p:spPr>
+        <p:txBody>
+          <a:bodyPr wrap="none" rtlCol="0">
+            <a:spAutoFit/>
+          </a:bodyPr>
+          <a:lstStyle/>
+          <a:p>
+            <a:r>
+              <a:rPr lang="es-ES" sz="2800" i="1" dirty="0" smtClean="0"/>
+              <a:t>Motor de simulación de estados cuánticos</a:t>
+            </a:r>
+            <a:endParaRPr lang="es-ES" sz="2800" i="1" dirty="0"/>
+          </a:p>
+        </p:txBody>
+      </p:sp>
+      <mc:AlternateContent xmlns:mc="http://schemas.openxmlformats.org/markup-compatibility/2006">
+        <mc:Choice xmlns:a14="http://schemas.microsoft.com/office/drawing/2010/main" Requires="a14">
+          <p:sp>
+            <p:nvSpPr>
+              <p:cNvPr id="6" name="5 CuadroTexto"/>
+              <p:cNvSpPr txBox="1"/>
+              <p:nvPr/>
+            </p:nvSpPr>
+            <p:spPr>
+              <a:xfrm>
+                <a:off x="1636581" y="1866889"/>
+                <a:ext cx="2040399" cy="1200329"/>
+              </a:xfrm>
+              <a:prstGeom prst="rect">
+                <a:avLst/>
+              </a:prstGeom>
+              <a:noFill/>
+            </p:spPr>
+            <p:txBody>
+              <a:bodyPr wrap="square" rtlCol="0">
+                <a:spAutoFit/>
+              </a:bodyPr>
+              <a:lstStyle/>
+              <a:p>
+                <a:pPr algn="ctr"/>
+                <a:r>
+                  <a:rPr lang="es-ES" sz="2400" dirty="0" smtClean="0"/>
+                  <a:t>Puerta </a:t>
+                </a:r>
+                <a:r>
+                  <a:rPr lang="es-ES" sz="2400" i="1" dirty="0" smtClean="0"/>
+                  <a:t>P</a:t>
+                </a:r>
+                <a:r>
+                  <a:rPr lang="es-ES" sz="2400" dirty="0" smtClean="0"/>
+                  <a:t> sobre qubit </a:t>
+                </a:r>
+                <a:r>
+                  <a:rPr lang="es-ES" sz="2400" i="1" dirty="0" smtClean="0"/>
+                  <a:t>q</a:t>
+                </a:r>
+                <a:r>
+                  <a:rPr lang="es-ES" sz="2400" dirty="0" smtClean="0"/>
+                  <a:t> del estado </a:t>
+                </a:r>
+                <a14:m>
+                  <m:oMath xmlns:m="http://schemas.openxmlformats.org/officeDocument/2006/math">
+                    <m:d>
+                      <m:dPr>
+                        <m:begChr m:val=""/>
+                        <m:endChr m:val="⟩"/>
+                        <m:ctrlPr>
+                          <a:rPr lang="es-ES" sz="2400" i="1">
+                            <a:latin typeface="Cambria Math"/>
+                          </a:rPr>
+                        </m:ctrlPr>
+                      </m:dPr>
+                      <m:e>
+                        <m:r>
+                          <a:rPr lang="es-ES" sz="2400" i="1" smtClean="0">
+                            <a:latin typeface="Cambria Math"/>
+                          </a:rPr>
+                          <m:t>|</m:t>
+                        </m:r>
+                        <m:r>
+                          <m:rPr>
+                            <m:sty m:val="p"/>
+                          </m:rPr>
+                          <a:rPr lang="el-GR" sz="2400" i="1" smtClean="0">
+                            <a:latin typeface="Cambria Math"/>
+                            <a:ea typeface="Cambria Math"/>
+                          </a:rPr>
+                          <m:t>Ψ</m:t>
+                        </m:r>
+                      </m:e>
+                    </m:d>
+                  </m:oMath>
+                </a14:m>
+                <a:endParaRPr lang="es-ES" sz="2400" dirty="0"/>
+              </a:p>
+            </p:txBody>
+          </p:sp>
+        </mc:Choice>
+        <mc:Fallback>
+          <p:sp>
+            <p:nvSpPr>
+              <p:cNvPr id="6" name="5 CuadroTexto"/>
+              <p:cNvSpPr txBox="1">
+                <a:spLocks noRot="1" noChangeAspect="1" noMove="1" noResize="1" noEditPoints="1" noAdjustHandles="1" noChangeArrowheads="1" noChangeShapeType="1" noTextEdit="1"/>
+              </p:cNvSpPr>
+              <p:nvPr/>
+            </p:nvSpPr>
+            <p:spPr>
+              <a:xfrm>
+                <a:off x="1636581" y="1866889"/>
+                <a:ext cx="2040399" cy="1200329"/>
+              </a:xfrm>
+              <a:prstGeom prst="rect">
+                <a:avLst/>
+              </a:prstGeom>
+              <a:blipFill rotWithShape="1">
+                <a:blip r:embed="rId2"/>
+                <a:stretch>
+                  <a:fillRect l="-3284" t="-4061" r="-19701" b="-74619"/>
+                </a:stretch>
+              </a:blipFill>
+            </p:spPr>
+            <p:txBody>
+              <a:bodyPr/>
+              <a:lstStyle/>
+              <a:p>
+                <a:r>
+                  <a:rPr lang="es-ES">
+                    <a:noFill/>
+                  </a:rPr>
+                  <a:t> </a:t>
+                </a:r>
+              </a:p>
+            </p:txBody>
+          </p:sp>
+        </mc:Fallback>
+      </mc:AlternateContent>
+      <mc:AlternateContent xmlns:mc="http://schemas.openxmlformats.org/markup-compatibility/2006">
+        <mc:Choice xmlns:a14="http://schemas.microsoft.com/office/drawing/2010/main" Requires="a14">
+          <p:sp>
+            <p:nvSpPr>
+              <p:cNvPr id="7" name="6 CuadroTexto"/>
+              <p:cNvSpPr txBox="1"/>
+              <p:nvPr/>
+            </p:nvSpPr>
+            <p:spPr>
+              <a:xfrm>
+                <a:off x="2676753" y="5786649"/>
+                <a:ext cx="3834511" cy="400110"/>
+              </a:xfrm>
+              <a:prstGeom prst="rect">
+                <a:avLst/>
+              </a:prstGeom>
+              <a:noFill/>
+            </p:spPr>
+            <p:txBody>
+              <a:bodyPr wrap="none" rtlCol="0">
+                <a:spAutoFit/>
+              </a:bodyPr>
+              <a:lstStyle/>
+              <a:p>
+                <a14:m>
+                  <m:oMathPara xmlns:m="http://schemas.openxmlformats.org/officeDocument/2006/math">
+                    <m:oMathParaPr>
+                      <m:jc m:val="centerGroup"/>
+                    </m:oMathParaPr>
+                    <m:oMath xmlns:m="http://schemas.openxmlformats.org/officeDocument/2006/math">
+                      <m:r>
+                        <a:rPr lang="es-ES" sz="2000" b="0" i="1" smtClean="0">
+                          <a:latin typeface="Cambria Math"/>
+                        </a:rPr>
+                        <m:t>𝑋</m:t>
+                      </m:r>
+                      <m:d>
+                        <m:dPr>
+                          <m:ctrlPr>
+                            <a:rPr lang="es-ES" sz="2000" b="0" i="1" smtClean="0">
+                              <a:latin typeface="Cambria Math"/>
+                            </a:rPr>
+                          </m:ctrlPr>
+                        </m:dPr>
+                        <m:e>
+                          <m:r>
+                            <a:rPr lang="es-ES" sz="2000" b="0" i="1" smtClean="0">
+                              <a:latin typeface="Cambria Math"/>
+                            </a:rPr>
+                            <m:t>0, </m:t>
+                          </m:r>
+                          <m:d>
+                            <m:dPr>
+                              <m:begChr m:val="{"/>
+                              <m:endChr m:val="}"/>
+                              <m:ctrlPr>
+                                <a:rPr lang="es-ES" sz="2000" i="1" smtClean="0">
+                                  <a:latin typeface="Cambria Math"/>
+                                </a:rPr>
+                              </m:ctrlPr>
+                            </m:dPr>
+                            <m:e>
+                              <m:d>
+                                <m:dPr>
+                                  <m:begChr m:val="["/>
+                                  <m:endChr m:val="]"/>
+                                  <m:ctrlPr>
+                                    <a:rPr lang="es-ES" sz="2000" i="1" smtClean="0">
+                                      <a:latin typeface="Cambria Math"/>
+                                    </a:rPr>
+                                  </m:ctrlPr>
+                                </m:dPr>
+                                <m:e>
+                                  <m:r>
+                                    <a:rPr lang="es-ES" sz="2000" b="0" i="1" smtClean="0">
+                                      <a:latin typeface="Cambria Math"/>
+                                    </a:rPr>
+                                    <m:t>000</m:t>
+                                  </m:r>
+                                  <m:r>
+                                    <a:rPr lang="es-ES" sz="2000" b="0" i="1" smtClean="0">
+                                      <a:latin typeface="Cambria Math"/>
+                                      <a:ea typeface="Cambria Math"/>
+                                    </a:rPr>
+                                    <m:t>→1</m:t>
+                                  </m:r>
+                                </m:e>
+                              </m:d>
+                            </m:e>
+                          </m:d>
+                        </m:e>
+                      </m:d>
+                      <m:r>
+                        <a:rPr lang="es-ES" sz="2000" b="0" i="1" smtClean="0">
+                          <a:latin typeface="Cambria Math"/>
+                          <a:ea typeface="Cambria Math"/>
+                        </a:rPr>
+                        <m:t>→</m:t>
+                      </m:r>
+                      <m:d>
+                        <m:dPr>
+                          <m:begChr m:val="{"/>
+                          <m:endChr m:val="}"/>
+                          <m:ctrlPr>
+                            <a:rPr lang="es-ES" sz="2000" i="1">
+                              <a:latin typeface="Cambria Math"/>
+                            </a:rPr>
+                          </m:ctrlPr>
+                        </m:dPr>
+                        <m:e>
+                          <m:d>
+                            <m:dPr>
+                              <m:begChr m:val="["/>
+                              <m:endChr m:val="]"/>
+                              <m:ctrlPr>
+                                <a:rPr lang="es-ES" sz="2000" i="1">
+                                  <a:latin typeface="Cambria Math"/>
+                                </a:rPr>
+                              </m:ctrlPr>
+                            </m:dPr>
+                            <m:e>
+                              <m:r>
+                                <a:rPr lang="es-ES" sz="2000" b="0" i="1" smtClean="0">
+                                  <a:latin typeface="Cambria Math"/>
+                                </a:rPr>
+                                <m:t>1</m:t>
+                              </m:r>
+                              <m:r>
+                                <a:rPr lang="es-ES" sz="2000" i="1">
+                                  <a:latin typeface="Cambria Math"/>
+                                </a:rPr>
+                                <m:t>00</m:t>
+                              </m:r>
+                              <m:r>
+                                <a:rPr lang="es-ES" sz="2000" i="1">
+                                  <a:latin typeface="Cambria Math"/>
+                                  <a:ea typeface="Cambria Math"/>
+                                </a:rPr>
+                                <m:t>→1</m:t>
+                              </m:r>
+                            </m:e>
+                          </m:d>
+                        </m:e>
+                      </m:d>
+                    </m:oMath>
+                  </m:oMathPara>
+                </a14:m>
+                <a:endParaRPr lang="es-ES" sz="2000" dirty="0"/>
+              </a:p>
+            </p:txBody>
+          </p:sp>
+        </mc:Choice>
+        <mc:Fallback>
+          <p:sp>
+            <p:nvSpPr>
+              <p:cNvPr id="7" name="6 CuadroTexto"/>
+              <p:cNvSpPr txBox="1">
+                <a:spLocks noRot="1" noChangeAspect="1" noMove="1" noResize="1" noEditPoints="1" noAdjustHandles="1" noChangeArrowheads="1" noChangeShapeType="1" noTextEdit="1"/>
+              </p:cNvSpPr>
+              <p:nvPr/>
+            </p:nvSpPr>
+            <p:spPr>
+              <a:xfrm>
+                <a:off x="2676753" y="5786649"/>
+                <a:ext cx="3834511" cy="400110"/>
+              </a:xfrm>
+              <a:prstGeom prst="rect">
+                <a:avLst/>
+              </a:prstGeom>
+              <a:blipFill rotWithShape="1">
+                <a:blip r:embed="rId3"/>
+                <a:stretch>
+                  <a:fillRect/>
+                </a:stretch>
+              </a:blipFill>
+            </p:spPr>
+            <p:txBody>
+              <a:bodyPr/>
+              <a:lstStyle/>
+              <a:p>
+                <a:r>
+                  <a:rPr lang="es-ES">
+                    <a:noFill/>
+                  </a:rPr>
+                  <a:t> </a:t>
+                </a:r>
+              </a:p>
+            </p:txBody>
+          </p:sp>
+        </mc:Fallback>
+      </mc:AlternateContent>
+      <p:sp>
+        <p:nvSpPr>
+          <p:cNvPr id="8" name="7 Flecha derecha"/>
+          <p:cNvSpPr/>
+          <p:nvPr/>
+        </p:nvSpPr>
+        <p:spPr>
+          <a:xfrm>
+            <a:off x="3877660" y="2351638"/>
+            <a:ext cx="1368152" cy="230832"/>
+          </a:xfrm>
+          <a:prstGeom prst="rightArrow">
+            <a:avLst/>
+          </a:prstGeom>
+          <a:solidFill>
+            <a:schemeClr val="tx1"/>
+          </a:solidFill>
+          <a:ln>
+            <a:solidFill>
+              <a:schemeClr val="tx1"/>
+            </a:solidFill>
+          </a:ln>
+        </p:spPr>
+        <p:style>
+          <a:lnRef idx="2">
+            <a:schemeClr val="accent1">
+              <a:shade val="50000"/>
+            </a:schemeClr>
+          </a:lnRef>
+          <a:fillRef idx="1">
+            <a:schemeClr val="accent1"/>
+          </a:fillRef>
+          <a:effectRef idx="0">
+            <a:schemeClr val="accent1"/>
+          </a:effectRef>
+          <a:fontRef idx="minor">
+            <a:schemeClr val="lt1"/>
+          </a:fontRef>
+        </p:style>
+        <p:txBody>
+          <a:bodyPr rtlCol="0" anchor="ctr"/>
+          <a:lstStyle/>
+          <a:p>
+            <a:pPr algn="ctr"/>
+            <a:endParaRPr lang="es-ES"/>
+          </a:p>
+        </p:txBody>
+      </p:sp>
+      <mc:AlternateContent xmlns:mc="http://schemas.openxmlformats.org/markup-compatibility/2006">
+        <mc:Choice xmlns:a14="http://schemas.microsoft.com/office/drawing/2010/main" Requires="a14">
+          <p:sp>
+            <p:nvSpPr>
+              <p:cNvPr id="9" name="8 CuadroTexto"/>
+              <p:cNvSpPr txBox="1"/>
+              <p:nvPr/>
+            </p:nvSpPr>
+            <p:spPr>
+              <a:xfrm>
+                <a:off x="5315378" y="2236221"/>
+                <a:ext cx="2359941" cy="461665"/>
+              </a:xfrm>
+              <a:prstGeom prst="rect">
+                <a:avLst/>
+              </a:prstGeom>
+              <a:noFill/>
+            </p:spPr>
+            <p:txBody>
+              <a:bodyPr wrap="none" rtlCol="0">
+                <a:spAutoFit/>
+              </a:bodyPr>
+              <a:lstStyle/>
+              <a:p>
+                <a:r>
+                  <a:rPr lang="es-ES" sz="2400" dirty="0" smtClean="0"/>
+                  <a:t>Subrutina </a:t>
+                </a:r>
+                <a:r>
+                  <a:rPr lang="es-ES" sz="2400" i="1" dirty="0" smtClean="0"/>
+                  <a:t>P</a:t>
+                </a:r>
+                <a:r>
+                  <a:rPr lang="es-ES" sz="2400" dirty="0" smtClean="0"/>
+                  <a:t>(</a:t>
+                </a:r>
+                <a:r>
+                  <a:rPr lang="es-ES" sz="2400" i="1" dirty="0" smtClean="0"/>
+                  <a:t>q, </a:t>
+                </a:r>
+                <a14:m>
+                  <m:oMath xmlns:m="http://schemas.openxmlformats.org/officeDocument/2006/math">
+                    <m:r>
+                      <m:rPr>
+                        <m:sty m:val="p"/>
+                      </m:rPr>
+                      <a:rPr lang="el-GR" sz="2400" i="1">
+                        <a:latin typeface="Cambria Math"/>
+                        <a:ea typeface="Cambria Math"/>
+                      </a:rPr>
+                      <m:t>Ψ</m:t>
+                    </m:r>
+                  </m:oMath>
+                </a14:m>
+                <a:r>
+                  <a:rPr lang="es-ES" sz="2400" dirty="0" smtClean="0"/>
+                  <a:t>)</a:t>
+                </a:r>
+                <a:endParaRPr lang="es-ES" sz="2400" dirty="0"/>
+              </a:p>
+            </p:txBody>
+          </p:sp>
+        </mc:Choice>
+        <mc:Fallback>
+          <p:sp>
+            <p:nvSpPr>
+              <p:cNvPr id="9" name="8 CuadroTexto"/>
+              <p:cNvSpPr txBox="1">
+                <a:spLocks noRot="1" noChangeAspect="1" noMove="1" noResize="1" noEditPoints="1" noAdjustHandles="1" noChangeArrowheads="1" noChangeShapeType="1" noTextEdit="1"/>
+              </p:cNvSpPr>
+              <p:nvPr/>
+            </p:nvSpPr>
+            <p:spPr>
+              <a:xfrm>
+                <a:off x="5315378" y="2236221"/>
+                <a:ext cx="2359941" cy="461665"/>
+              </a:xfrm>
+              <a:prstGeom prst="rect">
+                <a:avLst/>
+              </a:prstGeom>
+              <a:blipFill rotWithShape="1">
+                <a:blip r:embed="rId4"/>
+                <a:stretch>
+                  <a:fillRect l="-4134" t="-10526" r="-2842" b="-28947"/>
+                </a:stretch>
+              </a:blipFill>
+            </p:spPr>
+            <p:txBody>
+              <a:bodyPr/>
+              <a:lstStyle/>
+              <a:p>
+                <a:r>
+                  <a:rPr lang="es-ES">
+                    <a:noFill/>
+                  </a:rPr>
+                  <a:t> </a:t>
+                </a:r>
+              </a:p>
+            </p:txBody>
+          </p:sp>
+        </mc:Fallback>
+      </mc:AlternateContent>
+      <p:pic>
+        <p:nvPicPr>
+          <p:cNvPr id="10" name="9 Imagen"/>
+          <p:cNvPicPr/>
+          <p:nvPr/>
+        </p:nvPicPr>
+        <p:blipFill>
+          <a:blip r:embed="rId5" cstate="print">
+            <a:extLst>
+              <a:ext uri="{28A0092B-C50C-407E-A947-70E740481C1C}">
+                <a14:useLocalDpi xmlns:a14="http://schemas.microsoft.com/office/drawing/2010/main" val="0"/>
+              </a:ext>
+            </a:extLst>
+          </a:blip>
+          <a:srcRect/>
+          <a:stretch>
+            <a:fillRect/>
+          </a:stretch>
+        </p:blipFill>
+        <p:spPr bwMode="auto">
+          <a:xfrm>
+            <a:off x="1668855" y="3573016"/>
+            <a:ext cx="5850309" cy="1584176"/>
+          </a:xfrm>
+          <a:prstGeom prst="rect">
+            <a:avLst/>
+          </a:prstGeom>
+          <a:noFill/>
+        </p:spPr>
+      </p:pic>
+      <p:cxnSp>
+        <p:nvCxnSpPr>
+          <p:cNvPr id="12" name="11 Conector recto"/>
+          <p:cNvCxnSpPr/>
+          <p:nvPr/>
+        </p:nvCxnSpPr>
+        <p:spPr>
+          <a:xfrm>
+            <a:off x="683568" y="3262830"/>
+            <a:ext cx="7776864" cy="0"/>
+          </a:xfrm>
+          <a:prstGeom prst="line">
+            <a:avLst/>
+          </a:prstGeom>
+          <a:ln w="28575">
+            <a:solidFill>
+              <a:schemeClr val="tx1"/>
+            </a:solidFill>
+          </a:ln>
+        </p:spPr>
+        <p:style>
+          <a:lnRef idx="1">
+            <a:schemeClr val="accent1"/>
+          </a:lnRef>
+          <a:fillRef idx="0">
+            <a:schemeClr val="accent1"/>
+          </a:fillRef>
+          <a:effectRef idx="0">
+            <a:schemeClr val="accent1"/>
+          </a:effectRef>
+          <a:fontRef idx="minor">
+            <a:schemeClr val="tx1"/>
+          </a:fontRef>
+        </p:style>
+      </p:cxnSp>
+      <mc:AlternateContent xmlns:mc="http://schemas.openxmlformats.org/markup-compatibility/2006">
+        <mc:Choice xmlns:a14="http://schemas.microsoft.com/office/drawing/2010/main" Requires="a14">
+          <p:sp>
+            <p:nvSpPr>
+              <p:cNvPr id="13" name="12 CuadroTexto"/>
+              <p:cNvSpPr txBox="1"/>
+              <p:nvPr/>
+            </p:nvSpPr>
+            <p:spPr>
+              <a:xfrm>
+                <a:off x="2644480" y="6197242"/>
+                <a:ext cx="3834511" cy="400110"/>
+              </a:xfrm>
+              <a:prstGeom prst="rect">
+                <a:avLst/>
+              </a:prstGeom>
+              <a:noFill/>
+            </p:spPr>
+            <p:txBody>
+              <a:bodyPr wrap="none" rtlCol="0">
+                <a:spAutoFit/>
+              </a:bodyPr>
+              <a:lstStyle/>
+              <a:p>
+                <a14:m>
+                  <m:oMathPara xmlns:m="http://schemas.openxmlformats.org/officeDocument/2006/math">
+                    <m:oMathParaPr>
+                      <m:jc m:val="centerGroup"/>
+                    </m:oMathParaPr>
+                    <m:oMath xmlns:m="http://schemas.openxmlformats.org/officeDocument/2006/math">
+                      <m:r>
+                        <a:rPr lang="es-ES" sz="2000" b="0" i="1" smtClean="0">
+                          <a:latin typeface="Cambria Math"/>
+                        </a:rPr>
+                        <m:t>𝑋</m:t>
+                      </m:r>
+                      <m:d>
+                        <m:dPr>
+                          <m:ctrlPr>
+                            <a:rPr lang="es-ES" sz="2000" b="0" i="1" smtClean="0">
+                              <a:latin typeface="Cambria Math"/>
+                            </a:rPr>
+                          </m:ctrlPr>
+                        </m:dPr>
+                        <m:e>
+                          <m:r>
+                            <a:rPr lang="es-ES" sz="2000" b="0" i="1" smtClean="0">
+                              <a:latin typeface="Cambria Math"/>
+                            </a:rPr>
+                            <m:t>2, </m:t>
+                          </m:r>
+                          <m:d>
+                            <m:dPr>
+                              <m:begChr m:val="{"/>
+                              <m:endChr m:val="}"/>
+                              <m:ctrlPr>
+                                <a:rPr lang="es-ES" sz="2000" i="1" smtClean="0">
+                                  <a:latin typeface="Cambria Math"/>
+                                </a:rPr>
+                              </m:ctrlPr>
+                            </m:dPr>
+                            <m:e>
+                              <m:d>
+                                <m:dPr>
+                                  <m:begChr m:val="["/>
+                                  <m:endChr m:val="]"/>
+                                  <m:ctrlPr>
+                                    <a:rPr lang="es-ES" sz="2000" i="1" smtClean="0">
+                                      <a:latin typeface="Cambria Math"/>
+                                    </a:rPr>
+                                  </m:ctrlPr>
+                                </m:dPr>
+                                <m:e>
+                                  <m:r>
+                                    <a:rPr lang="es-ES" sz="2000" b="0" i="1" smtClean="0">
+                                      <a:latin typeface="Cambria Math"/>
+                                    </a:rPr>
+                                    <m:t>100</m:t>
+                                  </m:r>
+                                  <m:r>
+                                    <a:rPr lang="es-ES" sz="2000" b="0" i="1" smtClean="0">
+                                      <a:latin typeface="Cambria Math"/>
+                                      <a:ea typeface="Cambria Math"/>
+                                    </a:rPr>
+                                    <m:t>→1</m:t>
+                                  </m:r>
+                                </m:e>
+                              </m:d>
+                            </m:e>
+                          </m:d>
+                        </m:e>
+                      </m:d>
+                      <m:r>
+                        <a:rPr lang="es-ES" sz="2000" b="0" i="1" smtClean="0">
+                          <a:latin typeface="Cambria Math"/>
+                          <a:ea typeface="Cambria Math"/>
+                        </a:rPr>
+                        <m:t>→</m:t>
+                      </m:r>
+                      <m:d>
+                        <m:dPr>
+                          <m:begChr m:val="{"/>
+                          <m:endChr m:val="}"/>
+                          <m:ctrlPr>
+                            <a:rPr lang="es-ES" sz="2000" i="1">
+                              <a:latin typeface="Cambria Math"/>
+                            </a:rPr>
+                          </m:ctrlPr>
+                        </m:dPr>
+                        <m:e>
+                          <m:d>
+                            <m:dPr>
+                              <m:begChr m:val="["/>
+                              <m:endChr m:val="]"/>
+                              <m:ctrlPr>
+                                <a:rPr lang="es-ES" sz="2000" i="1">
+                                  <a:latin typeface="Cambria Math"/>
+                                </a:rPr>
+                              </m:ctrlPr>
+                            </m:dPr>
+                            <m:e>
+                              <m:r>
+                                <a:rPr lang="es-ES" sz="2000" b="0" i="1" smtClean="0">
+                                  <a:latin typeface="Cambria Math"/>
+                                </a:rPr>
+                                <m:t>1</m:t>
+                              </m:r>
+                              <m:r>
+                                <a:rPr lang="es-ES" sz="2000" i="1">
+                                  <a:latin typeface="Cambria Math"/>
+                                </a:rPr>
+                                <m:t>0</m:t>
+                              </m:r>
+                              <m:r>
+                                <a:rPr lang="es-ES" sz="2000" b="0" i="1" smtClean="0">
+                                  <a:latin typeface="Cambria Math"/>
+                                </a:rPr>
+                                <m:t>1</m:t>
+                              </m:r>
+                              <m:r>
+                                <a:rPr lang="es-ES" sz="2000" i="1">
+                                  <a:latin typeface="Cambria Math"/>
+                                  <a:ea typeface="Cambria Math"/>
+                                </a:rPr>
+                                <m:t>→1</m:t>
+                              </m:r>
+                            </m:e>
+                          </m:d>
+                        </m:e>
+                      </m:d>
+                    </m:oMath>
+                  </m:oMathPara>
+                </a14:m>
+                <a:endParaRPr lang="es-ES" sz="2000" dirty="0"/>
+              </a:p>
+            </p:txBody>
+          </p:sp>
+        </mc:Choice>
+        <mc:Fallback>
+          <p:sp>
+            <p:nvSpPr>
+              <p:cNvPr id="13" name="12 CuadroTexto"/>
+              <p:cNvSpPr txBox="1">
+                <a:spLocks noRot="1" noChangeAspect="1" noMove="1" noResize="1" noEditPoints="1" noAdjustHandles="1" noChangeArrowheads="1" noChangeShapeType="1" noTextEdit="1"/>
+              </p:cNvSpPr>
+              <p:nvPr/>
+            </p:nvSpPr>
+            <p:spPr>
+              <a:xfrm>
+                <a:off x="2644480" y="6197242"/>
+                <a:ext cx="3834511" cy="400110"/>
+              </a:xfrm>
+              <a:prstGeom prst="rect">
+                <a:avLst/>
+              </a:prstGeom>
+              <a:blipFill rotWithShape="1">
+                <a:blip r:embed="rId6"/>
+                <a:stretch>
+                  <a:fillRect/>
+                </a:stretch>
+              </a:blipFill>
+            </p:spPr>
+            <p:txBody>
+              <a:bodyPr/>
+              <a:lstStyle/>
+              <a:p>
+                <a:r>
+                  <a:rPr lang="es-ES">
+                    <a:noFill/>
+                  </a:rPr>
+                  <a:t> </a:t>
+                </a:r>
+              </a:p>
+            </p:txBody>
+          </p:sp>
+        </mc:Fallback>
+      </mc:AlternateContent>
+      <p:sp>
+        <p:nvSpPr>
+          <p:cNvPr id="14" name="13 Flecha abajo"/>
+          <p:cNvSpPr/>
+          <p:nvPr/>
+        </p:nvSpPr>
+        <p:spPr>
+          <a:xfrm>
+            <a:off x="4113087" y="5078806"/>
+            <a:ext cx="961844" cy="557449"/>
+          </a:xfrm>
+          <a:prstGeom prst="downArrow">
+            <a:avLst/>
+          </a:prstGeom>
+        </p:spPr>
+        <p:style>
+          <a:lnRef idx="2">
+            <a:schemeClr val="dk1">
+              <a:shade val="50000"/>
+            </a:schemeClr>
+          </a:lnRef>
+          <a:fillRef idx="1">
+            <a:schemeClr val="dk1"/>
+          </a:fillRef>
+          <a:effectRef idx="0">
+            <a:schemeClr val="dk1"/>
+          </a:effectRef>
+          <a:fontRef idx="minor">
+            <a:schemeClr val="lt1"/>
+          </a:fontRef>
+        </p:style>
+        <p:txBody>
+          <a:bodyPr rtlCol="0" anchor="ctr"/>
+          <a:lstStyle/>
+          <a:p>
+            <a:pPr algn="ctr"/>
+            <a:endParaRPr lang="es-ES"/>
+          </a:p>
+        </p:txBody>
+      </p:sp>
+    </p:spTree>
+    <p:extLst>
+      <p:ext uri="{BB962C8B-B14F-4D97-AF65-F5344CB8AC3E}">
+        <p14:creationId xmlns:p14="http://schemas.microsoft.com/office/powerpoint/2010/main" val="2876512080"/>
+      </p:ext>
+    </p:extLst>
+  </p:cSld>
+  <p:clrMapOvr>
+    <a:masterClrMapping/>
+  </p:clrMapOvr>
+  <p:timing>
+    <p:tnLst>
+      <p:par>
+        <p:cTn id="1" dur="indefinite" restart="never" nodeType="tmRoot"/>
+      </p:par>
+    </p:tnLst>
+  </p:timing>
+</p:sld>
+</file>
+
+<file path=ppt/slides/slide22.xml><?xml version="1.0" encoding="utf-8"?>
+<p:sld xmlns:a="http://schemas.openxmlformats.org/drawingml/2006/main" xmlns:r="http://schemas.openxmlformats.org/officeDocument/2006/relationships" xmlns:p="http://schemas.openxmlformats.org/presentationml/2006/main">
+  <p:cSld>
+    <p:spTree>
+      <p:nvGrpSpPr>
+        <p:cNvPr id="1" name=""/>
+        <p:cNvGrpSpPr/>
+        <p:nvPr/>
+      </p:nvGrpSpPr>
+      <p:grpSpPr>
+        <a:xfrm>
+          <a:off x="0" y="0"/>
+          <a:ext cx="0" cy="0"/>
+          <a:chOff x="0" y="0"/>
+          <a:chExt cx="0" cy="0"/>
+        </a:xfrm>
+      </p:grpSpPr>
+      <p:sp>
+        <p:nvSpPr>
+          <p:cNvPr id="4" name="3 CuadroTexto"/>
+          <p:cNvSpPr txBox="1"/>
+          <p:nvPr/>
+        </p:nvSpPr>
+        <p:spPr>
+          <a:xfrm>
+            <a:off x="3335279" y="398910"/>
+            <a:ext cx="2452916" cy="707886"/>
+          </a:xfrm>
+          <a:prstGeom prst="rect">
+            <a:avLst/>
+          </a:prstGeom>
+          <a:noFill/>
+        </p:spPr>
+        <p:txBody>
+          <a:bodyPr wrap="none" rtlCol="0">
+            <a:spAutoFit/>
+          </a:bodyPr>
+          <a:lstStyle/>
+          <a:p>
+            <a:r>
+              <a:rPr lang="es-ES" sz="4000" dirty="0" smtClean="0"/>
+              <a:t>Simulación</a:t>
+            </a:r>
+            <a:endParaRPr lang="es-ES" sz="4000" dirty="0"/>
+          </a:p>
+        </p:txBody>
+      </p:sp>
+      <p:sp>
+        <p:nvSpPr>
+          <p:cNvPr id="5" name="4 CuadroTexto"/>
+          <p:cNvSpPr txBox="1"/>
+          <p:nvPr/>
+        </p:nvSpPr>
+        <p:spPr>
+          <a:xfrm>
+            <a:off x="2110136" y="1106796"/>
+            <a:ext cx="4903202" cy="523220"/>
+          </a:xfrm>
+          <a:prstGeom prst="rect">
+            <a:avLst/>
+          </a:prstGeom>
+          <a:noFill/>
+        </p:spPr>
+        <p:txBody>
+          <a:bodyPr wrap="none" rtlCol="0">
+            <a:spAutoFit/>
+          </a:bodyPr>
+          <a:lstStyle/>
+          <a:p>
+            <a:r>
+              <a:rPr lang="es-ES" sz="2800" i="1" dirty="0" smtClean="0"/>
+              <a:t>Motor de simulación de </a:t>
+            </a:r>
+            <a:r>
+              <a:rPr lang="es-ES" sz="2800" i="1" dirty="0" smtClean="0"/>
+              <a:t>circuitos</a:t>
+            </a:r>
+            <a:endParaRPr lang="es-ES" sz="2800" i="1" dirty="0"/>
+          </a:p>
+        </p:txBody>
+      </p:sp>
+      <p:cxnSp>
+        <p:nvCxnSpPr>
+          <p:cNvPr id="6" name="5 Conector recto"/>
+          <p:cNvCxnSpPr/>
+          <p:nvPr/>
+        </p:nvCxnSpPr>
+        <p:spPr>
+          <a:xfrm flipV="1">
+            <a:off x="2373422" y="2663351"/>
+            <a:ext cx="4752528" cy="11313"/>
+          </a:xfrm>
+          <a:prstGeom prst="line">
+            <a:avLst/>
+          </a:prstGeom>
+          <a:ln w="19050">
+            <a:solidFill>
+              <a:schemeClr val="tx1"/>
+            </a:solidFill>
+          </a:ln>
+        </p:spPr>
+        <p:style>
+          <a:lnRef idx="1">
+            <a:schemeClr val="accent1"/>
+          </a:lnRef>
+          <a:fillRef idx="0">
+            <a:schemeClr val="accent1"/>
+          </a:fillRef>
+          <a:effectRef idx="0">
+            <a:schemeClr val="accent1"/>
+          </a:effectRef>
+          <a:fontRef idx="minor">
+            <a:schemeClr val="tx1"/>
+          </a:fontRef>
+        </p:style>
+      </p:cxnSp>
+      <p:cxnSp>
+        <p:nvCxnSpPr>
+          <p:cNvPr id="7" name="6 Conector recto"/>
+          <p:cNvCxnSpPr/>
+          <p:nvPr/>
+        </p:nvCxnSpPr>
+        <p:spPr>
+          <a:xfrm flipV="1">
+            <a:off x="2373422" y="3721644"/>
+            <a:ext cx="4752528" cy="1"/>
+          </a:xfrm>
+          <a:prstGeom prst="line">
+            <a:avLst/>
+          </a:prstGeom>
+          <a:ln w="19050">
+            <a:solidFill>
+              <a:schemeClr val="tx1"/>
+            </a:solidFill>
+          </a:ln>
+        </p:spPr>
+        <p:style>
+          <a:lnRef idx="1">
+            <a:schemeClr val="accent1"/>
+          </a:lnRef>
+          <a:fillRef idx="0">
+            <a:schemeClr val="accent1"/>
+          </a:fillRef>
+          <a:effectRef idx="0">
+            <a:schemeClr val="accent1"/>
+          </a:effectRef>
+          <a:fontRef idx="minor">
+            <a:schemeClr val="tx1"/>
+          </a:fontRef>
+        </p:style>
+      </p:cxnSp>
+      <p:sp>
+        <p:nvSpPr>
+          <p:cNvPr id="13" name="12 Rectángulo"/>
+          <p:cNvSpPr/>
+          <p:nvPr/>
+        </p:nvSpPr>
+        <p:spPr>
+          <a:xfrm>
+            <a:off x="2843808" y="2489997"/>
+            <a:ext cx="360040" cy="370493"/>
+          </a:xfrm>
+          <a:prstGeom prst="rect">
+            <a:avLst/>
+          </a:prstGeom>
+          <a:solidFill>
+            <a:schemeClr val="bg1"/>
+          </a:solidFill>
+          <a:ln>
+            <a:solidFill>
+              <a:schemeClr val="tx1"/>
+            </a:solidFill>
+          </a:ln>
+        </p:spPr>
+        <p:style>
+          <a:lnRef idx="2">
+            <a:schemeClr val="accent1">
+              <a:shade val="50000"/>
+            </a:schemeClr>
+          </a:lnRef>
+          <a:fillRef idx="1">
+            <a:schemeClr val="accent1"/>
+          </a:fillRef>
+          <a:effectRef idx="0">
+            <a:schemeClr val="accent1"/>
+          </a:effectRef>
+          <a:fontRef idx="minor">
+            <a:schemeClr val="lt1"/>
+          </a:fontRef>
+        </p:style>
+        <p:txBody>
+          <a:bodyPr rtlCol="0" anchor="ctr"/>
+          <a:lstStyle/>
+          <a:p>
+            <a:pPr algn="ctr"/>
+            <a:r>
+              <a:rPr lang="es-ES" dirty="0" smtClean="0">
+                <a:solidFill>
+                  <a:schemeClr val="tx1"/>
+                </a:solidFill>
+              </a:rPr>
+              <a:t>H</a:t>
+            </a:r>
+            <a:endParaRPr lang="es-ES" dirty="0">
+              <a:solidFill>
+                <a:schemeClr val="tx1"/>
+              </a:solidFill>
+            </a:endParaRPr>
+          </a:p>
+        </p:txBody>
+      </p:sp>
+      <p:sp>
+        <p:nvSpPr>
+          <p:cNvPr id="14" name="13 Rectángulo"/>
+          <p:cNvSpPr/>
+          <p:nvPr/>
+        </p:nvSpPr>
+        <p:spPr>
+          <a:xfrm>
+            <a:off x="2843808" y="3536398"/>
+            <a:ext cx="360040" cy="370493"/>
+          </a:xfrm>
+          <a:prstGeom prst="rect">
+            <a:avLst/>
+          </a:prstGeom>
+          <a:solidFill>
+            <a:schemeClr val="bg1"/>
+          </a:solidFill>
+          <a:ln>
+            <a:solidFill>
+              <a:schemeClr val="tx1"/>
+            </a:solidFill>
+          </a:ln>
+        </p:spPr>
+        <p:style>
+          <a:lnRef idx="2">
+            <a:schemeClr val="accent1">
+              <a:shade val="50000"/>
+            </a:schemeClr>
+          </a:lnRef>
+          <a:fillRef idx="1">
+            <a:schemeClr val="accent1"/>
+          </a:fillRef>
+          <a:effectRef idx="0">
+            <a:schemeClr val="accent1"/>
+          </a:effectRef>
+          <a:fontRef idx="minor">
+            <a:schemeClr val="lt1"/>
+          </a:fontRef>
+        </p:style>
+        <p:txBody>
+          <a:bodyPr rtlCol="0" anchor="ctr"/>
+          <a:lstStyle/>
+          <a:p>
+            <a:pPr algn="ctr"/>
+            <a:r>
+              <a:rPr lang="es-ES" dirty="0" smtClean="0">
+                <a:solidFill>
+                  <a:schemeClr val="tx1"/>
+                </a:solidFill>
+              </a:rPr>
+              <a:t>H</a:t>
+            </a:r>
+            <a:endParaRPr lang="es-ES" dirty="0">
+              <a:solidFill>
+                <a:schemeClr val="tx1"/>
+              </a:solidFill>
+            </a:endParaRPr>
+          </a:p>
+        </p:txBody>
+      </p:sp>
+      <p:sp>
+        <p:nvSpPr>
+          <p:cNvPr id="15" name="14 Rectángulo"/>
+          <p:cNvSpPr/>
+          <p:nvPr/>
+        </p:nvSpPr>
+        <p:spPr>
+          <a:xfrm>
+            <a:off x="5080724" y="2489997"/>
+            <a:ext cx="360040" cy="370493"/>
+          </a:xfrm>
+          <a:prstGeom prst="rect">
+            <a:avLst/>
+          </a:prstGeom>
+          <a:solidFill>
+            <a:schemeClr val="bg1"/>
+          </a:solidFill>
+          <a:ln>
+            <a:solidFill>
+              <a:schemeClr val="tx1"/>
+            </a:solidFill>
+          </a:ln>
+        </p:spPr>
+        <p:style>
+          <a:lnRef idx="2">
+            <a:schemeClr val="accent1">
+              <a:shade val="50000"/>
+            </a:schemeClr>
+          </a:lnRef>
+          <a:fillRef idx="1">
+            <a:schemeClr val="accent1"/>
+          </a:fillRef>
+          <a:effectRef idx="0">
+            <a:schemeClr val="accent1"/>
+          </a:effectRef>
+          <a:fontRef idx="minor">
+            <a:schemeClr val="lt1"/>
+          </a:fontRef>
+        </p:style>
+        <p:txBody>
+          <a:bodyPr rtlCol="0" anchor="ctr"/>
+          <a:lstStyle/>
+          <a:p>
+            <a:pPr algn="ctr"/>
+            <a:r>
+              <a:rPr lang="es-ES" dirty="0" smtClean="0">
+                <a:solidFill>
+                  <a:schemeClr val="tx1"/>
+                </a:solidFill>
+              </a:rPr>
+              <a:t>H</a:t>
+            </a:r>
+            <a:endParaRPr lang="es-ES" dirty="0">
+              <a:solidFill>
+                <a:schemeClr val="tx1"/>
+              </a:solidFill>
+            </a:endParaRPr>
+          </a:p>
+        </p:txBody>
+      </p:sp>
+      <p:sp>
+        <p:nvSpPr>
+          <p:cNvPr id="16" name="15 Rectángulo"/>
+          <p:cNvSpPr/>
+          <p:nvPr/>
+        </p:nvSpPr>
+        <p:spPr>
+          <a:xfrm>
+            <a:off x="6199182" y="2489034"/>
+            <a:ext cx="360040" cy="359945"/>
+          </a:xfrm>
+          <a:prstGeom prst="rect">
+            <a:avLst/>
+          </a:prstGeom>
+          <a:blipFill>
+            <a:blip r:embed="rId2"/>
+            <a:stretch>
+              <a:fillRect/>
+            </a:stretch>
+          </a:blipFill>
+        </p:spPr>
+        <p:style>
+          <a:lnRef idx="2">
+            <a:schemeClr val="dk1"/>
+          </a:lnRef>
+          <a:fillRef idx="1">
+            <a:schemeClr val="lt1"/>
+          </a:fillRef>
+          <a:effectRef idx="0">
+            <a:schemeClr val="dk1"/>
+          </a:effectRef>
+          <a:fontRef idx="minor">
+            <a:schemeClr val="dk1"/>
+          </a:fontRef>
+        </p:style>
+        <p:txBody>
+          <a:bodyPr rtlCol="0" anchor="ctr"/>
+          <a:lstStyle/>
+          <a:p>
+            <a:endParaRPr lang="es-ES"/>
+          </a:p>
+        </p:txBody>
+      </p:sp>
+      <p:sp>
+        <p:nvSpPr>
+          <p:cNvPr id="32" name="31 Elipse"/>
+          <p:cNvSpPr/>
+          <p:nvPr/>
+        </p:nvSpPr>
+        <p:spPr>
+          <a:xfrm>
+            <a:off x="4075481" y="2621314"/>
+            <a:ext cx="107858" cy="107858"/>
+          </a:xfrm>
+          <a:prstGeom prst="ellipse">
+            <a:avLst/>
+          </a:prstGeom>
+          <a:ln w="19050">
+            <a:solidFill>
+              <a:schemeClr val="tx1"/>
+            </a:solidFill>
+          </a:ln>
+        </p:spPr>
+        <p:style>
+          <a:lnRef idx="2">
+            <a:schemeClr val="dk1">
+              <a:shade val="50000"/>
+            </a:schemeClr>
+          </a:lnRef>
+          <a:fillRef idx="1">
+            <a:schemeClr val="dk1"/>
+          </a:fillRef>
+          <a:effectRef idx="0">
+            <a:schemeClr val="dk1"/>
+          </a:effectRef>
+          <a:fontRef idx="minor">
+            <a:schemeClr val="lt1"/>
+          </a:fontRef>
+        </p:style>
+        <p:txBody>
+          <a:bodyPr rtlCol="0" anchor="ctr"/>
+          <a:lstStyle/>
+          <a:p>
+            <a:pPr algn="ctr"/>
+            <a:endParaRPr lang="es-ES"/>
+          </a:p>
+        </p:txBody>
+      </p:sp>
+      <p:sp>
+        <p:nvSpPr>
+          <p:cNvPr id="33" name="32 Elipse"/>
+          <p:cNvSpPr/>
+          <p:nvPr/>
+        </p:nvSpPr>
+        <p:spPr>
+          <a:xfrm>
+            <a:off x="3995936" y="3577629"/>
+            <a:ext cx="288032" cy="288032"/>
+          </a:xfrm>
+          <a:prstGeom prst="ellipse">
+            <a:avLst/>
+          </a:prstGeom>
+          <a:noFill/>
+          <a:ln w="19050">
+            <a:solidFill>
+              <a:schemeClr val="tx1"/>
+            </a:solidFill>
+          </a:ln>
+        </p:spPr>
+        <p:style>
+          <a:lnRef idx="2">
+            <a:schemeClr val="dk1"/>
+          </a:lnRef>
+          <a:fillRef idx="1">
+            <a:schemeClr val="lt1"/>
+          </a:fillRef>
+          <a:effectRef idx="0">
+            <a:schemeClr val="dk1"/>
+          </a:effectRef>
+          <a:fontRef idx="minor">
+            <a:schemeClr val="dk1"/>
+          </a:fontRef>
+        </p:style>
+        <p:txBody>
+          <a:bodyPr rtlCol="0" anchor="ctr"/>
+          <a:lstStyle/>
+          <a:p>
+            <a:pPr algn="ctr"/>
+            <a:endParaRPr lang="es-ES"/>
+          </a:p>
+        </p:txBody>
+      </p:sp>
+      <p:cxnSp>
+        <p:nvCxnSpPr>
+          <p:cNvPr id="34" name="33 Conector recto"/>
+          <p:cNvCxnSpPr>
+            <a:stCxn id="32" idx="4"/>
+          </p:cNvCxnSpPr>
+          <p:nvPr/>
+        </p:nvCxnSpPr>
+        <p:spPr>
+          <a:xfrm>
+            <a:off x="4129410" y="2729172"/>
+            <a:ext cx="10542" cy="1136489"/>
+          </a:xfrm>
+          <a:prstGeom prst="line">
+            <a:avLst/>
+          </a:prstGeom>
+          <a:ln w="19050">
+            <a:solidFill>
+              <a:schemeClr val="tx1"/>
+            </a:solidFill>
+          </a:ln>
+        </p:spPr>
+        <p:style>
+          <a:lnRef idx="1">
+            <a:schemeClr val="dk1"/>
+          </a:lnRef>
+          <a:fillRef idx="0">
+            <a:schemeClr val="dk1"/>
+          </a:fillRef>
+          <a:effectRef idx="0">
+            <a:schemeClr val="dk1"/>
+          </a:effectRef>
+          <a:fontRef idx="minor">
+            <a:schemeClr val="tx1"/>
+          </a:fontRef>
+        </p:style>
+      </p:cxnSp>
+      <p:sp>
+        <p:nvSpPr>
+          <p:cNvPr id="36" name="35 Rectángulo"/>
+          <p:cNvSpPr/>
+          <p:nvPr/>
+        </p:nvSpPr>
+        <p:spPr>
+          <a:xfrm>
+            <a:off x="2464599" y="2174957"/>
+            <a:ext cx="1118458" cy="2016224"/>
+          </a:xfrm>
+          <a:prstGeom prst="rect">
+            <a:avLst/>
+          </a:prstGeom>
+          <a:noFill/>
+          <a:ln>
+            <a:solidFill>
+              <a:schemeClr val="tx1"/>
+            </a:solidFill>
+          </a:ln>
+        </p:spPr>
+        <p:style>
+          <a:lnRef idx="2">
+            <a:schemeClr val="accent1">
+              <a:shade val="50000"/>
+            </a:schemeClr>
+          </a:lnRef>
+          <a:fillRef idx="1">
+            <a:schemeClr val="accent1"/>
+          </a:fillRef>
+          <a:effectRef idx="0">
+            <a:schemeClr val="accent1"/>
+          </a:effectRef>
+          <a:fontRef idx="minor">
+            <a:schemeClr val="lt1"/>
+          </a:fontRef>
+        </p:style>
+        <p:txBody>
+          <a:bodyPr rtlCol="0" anchor="ctr"/>
+          <a:lstStyle/>
+          <a:p>
+            <a:pPr algn="ctr"/>
+            <a:endParaRPr lang="es-ES" dirty="0"/>
+          </a:p>
+        </p:txBody>
+      </p:sp>
+      <p:sp>
+        <p:nvSpPr>
+          <p:cNvPr id="37" name="36 Rectángulo"/>
+          <p:cNvSpPr/>
+          <p:nvPr/>
+        </p:nvSpPr>
+        <p:spPr>
+          <a:xfrm>
+            <a:off x="3583057" y="2174957"/>
+            <a:ext cx="1118458" cy="2016224"/>
+          </a:xfrm>
+          <a:prstGeom prst="rect">
+            <a:avLst/>
+          </a:prstGeom>
+          <a:noFill/>
+          <a:ln>
+            <a:solidFill>
+              <a:schemeClr val="tx1"/>
+            </a:solidFill>
+          </a:ln>
+        </p:spPr>
+        <p:style>
+          <a:lnRef idx="2">
+            <a:schemeClr val="accent1">
+              <a:shade val="50000"/>
+            </a:schemeClr>
+          </a:lnRef>
+          <a:fillRef idx="1">
+            <a:schemeClr val="accent1"/>
+          </a:fillRef>
+          <a:effectRef idx="0">
+            <a:schemeClr val="accent1"/>
+          </a:effectRef>
+          <a:fontRef idx="minor">
+            <a:schemeClr val="lt1"/>
+          </a:fontRef>
+        </p:style>
+        <p:txBody>
+          <a:bodyPr rtlCol="0" anchor="ctr"/>
+          <a:lstStyle/>
+          <a:p>
+            <a:pPr algn="ctr"/>
+            <a:endParaRPr lang="es-ES" dirty="0"/>
+          </a:p>
+        </p:txBody>
+      </p:sp>
+      <p:sp>
+        <p:nvSpPr>
+          <p:cNvPr id="38" name="37 Rectángulo"/>
+          <p:cNvSpPr/>
+          <p:nvPr/>
+        </p:nvSpPr>
+        <p:spPr>
+          <a:xfrm>
+            <a:off x="4701515" y="2174957"/>
+            <a:ext cx="1118458" cy="2016224"/>
+          </a:xfrm>
+          <a:prstGeom prst="rect">
+            <a:avLst/>
+          </a:prstGeom>
+          <a:noFill/>
+          <a:ln>
+            <a:solidFill>
+              <a:schemeClr val="tx1"/>
+            </a:solidFill>
+          </a:ln>
+        </p:spPr>
+        <p:style>
+          <a:lnRef idx="2">
+            <a:schemeClr val="accent1">
+              <a:shade val="50000"/>
+            </a:schemeClr>
+          </a:lnRef>
+          <a:fillRef idx="1">
+            <a:schemeClr val="accent1"/>
+          </a:fillRef>
+          <a:effectRef idx="0">
+            <a:schemeClr val="accent1"/>
+          </a:effectRef>
+          <a:fontRef idx="minor">
+            <a:schemeClr val="lt1"/>
+          </a:fontRef>
+        </p:style>
+        <p:txBody>
+          <a:bodyPr rtlCol="0" anchor="ctr"/>
+          <a:lstStyle/>
+          <a:p>
+            <a:pPr algn="ctr"/>
+            <a:endParaRPr lang="es-ES" dirty="0"/>
+          </a:p>
+        </p:txBody>
+      </p:sp>
+      <p:sp>
+        <p:nvSpPr>
+          <p:cNvPr id="39" name="38 Rectángulo"/>
+          <p:cNvSpPr/>
+          <p:nvPr/>
+        </p:nvSpPr>
+        <p:spPr>
+          <a:xfrm>
+            <a:off x="5819973" y="2174957"/>
+            <a:ext cx="1118458" cy="2016224"/>
+          </a:xfrm>
+          <a:prstGeom prst="rect">
+            <a:avLst/>
+          </a:prstGeom>
+          <a:noFill/>
+          <a:ln>
+            <a:solidFill>
+              <a:schemeClr val="tx1"/>
+            </a:solidFill>
+          </a:ln>
+        </p:spPr>
+        <p:style>
+          <a:lnRef idx="2">
+            <a:schemeClr val="accent1">
+              <a:shade val="50000"/>
+            </a:schemeClr>
+          </a:lnRef>
+          <a:fillRef idx="1">
+            <a:schemeClr val="accent1"/>
+          </a:fillRef>
+          <a:effectRef idx="0">
+            <a:schemeClr val="accent1"/>
+          </a:effectRef>
+          <a:fontRef idx="minor">
+            <a:schemeClr val="lt1"/>
+          </a:fontRef>
+        </p:style>
+        <p:txBody>
+          <a:bodyPr rtlCol="0" anchor="ctr"/>
+          <a:lstStyle/>
+          <a:p>
+            <a:pPr algn="ctr"/>
+            <a:endParaRPr lang="es-ES" dirty="0"/>
+          </a:p>
+        </p:txBody>
+      </p:sp>
+      <p:sp>
+        <p:nvSpPr>
+          <p:cNvPr id="40" name="39 CuadroTexto"/>
+          <p:cNvSpPr txBox="1"/>
+          <p:nvPr/>
+        </p:nvSpPr>
+        <p:spPr>
+          <a:xfrm>
+            <a:off x="1627510" y="1778104"/>
+            <a:ext cx="837089" cy="400110"/>
+          </a:xfrm>
+          <a:prstGeom prst="rect">
+            <a:avLst/>
+          </a:prstGeom>
+          <a:noFill/>
+        </p:spPr>
+        <p:txBody>
+          <a:bodyPr wrap="none" rtlCol="0">
+            <a:spAutoFit/>
+          </a:bodyPr>
+          <a:lstStyle/>
+          <a:p>
+            <a:r>
+              <a:rPr lang="es-ES" sz="2000" i="1" dirty="0" err="1" smtClean="0"/>
+              <a:t>Array</a:t>
+            </a:r>
+            <a:r>
+              <a:rPr lang="es-ES" sz="2000" dirty="0"/>
+              <a:t>{</a:t>
+            </a:r>
+            <a:endParaRPr lang="es-ES" sz="2000" i="1" dirty="0"/>
+          </a:p>
+        </p:txBody>
+      </p:sp>
+      <p:sp>
+        <p:nvSpPr>
+          <p:cNvPr id="41" name="40 CuadroTexto"/>
+          <p:cNvSpPr txBox="1"/>
+          <p:nvPr/>
+        </p:nvSpPr>
+        <p:spPr>
+          <a:xfrm>
+            <a:off x="2538214" y="1778104"/>
+            <a:ext cx="959173" cy="400110"/>
+          </a:xfrm>
+          <a:prstGeom prst="rect">
+            <a:avLst/>
+          </a:prstGeom>
+          <a:noFill/>
+        </p:spPr>
+        <p:txBody>
+          <a:bodyPr wrap="none" rtlCol="0">
+            <a:spAutoFit/>
+          </a:bodyPr>
+          <a:lstStyle/>
+          <a:p>
+            <a:r>
+              <a:rPr lang="es-ES" sz="2000" dirty="0" smtClean="0"/>
+              <a:t>Etapa 0</a:t>
+            </a:r>
+            <a:endParaRPr lang="es-ES" sz="2000" dirty="0"/>
+          </a:p>
+        </p:txBody>
+      </p:sp>
+      <p:sp>
+        <p:nvSpPr>
+          <p:cNvPr id="42" name="41 CuadroTexto"/>
+          <p:cNvSpPr txBox="1"/>
+          <p:nvPr/>
+        </p:nvSpPr>
+        <p:spPr>
+          <a:xfrm>
+            <a:off x="3655094" y="1774847"/>
+            <a:ext cx="959173" cy="400110"/>
+          </a:xfrm>
+          <a:prstGeom prst="rect">
+            <a:avLst/>
+          </a:prstGeom>
+          <a:noFill/>
+        </p:spPr>
+        <p:txBody>
+          <a:bodyPr wrap="none" rtlCol="0">
+            <a:spAutoFit/>
+          </a:bodyPr>
+          <a:lstStyle/>
+          <a:p>
+            <a:r>
+              <a:rPr lang="es-ES" sz="2000" dirty="0" smtClean="0"/>
+              <a:t>Etapa 1</a:t>
+            </a:r>
+            <a:endParaRPr lang="es-ES" sz="2000" dirty="0"/>
+          </a:p>
+        </p:txBody>
+      </p:sp>
+      <p:sp>
+        <p:nvSpPr>
+          <p:cNvPr id="43" name="42 CuadroTexto"/>
+          <p:cNvSpPr txBox="1"/>
+          <p:nvPr/>
+        </p:nvSpPr>
+        <p:spPr>
+          <a:xfrm>
+            <a:off x="4781157" y="1778104"/>
+            <a:ext cx="959173" cy="400110"/>
+          </a:xfrm>
+          <a:prstGeom prst="rect">
+            <a:avLst/>
+          </a:prstGeom>
+          <a:noFill/>
+        </p:spPr>
+        <p:txBody>
+          <a:bodyPr wrap="none" rtlCol="0">
+            <a:spAutoFit/>
+          </a:bodyPr>
+          <a:lstStyle/>
+          <a:p>
+            <a:r>
+              <a:rPr lang="es-ES" sz="2000" dirty="0" smtClean="0"/>
+              <a:t>Etapa 2</a:t>
+            </a:r>
+            <a:endParaRPr lang="es-ES" sz="2000" dirty="0"/>
+          </a:p>
+        </p:txBody>
+      </p:sp>
+      <p:sp>
+        <p:nvSpPr>
+          <p:cNvPr id="44" name="43 CuadroTexto"/>
+          <p:cNvSpPr txBox="1"/>
+          <p:nvPr/>
+        </p:nvSpPr>
+        <p:spPr>
+          <a:xfrm>
+            <a:off x="5899615" y="1778104"/>
+            <a:ext cx="959173" cy="400110"/>
+          </a:xfrm>
+          <a:prstGeom prst="rect">
+            <a:avLst/>
+          </a:prstGeom>
+          <a:noFill/>
+        </p:spPr>
+        <p:txBody>
+          <a:bodyPr wrap="none" rtlCol="0">
+            <a:spAutoFit/>
+          </a:bodyPr>
+          <a:lstStyle/>
+          <a:p>
+            <a:r>
+              <a:rPr lang="es-ES" sz="2000" dirty="0" smtClean="0"/>
+              <a:t>Etapa 3</a:t>
+            </a:r>
+            <a:endParaRPr lang="es-ES" sz="2000" dirty="0"/>
+          </a:p>
+        </p:txBody>
+      </p:sp>
+      <p:sp>
+        <p:nvSpPr>
+          <p:cNvPr id="46" name="45 CuadroTexto"/>
+          <p:cNvSpPr txBox="1"/>
+          <p:nvPr/>
+        </p:nvSpPr>
+        <p:spPr>
+          <a:xfrm>
+            <a:off x="6938431" y="1774847"/>
+            <a:ext cx="264816" cy="400110"/>
+          </a:xfrm>
+          <a:prstGeom prst="rect">
+            <a:avLst/>
+          </a:prstGeom>
+          <a:noFill/>
+        </p:spPr>
+        <p:txBody>
+          <a:bodyPr wrap="none" rtlCol="0">
+            <a:spAutoFit/>
+          </a:bodyPr>
+          <a:lstStyle/>
+          <a:p>
+            <a:r>
+              <a:rPr lang="es-ES" sz="2000" dirty="0" smtClean="0"/>
+              <a:t>}</a:t>
+            </a:r>
+            <a:endParaRPr lang="es-ES" sz="2000" dirty="0"/>
+          </a:p>
+        </p:txBody>
+      </p:sp>
+      <p:sp>
+        <p:nvSpPr>
+          <p:cNvPr id="47" name="46 CuadroTexto"/>
+          <p:cNvSpPr txBox="1"/>
+          <p:nvPr/>
+        </p:nvSpPr>
+        <p:spPr>
+          <a:xfrm>
+            <a:off x="439108" y="1790916"/>
+            <a:ext cx="1188402" cy="400110"/>
+          </a:xfrm>
+          <a:prstGeom prst="rect">
+            <a:avLst/>
+          </a:prstGeom>
+          <a:noFill/>
+        </p:spPr>
+        <p:txBody>
+          <a:bodyPr wrap="none" rtlCol="0">
+            <a:spAutoFit/>
+          </a:bodyPr>
+          <a:lstStyle/>
+          <a:p>
+            <a:r>
+              <a:rPr lang="es-ES" sz="2000" b="1" dirty="0" smtClean="0"/>
+              <a:t>Circuito =</a:t>
+            </a:r>
+            <a:endParaRPr lang="es-ES" sz="2000" b="1" dirty="0"/>
+          </a:p>
+        </p:txBody>
+      </p:sp>
+      <p:grpSp>
+        <p:nvGrpSpPr>
+          <p:cNvPr id="74" name="73 Grupo"/>
+          <p:cNvGrpSpPr/>
+          <p:nvPr/>
+        </p:nvGrpSpPr>
+        <p:grpSpPr>
+          <a:xfrm>
+            <a:off x="4283968" y="4613066"/>
+            <a:ext cx="2516076" cy="1840270"/>
+            <a:chOff x="2631988" y="4817039"/>
+            <a:chExt cx="2516076" cy="1840270"/>
+          </a:xfrm>
+        </p:grpSpPr>
+        <p:sp>
+          <p:nvSpPr>
+            <p:cNvPr id="52" name="51 CuadroTexto"/>
+            <p:cNvSpPr txBox="1"/>
+            <p:nvPr/>
+          </p:nvSpPr>
+          <p:spPr>
+            <a:xfrm>
+              <a:off x="2631988" y="4818806"/>
+              <a:ext cx="968663" cy="400110"/>
+            </a:xfrm>
+            <a:prstGeom prst="rect">
+              <a:avLst/>
+            </a:prstGeom>
+            <a:noFill/>
+          </p:spPr>
+          <p:txBody>
+            <a:bodyPr wrap="none" rtlCol="0">
+              <a:spAutoFit/>
+            </a:bodyPr>
+            <a:lstStyle/>
+            <a:p>
+              <a:r>
+                <a:rPr lang="es-ES" sz="2000" b="1" dirty="0" smtClean="0"/>
+                <a:t>Etapa =</a:t>
+              </a:r>
+              <a:endParaRPr lang="es-ES" sz="2000" b="1" dirty="0"/>
+            </a:p>
+          </p:txBody>
+        </p:sp>
+        <p:cxnSp>
+          <p:nvCxnSpPr>
+            <p:cNvPr id="57" name="56 Conector recto"/>
+            <p:cNvCxnSpPr/>
+            <p:nvPr/>
+          </p:nvCxnSpPr>
+          <p:spPr>
+            <a:xfrm>
+              <a:off x="4457725" y="5572693"/>
+              <a:ext cx="690339" cy="0"/>
+            </a:xfrm>
+            <a:prstGeom prst="line">
+              <a:avLst/>
+            </a:prstGeom>
+            <a:ln w="19050">
+              <a:solidFill>
+                <a:schemeClr val="tx1"/>
+              </a:solidFill>
+            </a:ln>
+          </p:spPr>
+          <p:style>
+            <a:lnRef idx="1">
+              <a:schemeClr val="accent1"/>
+            </a:lnRef>
+            <a:fillRef idx="0">
+              <a:schemeClr val="accent1"/>
+            </a:fillRef>
+            <a:effectRef idx="0">
+              <a:schemeClr val="accent1"/>
+            </a:effectRef>
+            <a:fontRef idx="minor">
+              <a:schemeClr val="tx1"/>
+            </a:fontRef>
+          </p:style>
+        </p:cxnSp>
+        <p:cxnSp>
+          <p:nvCxnSpPr>
+            <p:cNvPr id="58" name="57 Conector recto"/>
+            <p:cNvCxnSpPr/>
+            <p:nvPr/>
+          </p:nvCxnSpPr>
+          <p:spPr>
+            <a:xfrm>
+              <a:off x="4457725" y="6299580"/>
+              <a:ext cx="690339" cy="0"/>
+            </a:xfrm>
+            <a:prstGeom prst="line">
+              <a:avLst/>
+            </a:prstGeom>
+            <a:ln w="19050">
+              <a:solidFill>
+                <a:schemeClr val="tx1"/>
+              </a:solidFill>
+            </a:ln>
+          </p:spPr>
+          <p:style>
+            <a:lnRef idx="1">
+              <a:schemeClr val="accent1"/>
+            </a:lnRef>
+            <a:fillRef idx="0">
+              <a:schemeClr val="accent1"/>
+            </a:fillRef>
+            <a:effectRef idx="0">
+              <a:schemeClr val="accent1"/>
+            </a:effectRef>
+            <a:fontRef idx="minor">
+              <a:schemeClr val="tx1"/>
+            </a:fontRef>
+          </p:style>
+        </p:cxnSp>
+        <p:sp>
+          <p:nvSpPr>
+            <p:cNvPr id="59" name="58 Rectángulo"/>
+            <p:cNvSpPr/>
+            <p:nvPr/>
+          </p:nvSpPr>
+          <p:spPr>
+            <a:xfrm>
+              <a:off x="4646379" y="5388025"/>
+              <a:ext cx="360040" cy="370493"/>
+            </a:xfrm>
+            <a:prstGeom prst="rect">
+              <a:avLst/>
+            </a:prstGeom>
+            <a:solidFill>
+              <a:schemeClr val="bg1"/>
+            </a:solidFill>
+            <a:ln>
+              <a:solidFill>
+                <a:schemeClr val="tx1"/>
+              </a:solidFill>
+            </a:ln>
+          </p:spPr>
+          <p:style>
+            <a:lnRef idx="2">
+              <a:schemeClr val="accent1">
+                <a:shade val="50000"/>
+              </a:schemeClr>
+            </a:lnRef>
+            <a:fillRef idx="1">
+              <a:schemeClr val="accent1"/>
+            </a:fillRef>
+            <a:effectRef idx="0">
+              <a:schemeClr val="accent1"/>
+            </a:effectRef>
+            <a:fontRef idx="minor">
+              <a:schemeClr val="lt1"/>
+            </a:fontRef>
+          </p:style>
+          <p:txBody>
+            <a:bodyPr rtlCol="0" anchor="ctr"/>
+            <a:lstStyle/>
+            <a:p>
+              <a:pPr algn="ctr"/>
+              <a:r>
+                <a:rPr lang="es-ES" dirty="0" smtClean="0">
+                  <a:solidFill>
+                    <a:schemeClr val="tx1"/>
+                  </a:solidFill>
+                </a:rPr>
+                <a:t>H</a:t>
+              </a:r>
+              <a:endParaRPr lang="es-ES" dirty="0">
+                <a:solidFill>
+                  <a:schemeClr val="tx1"/>
+                </a:solidFill>
+              </a:endParaRPr>
+            </a:p>
+          </p:txBody>
+        </p:sp>
+        <p:sp>
+          <p:nvSpPr>
+            <p:cNvPr id="60" name="59 Rectángulo"/>
+            <p:cNvSpPr/>
+            <p:nvPr/>
+          </p:nvSpPr>
+          <p:spPr>
+            <a:xfrm>
+              <a:off x="4646379" y="6114333"/>
+              <a:ext cx="360040" cy="370493"/>
+            </a:xfrm>
+            <a:prstGeom prst="rect">
+              <a:avLst/>
+            </a:prstGeom>
+            <a:solidFill>
+              <a:schemeClr val="bg1"/>
+            </a:solidFill>
+            <a:ln>
+              <a:solidFill>
+                <a:schemeClr val="tx1"/>
+              </a:solidFill>
+            </a:ln>
+          </p:spPr>
+          <p:style>
+            <a:lnRef idx="2">
+              <a:schemeClr val="accent1">
+                <a:shade val="50000"/>
+              </a:schemeClr>
+            </a:lnRef>
+            <a:fillRef idx="1">
+              <a:schemeClr val="accent1"/>
+            </a:fillRef>
+            <a:effectRef idx="0">
+              <a:schemeClr val="accent1"/>
+            </a:effectRef>
+            <a:fontRef idx="minor">
+              <a:schemeClr val="lt1"/>
+            </a:fontRef>
+          </p:style>
+          <p:txBody>
+            <a:bodyPr rtlCol="0" anchor="ctr"/>
+            <a:lstStyle/>
+            <a:p>
+              <a:pPr algn="ctr"/>
+              <a:r>
+                <a:rPr lang="es-ES" dirty="0" smtClean="0">
+                  <a:solidFill>
+                    <a:schemeClr val="tx1"/>
+                  </a:solidFill>
+                </a:rPr>
+                <a:t>H</a:t>
+              </a:r>
+              <a:endParaRPr lang="es-ES" dirty="0">
+                <a:solidFill>
+                  <a:schemeClr val="tx1"/>
+                </a:solidFill>
+              </a:endParaRPr>
+            </a:p>
+          </p:txBody>
+        </p:sp>
+        <p:sp>
+          <p:nvSpPr>
+            <p:cNvPr id="69" name="68 CuadroTexto"/>
+            <p:cNvSpPr txBox="1"/>
+            <p:nvPr/>
+          </p:nvSpPr>
+          <p:spPr>
+            <a:xfrm>
+              <a:off x="3457320" y="5373216"/>
+              <a:ext cx="1064779" cy="400110"/>
+            </a:xfrm>
+            <a:prstGeom prst="rect">
+              <a:avLst/>
+            </a:prstGeom>
+            <a:noFill/>
+          </p:spPr>
+          <p:txBody>
+            <a:bodyPr wrap="none" rtlCol="0">
+              <a:spAutoFit/>
+            </a:bodyPr>
+            <a:lstStyle/>
+            <a:p>
+              <a:r>
+                <a:rPr lang="es-ES" sz="2000" dirty="0" smtClean="0"/>
+                <a:t>Puerta 0</a:t>
+              </a:r>
+              <a:endParaRPr lang="es-ES" sz="2000" dirty="0"/>
+            </a:p>
+          </p:txBody>
+        </p:sp>
+        <p:sp>
+          <p:nvSpPr>
+            <p:cNvPr id="70" name="69 CuadroTexto"/>
+            <p:cNvSpPr txBox="1"/>
+            <p:nvPr/>
+          </p:nvSpPr>
+          <p:spPr>
+            <a:xfrm>
+              <a:off x="3457320" y="6099525"/>
+              <a:ext cx="1064779" cy="400110"/>
+            </a:xfrm>
+            <a:prstGeom prst="rect">
+              <a:avLst/>
+            </a:prstGeom>
+            <a:noFill/>
+          </p:spPr>
+          <p:txBody>
+            <a:bodyPr wrap="none" rtlCol="0">
+              <a:spAutoFit/>
+            </a:bodyPr>
+            <a:lstStyle/>
+            <a:p>
+              <a:r>
+                <a:rPr lang="es-ES" sz="2000" dirty="0" smtClean="0"/>
+                <a:t>Puerta 1</a:t>
+              </a:r>
+              <a:endParaRPr lang="es-ES" sz="2000" dirty="0"/>
+            </a:p>
+          </p:txBody>
+        </p:sp>
+        <p:sp>
+          <p:nvSpPr>
+            <p:cNvPr id="71" name="70 CuadroTexto"/>
+            <p:cNvSpPr txBox="1"/>
+            <p:nvPr/>
+          </p:nvSpPr>
+          <p:spPr>
+            <a:xfrm>
+              <a:off x="3496084" y="4817039"/>
+              <a:ext cx="756938" cy="400110"/>
+            </a:xfrm>
+            <a:prstGeom prst="rect">
+              <a:avLst/>
+            </a:prstGeom>
+            <a:noFill/>
+          </p:spPr>
+          <p:txBody>
+            <a:bodyPr wrap="none" rtlCol="0">
+              <a:spAutoFit/>
+            </a:bodyPr>
+            <a:lstStyle/>
+            <a:p>
+              <a:r>
+                <a:rPr lang="es-ES" sz="2000" i="1" dirty="0" err="1" smtClean="0"/>
+                <a:t>Array</a:t>
+              </a:r>
+              <a:endParaRPr lang="es-ES" sz="2000" i="1" dirty="0" smtClean="0"/>
+            </a:p>
+          </p:txBody>
+        </p:sp>
+        <p:sp>
+          <p:nvSpPr>
+            <p:cNvPr id="72" name="71 CuadroTexto"/>
+            <p:cNvSpPr txBox="1"/>
+            <p:nvPr/>
+          </p:nvSpPr>
+          <p:spPr>
+            <a:xfrm>
+              <a:off x="3665678" y="5200733"/>
+              <a:ext cx="492443" cy="172483"/>
+            </a:xfrm>
+            <a:prstGeom prst="rect">
+              <a:avLst/>
+            </a:prstGeom>
+            <a:noFill/>
+          </p:spPr>
+          <p:txBody>
+            <a:bodyPr vert="vert" wrap="none" rtlCol="0">
+              <a:spAutoFit/>
+            </a:bodyPr>
+            <a:lstStyle/>
+            <a:p>
+              <a:r>
+                <a:rPr lang="es-ES" sz="2000" dirty="0" smtClean="0"/>
+                <a:t>{</a:t>
+              </a:r>
+              <a:endParaRPr lang="es-ES" dirty="0"/>
+            </a:p>
+          </p:txBody>
+        </p:sp>
+        <p:sp>
+          <p:nvSpPr>
+            <p:cNvPr id="73" name="72 CuadroTexto"/>
+            <p:cNvSpPr txBox="1"/>
+            <p:nvPr/>
+          </p:nvSpPr>
+          <p:spPr>
+            <a:xfrm>
+              <a:off x="3690896" y="6484826"/>
+              <a:ext cx="492443" cy="172483"/>
+            </a:xfrm>
+            <a:prstGeom prst="rect">
+              <a:avLst/>
+            </a:prstGeom>
+            <a:noFill/>
+          </p:spPr>
+          <p:txBody>
+            <a:bodyPr vert="vert" wrap="none" rtlCol="0">
+              <a:spAutoFit/>
+            </a:bodyPr>
+            <a:lstStyle/>
+            <a:p>
+              <a:r>
+                <a:rPr lang="es-ES" sz="2000" dirty="0"/>
+                <a:t>}</a:t>
+              </a:r>
+              <a:endParaRPr lang="es-ES" dirty="0"/>
+            </a:p>
+          </p:txBody>
+        </p:sp>
+      </p:grpSp>
+      <p:cxnSp>
+        <p:nvCxnSpPr>
+          <p:cNvPr id="76" name="75 Conector angular"/>
+          <p:cNvCxnSpPr>
+            <a:stCxn id="36" idx="2"/>
+            <a:endCxn id="52" idx="1"/>
+          </p:cNvCxnSpPr>
+          <p:nvPr/>
+        </p:nvCxnSpPr>
+        <p:spPr>
+          <a:xfrm rot="16200000" flipH="1">
+            <a:off x="3342045" y="3872964"/>
+            <a:ext cx="623707" cy="1260140"/>
+          </a:xfrm>
+          <a:prstGeom prst="bentConnector2">
+            <a:avLst/>
+          </a:prstGeom>
+          <a:ln w="28575">
+            <a:solidFill>
+              <a:schemeClr val="tx1"/>
+            </a:solidFill>
+            <a:tailEnd type="arrow"/>
+          </a:ln>
+        </p:spPr>
+        <p:style>
+          <a:lnRef idx="1">
+            <a:schemeClr val="accent1"/>
+          </a:lnRef>
+          <a:fillRef idx="0">
+            <a:schemeClr val="accent1"/>
+          </a:fillRef>
+          <a:effectRef idx="0">
+            <a:schemeClr val="accent1"/>
+          </a:effectRef>
+          <a:fontRef idx="minor">
+            <a:schemeClr val="tx1"/>
+          </a:fontRef>
+        </p:style>
+      </p:cxnSp>
+      <mc:AlternateContent xmlns:mc="http://schemas.openxmlformats.org/markup-compatibility/2006">
+        <mc:Choice xmlns:a14="http://schemas.microsoft.com/office/drawing/2010/main" Requires="a14">
+          <p:sp>
+            <p:nvSpPr>
+              <p:cNvPr id="77" name="76 Rectángulo"/>
+              <p:cNvSpPr/>
+              <p:nvPr/>
+            </p:nvSpPr>
+            <p:spPr>
+              <a:xfrm>
+                <a:off x="1136737" y="2998403"/>
+                <a:ext cx="1236685" cy="369332"/>
+              </a:xfrm>
+              <a:prstGeom prst="rect">
+                <a:avLst/>
+              </a:prstGeom>
+            </p:spPr>
+            <p:txBody>
+              <a:bodyPr wrap="none">
+                <a:spAutoFit/>
+              </a:bodyPr>
+              <a:lstStyle/>
+              <a:p>
+                <a14:m>
+                  <m:oMathPara xmlns:m="http://schemas.openxmlformats.org/officeDocument/2006/math">
+                    <m:oMathParaPr>
+                      <m:jc m:val="centerGroup"/>
+                    </m:oMathParaPr>
+                    <m:oMath xmlns:m="http://schemas.openxmlformats.org/officeDocument/2006/math">
+                      <m:d>
+                        <m:dPr>
+                          <m:begChr m:val=""/>
+                          <m:endChr m:val="⟩"/>
+                          <m:ctrlPr>
+                            <a:rPr lang="es-ES" i="1" smtClean="0">
+                              <a:latin typeface="Cambria Math"/>
+                            </a:rPr>
+                          </m:ctrlPr>
+                        </m:dPr>
+                        <m:e>
+                          <m:r>
+                            <a:rPr lang="es-ES" i="1">
+                              <a:latin typeface="Cambria Math"/>
+                            </a:rPr>
+                            <m:t>|</m:t>
+                          </m:r>
+                          <m:r>
+                            <a:rPr lang="es-ES" b="0" i="1" smtClean="0">
+                              <a:latin typeface="Cambria Math"/>
+                            </a:rPr>
+                            <m:t>𝑒𝑛𝑡𝑟𝑎𝑑𝑎</m:t>
+                          </m:r>
+                        </m:e>
+                      </m:d>
+                    </m:oMath>
+                  </m:oMathPara>
+                </a14:m>
+                <a:endParaRPr lang="es-ES" dirty="0"/>
+              </a:p>
+            </p:txBody>
+          </p:sp>
+        </mc:Choice>
+        <mc:Fallback>
+          <p:sp>
+            <p:nvSpPr>
+              <p:cNvPr id="77" name="76 Rectángulo"/>
+              <p:cNvSpPr>
+                <a:spLocks noRot="1" noChangeAspect="1" noMove="1" noResize="1" noEditPoints="1" noAdjustHandles="1" noChangeArrowheads="1" noChangeShapeType="1" noTextEdit="1"/>
+              </p:cNvSpPr>
+              <p:nvPr/>
+            </p:nvSpPr>
+            <p:spPr>
+              <a:xfrm>
+                <a:off x="1136737" y="2998403"/>
+                <a:ext cx="1236685" cy="369332"/>
+              </a:xfrm>
+              <a:prstGeom prst="rect">
+                <a:avLst/>
+              </a:prstGeom>
+              <a:blipFill rotWithShape="1">
+                <a:blip r:embed="rId3"/>
+                <a:stretch>
+                  <a:fillRect t="-121667" r="-38424" b="-188333"/>
+                </a:stretch>
+              </a:blipFill>
+            </p:spPr>
+            <p:txBody>
+              <a:bodyPr/>
+              <a:lstStyle/>
+              <a:p>
+                <a:r>
+                  <a:rPr lang="es-ES">
+                    <a:noFill/>
+                  </a:rPr>
+                  <a:t> </a:t>
+                </a:r>
+              </a:p>
+            </p:txBody>
+          </p:sp>
+        </mc:Fallback>
+      </mc:AlternateContent>
+      <mc:AlternateContent xmlns:mc="http://schemas.openxmlformats.org/markup-compatibility/2006">
+        <mc:Choice xmlns:a14="http://schemas.microsoft.com/office/drawing/2010/main" Requires="a14">
+          <p:sp>
+            <p:nvSpPr>
+              <p:cNvPr id="78" name="77 Rectángulo"/>
+              <p:cNvSpPr/>
+              <p:nvPr/>
+            </p:nvSpPr>
+            <p:spPr>
+              <a:xfrm>
+                <a:off x="6938430" y="2998403"/>
+                <a:ext cx="1042721" cy="369332"/>
+              </a:xfrm>
+              <a:prstGeom prst="rect">
+                <a:avLst/>
+              </a:prstGeom>
+            </p:spPr>
+            <p:txBody>
+              <a:bodyPr wrap="none">
+                <a:spAutoFit/>
+              </a:bodyPr>
+              <a:lstStyle/>
+              <a:p>
+                <a14:m>
+                  <m:oMathPara xmlns:m="http://schemas.openxmlformats.org/officeDocument/2006/math">
+                    <m:oMathParaPr>
+                      <m:jc m:val="centerGroup"/>
+                    </m:oMathParaPr>
+                    <m:oMath xmlns:m="http://schemas.openxmlformats.org/officeDocument/2006/math">
+                      <m:d>
+                        <m:dPr>
+                          <m:begChr m:val=""/>
+                          <m:endChr m:val="⟩"/>
+                          <m:ctrlPr>
+                            <a:rPr lang="es-ES" i="1" smtClean="0">
+                              <a:latin typeface="Cambria Math"/>
+                            </a:rPr>
+                          </m:ctrlPr>
+                        </m:dPr>
+                        <m:e>
+                          <m:r>
+                            <a:rPr lang="es-ES" i="1">
+                              <a:latin typeface="Cambria Math"/>
+                            </a:rPr>
+                            <m:t>|</m:t>
+                          </m:r>
+                          <m:r>
+                            <a:rPr lang="es-ES" b="0" i="1" smtClean="0">
+                              <a:latin typeface="Cambria Math"/>
+                            </a:rPr>
+                            <m:t>𝑠𝑎𝑙𝑖𝑑𝑎</m:t>
+                          </m:r>
+                        </m:e>
+                      </m:d>
+                    </m:oMath>
+                  </m:oMathPara>
+                </a14:m>
+                <a:endParaRPr lang="es-ES" dirty="0"/>
+              </a:p>
+            </p:txBody>
+          </p:sp>
+        </mc:Choice>
+        <mc:Fallback>
+          <p:sp>
+            <p:nvSpPr>
+              <p:cNvPr id="78" name="77 Rectángulo"/>
+              <p:cNvSpPr>
+                <a:spLocks noRot="1" noChangeAspect="1" noMove="1" noResize="1" noEditPoints="1" noAdjustHandles="1" noChangeArrowheads="1" noChangeShapeType="1" noTextEdit="1"/>
+              </p:cNvSpPr>
+              <p:nvPr/>
+            </p:nvSpPr>
+            <p:spPr>
+              <a:xfrm>
+                <a:off x="6938430" y="2998403"/>
+                <a:ext cx="1042721" cy="369332"/>
+              </a:xfrm>
+              <a:prstGeom prst="rect">
+                <a:avLst/>
+              </a:prstGeom>
+              <a:blipFill rotWithShape="1">
+                <a:blip r:embed="rId4"/>
+                <a:stretch>
+                  <a:fillRect t="-121667" r="-45614" b="-188333"/>
+                </a:stretch>
+              </a:blipFill>
+            </p:spPr>
+            <p:txBody>
+              <a:bodyPr/>
+              <a:lstStyle/>
+              <a:p>
+                <a:r>
+                  <a:rPr lang="es-ES">
+                    <a:noFill/>
+                  </a:rPr>
+                  <a:t> </a:t>
+                </a:r>
+              </a:p>
+            </p:txBody>
+          </p:sp>
+        </mc:Fallback>
+      </mc:AlternateContent>
+    </p:spTree>
+    <p:extLst>
+      <p:ext uri="{BB962C8B-B14F-4D97-AF65-F5344CB8AC3E}">
+        <p14:creationId xmlns:p14="http://schemas.microsoft.com/office/powerpoint/2010/main" val="4249143198"/>
+      </p:ext>
+    </p:extLst>
+  </p:cSld>
+  <p:clrMapOvr>
+    <a:masterClrMapping/>
+  </p:clrMapOvr>
+  <p:timing>
+    <p:tnLst>
+      <p:par>
+        <p:cTn id="1" dur="indefinite" restart="never" nodeType="tmRoot"/>
+      </p:par>
+    </p:tnLst>
+  </p:timing>
+</p:sld>
+</file>
+
+<file path=ppt/slides/slide23.xml><?xml version="1.0" encoding="utf-8"?>
+<p:sld xmlns:a="http://schemas.openxmlformats.org/drawingml/2006/main" xmlns:r="http://schemas.openxmlformats.org/officeDocument/2006/relationships" xmlns:p="http://schemas.openxmlformats.org/presentationml/2006/main">
+  <p:cSld>
+    <p:spTree>
+      <p:nvGrpSpPr>
+        <p:cNvPr id="1" name=""/>
+        <p:cNvGrpSpPr/>
+        <p:nvPr/>
+      </p:nvGrpSpPr>
+      <p:grpSpPr>
+        <a:xfrm>
+          <a:off x="0" y="0"/>
+          <a:ext cx="0" cy="0"/>
+          <a:chOff x="0" y="0"/>
+          <a:chExt cx="0" cy="0"/>
+        </a:xfrm>
+      </p:grpSpPr>
+      <p:sp>
+        <p:nvSpPr>
+          <p:cNvPr id="30" name="29 CuadroTexto"/>
+          <p:cNvSpPr txBox="1"/>
+          <p:nvPr/>
+        </p:nvSpPr>
+        <p:spPr>
+          <a:xfrm>
+            <a:off x="3335279" y="398910"/>
+            <a:ext cx="2452916" cy="707886"/>
+          </a:xfrm>
+          <a:prstGeom prst="rect">
+            <a:avLst/>
+          </a:prstGeom>
+          <a:noFill/>
+        </p:spPr>
+        <p:txBody>
+          <a:bodyPr wrap="none" rtlCol="0">
+            <a:spAutoFit/>
+          </a:bodyPr>
+          <a:lstStyle/>
+          <a:p>
+            <a:r>
+              <a:rPr lang="es-ES" sz="4000" dirty="0" smtClean="0"/>
+              <a:t>Simulación</a:t>
+            </a:r>
+            <a:endParaRPr lang="es-ES" sz="4000" dirty="0"/>
+          </a:p>
+        </p:txBody>
+      </p:sp>
+      <p:sp>
+        <p:nvSpPr>
+          <p:cNvPr id="31" name="30 CuadroTexto"/>
+          <p:cNvSpPr txBox="1"/>
+          <p:nvPr/>
+        </p:nvSpPr>
+        <p:spPr>
+          <a:xfrm>
+            <a:off x="2008570" y="1098512"/>
+            <a:ext cx="5106334" cy="523220"/>
+          </a:xfrm>
+          <a:prstGeom prst="rect">
+            <a:avLst/>
+          </a:prstGeom>
+          <a:noFill/>
+        </p:spPr>
+        <p:txBody>
+          <a:bodyPr wrap="none" rtlCol="0">
+            <a:spAutoFit/>
+          </a:bodyPr>
+          <a:lstStyle/>
+          <a:p>
+            <a:r>
+              <a:rPr lang="es-ES" sz="2800" i="1" dirty="0" smtClean="0"/>
+              <a:t>Motor de simulación de </a:t>
+            </a:r>
+            <a:r>
+              <a:rPr lang="es-ES" sz="2800" i="1" dirty="0" smtClean="0"/>
+              <a:t>hardware</a:t>
+            </a:r>
+            <a:endParaRPr lang="es-ES" sz="2800" i="1" dirty="0"/>
+          </a:p>
+        </p:txBody>
+      </p:sp>
+    </p:spTree>
+    <p:extLst>
+      <p:ext uri="{BB962C8B-B14F-4D97-AF65-F5344CB8AC3E}">
+        <p14:creationId xmlns:p14="http://schemas.microsoft.com/office/powerpoint/2010/main" val="4210624364"/>
+      </p:ext>
+    </p:extLst>
+  </p:cSld>
+  <p:clrMapOvr>
+    <a:masterClrMapping/>
+  </p:clrMapOvr>
+  <p:timing>
+    <p:tnLst>
+      <p:par>
+        <p:cTn id="1" dur="indefinite" restart="never" nodeType="tmRoot"/>
+      </p:par>
+    </p:tnLst>
+  </p:timing>
+</p:sld>
+</file>
+
+<file path=ppt/slides/slide24.xml><?xml version="1.0" encoding="utf-8"?>
+<p:sld xmlns:a="http://schemas.openxmlformats.org/drawingml/2006/main" xmlns:r="http://schemas.openxmlformats.org/officeDocument/2006/relationships" xmlns:p="http://schemas.openxmlformats.org/presentationml/2006/main">
+  <p:cSld>
+    <p:spTree>
+      <p:nvGrpSpPr>
+        <p:cNvPr id="1" name=""/>
+        <p:cNvGrpSpPr/>
+        <p:nvPr/>
+      </p:nvGrpSpPr>
+      <p:grpSpPr>
+        <a:xfrm>
+          <a:off x="0" y="0"/>
+          <a:ext cx="0" cy="0"/>
+          <a:chOff x="0" y="0"/>
+          <a:chExt cx="0" cy="0"/>
+        </a:xfrm>
+      </p:grpSpPr>
+      <p:sp>
+        <p:nvSpPr>
+          <p:cNvPr id="6" name="5 CuadroTexto"/>
+          <p:cNvSpPr txBox="1"/>
+          <p:nvPr/>
+        </p:nvSpPr>
+        <p:spPr>
+          <a:xfrm>
+            <a:off x="2253237" y="1124744"/>
+            <a:ext cx="4670189" cy="1446550"/>
+          </a:xfrm>
+          <a:prstGeom prst="rect">
+            <a:avLst/>
+          </a:prstGeom>
+          <a:noFill/>
+        </p:spPr>
+        <p:txBody>
+          <a:bodyPr wrap="none" rtlCol="0">
+            <a:spAutoFit/>
+          </a:bodyPr>
+          <a:lstStyle/>
+          <a:p>
+            <a:pPr algn="ctr"/>
+            <a:r>
+              <a:rPr lang="es-ES" sz="4400" dirty="0" smtClean="0"/>
+              <a:t>4</a:t>
+            </a:r>
+            <a:endParaRPr lang="es-ES" sz="4400" dirty="0" smtClean="0"/>
+          </a:p>
+          <a:p>
+            <a:pPr algn="ctr"/>
+            <a:r>
+              <a:rPr lang="es-ES" sz="4400" dirty="0" smtClean="0"/>
+              <a:t>Arquitectura </a:t>
+            </a:r>
+            <a:r>
+              <a:rPr lang="es-ES" sz="4400" dirty="0" err="1" smtClean="0"/>
+              <a:t>qMIPS</a:t>
+            </a:r>
+            <a:endParaRPr lang="es-ES" sz="4400" dirty="0"/>
+          </a:p>
+        </p:txBody>
+      </p:sp>
+    </p:spTree>
+    <p:extLst>
+      <p:ext uri="{BB962C8B-B14F-4D97-AF65-F5344CB8AC3E}">
+        <p14:creationId xmlns:p14="http://schemas.microsoft.com/office/powerpoint/2010/main" val="1965434456"/>
+      </p:ext>
+    </p:extLst>
+  </p:cSld>
+  <p:clrMapOvr>
+    <a:masterClrMapping/>
+  </p:clrMapOvr>
+  <p:timing>
+    <p:tnLst>
+      <p:par>
+        <p:cTn id="1" dur="indefinite" restart="never" nodeType="tmRoot"/>
+      </p:par>
+    </p:tnLst>
+  </p:timing>
+</p:sld>
+</file>
+
+<file path=ppt/slides/slide25.xml><?xml version="1.0" encoding="utf-8"?>
+<p:sld xmlns:a="http://schemas.openxmlformats.org/drawingml/2006/main" xmlns:r="http://schemas.openxmlformats.org/officeDocument/2006/relationships" xmlns:p="http://schemas.openxmlformats.org/presentationml/2006/main">
+  <p:cSld>
+    <p:spTree>
+      <p:nvGrpSpPr>
+        <p:cNvPr id="1" name=""/>
+        <p:cNvGrpSpPr/>
+        <p:nvPr/>
+      </p:nvGrpSpPr>
+      <p:grpSpPr>
+        <a:xfrm>
+          <a:off x="0" y="0"/>
+          <a:ext cx="0" cy="0"/>
+          <a:chOff x="0" y="0"/>
+          <a:chExt cx="0" cy="0"/>
+        </a:xfrm>
+      </p:grpSpPr>
+      <p:sp>
+        <p:nvSpPr>
+          <p:cNvPr id="4" name="3 CuadroTexto"/>
+          <p:cNvSpPr txBox="1"/>
+          <p:nvPr/>
+        </p:nvSpPr>
+        <p:spPr>
+          <a:xfrm>
+            <a:off x="2433878" y="398910"/>
+            <a:ext cx="4255717" cy="707886"/>
+          </a:xfrm>
+          <a:prstGeom prst="rect">
+            <a:avLst/>
+          </a:prstGeom>
+          <a:noFill/>
+        </p:spPr>
+        <p:txBody>
+          <a:bodyPr wrap="none" rtlCol="0">
+            <a:spAutoFit/>
+          </a:bodyPr>
+          <a:lstStyle/>
+          <a:p>
+            <a:r>
+              <a:rPr lang="es-ES" sz="4000" dirty="0" smtClean="0"/>
+              <a:t>Arquitectura </a:t>
+            </a:r>
+            <a:r>
+              <a:rPr lang="es-ES" sz="4000" dirty="0" err="1" smtClean="0"/>
+              <a:t>qMIPS</a:t>
+            </a:r>
+            <a:endParaRPr lang="es-ES" sz="4000" dirty="0"/>
+          </a:p>
+        </p:txBody>
+      </p:sp>
+      <p:sp>
+        <p:nvSpPr>
+          <p:cNvPr id="5" name="4 CuadroTexto"/>
+          <p:cNvSpPr txBox="1"/>
+          <p:nvPr/>
+        </p:nvSpPr>
+        <p:spPr>
+          <a:xfrm>
+            <a:off x="2943665" y="1106796"/>
+            <a:ext cx="3236142" cy="523220"/>
+          </a:xfrm>
+          <a:prstGeom prst="rect">
+            <a:avLst/>
+          </a:prstGeom>
+          <a:noFill/>
+        </p:spPr>
+        <p:txBody>
+          <a:bodyPr wrap="none" rtlCol="0">
+            <a:spAutoFit/>
+          </a:bodyPr>
+          <a:lstStyle/>
+          <a:p>
+            <a:r>
+              <a:rPr lang="es-ES" sz="2800" i="1" dirty="0" smtClean="0"/>
+              <a:t>La arquitectura MIPS</a:t>
+            </a:r>
+            <a:endParaRPr lang="es-ES" sz="2800" i="1" dirty="0"/>
+          </a:p>
+        </p:txBody>
+      </p:sp>
+    </p:spTree>
+    <p:extLst>
+      <p:ext uri="{BB962C8B-B14F-4D97-AF65-F5344CB8AC3E}">
+        <p14:creationId xmlns:p14="http://schemas.microsoft.com/office/powerpoint/2010/main" val="665305486"/>
+      </p:ext>
+    </p:extLst>
+  </p:cSld>
+  <p:clrMapOvr>
+    <a:masterClrMapping/>
+  </p:clrMapOvr>
+  <p:timing>
+    <p:tnLst>
+      <p:par>
+        <p:cTn id="1" dur="indefinite" restart="never" nodeType="tmRoot"/>
+      </p:par>
+    </p:tnLst>
+  </p:timing>
 </p:sld>
 </file>
 

</xml_diff>

<commit_message>
Presentation updated. Final version.
</commit_message>
<xml_diff>
--- a/qMIPS/doc/Presentacion PFC.pptx
+++ b/qMIPS/doc/Presentacion PFC.pptx
@@ -234,7 +234,7 @@
           <a:p>
             <a:fld id="{AB13600B-983D-4584-B53F-0B1CEA54138F}" type="datetimeFigureOut">
               <a:rPr lang="es-ES" smtClean="0"/>
-              <a:t>30/06/2013</a:t>
+              <a:t>01/07/2013</a:t>
             </a:fld>
             <a:endParaRPr lang="es-ES"/>
           </a:p>
@@ -772,9 +772,9 @@
           <a:bodyPr/>
           <a:lstStyle/>
           <a:p>
-            <a:fld id="{F75EC40F-9447-4392-BFAF-1FB05BB336C0}" type="datetime1">
+            <a:fld id="{C3967CDB-A549-494F-9200-E88BD12A88E7}" type="datetime1">
               <a:rPr lang="es-ES" smtClean="0"/>
-              <a:t>30/06/2013</a:t>
+              <a:t>01/07/2013</a:t>
             </a:fld>
             <a:endParaRPr lang="es-ES"/>
           </a:p>
@@ -972,9 +972,9 @@
           <a:bodyPr/>
           <a:lstStyle/>
           <a:p>
-            <a:fld id="{B7005BB4-8995-4FAC-862F-CF042EE09AD8}" type="datetime1">
+            <a:fld id="{2BFE0104-DA63-4337-BC31-D3B39945ADF4}" type="datetime1">
               <a:rPr lang="es-ES" smtClean="0"/>
-              <a:t>30/06/2013</a:t>
+              <a:t>01/07/2013</a:t>
             </a:fld>
             <a:endParaRPr lang="es-ES"/>
           </a:p>
@@ -1147,9 +1147,9 @@
           <a:bodyPr/>
           <a:lstStyle/>
           <a:p>
-            <a:fld id="{764F323A-5839-4F61-8861-2B8B363F3D3A}" type="datetime1">
+            <a:fld id="{33452893-1ECD-4E63-8225-107CA719C00F}" type="datetime1">
               <a:rPr lang="es-ES" smtClean="0"/>
-              <a:t>30/06/2013</a:t>
+              <a:t>01/07/2013</a:t>
             </a:fld>
             <a:endParaRPr lang="es-ES"/>
           </a:p>
@@ -1312,9 +1312,9 @@
           <a:bodyPr/>
           <a:lstStyle/>
           <a:p>
-            <a:fld id="{EA5C91CF-12C1-4498-8A8A-7485BE245B16}" type="datetime1">
+            <a:fld id="{1F2FD71C-4882-4477-BBE2-4BD67691D07E}" type="datetime1">
               <a:rPr lang="es-ES" smtClean="0"/>
-              <a:t>30/06/2013</a:t>
+              <a:t>01/07/2013</a:t>
             </a:fld>
             <a:endParaRPr lang="es-ES"/>
           </a:p>
@@ -1560,9 +1560,9 @@
           <a:bodyPr/>
           <a:lstStyle/>
           <a:p>
-            <a:fld id="{72847918-28E3-4415-98CD-D1136F016B85}" type="datetime1">
+            <a:fld id="{C9B27F70-A1F2-4761-94FF-C34EC0B5C26B}" type="datetime1">
               <a:rPr lang="es-ES" smtClean="0"/>
-              <a:t>30/06/2013</a:t>
+              <a:t>01/07/2013</a:t>
             </a:fld>
             <a:endParaRPr lang="es-ES"/>
           </a:p>
@@ -1878,9 +1878,9 @@
           <a:bodyPr/>
           <a:lstStyle/>
           <a:p>
-            <a:fld id="{EC10D93C-9EA6-4B9C-96E8-42BB91E6CB8E}" type="datetime1">
+            <a:fld id="{835D4200-5903-4DD7-9F81-459CB121BC07}" type="datetime1">
               <a:rPr lang="es-ES" smtClean="0"/>
-              <a:t>30/06/2013</a:t>
+              <a:t>01/07/2013</a:t>
             </a:fld>
             <a:endParaRPr lang="es-ES"/>
           </a:p>
@@ -2344,9 +2344,9 @@
           <a:bodyPr/>
           <a:lstStyle/>
           <a:p>
-            <a:fld id="{B82F659C-590E-44E6-AB27-766EBDB1C1ED}" type="datetime1">
+            <a:fld id="{81D0FF4F-79FE-4538-B979-A2A984573A10}" type="datetime1">
               <a:rPr lang="es-ES" smtClean="0"/>
-              <a:t>30/06/2013</a:t>
+              <a:t>01/07/2013</a:t>
             </a:fld>
             <a:endParaRPr lang="es-ES"/>
           </a:p>
@@ -2492,9 +2492,9 @@
           <a:bodyPr/>
           <a:lstStyle/>
           <a:p>
-            <a:fld id="{426ECC86-B7C5-4CB9-9600-C02568D6E256}" type="datetime1">
+            <a:fld id="{04AB70DA-4DFE-480B-8C7C-DD89595D65B0}" type="datetime1">
               <a:rPr lang="es-ES" smtClean="0"/>
-              <a:t>30/06/2013</a:t>
+              <a:t>01/07/2013</a:t>
             </a:fld>
             <a:endParaRPr lang="es-ES"/>
           </a:p>
@@ -2582,9 +2582,9 @@
           <a:bodyPr/>
           <a:lstStyle/>
           <a:p>
-            <a:fld id="{DA79D0DE-E067-4E64-A7CD-9D3FB2CD9292}" type="datetime1">
+            <a:fld id="{E5AD5170-137E-4220-AAD9-09864698BDE0}" type="datetime1">
               <a:rPr lang="es-ES" smtClean="0"/>
-              <a:t>30/06/2013</a:t>
+              <a:t>01/07/2013</a:t>
             </a:fld>
             <a:endParaRPr lang="es-ES"/>
           </a:p>
@@ -2856,9 +2856,9 @@
           <a:bodyPr/>
           <a:lstStyle/>
           <a:p>
-            <a:fld id="{3B08B1EA-EB46-433F-8CE7-35BEB26C76E9}" type="datetime1">
+            <a:fld id="{006AF552-B44A-45CB-A9F6-1C1DCC86DB82}" type="datetime1">
               <a:rPr lang="es-ES" smtClean="0"/>
-              <a:t>30/06/2013</a:t>
+              <a:t>01/07/2013</a:t>
             </a:fld>
             <a:endParaRPr lang="es-ES"/>
           </a:p>
@@ -3161,9 +3161,9 @@
           <a:bodyPr/>
           <a:lstStyle/>
           <a:p>
-            <a:fld id="{D4100023-18BC-452D-8831-2FAD846FA9AE}" type="datetime1">
+            <a:fld id="{289BF707-9D58-4A85-9E77-4133DEF04B28}" type="datetime1">
               <a:rPr lang="es-ES" smtClean="0"/>
-              <a:t>30/06/2013</a:t>
+              <a:t>01/07/2013</a:t>
             </a:fld>
             <a:endParaRPr lang="es-ES"/>
           </a:p>
@@ -3459,9 +3459,9 @@
             </a:lvl1pPr>
           </a:lstStyle>
           <a:p>
-            <a:fld id="{79147284-D552-4485-90D3-B77EF89773C6}" type="datetime1">
+            <a:fld id="{05DCF1C9-7720-4238-86A3-5AA26F77ADEA}" type="datetime1">
               <a:rPr lang="es-ES" smtClean="0"/>
-              <a:t>30/06/2013</a:t>
+              <a:t>01/07/2013</a:t>
             </a:fld>
             <a:endParaRPr lang="es-ES"/>
           </a:p>
@@ -6810,8 +6810,8 @@
           </a:p>
         </p:txBody>
       </p:sp>
-      <mc:AlternateContent xmlns:mc="http://schemas.openxmlformats.org/markup-compatibility/2006">
-        <mc:Choice xmlns:a14="http://schemas.microsoft.com/office/drawing/2010/main" Requires="a14">
+      <mc:AlternateContent xmlns:mc="http://schemas.openxmlformats.org/markup-compatibility/2006" xmlns:a14="http://schemas.microsoft.com/office/drawing/2010/main">
+        <mc:Choice Requires="a14">
           <p:sp>
             <p:nvSpPr>
               <p:cNvPr id="14" name="13 CuadroTexto"/>
@@ -6925,7 +6925,7 @@
             </p:txBody>
           </p:sp>
         </mc:Choice>
-        <mc:Fallback>
+        <mc:Fallback xmlns="">
           <p:sp>
             <p:nvSpPr>
               <p:cNvPr id="14" name="13 CuadroTexto"/>
@@ -20503,6 +20503,139 @@
           </a:p>
         </p:txBody>
       </p:sp>
+      <p:grpSp>
+        <p:nvGrpSpPr>
+          <p:cNvPr id="3" name="2 Grupo"/>
+          <p:cNvGrpSpPr/>
+          <p:nvPr/>
+        </p:nvGrpSpPr>
+        <p:grpSpPr>
+          <a:xfrm>
+            <a:off x="1901052" y="3356992"/>
+            <a:ext cx="5374558" cy="1080120"/>
+            <a:chOff x="2123728" y="3356992"/>
+            <a:chExt cx="5374558" cy="1080120"/>
+          </a:xfrm>
+        </p:grpSpPr>
+        <p:pic>
+          <p:nvPicPr>
+            <p:cNvPr id="2053" name="Picture 5"/>
+            <p:cNvPicPr>
+              <a:picLocks noChangeAspect="1" noChangeArrowheads="1"/>
+            </p:cNvPicPr>
+            <p:nvPr/>
+          </p:nvPicPr>
+          <p:blipFill>
+            <a:blip r:embed="rId2">
+              <a:extLst>
+                <a:ext uri="{28A0092B-C50C-407E-A947-70E740481C1C}">
+                  <a14:useLocalDpi xmlns:a14="http://schemas.microsoft.com/office/drawing/2010/main" val="0"/>
+                </a:ext>
+              </a:extLst>
+            </a:blip>
+            <a:srcRect/>
+            <a:stretch>
+              <a:fillRect/>
+            </a:stretch>
+          </p:blipFill>
+          <p:spPr bwMode="auto">
+            <a:xfrm>
+              <a:off x="3135836" y="3460789"/>
+              <a:ext cx="4362450" cy="828675"/>
+            </a:xfrm>
+            <a:prstGeom prst="rect">
+              <a:avLst/>
+            </a:prstGeom>
+            <a:noFill/>
+            <a:ln>
+              <a:noFill/>
+            </a:ln>
+            <a:extLst>
+              <a:ext uri="{909E8E84-426E-40DD-AFC4-6F175D3DCCD1}">
+                <a14:hiddenFill xmlns:a14="http://schemas.microsoft.com/office/drawing/2010/main">
+                  <a:solidFill>
+                    <a:schemeClr val="accent1"/>
+                  </a:solidFill>
+                </a14:hiddenFill>
+              </a:ext>
+              <a:ext uri="{91240B29-F687-4F45-9708-019B960494DF}">
+                <a14:hiddenLine xmlns:a14="http://schemas.microsoft.com/office/drawing/2010/main" w="9525">
+                  <a:solidFill>
+                    <a:schemeClr val="tx1"/>
+                  </a:solidFill>
+                  <a:miter lim="800000"/>
+                  <a:headEnd/>
+                  <a:tailEnd/>
+                </a14:hiddenLine>
+              </a:ext>
+            </a:extLst>
+          </p:spPr>
+        </p:pic>
+        <p:pic>
+          <p:nvPicPr>
+            <p:cNvPr id="7" name="Picture 2"/>
+            <p:cNvPicPr>
+              <a:picLocks noChangeAspect="1" noChangeArrowheads="1"/>
+            </p:cNvPicPr>
+            <p:nvPr/>
+          </p:nvPicPr>
+          <p:blipFill>
+            <a:blip r:embed="rId3">
+              <a:extLst>
+                <a:ext uri="{28A0092B-C50C-407E-A947-70E740481C1C}">
+                  <a14:useLocalDpi xmlns:a14="http://schemas.microsoft.com/office/drawing/2010/main" val="0"/>
+                </a:ext>
+              </a:extLst>
+            </a:blip>
+            <a:srcRect/>
+            <a:stretch>
+              <a:fillRect/>
+            </a:stretch>
+          </p:blipFill>
+          <p:spPr bwMode="auto">
+            <a:xfrm>
+              <a:off x="2123728" y="3356992"/>
+              <a:ext cx="1080120" cy="1080120"/>
+            </a:xfrm>
+            <a:prstGeom prst="rect">
+              <a:avLst/>
+            </a:prstGeom>
+            <a:noFill/>
+            <a:ln>
+              <a:noFill/>
+            </a:ln>
+            <a:effectLst/>
+            <a:extLst>
+              <a:ext uri="{909E8E84-426E-40DD-AFC4-6F175D3DCCD1}">
+                <a14:hiddenFill xmlns:a14="http://schemas.microsoft.com/office/drawing/2010/main">
+                  <a:solidFill>
+                    <a:schemeClr val="accent1"/>
+                  </a:solidFill>
+                </a14:hiddenFill>
+              </a:ext>
+              <a:ext uri="{91240B29-F687-4F45-9708-019B960494DF}">
+                <a14:hiddenLine xmlns:a14="http://schemas.microsoft.com/office/drawing/2010/main" w="9525">
+                  <a:solidFill>
+                    <a:schemeClr val="tx1"/>
+                  </a:solidFill>
+                  <a:miter lim="800000"/>
+                  <a:headEnd/>
+                  <a:tailEnd/>
+                </a14:hiddenLine>
+              </a:ext>
+              <a:ext uri="{AF507438-7753-43E0-B8FC-AC1667EBCBE1}">
+                <a14:hiddenEffects xmlns:a14="http://schemas.microsoft.com/office/drawing/2010/main">
+                  <a:effectLst>
+                    <a:outerShdw dist="35921" dir="2700000" algn="ctr" rotWithShape="0">
+                      <a:schemeClr val="bg2"/>
+                    </a:outerShdw>
+                  </a:effectLst>
+                </a14:hiddenEffects>
+              </a:ext>
+            </a:extLst>
+          </p:spPr>
+        </p:pic>
+      </p:grpSp>
     </p:spTree>
     <p:extLst>
       <p:ext uri="{BB962C8B-B14F-4D97-AF65-F5344CB8AC3E}">
@@ -20624,6 +20757,287 @@
               <a:t>22</a:t>
             </a:fld>
             <a:endParaRPr lang="es-ES"/>
+          </a:p>
+        </p:txBody>
+      </p:sp>
+      <p:sp>
+        <p:nvSpPr>
+          <p:cNvPr id="3" name="2 CuadroTexto"/>
+          <p:cNvSpPr txBox="1"/>
+          <p:nvPr/>
+        </p:nvSpPr>
+        <p:spPr>
+          <a:xfrm>
+            <a:off x="1201072" y="2492896"/>
+            <a:ext cx="6721327" cy="400110"/>
+          </a:xfrm>
+          <a:prstGeom prst="rect">
+            <a:avLst/>
+          </a:prstGeom>
+          <a:noFill/>
+        </p:spPr>
+        <p:txBody>
+          <a:bodyPr wrap="none" rtlCol="0">
+            <a:spAutoFit/>
+          </a:bodyPr>
+          <a:lstStyle/>
+          <a:p>
+            <a:r>
+              <a:rPr lang="es-ES" sz="2000" b="1" dirty="0" smtClean="0"/>
+              <a:t>Arquitectura RISC estricta: </a:t>
+            </a:r>
+            <a:r>
+              <a:rPr lang="es-ES" sz="2000" i="1" dirty="0" err="1" smtClean="0"/>
+              <a:t>Reduced</a:t>
+            </a:r>
+            <a:r>
+              <a:rPr lang="es-ES" sz="2000" i="1" dirty="0" smtClean="0"/>
+              <a:t> </a:t>
+            </a:r>
+            <a:r>
+              <a:rPr lang="es-ES" sz="2000" i="1" dirty="0" err="1"/>
+              <a:t>I</a:t>
+            </a:r>
+            <a:r>
+              <a:rPr lang="es-ES" sz="2000" i="1" dirty="0" err="1" smtClean="0"/>
+              <a:t>nstruction</a:t>
+            </a:r>
+            <a:r>
+              <a:rPr lang="es-ES" sz="2000" i="1" dirty="0" smtClean="0"/>
+              <a:t> Set </a:t>
+            </a:r>
+            <a:r>
+              <a:rPr lang="es-ES" sz="2000" i="1" dirty="0"/>
+              <a:t>C</a:t>
+            </a:r>
+            <a:r>
+              <a:rPr lang="es-ES" sz="2000" i="1" dirty="0" smtClean="0"/>
+              <a:t>omputing</a:t>
+            </a:r>
+            <a:r>
+              <a:rPr lang="es-ES" sz="2000" b="1" dirty="0" smtClean="0"/>
+              <a:t> </a:t>
+            </a:r>
+            <a:endParaRPr lang="es-ES" sz="2000" b="1" dirty="0"/>
+          </a:p>
+        </p:txBody>
+      </p:sp>
+      <p:sp>
+        <p:nvSpPr>
+          <p:cNvPr id="6" name="5 Rectángulo"/>
+          <p:cNvSpPr/>
+          <p:nvPr/>
+        </p:nvSpPr>
+        <p:spPr>
+          <a:xfrm>
+            <a:off x="1204211" y="3767841"/>
+            <a:ext cx="2798587" cy="400110"/>
+          </a:xfrm>
+          <a:prstGeom prst="rect">
+            <a:avLst/>
+          </a:prstGeom>
+        </p:spPr>
+        <p:txBody>
+          <a:bodyPr wrap="none">
+            <a:spAutoFit/>
+          </a:bodyPr>
+          <a:lstStyle/>
+          <a:p>
+            <a:r>
+              <a:rPr lang="es-ES" sz="2000" b="1" dirty="0" smtClean="0"/>
+              <a:t>Ejecución en cinco fases:</a:t>
+            </a:r>
+            <a:endParaRPr lang="es-ES" sz="2000" dirty="0"/>
+          </a:p>
+        </p:txBody>
+      </p:sp>
+      <p:sp>
+        <p:nvSpPr>
+          <p:cNvPr id="7" name="6 CuadroTexto"/>
+          <p:cNvSpPr txBox="1"/>
+          <p:nvPr/>
+        </p:nvSpPr>
+        <p:spPr>
+          <a:xfrm>
+            <a:off x="4160382" y="3247816"/>
+            <a:ext cx="2571858" cy="1477328"/>
+          </a:xfrm>
+          <a:prstGeom prst="rect">
+            <a:avLst/>
+          </a:prstGeom>
+          <a:noFill/>
+        </p:spPr>
+        <p:txBody>
+          <a:bodyPr wrap="none" rtlCol="0">
+            <a:spAutoFit/>
+          </a:bodyPr>
+          <a:lstStyle/>
+          <a:p>
+            <a:pPr marL="285750" indent="-285750">
+              <a:buFont typeface="Arial" pitchFamily="34" charset="0"/>
+              <a:buChar char="•"/>
+            </a:pPr>
+            <a:r>
+              <a:rPr lang="es-ES" dirty="0" smtClean="0"/>
+              <a:t>IF: </a:t>
+            </a:r>
+            <a:r>
+              <a:rPr lang="es-ES" i="1" dirty="0" err="1" smtClean="0"/>
+              <a:t>Instruction</a:t>
+            </a:r>
+            <a:r>
+              <a:rPr lang="es-ES" i="1" dirty="0" smtClean="0"/>
+              <a:t> </a:t>
+            </a:r>
+            <a:r>
+              <a:rPr lang="es-ES" i="1" dirty="0" err="1" smtClean="0"/>
+              <a:t>Fetch</a:t>
+            </a:r>
+            <a:endParaRPr lang="es-ES" i="1" dirty="0" smtClean="0"/>
+          </a:p>
+          <a:p>
+            <a:pPr marL="285750" indent="-285750">
+              <a:buFont typeface="Arial" pitchFamily="34" charset="0"/>
+              <a:buChar char="•"/>
+            </a:pPr>
+            <a:r>
+              <a:rPr lang="es-ES" dirty="0" smtClean="0"/>
+              <a:t>ID: </a:t>
+            </a:r>
+            <a:r>
+              <a:rPr lang="es-ES" i="1" dirty="0" err="1" smtClean="0"/>
+              <a:t>Instruction</a:t>
+            </a:r>
+            <a:r>
+              <a:rPr lang="es-ES" i="1" dirty="0" smtClean="0"/>
+              <a:t> </a:t>
+            </a:r>
+            <a:r>
+              <a:rPr lang="es-ES" i="1" dirty="0" err="1" smtClean="0"/>
+              <a:t>Decode</a:t>
+            </a:r>
+            <a:endParaRPr lang="es-ES" i="1" dirty="0" smtClean="0"/>
+          </a:p>
+          <a:p>
+            <a:pPr marL="285750" indent="-285750">
+              <a:buFont typeface="Arial" pitchFamily="34" charset="0"/>
+              <a:buChar char="•"/>
+            </a:pPr>
+            <a:r>
+              <a:rPr lang="es-ES" dirty="0" smtClean="0"/>
+              <a:t>EXE: </a:t>
+            </a:r>
+            <a:r>
+              <a:rPr lang="es-ES" i="1" dirty="0" err="1" smtClean="0"/>
+              <a:t>Execution</a:t>
+            </a:r>
+            <a:endParaRPr lang="es-ES" i="1" dirty="0" smtClean="0"/>
+          </a:p>
+          <a:p>
+            <a:pPr marL="285750" indent="-285750">
+              <a:buFont typeface="Arial" pitchFamily="34" charset="0"/>
+              <a:buChar char="•"/>
+            </a:pPr>
+            <a:r>
+              <a:rPr lang="es-ES" dirty="0" smtClean="0"/>
+              <a:t>MEM: </a:t>
+            </a:r>
+            <a:r>
+              <a:rPr lang="es-ES" i="1" dirty="0" err="1" smtClean="0"/>
+              <a:t>Memory</a:t>
+            </a:r>
+            <a:endParaRPr lang="es-ES" i="1" dirty="0" smtClean="0"/>
+          </a:p>
+          <a:p>
+            <a:pPr marL="285750" indent="-285750">
+              <a:buFont typeface="Arial" pitchFamily="34" charset="0"/>
+              <a:buChar char="•"/>
+            </a:pPr>
+            <a:r>
+              <a:rPr lang="es-ES" dirty="0" smtClean="0"/>
+              <a:t>WB: </a:t>
+            </a:r>
+            <a:r>
+              <a:rPr lang="es-ES" i="1" dirty="0" err="1" smtClean="0"/>
+              <a:t>Write</a:t>
+            </a:r>
+            <a:r>
+              <a:rPr lang="es-ES" i="1" dirty="0" smtClean="0"/>
+              <a:t> Back</a:t>
+            </a:r>
+            <a:endParaRPr lang="es-ES" i="1" dirty="0"/>
+          </a:p>
+        </p:txBody>
+      </p:sp>
+      <p:sp>
+        <p:nvSpPr>
+          <p:cNvPr id="8" name="7 Abrir llave"/>
+          <p:cNvSpPr/>
+          <p:nvPr/>
+        </p:nvSpPr>
+        <p:spPr>
+          <a:xfrm>
+            <a:off x="4016366" y="3247816"/>
+            <a:ext cx="288032" cy="1440160"/>
+          </a:xfrm>
+          <a:prstGeom prst="leftBrace">
+            <a:avLst/>
+          </a:prstGeom>
+          <a:ln w="19050">
+            <a:solidFill>
+              <a:schemeClr val="tx1"/>
+            </a:solidFill>
+          </a:ln>
+        </p:spPr>
+        <p:style>
+          <a:lnRef idx="1">
+            <a:schemeClr val="accent1"/>
+          </a:lnRef>
+          <a:fillRef idx="0">
+            <a:schemeClr val="accent1"/>
+          </a:fillRef>
+          <a:effectRef idx="0">
+            <a:schemeClr val="accent1"/>
+          </a:effectRef>
+          <a:fontRef idx="minor">
+            <a:schemeClr val="tx1"/>
+          </a:fontRef>
+        </p:style>
+        <p:txBody>
+          <a:bodyPr rtlCol="0" anchor="ctr"/>
+          <a:lstStyle/>
+          <a:p>
+            <a:pPr algn="ctr"/>
+            <a:endParaRPr lang="es-ES"/>
+          </a:p>
+        </p:txBody>
+      </p:sp>
+      <p:sp>
+        <p:nvSpPr>
+          <p:cNvPr id="9" name="8 Rectángulo"/>
+          <p:cNvSpPr/>
+          <p:nvPr/>
+        </p:nvSpPr>
+        <p:spPr>
+          <a:xfrm>
+            <a:off x="1201072" y="5013176"/>
+            <a:ext cx="3569632" cy="400110"/>
+          </a:xfrm>
+          <a:prstGeom prst="rect">
+            <a:avLst/>
+          </a:prstGeom>
+        </p:spPr>
+        <p:txBody>
+          <a:bodyPr wrap="none">
+            <a:spAutoFit/>
+          </a:bodyPr>
+          <a:lstStyle/>
+          <a:p>
+            <a:r>
+              <a:rPr lang="es-ES" sz="2000" b="1" dirty="0" smtClean="0"/>
+              <a:t>Arquitectura sencilla y didáctica</a:t>
+            </a:r>
+            <a:endParaRPr lang="es-ES" sz="2000" dirty="0"/>
           </a:p>
         </p:txBody>
       </p:sp>
@@ -24427,7 +24841,7 @@
         </p:blipFill>
         <p:spPr bwMode="auto">
           <a:xfrm>
-            <a:off x="1403978" y="1844824"/>
+            <a:off x="1403978" y="1700808"/>
             <a:ext cx="7740022" cy="4464496"/>
           </a:xfrm>
           <a:prstGeom prst="rect">
@@ -24500,13 +24914,13 @@
           <p:nvPr>
             <p:extLst>
               <p:ext uri="{D42A27DB-BD31-4B8C-83A1-F6EECF244321}">
-                <p14:modId xmlns:p14="http://schemas.microsoft.com/office/powerpoint/2010/main" val="3645807563"/>
+                <p14:modId xmlns:p14="http://schemas.microsoft.com/office/powerpoint/2010/main" val="901170445"/>
               </p:ext>
             </p:extLst>
           </p:nvPr>
         </p:nvGraphicFramePr>
         <p:xfrm>
-          <a:off x="1403978" y="5972128"/>
+          <a:off x="1403978" y="5828112"/>
           <a:ext cx="6480390" cy="841248"/>
         </p:xfrm>
         <a:graphic>
@@ -24514,8 +24928,8 @@
             <a:tbl>
               <a:tblPr firstRow="1" firstCol="1" bandRow="1"/>
               <a:tblGrid>
-                <a:gridCol w="2349120"/>
-                <a:gridCol w="4131270"/>
+                <a:gridCol w="1583846"/>
+                <a:gridCol w="4896544"/>
               </a:tblGrid>
               <a:tr h="164462">
                 <a:tc>
@@ -24747,23 +25161,20 @@
                         </a:spcAft>
                       </a:pPr>
                       <a:r>
-                        <a:rPr lang="es-ES" sz="1600" dirty="0" err="1">
+                        <a:rPr lang="es-ES" sz="1600" dirty="0" smtClean="0">
                           <a:effectLst/>
                           <a:latin typeface="Calibri"/>
                           <a:ea typeface="Calibri"/>
                           <a:cs typeface="Times New Roman"/>
                         </a:rPr>
-                        <a:t>Excepcion</a:t>
+                        <a:t>Desplazamiento de etiquetas</a:t>
                       </a:r>
-                      <a:r>
-                        <a:rPr lang="es-ES" sz="1600" dirty="0">
-                          <a:effectLst/>
-                          <a:latin typeface="Calibri"/>
-                          <a:ea typeface="Calibri"/>
-                          <a:cs typeface="Times New Roman"/>
-                        </a:rPr>
-                        <a:t> C</a:t>
-                      </a:r>
+                      <a:endParaRPr lang="es-ES" sz="1600" dirty="0">
+                        <a:effectLst/>
+                        <a:latin typeface="Calibri"/>
+                        <a:ea typeface="Calibri"/>
+                        <a:cs typeface="Times New Roman"/>
+                      </a:endParaRPr>
                     </a:p>
                   </a:txBody>
                   <a:tcPr marL="68580" marR="68580" marT="0" marB="0">
@@ -24890,31 +25301,13 @@
                         </a:spcAft>
                       </a:pPr>
                       <a:r>
-                        <a:rPr lang="es-ES" sz="1600" dirty="0" err="1">
+                        <a:rPr lang="es-ES" sz="1600" dirty="0" smtClean="0">
                           <a:effectLst/>
                           <a:latin typeface="Calibri"/>
                           <a:ea typeface="Calibri"/>
                           <a:cs typeface="Times New Roman"/>
                         </a:rPr>
-                        <a:t>Rs</a:t>
-                      </a:r>
-                      <a:r>
-                        <a:rPr lang="es-ES" sz="1600" dirty="0">
-                          <a:effectLst/>
-                          <a:latin typeface="Calibri"/>
-                          <a:ea typeface="Calibri"/>
-                          <a:cs typeface="Times New Roman"/>
-                        </a:rPr>
-                        <a:t> &lt;- </a:t>
-                      </a:r>
-                      <a:r>
-                        <a:rPr lang="es-ES" sz="1600" dirty="0" err="1">
-                          <a:effectLst/>
-                          <a:latin typeface="Calibri"/>
-                          <a:ea typeface="Calibri"/>
-                          <a:cs typeface="Times New Roman"/>
-                        </a:rPr>
-                        <a:t>RHigh</a:t>
+                        <a:t>Selector de qubit de control</a:t>
                       </a:r>
                       <a:endParaRPr lang="es-ES" sz="1600" dirty="0">
                         <a:effectLst/>
@@ -25071,6 +25464,36 @@
           </a:p>
         </p:txBody>
       </p:sp>
+      <p:pic>
+        <p:nvPicPr>
+          <p:cNvPr id="5" name="4 Imagen"/>
+          <p:cNvPicPr/>
+          <p:nvPr/>
+        </p:nvPicPr>
+        <p:blipFill>
+          <a:blip r:embed="rId2">
+            <a:extLst>
+              <a:ext uri="{28A0092B-C50C-407E-A947-70E740481C1C}">
+                <a14:useLocalDpi xmlns:a14="http://schemas.microsoft.com/office/drawing/2010/main" val="0"/>
+              </a:ext>
+            </a:extLst>
+          </a:blip>
+          <a:srcRect/>
+          <a:stretch>
+            <a:fillRect/>
+          </a:stretch>
+        </p:blipFill>
+        <p:spPr bwMode="auto">
+          <a:xfrm>
+            <a:off x="2211842" y="3284984"/>
+            <a:ext cx="4752986" cy="2237416"/>
+          </a:xfrm>
+          <a:prstGeom prst="rect">
+            <a:avLst/>
+          </a:prstGeom>
+          <a:noFill/>
+        </p:spPr>
+      </p:pic>
     </p:spTree>
     <p:extLst>
       <p:ext uri="{BB962C8B-B14F-4D97-AF65-F5344CB8AC3E}">
@@ -29626,8 +30049,8 @@
           </a:p>
         </p:txBody>
       </p:sp>
-      <mc:AlternateContent xmlns:mc="http://schemas.openxmlformats.org/markup-compatibility/2006">
-        <mc:Choice xmlns:a14="http://schemas.microsoft.com/office/drawing/2010/main" Requires="a14">
+      <mc:AlternateContent xmlns:mc="http://schemas.openxmlformats.org/markup-compatibility/2006" xmlns:a14="http://schemas.microsoft.com/office/drawing/2010/main">
+        <mc:Choice Requires="a14">
           <p:sp>
             <p:nvSpPr>
               <p:cNvPr id="33" name="32 Rectángulo"/>
@@ -30225,7 +30648,7 @@
             </p:txBody>
           </p:sp>
         </mc:Choice>
-        <mc:Fallback>
+        <mc:Fallback xmlns="">
           <p:sp>
             <p:nvSpPr>
               <p:cNvPr id="33" name="32 Rectángulo"/>
@@ -30673,8 +31096,8 @@
           </a:p>
         </p:txBody>
       </p:sp>
-      <mc:AlternateContent xmlns:mc="http://schemas.openxmlformats.org/markup-compatibility/2006">
-        <mc:Choice xmlns:a14="http://schemas.microsoft.com/office/drawing/2010/main" Requires="a14">
+      <mc:AlternateContent xmlns:mc="http://schemas.openxmlformats.org/markup-compatibility/2006" xmlns:a14="http://schemas.microsoft.com/office/drawing/2010/main">
+        <mc:Choice Requires="a14">
           <p:sp>
             <p:nvSpPr>
               <p:cNvPr id="7" name="6 Rectángulo"/>
@@ -30696,6 +31119,7 @@
               </a:bodyPr>
               <a:lstStyle/>
               <a:p>
+                <a:pPr/>
                 <a14:m>
                   <m:oMathPara xmlns:m="http://schemas.openxmlformats.org/officeDocument/2006/math">
                     <m:oMathParaPr>
@@ -30707,7 +31131,9 @@
                           <m:begChr m:val="{"/>
                           <m:endChr m:val=""/>
                           <m:ctrlPr>
-                            <a:rPr lang="es-ES" i="1"/>
+                            <a:rPr lang="es-ES" i="1">
+                              <a:latin typeface="Cambria Math"/>
+                            </a:rPr>
                           </m:ctrlPr>
                         </m:dPr>
                         <m:e>
@@ -30722,13 +31148,17 @@
                                 </m:mc>
                               </m:mcs>
                               <m:ctrlPr>
-                                <a:rPr lang="es-ES" i="1"/>
+                                <a:rPr lang="es-ES" i="1">
+                                  <a:latin typeface="Cambria Math"/>
+                                </a:rPr>
                               </m:ctrlPr>
                             </m:mPr>
                             <m:mr>
                               <m:e>
                                 <m:r>
-                                  <a:rPr lang="es-ES" i="1"/>
+                                  <a:rPr lang="es-ES" i="1">
+                                    <a:latin typeface="Cambria Math"/>
+                                  </a:rPr>
                                   <m:t>±</m:t>
                                 </m:r>
                                 <m:d>
@@ -30736,19 +31166,25 @@
                                     <m:begChr m:val="["/>
                                     <m:endChr m:val="]"/>
                                     <m:ctrlPr>
-                                      <a:rPr lang="es-ES" i="1"/>
+                                      <a:rPr lang="es-ES" i="1">
+                                        <a:latin typeface="Cambria Math"/>
+                                      </a:rPr>
                                     </m:ctrlPr>
                                   </m:dPr>
                                   <m:e>
                                     <m:f>
                                       <m:fPr>
                                         <m:ctrlPr>
-                                          <a:rPr lang="es-ES" i="1"/>
+                                          <a:rPr lang="es-ES" i="1">
+                                            <a:latin typeface="Cambria Math"/>
+                                          </a:rPr>
                                         </m:ctrlPr>
                                       </m:fPr>
                                       <m:num>
                                         <m:r>
-                                          <a:rPr lang="es-ES" i="1"/>
+                                          <a:rPr lang="es-ES" i="1">
+                                            <a:latin typeface="Cambria Math"/>
+                                          </a:rPr>
                                           <m:t>1</m:t>
                                         </m:r>
                                       </m:num>
@@ -30757,13 +31193,17 @@
                                           <m:radPr>
                                             <m:degHide m:val="on"/>
                                             <m:ctrlPr>
-                                              <a:rPr lang="es-ES" i="1"/>
+                                              <a:rPr lang="es-ES" i="1">
+                                                <a:latin typeface="Cambria Math"/>
+                                              </a:rPr>
                                             </m:ctrlPr>
                                           </m:radPr>
                                           <m:deg/>
                                           <m:e>
                                             <m:r>
-                                              <a:rPr lang="es-ES" i="1"/>
+                                              <a:rPr lang="es-ES" i="1">
+                                                <a:latin typeface="Cambria Math"/>
+                                              </a:rPr>
                                               <m:t>2</m:t>
                                             </m:r>
                                           </m:e>
@@ -30773,12 +31213,16 @@
                                     <m:d>
                                       <m:dPr>
                                         <m:ctrlPr>
-                                          <a:rPr lang="es-ES" i="1"/>
+                                          <a:rPr lang="es-ES" i="1">
+                                            <a:latin typeface="Cambria Math"/>
+                                          </a:rPr>
                                         </m:ctrlPr>
                                       </m:dPr>
                                       <m:e>
                                         <m:r>
-                                          <a:rPr lang="es-ES"/>
+                                          <a:rPr lang="es-ES">
+                                            <a:latin typeface="Cambria Math"/>
+                                          </a:rPr>
                                           <m:t> </m:t>
                                         </m:r>
                                         <m:d>
@@ -30786,18 +31230,24 @@
                                             <m:begChr m:val=""/>
                                             <m:endChr m:val="⟩"/>
                                             <m:ctrlPr>
-                                              <a:rPr lang="es-ES" i="1"/>
+                                              <a:rPr lang="es-ES" i="1">
+                                                <a:latin typeface="Cambria Math"/>
+                                              </a:rPr>
                                             </m:ctrlPr>
                                           </m:dPr>
                                           <m:e>
                                             <m:r>
-                                              <a:rPr lang="es-ES" i="1"/>
+                                              <a:rPr lang="es-ES" i="1">
+                                                <a:latin typeface="Cambria Math"/>
+                                              </a:rPr>
                                               <m:t>|0</m:t>
                                             </m:r>
                                           </m:e>
                                         </m:d>
                                         <m:r>
-                                          <a:rPr lang="es-ES"/>
+                                          <a:rPr lang="es-ES">
+                                            <a:latin typeface="Cambria Math"/>
+                                          </a:rPr>
                                           <m:t>+</m:t>
                                         </m:r>
                                         <m:d>
@@ -30805,12 +31255,16 @@
                                             <m:begChr m:val=""/>
                                             <m:endChr m:val="⟩"/>
                                             <m:ctrlPr>
-                                              <a:rPr lang="es-ES" i="1"/>
+                                              <a:rPr lang="es-ES" i="1">
+                                                <a:latin typeface="Cambria Math"/>
+                                              </a:rPr>
                                             </m:ctrlPr>
                                           </m:dPr>
                                           <m:e>
                                             <m:r>
-                                              <a:rPr lang="es-ES" i="1"/>
+                                              <a:rPr lang="es-ES" i="1">
+                                                <a:latin typeface="Cambria Math"/>
+                                              </a:rPr>
                                               <m:t>|1</m:t>
                                             </m:r>
                                           </m:e>
@@ -30824,19 +31278,25 @@
                                     <m:begChr m:val="["/>
                                     <m:endChr m:val="]"/>
                                     <m:ctrlPr>
-                                      <a:rPr lang="es-ES" i="1"/>
+                                      <a:rPr lang="es-ES" i="1">
+                                        <a:latin typeface="Cambria Math"/>
+                                      </a:rPr>
                                     </m:ctrlPr>
                                   </m:dPr>
                                   <m:e>
                                     <m:f>
                                       <m:fPr>
                                         <m:ctrlPr>
-                                          <a:rPr lang="es-ES" i="1"/>
+                                          <a:rPr lang="es-ES" i="1">
+                                            <a:latin typeface="Cambria Math"/>
+                                          </a:rPr>
                                         </m:ctrlPr>
                                       </m:fPr>
                                       <m:num>
                                         <m:r>
-                                          <a:rPr lang="es-ES" i="1"/>
+                                          <a:rPr lang="es-ES" i="1">
+                                            <a:latin typeface="Cambria Math"/>
+                                          </a:rPr>
                                           <m:t>1</m:t>
                                         </m:r>
                                       </m:num>
@@ -30845,13 +31305,17 @@
                                           <m:radPr>
                                             <m:degHide m:val="on"/>
                                             <m:ctrlPr>
-                                              <a:rPr lang="es-ES" i="1"/>
+                                              <a:rPr lang="es-ES" i="1">
+                                                <a:latin typeface="Cambria Math"/>
+                                              </a:rPr>
                                             </m:ctrlPr>
                                           </m:radPr>
                                           <m:deg/>
                                           <m:e>
                                             <m:r>
-                                              <a:rPr lang="es-ES" i="1"/>
+                                              <a:rPr lang="es-ES" i="1">
+                                                <a:latin typeface="Cambria Math"/>
+                                              </a:rPr>
                                               <m:t>2</m:t>
                                             </m:r>
                                           </m:e>
@@ -30861,12 +31325,16 @@
                                     <m:d>
                                       <m:dPr>
                                         <m:ctrlPr>
-                                          <a:rPr lang="es-ES" i="1"/>
+                                          <a:rPr lang="es-ES" i="1">
+                                            <a:latin typeface="Cambria Math"/>
+                                          </a:rPr>
                                         </m:ctrlPr>
                                       </m:dPr>
                                       <m:e>
                                         <m:r>
-                                          <a:rPr lang="es-ES"/>
+                                          <a:rPr lang="es-ES">
+                                            <a:latin typeface="Cambria Math"/>
+                                          </a:rPr>
                                           <m:t> </m:t>
                                         </m:r>
                                         <m:d>
@@ -30874,18 +31342,24 @@
                                             <m:begChr m:val=""/>
                                             <m:endChr m:val="⟩"/>
                                             <m:ctrlPr>
-                                              <a:rPr lang="es-ES" i="1"/>
+                                              <a:rPr lang="es-ES" i="1">
+                                                <a:latin typeface="Cambria Math"/>
+                                              </a:rPr>
                                             </m:ctrlPr>
                                           </m:dPr>
                                           <m:e>
                                             <m:r>
-                                              <a:rPr lang="es-ES" i="1"/>
+                                              <a:rPr lang="es-ES" i="1">
+                                                <a:latin typeface="Cambria Math"/>
+                                              </a:rPr>
                                               <m:t>|0</m:t>
                                             </m:r>
                                           </m:e>
                                         </m:d>
                                         <m:r>
-                                          <a:rPr lang="es-ES" i="1"/>
+                                          <a:rPr lang="es-ES" i="1">
+                                            <a:latin typeface="Cambria Math"/>
+                                          </a:rPr>
                                           <m:t>−</m:t>
                                         </m:r>
                                         <m:d>
@@ -30893,12 +31367,16 @@
                                             <m:begChr m:val=""/>
                                             <m:endChr m:val="⟩"/>
                                             <m:ctrlPr>
-                                              <a:rPr lang="es-ES" i="1"/>
+                                              <a:rPr lang="es-ES" i="1">
+                                                <a:latin typeface="Cambria Math"/>
+                                              </a:rPr>
                                             </m:ctrlPr>
                                           </m:dPr>
                                           <m:e>
                                             <m:r>
-                                              <a:rPr lang="es-ES" i="1"/>
+                                              <a:rPr lang="es-ES" i="1">
+                                                <a:latin typeface="Cambria Math"/>
+                                              </a:rPr>
                                               <m:t>|1</m:t>
                                             </m:r>
                                           </m:e>
@@ -30908,40 +31386,56 @@
                                   </m:e>
                                 </m:d>
                                 <m:r>
-                                  <a:rPr lang="es-ES" i="1"/>
+                                  <a:rPr lang="es-ES" i="1">
+                                    <a:latin typeface="Cambria Math"/>
+                                  </a:rPr>
                                   <m:t>𝑠𝑖</m:t>
                                 </m:r>
                                 <m:r>
-                                  <a:rPr lang="es-ES" i="1"/>
+                                  <a:rPr lang="es-ES" i="1">
+                                    <a:latin typeface="Cambria Math"/>
+                                  </a:rPr>
                                   <m:t> </m:t>
                                 </m:r>
                                 <m:r>
-                                  <a:rPr lang="es-ES" i="1"/>
+                                  <a:rPr lang="es-ES" i="1">
+                                    <a:latin typeface="Cambria Math"/>
+                                  </a:rPr>
                                   <m:t>𝑓</m:t>
                                 </m:r>
                                 <m:d>
                                   <m:dPr>
                                     <m:ctrlPr>
-                                      <a:rPr lang="es-ES" i="1"/>
+                                      <a:rPr lang="es-ES" i="1">
+                                        <a:latin typeface="Cambria Math"/>
+                                      </a:rPr>
                                     </m:ctrlPr>
                                   </m:dPr>
                                   <m:e>
                                     <m:r>
-                                      <a:rPr lang="es-ES" i="1"/>
+                                      <a:rPr lang="es-ES" i="1">
+                                        <a:latin typeface="Cambria Math"/>
+                                      </a:rPr>
                                       <m:t>0</m:t>
                                     </m:r>
                                   </m:e>
                                 </m:d>
                                 <m:r>
-                                  <a:rPr lang="es-ES" i="1"/>
+                                  <a:rPr lang="es-ES" i="1">
+                                    <a:latin typeface="Cambria Math"/>
+                                  </a:rPr>
                                   <m:t>=</m:t>
                                 </m:r>
                                 <m:r>
-                                  <a:rPr lang="es-ES" i="1"/>
+                                  <a:rPr lang="es-ES" i="1">
+                                    <a:latin typeface="Cambria Math"/>
+                                  </a:rPr>
                                   <m:t>𝑓</m:t>
                                 </m:r>
                                 <m:r>
-                                  <a:rPr lang="es-ES" i="1"/>
+                                  <a:rPr lang="es-ES" i="1">
+                                    <a:latin typeface="Cambria Math"/>
+                                  </a:rPr>
                                   <m:t>(1)</m:t>
                                 </m:r>
                               </m:e>
@@ -30949,7 +31443,9 @@
                             <m:mr>
                               <m:e>
                                 <m:r>
-                                  <a:rPr lang="es-ES" i="1"/>
+                                  <a:rPr lang="es-ES" i="1">
+                                    <a:latin typeface="Cambria Math"/>
+                                  </a:rPr>
                                   <m:t>±</m:t>
                                 </m:r>
                                 <m:d>
@@ -30957,19 +31453,25 @@
                                     <m:begChr m:val="["/>
                                     <m:endChr m:val="]"/>
                                     <m:ctrlPr>
-                                      <a:rPr lang="es-ES" i="1"/>
+                                      <a:rPr lang="es-ES" i="1">
+                                        <a:latin typeface="Cambria Math"/>
+                                      </a:rPr>
                                     </m:ctrlPr>
                                   </m:dPr>
                                   <m:e>
                                     <m:f>
                                       <m:fPr>
                                         <m:ctrlPr>
-                                          <a:rPr lang="es-ES" i="1"/>
+                                          <a:rPr lang="es-ES" i="1">
+                                            <a:latin typeface="Cambria Math"/>
+                                          </a:rPr>
                                         </m:ctrlPr>
                                       </m:fPr>
                                       <m:num>
                                         <m:r>
-                                          <a:rPr lang="es-ES" i="1"/>
+                                          <a:rPr lang="es-ES" i="1">
+                                            <a:latin typeface="Cambria Math"/>
+                                          </a:rPr>
                                           <m:t>1</m:t>
                                         </m:r>
                                       </m:num>
@@ -30978,13 +31480,17 @@
                                           <m:radPr>
                                             <m:degHide m:val="on"/>
                                             <m:ctrlPr>
-                                              <a:rPr lang="es-ES" i="1"/>
+                                              <a:rPr lang="es-ES" i="1">
+                                                <a:latin typeface="Cambria Math"/>
+                                              </a:rPr>
                                             </m:ctrlPr>
                                           </m:radPr>
                                           <m:deg/>
                                           <m:e>
                                             <m:r>
-                                              <a:rPr lang="es-ES" i="1"/>
+                                              <a:rPr lang="es-ES" i="1">
+                                                <a:latin typeface="Cambria Math"/>
+                                              </a:rPr>
                                               <m:t>2</m:t>
                                             </m:r>
                                           </m:e>
@@ -30994,12 +31500,16 @@
                                     <m:d>
                                       <m:dPr>
                                         <m:ctrlPr>
-                                          <a:rPr lang="es-ES" i="1"/>
+                                          <a:rPr lang="es-ES" i="1">
+                                            <a:latin typeface="Cambria Math"/>
+                                          </a:rPr>
                                         </m:ctrlPr>
                                       </m:dPr>
                                       <m:e>
                                         <m:r>
-                                          <a:rPr lang="es-ES"/>
+                                          <a:rPr lang="es-ES">
+                                            <a:latin typeface="Cambria Math"/>
+                                          </a:rPr>
                                           <m:t> </m:t>
                                         </m:r>
                                         <m:d>
@@ -31007,18 +31517,24 @@
                                             <m:begChr m:val=""/>
                                             <m:endChr m:val="⟩"/>
                                             <m:ctrlPr>
-                                              <a:rPr lang="es-ES" i="1"/>
+                                              <a:rPr lang="es-ES" i="1">
+                                                <a:latin typeface="Cambria Math"/>
+                                              </a:rPr>
                                             </m:ctrlPr>
                                           </m:dPr>
                                           <m:e>
                                             <m:r>
-                                              <a:rPr lang="es-ES" i="1"/>
+                                              <a:rPr lang="es-ES" i="1">
+                                                <a:latin typeface="Cambria Math"/>
+                                              </a:rPr>
                                               <m:t>|0</m:t>
                                             </m:r>
                                           </m:e>
                                         </m:d>
                                         <m:r>
-                                          <a:rPr lang="es-ES" i="1"/>
+                                          <a:rPr lang="es-ES" i="1">
+                                            <a:latin typeface="Cambria Math"/>
+                                          </a:rPr>
                                           <m:t>−</m:t>
                                         </m:r>
                                         <m:d>
@@ -31026,12 +31542,16 @@
                                             <m:begChr m:val=""/>
                                             <m:endChr m:val="⟩"/>
                                             <m:ctrlPr>
-                                              <a:rPr lang="es-ES" i="1"/>
+                                              <a:rPr lang="es-ES" i="1">
+                                                <a:latin typeface="Cambria Math"/>
+                                              </a:rPr>
                                             </m:ctrlPr>
                                           </m:dPr>
                                           <m:e>
                                             <m:r>
-                                              <a:rPr lang="es-ES" i="1"/>
+                                              <a:rPr lang="es-ES" i="1">
+                                                <a:latin typeface="Cambria Math"/>
+                                              </a:rPr>
                                               <m:t>|1</m:t>
                                             </m:r>
                                           </m:e>
@@ -31045,19 +31565,25 @@
                                     <m:begChr m:val="["/>
                                     <m:endChr m:val="]"/>
                                     <m:ctrlPr>
-                                      <a:rPr lang="es-ES" i="1"/>
+                                      <a:rPr lang="es-ES" i="1">
+                                        <a:latin typeface="Cambria Math"/>
+                                      </a:rPr>
                                     </m:ctrlPr>
                                   </m:dPr>
                                   <m:e>
                                     <m:f>
                                       <m:fPr>
                                         <m:ctrlPr>
-                                          <a:rPr lang="es-ES" i="1"/>
+                                          <a:rPr lang="es-ES" i="1">
+                                            <a:latin typeface="Cambria Math"/>
+                                          </a:rPr>
                                         </m:ctrlPr>
                                       </m:fPr>
                                       <m:num>
                                         <m:r>
-                                          <a:rPr lang="es-ES" i="1"/>
+                                          <a:rPr lang="es-ES" i="1">
+                                            <a:latin typeface="Cambria Math"/>
+                                          </a:rPr>
                                           <m:t>1</m:t>
                                         </m:r>
                                       </m:num>
@@ -31066,13 +31592,17 @@
                                           <m:radPr>
                                             <m:degHide m:val="on"/>
                                             <m:ctrlPr>
-                                              <a:rPr lang="es-ES" i="1"/>
+                                              <a:rPr lang="es-ES" i="1">
+                                                <a:latin typeface="Cambria Math"/>
+                                              </a:rPr>
                                             </m:ctrlPr>
                                           </m:radPr>
                                           <m:deg/>
                                           <m:e>
                                             <m:r>
-                                              <a:rPr lang="es-ES" i="1"/>
+                                              <a:rPr lang="es-ES" i="1">
+                                                <a:latin typeface="Cambria Math"/>
+                                              </a:rPr>
                                               <m:t>2</m:t>
                                             </m:r>
                                           </m:e>
@@ -31082,12 +31612,16 @@
                                     <m:d>
                                       <m:dPr>
                                         <m:ctrlPr>
-                                          <a:rPr lang="es-ES" i="1"/>
+                                          <a:rPr lang="es-ES" i="1">
+                                            <a:latin typeface="Cambria Math"/>
+                                          </a:rPr>
                                         </m:ctrlPr>
                                       </m:dPr>
                                       <m:e>
                                         <m:r>
-                                          <a:rPr lang="es-ES"/>
+                                          <a:rPr lang="es-ES">
+                                            <a:latin typeface="Cambria Math"/>
+                                          </a:rPr>
                                           <m:t> </m:t>
                                         </m:r>
                                         <m:d>
@@ -31095,18 +31629,24 @@
                                             <m:begChr m:val=""/>
                                             <m:endChr m:val="⟩"/>
                                             <m:ctrlPr>
-                                              <a:rPr lang="es-ES" i="1"/>
+                                              <a:rPr lang="es-ES" i="1">
+                                                <a:latin typeface="Cambria Math"/>
+                                              </a:rPr>
                                             </m:ctrlPr>
                                           </m:dPr>
                                           <m:e>
                                             <m:r>
-                                              <a:rPr lang="es-ES" i="1"/>
+                                              <a:rPr lang="es-ES" i="1">
+                                                <a:latin typeface="Cambria Math"/>
+                                              </a:rPr>
                                               <m:t>|0</m:t>
                                             </m:r>
                                           </m:e>
                                         </m:d>
                                         <m:r>
-                                          <a:rPr lang="es-ES" i="1"/>
+                                          <a:rPr lang="es-ES" i="1">
+                                            <a:latin typeface="Cambria Math"/>
+                                          </a:rPr>
                                           <m:t>−</m:t>
                                         </m:r>
                                         <m:d>
@@ -31114,12 +31654,16 @@
                                             <m:begChr m:val=""/>
                                             <m:endChr m:val="⟩"/>
                                             <m:ctrlPr>
-                                              <a:rPr lang="es-ES" i="1"/>
+                                              <a:rPr lang="es-ES" i="1">
+                                                <a:latin typeface="Cambria Math"/>
+                                              </a:rPr>
                                             </m:ctrlPr>
                                           </m:dPr>
                                           <m:e>
                                             <m:r>
-                                              <a:rPr lang="es-ES" i="1"/>
+                                              <a:rPr lang="es-ES" i="1">
+                                                <a:latin typeface="Cambria Math"/>
+                                              </a:rPr>
                                               <m:t>|1</m:t>
                                             </m:r>
                                           </m:e>
@@ -31129,40 +31673,56 @@
                                   </m:e>
                                 </m:d>
                                 <m:r>
-                                  <a:rPr lang="es-ES" i="1"/>
+                                  <a:rPr lang="es-ES" i="1">
+                                    <a:latin typeface="Cambria Math"/>
+                                  </a:rPr>
                                   <m:t>𝑠𝑖</m:t>
                                 </m:r>
                                 <m:r>
-                                  <a:rPr lang="es-ES" i="1"/>
+                                  <a:rPr lang="es-ES" i="1">
+                                    <a:latin typeface="Cambria Math"/>
+                                  </a:rPr>
                                   <m:t> </m:t>
                                 </m:r>
                                 <m:r>
-                                  <a:rPr lang="es-ES" i="1"/>
+                                  <a:rPr lang="es-ES" i="1">
+                                    <a:latin typeface="Cambria Math"/>
+                                  </a:rPr>
                                   <m:t>𝑓</m:t>
                                 </m:r>
                                 <m:d>
                                   <m:dPr>
                                     <m:ctrlPr>
-                                      <a:rPr lang="es-ES" i="1"/>
+                                      <a:rPr lang="es-ES" i="1">
+                                        <a:latin typeface="Cambria Math"/>
+                                      </a:rPr>
                                     </m:ctrlPr>
                                   </m:dPr>
                                   <m:e>
                                     <m:r>
-                                      <a:rPr lang="es-ES" i="1"/>
+                                      <a:rPr lang="es-ES" i="1">
+                                        <a:latin typeface="Cambria Math"/>
+                                      </a:rPr>
                                       <m:t>0</m:t>
                                     </m:r>
                                   </m:e>
                                 </m:d>
                                 <m:r>
-                                  <a:rPr lang="es-ES" i="1"/>
+                                  <a:rPr lang="es-ES" i="1">
+                                    <a:latin typeface="Cambria Math"/>
+                                  </a:rPr>
                                   <m:t> ≠</m:t>
                                 </m:r>
                                 <m:r>
-                                  <a:rPr lang="es-ES" i="1"/>
+                                  <a:rPr lang="es-ES" i="1">
+                                    <a:latin typeface="Cambria Math"/>
+                                  </a:rPr>
                                   <m:t>𝑓</m:t>
                                 </m:r>
                                 <m:r>
-                                  <a:rPr lang="es-ES" i="1"/>
+                                  <a:rPr lang="es-ES" i="1">
+                                    <a:latin typeface="Cambria Math"/>
+                                  </a:rPr>
                                   <m:t>(1)</m:t>
                                 </m:r>
                               </m:e>
@@ -31178,7 +31738,7 @@
             </p:txBody>
           </p:sp>
         </mc:Choice>
-        <mc:Fallback>
+        <mc:Fallback xmlns="">
           <p:sp>
             <p:nvSpPr>
               <p:cNvPr id="7" name="6 Rectángulo"/>
@@ -31217,8 +31777,8 @@
           </p:sp>
         </mc:Fallback>
       </mc:AlternateContent>
-      <mc:AlternateContent xmlns:mc="http://schemas.openxmlformats.org/markup-compatibility/2006">
-        <mc:Choice xmlns:a14="http://schemas.microsoft.com/office/drawing/2010/main" Requires="a14">
+      <mc:AlternateContent xmlns:mc="http://schemas.openxmlformats.org/markup-compatibility/2006" xmlns:a14="http://schemas.microsoft.com/office/drawing/2010/main">
+        <mc:Choice Requires="a14">
           <p:sp>
             <p:nvSpPr>
               <p:cNvPr id="8" name="7 Rectángulo"/>
@@ -31240,6 +31800,7 @@
               </a:bodyPr>
               <a:lstStyle/>
               <a:p>
+                <a:pPr/>
                 <a14:m>
                   <m:oMathPara xmlns:m="http://schemas.openxmlformats.org/officeDocument/2006/math">
                     <m:oMathParaPr>
@@ -31251,7 +31812,9 @@
                           <m:begChr m:val="{"/>
                           <m:endChr m:val=""/>
                           <m:ctrlPr>
-                            <a:rPr lang="es-ES" i="1"/>
+                            <a:rPr lang="es-ES" i="1">
+                              <a:latin typeface="Cambria Math"/>
+                            </a:rPr>
                           </m:ctrlPr>
                         </m:dPr>
                         <m:e>
@@ -31266,17 +31829,23 @@
                                 </m:mc>
                               </m:mcs>
                               <m:ctrlPr>
-                                <a:rPr lang="es-ES" i="1"/>
+                                <a:rPr lang="es-ES" i="1">
+                                  <a:latin typeface="Cambria Math"/>
+                                </a:rPr>
                               </m:ctrlPr>
                             </m:mPr>
                             <m:mr>
                               <m:e>
                                 <m:r>
-                                  <a:rPr lang="es-ES" i="1"/>
+                                  <a:rPr lang="es-ES" i="1">
+                                    <a:latin typeface="Cambria Math"/>
+                                  </a:rPr>
                                   <m:t>±</m:t>
                                 </m:r>
                                 <m:r>
-                                  <a:rPr lang="es-ES"/>
+                                  <a:rPr lang="es-ES">
+                                    <a:latin typeface="Cambria Math"/>
+                                  </a:rPr>
                                   <m:t> </m:t>
                                 </m:r>
                                 <m:d>
@@ -31284,12 +31853,16 @@
                                     <m:begChr m:val=""/>
                                     <m:endChr m:val="⟩"/>
                                     <m:ctrlPr>
-                                      <a:rPr lang="es-ES" i="1"/>
+                                      <a:rPr lang="es-ES" i="1">
+                                        <a:latin typeface="Cambria Math"/>
+                                      </a:rPr>
                                     </m:ctrlPr>
                                   </m:dPr>
                                   <m:e>
                                     <m:r>
-                                      <a:rPr lang="es-ES" i="1"/>
+                                      <a:rPr lang="es-ES" i="1">
+                                        <a:latin typeface="Cambria Math"/>
+                                      </a:rPr>
                                       <m:t>|0</m:t>
                                     </m:r>
                                   </m:e>
@@ -31299,19 +31872,25 @@
                                     <m:begChr m:val="["/>
                                     <m:endChr m:val="]"/>
                                     <m:ctrlPr>
-                                      <a:rPr lang="es-ES" i="1"/>
+                                      <a:rPr lang="es-ES" i="1">
+                                        <a:latin typeface="Cambria Math"/>
+                                      </a:rPr>
                                     </m:ctrlPr>
                                   </m:dPr>
                                   <m:e>
                                     <m:f>
                                       <m:fPr>
                                         <m:ctrlPr>
-                                          <a:rPr lang="es-ES" i="1"/>
+                                          <a:rPr lang="es-ES" i="1">
+                                            <a:latin typeface="Cambria Math"/>
+                                          </a:rPr>
                                         </m:ctrlPr>
                                       </m:fPr>
                                       <m:num>
                                         <m:r>
-                                          <a:rPr lang="es-ES" i="1"/>
+                                          <a:rPr lang="es-ES" i="1">
+                                            <a:latin typeface="Cambria Math"/>
+                                          </a:rPr>
                                           <m:t>1</m:t>
                                         </m:r>
                                       </m:num>
@@ -31320,13 +31899,17 @@
                                           <m:radPr>
                                             <m:degHide m:val="on"/>
                                             <m:ctrlPr>
-                                              <a:rPr lang="es-ES" i="1"/>
+                                              <a:rPr lang="es-ES" i="1">
+                                                <a:latin typeface="Cambria Math"/>
+                                              </a:rPr>
                                             </m:ctrlPr>
                                           </m:radPr>
                                           <m:deg/>
                                           <m:e>
                                             <m:r>
-                                              <a:rPr lang="es-ES" i="1"/>
+                                              <a:rPr lang="es-ES" i="1">
+                                                <a:latin typeface="Cambria Math"/>
+                                              </a:rPr>
                                               <m:t>2</m:t>
                                             </m:r>
                                           </m:e>
@@ -31336,12 +31919,16 @@
                                     <m:d>
                                       <m:dPr>
                                         <m:ctrlPr>
-                                          <a:rPr lang="es-ES" i="1"/>
+                                          <a:rPr lang="es-ES" i="1">
+                                            <a:latin typeface="Cambria Math"/>
+                                          </a:rPr>
                                         </m:ctrlPr>
                                       </m:dPr>
                                       <m:e>
                                         <m:r>
-                                          <a:rPr lang="es-ES"/>
+                                          <a:rPr lang="es-ES">
+                                            <a:latin typeface="Cambria Math"/>
+                                          </a:rPr>
                                           <m:t> </m:t>
                                         </m:r>
                                         <m:d>
@@ -31349,18 +31936,24 @@
                                             <m:begChr m:val=""/>
                                             <m:endChr m:val="⟩"/>
                                             <m:ctrlPr>
-                                              <a:rPr lang="es-ES" i="1"/>
+                                              <a:rPr lang="es-ES" i="1">
+                                                <a:latin typeface="Cambria Math"/>
+                                              </a:rPr>
                                             </m:ctrlPr>
                                           </m:dPr>
                                           <m:e>
                                             <m:r>
-                                              <a:rPr lang="es-ES" i="1"/>
+                                              <a:rPr lang="es-ES" i="1">
+                                                <a:latin typeface="Cambria Math"/>
+                                              </a:rPr>
                                               <m:t>|0</m:t>
                                             </m:r>
                                           </m:e>
                                         </m:d>
                                         <m:r>
-                                          <a:rPr lang="es-ES" i="1"/>
+                                          <a:rPr lang="es-ES" i="1">
+                                            <a:latin typeface="Cambria Math"/>
+                                          </a:rPr>
                                           <m:t>−</m:t>
                                         </m:r>
                                         <m:d>
@@ -31368,12 +31961,16 @@
                                             <m:begChr m:val=""/>
                                             <m:endChr m:val="⟩"/>
                                             <m:ctrlPr>
-                                              <a:rPr lang="es-ES" i="1"/>
+                                              <a:rPr lang="es-ES" i="1">
+                                                <a:latin typeface="Cambria Math"/>
+                                              </a:rPr>
                                             </m:ctrlPr>
                                           </m:dPr>
                                           <m:e>
                                             <m:r>
-                                              <a:rPr lang="es-ES" i="1"/>
+                                              <a:rPr lang="es-ES" i="1">
+                                                <a:latin typeface="Cambria Math"/>
+                                              </a:rPr>
                                               <m:t>|1</m:t>
                                             </m:r>
                                           </m:e>
@@ -31383,40 +31980,56 @@
                                   </m:e>
                                 </m:d>
                                 <m:r>
-                                  <a:rPr lang="es-ES" i="1"/>
+                                  <a:rPr lang="es-ES" i="1">
+                                    <a:latin typeface="Cambria Math"/>
+                                  </a:rPr>
                                   <m:t>𝑠𝑖</m:t>
                                 </m:r>
                                 <m:r>
-                                  <a:rPr lang="es-ES" i="1"/>
+                                  <a:rPr lang="es-ES" i="1">
+                                    <a:latin typeface="Cambria Math"/>
+                                  </a:rPr>
                                   <m:t> </m:t>
                                 </m:r>
                                 <m:r>
-                                  <a:rPr lang="es-ES" i="1"/>
+                                  <a:rPr lang="es-ES" i="1">
+                                    <a:latin typeface="Cambria Math"/>
+                                  </a:rPr>
                                   <m:t>𝑓</m:t>
                                 </m:r>
                                 <m:d>
                                   <m:dPr>
                                     <m:ctrlPr>
-                                      <a:rPr lang="es-ES" i="1"/>
+                                      <a:rPr lang="es-ES" i="1">
+                                        <a:latin typeface="Cambria Math"/>
+                                      </a:rPr>
                                     </m:ctrlPr>
                                   </m:dPr>
                                   <m:e>
                                     <m:r>
-                                      <a:rPr lang="es-ES" i="1"/>
+                                      <a:rPr lang="es-ES" i="1">
+                                        <a:latin typeface="Cambria Math"/>
+                                      </a:rPr>
                                       <m:t>0</m:t>
                                     </m:r>
                                   </m:e>
                                 </m:d>
                                 <m:r>
-                                  <a:rPr lang="es-ES" i="1"/>
+                                  <a:rPr lang="es-ES" i="1">
+                                    <a:latin typeface="Cambria Math"/>
+                                  </a:rPr>
                                   <m:t>=</m:t>
                                 </m:r>
                                 <m:r>
-                                  <a:rPr lang="es-ES" i="1"/>
+                                  <a:rPr lang="es-ES" i="1">
+                                    <a:latin typeface="Cambria Math"/>
+                                  </a:rPr>
                                   <m:t>𝑓</m:t>
                                 </m:r>
                                 <m:r>
-                                  <a:rPr lang="es-ES" i="1"/>
+                                  <a:rPr lang="es-ES" i="1">
+                                    <a:latin typeface="Cambria Math"/>
+                                  </a:rPr>
                                   <m:t>(1)</m:t>
                                 </m:r>
                               </m:e>
@@ -31424,11 +32037,15 @@
                             <m:mr>
                               <m:e>
                                 <m:r>
-                                  <a:rPr lang="es-ES" i="1"/>
+                                  <a:rPr lang="es-ES" i="1">
+                                    <a:latin typeface="Cambria Math"/>
+                                  </a:rPr>
                                   <m:t>±</m:t>
                                 </m:r>
                                 <m:r>
-                                  <a:rPr lang="es-ES"/>
+                                  <a:rPr lang="es-ES">
+                                    <a:latin typeface="Cambria Math"/>
+                                  </a:rPr>
                                   <m:t> </m:t>
                                 </m:r>
                                 <m:d>
@@ -31436,12 +32053,16 @@
                                     <m:begChr m:val=""/>
                                     <m:endChr m:val="⟩"/>
                                     <m:ctrlPr>
-                                      <a:rPr lang="es-ES" i="1"/>
+                                      <a:rPr lang="es-ES" i="1">
+                                        <a:latin typeface="Cambria Math"/>
+                                      </a:rPr>
                                     </m:ctrlPr>
                                   </m:dPr>
                                   <m:e>
                                     <m:r>
-                                      <a:rPr lang="es-ES" i="1"/>
+                                      <a:rPr lang="es-ES" i="1">
+                                        <a:latin typeface="Cambria Math"/>
+                                      </a:rPr>
                                       <m:t>|1</m:t>
                                     </m:r>
                                   </m:e>
@@ -31451,19 +32072,25 @@
                                     <m:begChr m:val="["/>
                                     <m:endChr m:val="]"/>
                                     <m:ctrlPr>
-                                      <a:rPr lang="es-ES" i="1"/>
+                                      <a:rPr lang="es-ES" i="1">
+                                        <a:latin typeface="Cambria Math"/>
+                                      </a:rPr>
                                     </m:ctrlPr>
                                   </m:dPr>
                                   <m:e>
                                     <m:f>
                                       <m:fPr>
                                         <m:ctrlPr>
-                                          <a:rPr lang="es-ES" i="1"/>
+                                          <a:rPr lang="es-ES" i="1">
+                                            <a:latin typeface="Cambria Math"/>
+                                          </a:rPr>
                                         </m:ctrlPr>
                                       </m:fPr>
                                       <m:num>
                                         <m:r>
-                                          <a:rPr lang="es-ES" i="1"/>
+                                          <a:rPr lang="es-ES" i="1">
+                                            <a:latin typeface="Cambria Math"/>
+                                          </a:rPr>
                                           <m:t>1</m:t>
                                         </m:r>
                                       </m:num>
@@ -31472,13 +32099,17 @@
                                           <m:radPr>
                                             <m:degHide m:val="on"/>
                                             <m:ctrlPr>
-                                              <a:rPr lang="es-ES" i="1"/>
+                                              <a:rPr lang="es-ES" i="1">
+                                                <a:latin typeface="Cambria Math"/>
+                                              </a:rPr>
                                             </m:ctrlPr>
                                           </m:radPr>
                                           <m:deg/>
                                           <m:e>
                                             <m:r>
-                                              <a:rPr lang="es-ES" i="1"/>
+                                              <a:rPr lang="es-ES" i="1">
+                                                <a:latin typeface="Cambria Math"/>
+                                              </a:rPr>
                                               <m:t>2</m:t>
                                             </m:r>
                                           </m:e>
@@ -31488,12 +32119,16 @@
                                     <m:d>
                                       <m:dPr>
                                         <m:ctrlPr>
-                                          <a:rPr lang="es-ES" i="1"/>
+                                          <a:rPr lang="es-ES" i="1">
+                                            <a:latin typeface="Cambria Math"/>
+                                          </a:rPr>
                                         </m:ctrlPr>
                                       </m:dPr>
                                       <m:e>
                                         <m:r>
-                                          <a:rPr lang="es-ES"/>
+                                          <a:rPr lang="es-ES">
+                                            <a:latin typeface="Cambria Math"/>
+                                          </a:rPr>
                                           <m:t> </m:t>
                                         </m:r>
                                         <m:d>
@@ -31501,18 +32136,24 @@
                                             <m:begChr m:val=""/>
                                             <m:endChr m:val="⟩"/>
                                             <m:ctrlPr>
-                                              <a:rPr lang="es-ES" i="1"/>
+                                              <a:rPr lang="es-ES" i="1">
+                                                <a:latin typeface="Cambria Math"/>
+                                              </a:rPr>
                                             </m:ctrlPr>
                                           </m:dPr>
                                           <m:e>
                                             <m:r>
-                                              <a:rPr lang="es-ES" i="1"/>
+                                              <a:rPr lang="es-ES" i="1">
+                                                <a:latin typeface="Cambria Math"/>
+                                              </a:rPr>
                                               <m:t>|0</m:t>
                                             </m:r>
                                           </m:e>
                                         </m:d>
                                         <m:r>
-                                          <a:rPr lang="es-ES" i="1"/>
+                                          <a:rPr lang="es-ES" i="1">
+                                            <a:latin typeface="Cambria Math"/>
+                                          </a:rPr>
                                           <m:t>−</m:t>
                                         </m:r>
                                         <m:d>
@@ -31520,12 +32161,16 @@
                                             <m:begChr m:val=""/>
                                             <m:endChr m:val="⟩"/>
                                             <m:ctrlPr>
-                                              <a:rPr lang="es-ES" i="1"/>
+                                              <a:rPr lang="es-ES" i="1">
+                                                <a:latin typeface="Cambria Math"/>
+                                              </a:rPr>
                                             </m:ctrlPr>
                                           </m:dPr>
                                           <m:e>
                                             <m:r>
-                                              <a:rPr lang="es-ES" i="1"/>
+                                              <a:rPr lang="es-ES" i="1">
+                                                <a:latin typeface="Cambria Math"/>
+                                              </a:rPr>
                                               <m:t>|1</m:t>
                                             </m:r>
                                           </m:e>
@@ -31535,40 +32180,56 @@
                                   </m:e>
                                 </m:d>
                                 <m:r>
-                                  <a:rPr lang="es-ES" i="1"/>
+                                  <a:rPr lang="es-ES" i="1">
+                                    <a:latin typeface="Cambria Math"/>
+                                  </a:rPr>
                                   <m:t>𝑠𝑖</m:t>
                                 </m:r>
                                 <m:r>
-                                  <a:rPr lang="es-ES" i="1"/>
+                                  <a:rPr lang="es-ES" i="1">
+                                    <a:latin typeface="Cambria Math"/>
+                                  </a:rPr>
                                   <m:t> </m:t>
                                 </m:r>
                                 <m:r>
-                                  <a:rPr lang="es-ES" i="1"/>
+                                  <a:rPr lang="es-ES" i="1">
+                                    <a:latin typeface="Cambria Math"/>
+                                  </a:rPr>
                                   <m:t>𝑓</m:t>
                                 </m:r>
                                 <m:d>
                                   <m:dPr>
                                     <m:ctrlPr>
-                                      <a:rPr lang="es-ES" i="1"/>
+                                      <a:rPr lang="es-ES" i="1">
+                                        <a:latin typeface="Cambria Math"/>
+                                      </a:rPr>
                                     </m:ctrlPr>
                                   </m:dPr>
                                   <m:e>
                                     <m:r>
-                                      <a:rPr lang="es-ES" i="1"/>
+                                      <a:rPr lang="es-ES" i="1">
+                                        <a:latin typeface="Cambria Math"/>
+                                      </a:rPr>
                                       <m:t>0</m:t>
                                     </m:r>
                                   </m:e>
                                 </m:d>
                                 <m:r>
-                                  <a:rPr lang="es-ES" i="1"/>
+                                  <a:rPr lang="es-ES" i="1">
+                                    <a:latin typeface="Cambria Math"/>
+                                  </a:rPr>
                                   <m:t> ≠</m:t>
                                 </m:r>
                                 <m:r>
-                                  <a:rPr lang="es-ES" i="1"/>
+                                  <a:rPr lang="es-ES" i="1">
+                                    <a:latin typeface="Cambria Math"/>
+                                  </a:rPr>
                                   <m:t>𝑓</m:t>
                                 </m:r>
                                 <m:r>
-                                  <a:rPr lang="es-ES" i="1"/>
+                                  <a:rPr lang="es-ES" i="1">
+                                    <a:latin typeface="Cambria Math"/>
+                                  </a:rPr>
                                   <m:t>(1)</m:t>
                                 </m:r>
                               </m:e>
@@ -31584,7 +32245,7 @@
             </p:txBody>
           </p:sp>
         </mc:Choice>
-        <mc:Fallback>
+        <mc:Fallback xmlns="">
           <p:sp>
             <p:nvSpPr>
               <p:cNvPr id="8" name="7 Rectángulo"/>
@@ -31848,6 +32509,29 @@
           </a:p>
         </p:txBody>
       </p:sp>
+      <p:sp>
+        <p:nvSpPr>
+          <p:cNvPr id="2" name="1 Marcador de número de diapositiva"/>
+          <p:cNvSpPr>
+            <a:spLocks noGrp="1"/>
+          </p:cNvSpPr>
+          <p:nvPr>
+            <p:ph type="sldNum" sz="quarter" idx="12"/>
+          </p:nvPr>
+        </p:nvSpPr>
+        <p:spPr/>
+        <p:txBody>
+          <a:bodyPr/>
+          <a:lstStyle/>
+          <a:p>
+            <a:fld id="{132FADFE-3B8F-471C-ABF0-DBC7717ECBBC}" type="slidenum">
+              <a:rPr lang="es-ES" smtClean="0"/>
+              <a:t>33</a:t>
+            </a:fld>
+            <a:endParaRPr lang="es-ES"/>
+          </a:p>
+        </p:txBody>
+      </p:sp>
     </p:spTree>
     <p:extLst>
       <p:ext uri="{BB962C8B-B14F-4D97-AF65-F5344CB8AC3E}">
@@ -31949,8 +32633,8 @@
           </a:p>
         </p:txBody>
       </p:sp>
-      <mc:AlternateContent xmlns:mc="http://schemas.openxmlformats.org/markup-compatibility/2006">
-        <mc:Choice xmlns:a14="http://schemas.microsoft.com/office/drawing/2010/main" Requires="a14">
+      <mc:AlternateContent xmlns:mc="http://schemas.openxmlformats.org/markup-compatibility/2006" xmlns:a14="http://schemas.microsoft.com/office/drawing/2010/main">
+        <mc:Choice Requires="a14">
           <p:sp>
             <p:nvSpPr>
               <p:cNvPr id="7" name="6 Rectángulo"/>
@@ -31972,6 +32656,7 @@
               </a:bodyPr>
               <a:lstStyle/>
               <a:p>
+                <a:pPr/>
                 <a14:m>
                   <m:oMathPara xmlns:m="http://schemas.openxmlformats.org/officeDocument/2006/math">
                     <m:oMathParaPr>
@@ -31983,7 +32668,9 @@
                           <m:begChr m:val="{"/>
                           <m:endChr m:val=""/>
                           <m:ctrlPr>
-                            <a:rPr lang="es-ES" i="1"/>
+                            <a:rPr lang="es-ES" i="1">
+                              <a:latin typeface="Cambria Math"/>
+                            </a:rPr>
                           </m:ctrlPr>
                         </m:dPr>
                         <m:e>
@@ -31998,17 +32685,23 @@
                                 </m:mc>
                               </m:mcs>
                               <m:ctrlPr>
-                                <a:rPr lang="es-ES" i="1"/>
+                                <a:rPr lang="es-ES" i="1">
+                                  <a:latin typeface="Cambria Math"/>
+                                </a:rPr>
                               </m:ctrlPr>
                             </m:mPr>
                             <m:mr>
                               <m:e>
                                 <m:r>
-                                  <a:rPr lang="es-ES" i="1"/>
+                                  <a:rPr lang="es-ES" i="1">
+                                    <a:latin typeface="Cambria Math"/>
+                                  </a:rPr>
                                   <m:t>±</m:t>
                                 </m:r>
                                 <m:r>
-                                  <a:rPr lang="es-ES"/>
+                                  <a:rPr lang="es-ES">
+                                    <a:latin typeface="Cambria Math"/>
+                                  </a:rPr>
                                   <m:t> </m:t>
                                 </m:r>
                                 <m:d>
@@ -32016,12 +32709,16 @@
                                     <m:begChr m:val=""/>
                                     <m:endChr m:val="⟩"/>
                                     <m:ctrlPr>
-                                      <a:rPr lang="es-ES" i="1"/>
+                                      <a:rPr lang="es-ES" i="1">
+                                        <a:latin typeface="Cambria Math"/>
+                                      </a:rPr>
                                     </m:ctrlPr>
                                   </m:dPr>
                                   <m:e>
                                     <m:r>
-                                      <a:rPr lang="es-ES" i="1"/>
+                                      <a:rPr lang="es-ES" i="1">
+                                        <a:latin typeface="Cambria Math"/>
+                                      </a:rPr>
                                       <m:t>|0</m:t>
                                     </m:r>
                                   </m:e>
@@ -32031,19 +32728,25 @@
                                     <m:begChr m:val="["/>
                                     <m:endChr m:val="]"/>
                                     <m:ctrlPr>
-                                      <a:rPr lang="es-ES" i="1"/>
+                                      <a:rPr lang="es-ES" i="1">
+                                        <a:latin typeface="Cambria Math"/>
+                                      </a:rPr>
                                     </m:ctrlPr>
                                   </m:dPr>
                                   <m:e>
                                     <m:f>
                                       <m:fPr>
                                         <m:ctrlPr>
-                                          <a:rPr lang="es-ES" i="1"/>
+                                          <a:rPr lang="es-ES" i="1">
+                                            <a:latin typeface="Cambria Math"/>
+                                          </a:rPr>
                                         </m:ctrlPr>
                                       </m:fPr>
                                       <m:num>
                                         <m:r>
-                                          <a:rPr lang="es-ES" i="1"/>
+                                          <a:rPr lang="es-ES" i="1">
+                                            <a:latin typeface="Cambria Math"/>
+                                          </a:rPr>
                                           <m:t>1</m:t>
                                         </m:r>
                                       </m:num>
@@ -32052,13 +32755,17 @@
                                           <m:radPr>
                                             <m:degHide m:val="on"/>
                                             <m:ctrlPr>
-                                              <a:rPr lang="es-ES" i="1"/>
+                                              <a:rPr lang="es-ES" i="1">
+                                                <a:latin typeface="Cambria Math"/>
+                                              </a:rPr>
                                             </m:ctrlPr>
                                           </m:radPr>
                                           <m:deg/>
                                           <m:e>
                                             <m:r>
-                                              <a:rPr lang="es-ES" i="1"/>
+                                              <a:rPr lang="es-ES" i="1">
+                                                <a:latin typeface="Cambria Math"/>
+                                              </a:rPr>
                                               <m:t>2</m:t>
                                             </m:r>
                                           </m:e>
@@ -32068,12 +32775,16 @@
                                     <m:d>
                                       <m:dPr>
                                         <m:ctrlPr>
-                                          <a:rPr lang="es-ES" i="1"/>
+                                          <a:rPr lang="es-ES" i="1">
+                                            <a:latin typeface="Cambria Math"/>
+                                          </a:rPr>
                                         </m:ctrlPr>
                                       </m:dPr>
                                       <m:e>
                                         <m:r>
-                                          <a:rPr lang="es-ES"/>
+                                          <a:rPr lang="es-ES">
+                                            <a:latin typeface="Cambria Math"/>
+                                          </a:rPr>
                                           <m:t> </m:t>
                                         </m:r>
                                         <m:d>
@@ -32081,18 +32792,24 @@
                                             <m:begChr m:val=""/>
                                             <m:endChr m:val="⟩"/>
                                             <m:ctrlPr>
-                                              <a:rPr lang="es-ES" i="1"/>
+                                              <a:rPr lang="es-ES" i="1">
+                                                <a:latin typeface="Cambria Math"/>
+                                              </a:rPr>
                                             </m:ctrlPr>
                                           </m:dPr>
                                           <m:e>
                                             <m:r>
-                                              <a:rPr lang="es-ES" i="1"/>
+                                              <a:rPr lang="es-ES" i="1">
+                                                <a:latin typeface="Cambria Math"/>
+                                              </a:rPr>
                                               <m:t>|0</m:t>
                                             </m:r>
                                           </m:e>
                                         </m:d>
                                         <m:r>
-                                          <a:rPr lang="es-ES" i="1"/>
+                                          <a:rPr lang="es-ES" i="1">
+                                            <a:latin typeface="Cambria Math"/>
+                                          </a:rPr>
                                           <m:t>−</m:t>
                                         </m:r>
                                         <m:d>
@@ -32100,12 +32817,16 @@
                                             <m:begChr m:val=""/>
                                             <m:endChr m:val="⟩"/>
                                             <m:ctrlPr>
-                                              <a:rPr lang="es-ES" i="1"/>
+                                              <a:rPr lang="es-ES" i="1">
+                                                <a:latin typeface="Cambria Math"/>
+                                              </a:rPr>
                                             </m:ctrlPr>
                                           </m:dPr>
                                           <m:e>
                                             <m:r>
-                                              <a:rPr lang="es-ES" i="1"/>
+                                              <a:rPr lang="es-ES" i="1">
+                                                <a:latin typeface="Cambria Math"/>
+                                              </a:rPr>
                                               <m:t>|1</m:t>
                                             </m:r>
                                           </m:e>
@@ -32115,40 +32836,56 @@
                                   </m:e>
                                 </m:d>
                                 <m:r>
-                                  <a:rPr lang="es-ES" i="1"/>
+                                  <a:rPr lang="es-ES" i="1">
+                                    <a:latin typeface="Cambria Math"/>
+                                  </a:rPr>
                                   <m:t>𝑠𝑖</m:t>
                                 </m:r>
                                 <m:r>
-                                  <a:rPr lang="es-ES" i="1"/>
+                                  <a:rPr lang="es-ES" i="1">
+                                    <a:latin typeface="Cambria Math"/>
+                                  </a:rPr>
                                   <m:t> </m:t>
                                 </m:r>
                                 <m:r>
-                                  <a:rPr lang="es-ES" i="1"/>
+                                  <a:rPr lang="es-ES" i="1">
+                                    <a:latin typeface="Cambria Math"/>
+                                  </a:rPr>
                                   <m:t>𝑓</m:t>
                                 </m:r>
                                 <m:d>
                                   <m:dPr>
                                     <m:ctrlPr>
-                                      <a:rPr lang="es-ES" i="1"/>
+                                      <a:rPr lang="es-ES" i="1">
+                                        <a:latin typeface="Cambria Math"/>
+                                      </a:rPr>
                                     </m:ctrlPr>
                                   </m:dPr>
                                   <m:e>
                                     <m:r>
-                                      <a:rPr lang="es-ES" i="1"/>
+                                      <a:rPr lang="es-ES" i="1">
+                                        <a:latin typeface="Cambria Math"/>
+                                      </a:rPr>
                                       <m:t>0</m:t>
                                     </m:r>
                                   </m:e>
                                 </m:d>
                                 <m:r>
-                                  <a:rPr lang="es-ES" i="1"/>
+                                  <a:rPr lang="es-ES" i="1">
+                                    <a:latin typeface="Cambria Math"/>
+                                  </a:rPr>
                                   <m:t>=</m:t>
                                 </m:r>
                                 <m:r>
-                                  <a:rPr lang="es-ES" i="1"/>
+                                  <a:rPr lang="es-ES" i="1">
+                                    <a:latin typeface="Cambria Math"/>
+                                  </a:rPr>
                                   <m:t>𝑓</m:t>
                                 </m:r>
                                 <m:r>
-                                  <a:rPr lang="es-ES" i="1"/>
+                                  <a:rPr lang="es-ES" i="1">
+                                    <a:latin typeface="Cambria Math"/>
+                                  </a:rPr>
                                   <m:t>(1)</m:t>
                                 </m:r>
                               </m:e>
@@ -32156,11 +32893,15 @@
                             <m:mr>
                               <m:e>
                                 <m:r>
-                                  <a:rPr lang="es-ES" i="1"/>
+                                  <a:rPr lang="es-ES" i="1">
+                                    <a:latin typeface="Cambria Math"/>
+                                  </a:rPr>
                                   <m:t>±</m:t>
                                 </m:r>
                                 <m:r>
-                                  <a:rPr lang="es-ES"/>
+                                  <a:rPr lang="es-ES">
+                                    <a:latin typeface="Cambria Math"/>
+                                  </a:rPr>
                                   <m:t> </m:t>
                                 </m:r>
                                 <m:d>
@@ -32168,12 +32909,16 @@
                                     <m:begChr m:val=""/>
                                     <m:endChr m:val="⟩"/>
                                     <m:ctrlPr>
-                                      <a:rPr lang="es-ES" i="1"/>
+                                      <a:rPr lang="es-ES" i="1">
+                                        <a:latin typeface="Cambria Math"/>
+                                      </a:rPr>
                                     </m:ctrlPr>
                                   </m:dPr>
                                   <m:e>
                                     <m:r>
-                                      <a:rPr lang="es-ES" i="1"/>
+                                      <a:rPr lang="es-ES" i="1">
+                                        <a:latin typeface="Cambria Math"/>
+                                      </a:rPr>
                                       <m:t>|1</m:t>
                                     </m:r>
                                   </m:e>
@@ -32183,19 +32928,25 @@
                                     <m:begChr m:val="["/>
                                     <m:endChr m:val="]"/>
                                     <m:ctrlPr>
-                                      <a:rPr lang="es-ES" i="1"/>
+                                      <a:rPr lang="es-ES" i="1">
+                                        <a:latin typeface="Cambria Math"/>
+                                      </a:rPr>
                                     </m:ctrlPr>
                                   </m:dPr>
                                   <m:e>
                                     <m:f>
                                       <m:fPr>
                                         <m:ctrlPr>
-                                          <a:rPr lang="es-ES" i="1"/>
+                                          <a:rPr lang="es-ES" i="1">
+                                            <a:latin typeface="Cambria Math"/>
+                                          </a:rPr>
                                         </m:ctrlPr>
                                       </m:fPr>
                                       <m:num>
                                         <m:r>
-                                          <a:rPr lang="es-ES" i="1"/>
+                                          <a:rPr lang="es-ES" i="1">
+                                            <a:latin typeface="Cambria Math"/>
+                                          </a:rPr>
                                           <m:t>1</m:t>
                                         </m:r>
                                       </m:num>
@@ -32204,13 +32955,17 @@
                                           <m:radPr>
                                             <m:degHide m:val="on"/>
                                             <m:ctrlPr>
-                                              <a:rPr lang="es-ES" i="1"/>
+                                              <a:rPr lang="es-ES" i="1">
+                                                <a:latin typeface="Cambria Math"/>
+                                              </a:rPr>
                                             </m:ctrlPr>
                                           </m:radPr>
                                           <m:deg/>
                                           <m:e>
                                             <m:r>
-                                              <a:rPr lang="es-ES" i="1"/>
+                                              <a:rPr lang="es-ES" i="1">
+                                                <a:latin typeface="Cambria Math"/>
+                                              </a:rPr>
                                               <m:t>2</m:t>
                                             </m:r>
                                           </m:e>
@@ -32220,12 +32975,16 @@
                                     <m:d>
                                       <m:dPr>
                                         <m:ctrlPr>
-                                          <a:rPr lang="es-ES" i="1"/>
+                                          <a:rPr lang="es-ES" i="1">
+                                            <a:latin typeface="Cambria Math"/>
+                                          </a:rPr>
                                         </m:ctrlPr>
                                       </m:dPr>
                                       <m:e>
                                         <m:r>
-                                          <a:rPr lang="es-ES"/>
+                                          <a:rPr lang="es-ES">
+                                            <a:latin typeface="Cambria Math"/>
+                                          </a:rPr>
                                           <m:t> </m:t>
                                         </m:r>
                                         <m:d>
@@ -32233,18 +32992,24 @@
                                             <m:begChr m:val=""/>
                                             <m:endChr m:val="⟩"/>
                                             <m:ctrlPr>
-                                              <a:rPr lang="es-ES" i="1"/>
+                                              <a:rPr lang="es-ES" i="1">
+                                                <a:latin typeface="Cambria Math"/>
+                                              </a:rPr>
                                             </m:ctrlPr>
                                           </m:dPr>
                                           <m:e>
                                             <m:r>
-                                              <a:rPr lang="es-ES" i="1"/>
+                                              <a:rPr lang="es-ES" i="1">
+                                                <a:latin typeface="Cambria Math"/>
+                                              </a:rPr>
                                               <m:t>|0</m:t>
                                             </m:r>
                                           </m:e>
                                         </m:d>
                                         <m:r>
-                                          <a:rPr lang="es-ES" i="1"/>
+                                          <a:rPr lang="es-ES" i="1">
+                                            <a:latin typeface="Cambria Math"/>
+                                          </a:rPr>
                                           <m:t>−</m:t>
                                         </m:r>
                                         <m:d>
@@ -32252,12 +33017,16 @@
                                             <m:begChr m:val=""/>
                                             <m:endChr m:val="⟩"/>
                                             <m:ctrlPr>
-                                              <a:rPr lang="es-ES" i="1"/>
+                                              <a:rPr lang="es-ES" i="1">
+                                                <a:latin typeface="Cambria Math"/>
+                                              </a:rPr>
                                             </m:ctrlPr>
                                           </m:dPr>
                                           <m:e>
                                             <m:r>
-                                              <a:rPr lang="es-ES" i="1"/>
+                                              <a:rPr lang="es-ES" i="1">
+                                                <a:latin typeface="Cambria Math"/>
+                                              </a:rPr>
                                               <m:t>|1</m:t>
                                             </m:r>
                                           </m:e>
@@ -32267,40 +33036,56 @@
                                   </m:e>
                                 </m:d>
                                 <m:r>
-                                  <a:rPr lang="es-ES" i="1"/>
+                                  <a:rPr lang="es-ES" i="1">
+                                    <a:latin typeface="Cambria Math"/>
+                                  </a:rPr>
                                   <m:t>𝑠𝑖</m:t>
                                 </m:r>
                                 <m:r>
-                                  <a:rPr lang="es-ES" i="1"/>
+                                  <a:rPr lang="es-ES" i="1">
+                                    <a:latin typeface="Cambria Math"/>
+                                  </a:rPr>
                                   <m:t> </m:t>
                                 </m:r>
                                 <m:r>
-                                  <a:rPr lang="es-ES" i="1"/>
+                                  <a:rPr lang="es-ES" i="1">
+                                    <a:latin typeface="Cambria Math"/>
+                                  </a:rPr>
                                   <m:t>𝑓</m:t>
                                 </m:r>
                                 <m:d>
                                   <m:dPr>
                                     <m:ctrlPr>
-                                      <a:rPr lang="es-ES" i="1"/>
+                                      <a:rPr lang="es-ES" i="1">
+                                        <a:latin typeface="Cambria Math"/>
+                                      </a:rPr>
                                     </m:ctrlPr>
                                   </m:dPr>
                                   <m:e>
                                     <m:r>
-                                      <a:rPr lang="es-ES" i="1"/>
+                                      <a:rPr lang="es-ES" i="1">
+                                        <a:latin typeface="Cambria Math"/>
+                                      </a:rPr>
                                       <m:t>0</m:t>
                                     </m:r>
                                   </m:e>
                                 </m:d>
                                 <m:r>
-                                  <a:rPr lang="es-ES" i="1"/>
+                                  <a:rPr lang="es-ES" i="1">
+                                    <a:latin typeface="Cambria Math"/>
+                                  </a:rPr>
                                   <m:t> ≠</m:t>
                                 </m:r>
                                 <m:r>
-                                  <a:rPr lang="es-ES" i="1"/>
+                                  <a:rPr lang="es-ES" i="1">
+                                    <a:latin typeface="Cambria Math"/>
+                                  </a:rPr>
                                   <m:t>𝑓</m:t>
                                 </m:r>
                                 <m:r>
-                                  <a:rPr lang="es-ES" i="1"/>
+                                  <a:rPr lang="es-ES" i="1">
+                                    <a:latin typeface="Cambria Math"/>
+                                  </a:rPr>
                                   <m:t>(1)</m:t>
                                 </m:r>
                               </m:e>
@@ -32316,7 +33101,7 @@
             </p:txBody>
           </p:sp>
         </mc:Choice>
-        <mc:Fallback>
+        <mc:Fallback xmlns="">
           <p:sp>
             <p:nvSpPr>
               <p:cNvPr id="7" name="6 Rectángulo"/>
@@ -32719,6 +33504,29 @@
           </a:p>
         </p:txBody>
       </p:sp>
+      <p:sp>
+        <p:nvSpPr>
+          <p:cNvPr id="2" name="1 Marcador de número de diapositiva"/>
+          <p:cNvSpPr>
+            <a:spLocks noGrp="1"/>
+          </p:cNvSpPr>
+          <p:nvPr>
+            <p:ph type="sldNum" sz="quarter" idx="12"/>
+          </p:nvPr>
+        </p:nvSpPr>
+        <p:spPr/>
+        <p:txBody>
+          <a:bodyPr/>
+          <a:lstStyle/>
+          <a:p>
+            <a:fld id="{132FADFE-3B8F-471C-ABF0-DBC7717ECBBC}" type="slidenum">
+              <a:rPr lang="es-ES" smtClean="0"/>
+              <a:t>34</a:t>
+            </a:fld>
+            <a:endParaRPr lang="es-ES"/>
+          </a:p>
+        </p:txBody>
+      </p:sp>
     </p:spTree>
     <p:extLst>
       <p:ext uri="{BB962C8B-B14F-4D97-AF65-F5344CB8AC3E}">
@@ -32783,7 +33591,6 @@
               <a:rPr lang="es-ES" sz="4400" dirty="0" smtClean="0"/>
               <a:t>6</a:t>
             </a:r>
-            <a:endParaRPr lang="es-ES" sz="4400" dirty="0" smtClean="0"/>
           </a:p>
           <a:p>
             <a:pPr algn="ctr"/>
@@ -34544,6 +35351,29 @@
           </p:spPr>
         </p:pic>
       </p:grpSp>
+      <p:sp>
+        <p:nvSpPr>
+          <p:cNvPr id="2" name="1 Marcador de número de diapositiva"/>
+          <p:cNvSpPr>
+            <a:spLocks noGrp="1"/>
+          </p:cNvSpPr>
+          <p:nvPr>
+            <p:ph type="sldNum" sz="quarter" idx="12"/>
+          </p:nvPr>
+        </p:nvSpPr>
+        <p:spPr/>
+        <p:txBody>
+          <a:bodyPr/>
+          <a:lstStyle/>
+          <a:p>
+            <a:fld id="{132FADFE-3B8F-471C-ABF0-DBC7717ECBBC}" type="slidenum">
+              <a:rPr lang="es-ES" smtClean="0"/>
+              <a:t>35</a:t>
+            </a:fld>
+            <a:endParaRPr lang="es-ES"/>
+          </a:p>
+        </p:txBody>
+      </p:sp>
     </p:spTree>
     <p:extLst>
       <p:ext uri="{BB962C8B-B14F-4D97-AF65-F5344CB8AC3E}">
@@ -34705,8 +35535,8 @@
           <a:noFill/>
         </p:spPr>
       </p:pic>
-      <mc:AlternateContent xmlns:mc="http://schemas.openxmlformats.org/markup-compatibility/2006">
-        <mc:Choice xmlns:a14="http://schemas.microsoft.com/office/drawing/2010/main" Requires="a14">
+      <mc:AlternateContent xmlns:mc="http://schemas.openxmlformats.org/markup-compatibility/2006" xmlns:a14="http://schemas.microsoft.com/office/drawing/2010/main">
+        <mc:Choice Requires="a14">
           <p:sp>
             <p:nvSpPr>
               <p:cNvPr id="9" name="8 CuadroTexto"/>
@@ -34779,7 +35609,7 @@
             </p:txBody>
           </p:sp>
         </mc:Choice>
-        <mc:Fallback>
+        <mc:Fallback xmlns="">
           <p:sp>
             <p:nvSpPr>
               <p:cNvPr id="9" name="8 CuadroTexto"/>
@@ -34818,6 +35648,29 @@
           </p:sp>
         </mc:Fallback>
       </mc:AlternateContent>
+      <p:sp>
+        <p:nvSpPr>
+          <p:cNvPr id="2" name="1 Marcador de número de diapositiva"/>
+          <p:cNvSpPr>
+            <a:spLocks noGrp="1"/>
+          </p:cNvSpPr>
+          <p:nvPr>
+            <p:ph type="sldNum" sz="quarter" idx="12"/>
+          </p:nvPr>
+        </p:nvSpPr>
+        <p:spPr/>
+        <p:txBody>
+          <a:bodyPr/>
+          <a:lstStyle/>
+          <a:p>
+            <a:fld id="{132FADFE-3B8F-471C-ABF0-DBC7717ECBBC}" type="slidenum">
+              <a:rPr lang="es-ES" smtClean="0"/>
+              <a:t>36</a:t>
+            </a:fld>
+            <a:endParaRPr lang="es-ES"/>
+          </a:p>
+        </p:txBody>
+      </p:sp>
     </p:spTree>
     <p:extLst>
       <p:ext uri="{BB962C8B-B14F-4D97-AF65-F5344CB8AC3E}">
@@ -34894,6 +35747,149 @@
           </a:p>
         </p:txBody>
       </p:sp>
+      <p:sp>
+        <p:nvSpPr>
+          <p:cNvPr id="2" name="1 Marcador de número de diapositiva"/>
+          <p:cNvSpPr>
+            <a:spLocks noGrp="1"/>
+          </p:cNvSpPr>
+          <p:nvPr>
+            <p:ph type="sldNum" sz="quarter" idx="12"/>
+          </p:nvPr>
+        </p:nvSpPr>
+        <p:spPr/>
+        <p:txBody>
+          <a:bodyPr/>
+          <a:lstStyle/>
+          <a:p>
+            <a:fld id="{132FADFE-3B8F-471C-ABF0-DBC7717ECBBC}" type="slidenum">
+              <a:rPr lang="es-ES" smtClean="0"/>
+              <a:t>37</a:t>
+            </a:fld>
+            <a:endParaRPr lang="es-ES"/>
+          </a:p>
+        </p:txBody>
+      </p:sp>
+      <p:grpSp>
+        <p:nvGrpSpPr>
+          <p:cNvPr id="3" name="2 Grupo"/>
+          <p:cNvGrpSpPr/>
+          <p:nvPr/>
+        </p:nvGrpSpPr>
+        <p:grpSpPr>
+          <a:xfrm>
+            <a:off x="1945589" y="3068960"/>
+            <a:ext cx="5285498" cy="2437567"/>
+            <a:chOff x="899592" y="3472849"/>
+            <a:chExt cx="5285498" cy="2437567"/>
+          </a:xfrm>
+        </p:grpSpPr>
+        <p:pic>
+          <p:nvPicPr>
+            <p:cNvPr id="1026" name="Picture 2"/>
+            <p:cNvPicPr>
+              <a:picLocks noChangeAspect="1" noChangeArrowheads="1"/>
+            </p:cNvPicPr>
+            <p:nvPr/>
+          </p:nvPicPr>
+          <p:blipFill>
+            <a:blip r:embed="rId2">
+              <a:extLst>
+                <a:ext uri="{28A0092B-C50C-407E-A947-70E740481C1C}">
+                  <a14:useLocalDpi xmlns:a14="http://schemas.microsoft.com/office/drawing/2010/main" val="0"/>
+                </a:ext>
+              </a:extLst>
+            </a:blip>
+            <a:srcRect/>
+            <a:stretch>
+              <a:fillRect/>
+            </a:stretch>
+          </p:blipFill>
+          <p:spPr bwMode="auto">
+            <a:xfrm>
+              <a:off x="899592" y="3501008"/>
+              <a:ext cx="2381250" cy="2381250"/>
+            </a:xfrm>
+            <a:prstGeom prst="rect">
+              <a:avLst/>
+            </a:prstGeom>
+            <a:noFill/>
+            <a:ln>
+              <a:noFill/>
+            </a:ln>
+            <a:effectLst/>
+            <a:extLst>
+              <a:ext uri="{909E8E84-426E-40DD-AFC4-6F175D3DCCD1}">
+                <a14:hiddenFill xmlns:a14="http://schemas.microsoft.com/office/drawing/2010/main">
+                  <a:solidFill>
+                    <a:schemeClr val="accent1"/>
+                  </a:solidFill>
+                </a14:hiddenFill>
+              </a:ext>
+              <a:ext uri="{91240B29-F687-4F45-9708-019B960494DF}">
+                <a14:hiddenLine xmlns:a14="http://schemas.microsoft.com/office/drawing/2010/main" w="9525">
+                  <a:solidFill>
+                    <a:schemeClr val="tx1"/>
+                  </a:solidFill>
+                  <a:miter lim="800000"/>
+                  <a:headEnd/>
+                  <a:tailEnd/>
+                </a14:hiddenLine>
+              </a:ext>
+              <a:ext uri="{AF507438-7753-43E0-B8FC-AC1667EBCBE1}">
+                <a14:hiddenEffects xmlns:a14="http://schemas.microsoft.com/office/drawing/2010/main">
+                  <a:effectLst>
+                    <a:outerShdw dist="35921" dir="2700000" algn="ctr" rotWithShape="0">
+                      <a:schemeClr val="bg2"/>
+                    </a:outerShdw>
+                  </a:effectLst>
+                </a14:hiddenEffects>
+              </a:ext>
+            </a:extLst>
+          </p:spPr>
+        </p:pic>
+        <p:pic>
+          <p:nvPicPr>
+            <p:cNvPr id="1028" name="Picture 4" descr="C:\Users\Jaime\Desktop\BACKUP PEN\Qubit101\Qubit101\icons\Qubit101Icon.png"/>
+            <p:cNvPicPr>
+              <a:picLocks noChangeAspect="1" noChangeArrowheads="1"/>
+            </p:cNvPicPr>
+            <p:nvPr/>
+          </p:nvPicPr>
+          <p:blipFill>
+            <a:blip r:embed="rId3">
+              <a:extLst>
+                <a:ext uri="{28A0092B-C50C-407E-A947-70E740481C1C}">
+                  <a14:useLocalDpi xmlns:a14="http://schemas.microsoft.com/office/drawing/2010/main" val="0"/>
+                </a:ext>
+              </a:extLst>
+            </a:blip>
+            <a:srcRect/>
+            <a:stretch>
+              <a:fillRect/>
+            </a:stretch>
+          </p:blipFill>
+          <p:spPr bwMode="auto">
+            <a:xfrm>
+              <a:off x="3747523" y="3472849"/>
+              <a:ext cx="2437567" cy="2437567"/>
+            </a:xfrm>
+            <a:prstGeom prst="rect">
+              <a:avLst/>
+            </a:prstGeom>
+            <a:noFill/>
+            <a:extLst>
+              <a:ext uri="{909E8E84-426E-40DD-AFC4-6F175D3DCCD1}">
+                <a14:hiddenFill xmlns:a14="http://schemas.microsoft.com/office/drawing/2010/main">
+                  <a:solidFill>
+                    <a:srgbClr val="FFFFFF"/>
+                  </a:solidFill>
+                </a14:hiddenFill>
+              </a:ext>
+            </a:extLst>
+          </p:spPr>
+        </p:pic>
+      </p:grpSp>
     </p:spTree>
     <p:extLst>
       <p:ext uri="{BB962C8B-B14F-4D97-AF65-F5344CB8AC3E}">
@@ -34958,6 +35954,309 @@
               <a:t>Conclusiones</a:t>
             </a:r>
             <a:endParaRPr lang="es-ES" sz="4000" dirty="0"/>
+          </a:p>
+        </p:txBody>
+      </p:sp>
+      <p:sp>
+        <p:nvSpPr>
+          <p:cNvPr id="2" name="1 Marcador de número de diapositiva"/>
+          <p:cNvSpPr>
+            <a:spLocks noGrp="1"/>
+          </p:cNvSpPr>
+          <p:nvPr>
+            <p:ph type="sldNum" sz="quarter" idx="12"/>
+          </p:nvPr>
+        </p:nvSpPr>
+        <p:spPr/>
+        <p:txBody>
+          <a:bodyPr/>
+          <a:lstStyle/>
+          <a:p>
+            <a:fld id="{132FADFE-3B8F-471C-ABF0-DBC7717ECBBC}" type="slidenum">
+              <a:rPr lang="es-ES" smtClean="0"/>
+              <a:t>38</a:t>
+            </a:fld>
+            <a:endParaRPr lang="es-ES"/>
+          </a:p>
+        </p:txBody>
+      </p:sp>
+      <p:sp>
+        <p:nvSpPr>
+          <p:cNvPr id="3" name="2 CuadroTexto"/>
+          <p:cNvSpPr txBox="1"/>
+          <p:nvPr/>
+        </p:nvSpPr>
+        <p:spPr>
+          <a:xfrm>
+            <a:off x="3912707" y="1268760"/>
+            <a:ext cx="1284326" cy="584775"/>
+          </a:xfrm>
+          <a:prstGeom prst="rect">
+            <a:avLst/>
+          </a:prstGeom>
+          <a:noFill/>
+        </p:spPr>
+        <p:txBody>
+          <a:bodyPr wrap="none" rtlCol="0">
+            <a:spAutoFit/>
+          </a:bodyPr>
+          <a:lstStyle/>
+          <a:p>
+            <a:r>
+              <a:rPr lang="es-ES" sz="3200" b="1" dirty="0" err="1" smtClean="0"/>
+              <a:t>qMIPS</a:t>
+            </a:r>
+            <a:endParaRPr lang="es-ES" sz="2000" b="1" dirty="0"/>
+          </a:p>
+        </p:txBody>
+      </p:sp>
+      <p:sp>
+        <p:nvSpPr>
+          <p:cNvPr id="4" name="3 CuadroTexto"/>
+          <p:cNvSpPr txBox="1"/>
+          <p:nvPr/>
+        </p:nvSpPr>
+        <p:spPr>
+          <a:xfrm>
+            <a:off x="427169" y="2002468"/>
+            <a:ext cx="8255401" cy="1569660"/>
+          </a:xfrm>
+          <a:prstGeom prst="rect">
+            <a:avLst/>
+          </a:prstGeom>
+          <a:noFill/>
+        </p:spPr>
+        <p:txBody>
+          <a:bodyPr wrap="none" rtlCol="0">
+            <a:spAutoFit/>
+          </a:bodyPr>
+          <a:lstStyle/>
+          <a:p>
+            <a:pPr marL="285750" indent="-285750">
+              <a:buFont typeface="Arial" pitchFamily="34" charset="0"/>
+              <a:buChar char="•"/>
+            </a:pPr>
+            <a:r>
+              <a:rPr lang="es-ES" sz="2400" dirty="0" smtClean="0"/>
+              <a:t>Simulación de una arquitectura clásico-cuántica</a:t>
+            </a:r>
+          </a:p>
+          <a:p>
+            <a:pPr marL="285750" indent="-285750">
+              <a:buFont typeface="Arial" pitchFamily="34" charset="0"/>
+              <a:buChar char="•"/>
+            </a:pPr>
+            <a:r>
+              <a:rPr lang="es-ES" sz="2400" dirty="0" smtClean="0"/>
+              <a:t>Versatilidad a la hora de programar</a:t>
+            </a:r>
+          </a:p>
+          <a:p>
+            <a:pPr marL="285750" indent="-285750">
+              <a:buFont typeface="Arial" pitchFamily="34" charset="0"/>
+              <a:buChar char="•"/>
+            </a:pPr>
+            <a:r>
+              <a:rPr lang="es-ES" sz="2400" dirty="0" smtClean="0"/>
+              <a:t>Experimentación de la implementación física de los algoritmos</a:t>
+            </a:r>
+          </a:p>
+          <a:p>
+            <a:pPr marL="285750" indent="-285750">
+              <a:buFont typeface="Arial" pitchFamily="34" charset="0"/>
+              <a:buChar char="•"/>
+            </a:pPr>
+            <a:r>
+              <a:rPr lang="es-ES" sz="2400" dirty="0" smtClean="0"/>
+              <a:t>Herramienta didáctica sobre computación cuántica</a:t>
+            </a:r>
+            <a:endParaRPr lang="es-ES" sz="2400" dirty="0"/>
+          </a:p>
+        </p:txBody>
+      </p:sp>
+      <p:sp>
+        <p:nvSpPr>
+          <p:cNvPr id="6" name="5 Rectángulo"/>
+          <p:cNvSpPr/>
+          <p:nvPr/>
+        </p:nvSpPr>
+        <p:spPr>
+          <a:xfrm>
+            <a:off x="179512" y="1268760"/>
+            <a:ext cx="8712968" cy="2447384"/>
+          </a:xfrm>
+          <a:prstGeom prst="rect">
+            <a:avLst/>
+          </a:prstGeom>
+          <a:noFill/>
+          <a:ln>
+            <a:solidFill>
+              <a:schemeClr val="tx1"/>
+            </a:solidFill>
+          </a:ln>
+        </p:spPr>
+        <p:style>
+          <a:lnRef idx="2">
+            <a:schemeClr val="accent1">
+              <a:shade val="50000"/>
+            </a:schemeClr>
+          </a:lnRef>
+          <a:fillRef idx="1">
+            <a:schemeClr val="accent1"/>
+          </a:fillRef>
+          <a:effectRef idx="0">
+            <a:schemeClr val="accent1"/>
+          </a:effectRef>
+          <a:fontRef idx="minor">
+            <a:schemeClr val="lt1"/>
+          </a:fontRef>
+        </p:style>
+        <p:txBody>
+          <a:bodyPr rtlCol="0" anchor="ctr"/>
+          <a:lstStyle/>
+          <a:p>
+            <a:pPr algn="ctr"/>
+            <a:endParaRPr lang="es-ES"/>
+          </a:p>
+        </p:txBody>
+      </p:sp>
+      <p:sp>
+        <p:nvSpPr>
+          <p:cNvPr id="8" name="7 Rectángulo"/>
+          <p:cNvSpPr/>
+          <p:nvPr/>
+        </p:nvSpPr>
+        <p:spPr>
+          <a:xfrm>
+            <a:off x="198386" y="4077072"/>
+            <a:ext cx="8712968" cy="2447384"/>
+          </a:xfrm>
+          <a:prstGeom prst="rect">
+            <a:avLst/>
+          </a:prstGeom>
+          <a:noFill/>
+          <a:ln>
+            <a:solidFill>
+              <a:schemeClr val="tx1"/>
+            </a:solidFill>
+          </a:ln>
+        </p:spPr>
+        <p:style>
+          <a:lnRef idx="2">
+            <a:schemeClr val="accent1">
+              <a:shade val="50000"/>
+            </a:schemeClr>
+          </a:lnRef>
+          <a:fillRef idx="1">
+            <a:schemeClr val="accent1"/>
+          </a:fillRef>
+          <a:effectRef idx="0">
+            <a:schemeClr val="accent1"/>
+          </a:effectRef>
+          <a:fontRef idx="minor">
+            <a:schemeClr val="lt1"/>
+          </a:fontRef>
+        </p:style>
+        <p:txBody>
+          <a:bodyPr rtlCol="0" anchor="ctr"/>
+          <a:lstStyle/>
+          <a:p>
+            <a:pPr algn="ctr"/>
+            <a:endParaRPr lang="es-ES"/>
+          </a:p>
+        </p:txBody>
+      </p:sp>
+      <p:sp>
+        <p:nvSpPr>
+          <p:cNvPr id="9" name="8 CuadroTexto"/>
+          <p:cNvSpPr txBox="1"/>
+          <p:nvPr/>
+        </p:nvSpPr>
+        <p:spPr>
+          <a:xfrm>
+            <a:off x="3667447" y="4149080"/>
+            <a:ext cx="1774845" cy="584775"/>
+          </a:xfrm>
+          <a:prstGeom prst="rect">
+            <a:avLst/>
+          </a:prstGeom>
+          <a:noFill/>
+        </p:spPr>
+        <p:txBody>
+          <a:bodyPr wrap="none" rtlCol="0">
+            <a:spAutoFit/>
+          </a:bodyPr>
+          <a:lstStyle/>
+          <a:p>
+            <a:r>
+              <a:rPr lang="es-ES" sz="3200" b="1" dirty="0" smtClean="0"/>
+              <a:t>Qubit101</a:t>
+            </a:r>
+            <a:endParaRPr lang="es-ES" sz="2000" b="1" dirty="0"/>
+          </a:p>
+        </p:txBody>
+      </p:sp>
+      <p:sp>
+        <p:nvSpPr>
+          <p:cNvPr id="10" name="9 CuadroTexto"/>
+          <p:cNvSpPr txBox="1"/>
+          <p:nvPr/>
+        </p:nvSpPr>
+        <p:spPr>
+          <a:xfrm>
+            <a:off x="408295" y="4811668"/>
+            <a:ext cx="7275710" cy="1569660"/>
+          </a:xfrm>
+          <a:prstGeom prst="rect">
+            <a:avLst/>
+          </a:prstGeom>
+          <a:noFill/>
+        </p:spPr>
+        <p:txBody>
+          <a:bodyPr wrap="none" rtlCol="0">
+            <a:spAutoFit/>
+          </a:bodyPr>
+          <a:lstStyle/>
+          <a:p>
+            <a:pPr marL="285750" indent="-285750">
+              <a:buFont typeface="Arial" pitchFamily="34" charset="0"/>
+              <a:buChar char="•"/>
+            </a:pPr>
+            <a:r>
+              <a:rPr lang="es-ES" sz="2400" dirty="0" smtClean="0"/>
+              <a:t>Simulación de circuitos cuánticos</a:t>
+            </a:r>
+          </a:p>
+          <a:p>
+            <a:pPr marL="285750" indent="-285750">
+              <a:buFont typeface="Arial" pitchFamily="34" charset="0"/>
+              <a:buChar char="•"/>
+            </a:pPr>
+            <a:r>
+              <a:rPr lang="es-ES" sz="2400" dirty="0" smtClean="0"/>
+              <a:t>Facilidad para construir circuitos de alta complejidad</a:t>
+            </a:r>
+          </a:p>
+          <a:p>
+            <a:pPr marL="285750" indent="-285750">
+              <a:buFont typeface="Arial" pitchFamily="34" charset="0"/>
+              <a:buChar char="•"/>
+            </a:pPr>
+            <a:r>
+              <a:rPr lang="es-ES" sz="2400" dirty="0" smtClean="0"/>
+              <a:t>Muy eficiente</a:t>
+            </a:r>
+          </a:p>
+          <a:p>
+            <a:pPr marL="285750" indent="-285750">
+              <a:buFont typeface="Arial" pitchFamily="34" charset="0"/>
+              <a:buChar char="•"/>
+            </a:pPr>
+            <a:r>
+              <a:rPr lang="es-ES" sz="2400" dirty="0" smtClean="0"/>
+              <a:t>Banco de desarrollo y pruebas de algoritmos cuánticos</a:t>
+            </a:r>
+            <a:endParaRPr lang="es-ES" sz="2400" dirty="0"/>
           </a:p>
         </p:txBody>
       </p:sp>
@@ -40390,6 +41689,13 @@
   <p:clrMapOvr>
     <a:masterClrMapping/>
   </p:clrMapOvr>
+  <p:timing>
+    <p:tnLst>
+      <p:par>
+        <p:cTn id="1" dur="indefinite" restart="never" nodeType="tmRoot"/>
+      </p:par>
+    </p:tnLst>
+  </p:timing>
 </p:sld>
 </file>
 
@@ -41994,9 +43300,37 @@
           </a:p>
         </p:txBody>
       </p:sp>
+      <p:sp>
+        <p:nvSpPr>
+          <p:cNvPr id="8" name="7 CuadroTexto"/>
+          <p:cNvSpPr txBox="1"/>
+          <p:nvPr/>
+        </p:nvSpPr>
+        <p:spPr>
+          <a:xfrm>
+            <a:off x="5148064" y="3789040"/>
+            <a:ext cx="184731" cy="400110"/>
+          </a:xfrm>
+          <a:prstGeom prst="rect">
+            <a:avLst/>
+          </a:prstGeom>
+          <a:solidFill>
+            <a:schemeClr val="bg1"/>
+          </a:solidFill>
+        </p:spPr>
+        <p:txBody>
+          <a:bodyPr wrap="none" rtlCol="0">
+            <a:spAutoFit/>
+          </a:bodyPr>
+          <a:lstStyle/>
+          <a:p>
+            <a:endParaRPr lang="es-ES" sz="2000" b="1" dirty="0"/>
+          </a:p>
+        </p:txBody>
+      </p:sp>
       <p:pic>
         <p:nvPicPr>
-          <p:cNvPr id="1026" name="Picture 2"/>
+          <p:cNvPr id="3074" name="Picture 2"/>
           <p:cNvPicPr>
             <a:picLocks noChangeAspect="1" noChangeArrowheads="1"/>
           </p:cNvPicPr>
@@ -42016,9 +43350,9 @@
           </a:stretch>
         </p:blipFill>
         <p:spPr bwMode="auto">
-          <a:xfrm rot="16200000">
-            <a:off x="3364368" y="3097535"/>
-            <a:ext cx="2447925" cy="2390775"/>
+          <a:xfrm>
+            <a:off x="2938588" y="2924944"/>
+            <a:ext cx="3299486" cy="3230746"/>
           </a:xfrm>
           <a:prstGeom prst="rect">
             <a:avLst/>
@@ -42048,246 +43382,338 @@
           </a:extLst>
         </p:spPr>
       </p:pic>
-      <mc:AlternateContent xmlns:mc="http://schemas.openxmlformats.org/markup-compatibility/2006">
-        <mc:Choice xmlns:a14="http://schemas.microsoft.com/office/drawing/2010/main" Requires="a14">
-          <p:sp>
-            <p:nvSpPr>
-              <p:cNvPr id="6" name="5 CuadroTexto"/>
-              <p:cNvSpPr txBox="1"/>
-              <p:nvPr/>
-            </p:nvSpPr>
-            <p:spPr>
-              <a:xfrm>
-                <a:off x="3779913" y="3460938"/>
-                <a:ext cx="432048" cy="400110"/>
-              </a:xfrm>
-              <a:prstGeom prst="rect">
-                <a:avLst/>
-              </a:prstGeom>
+      <p:grpSp>
+        <p:nvGrpSpPr>
+          <p:cNvPr id="7" name="6 Grupo"/>
+          <p:cNvGrpSpPr/>
+          <p:nvPr/>
+        </p:nvGrpSpPr>
+        <p:grpSpPr>
+          <a:xfrm>
+            <a:off x="4319972" y="2852935"/>
+            <a:ext cx="504056" cy="461665"/>
+            <a:chOff x="3563888" y="2852936"/>
+            <a:chExt cx="504056" cy="461665"/>
+          </a:xfrm>
+        </p:grpSpPr>
+        <p:sp>
+          <p:nvSpPr>
+            <p:cNvPr id="5" name="4 Rectángulo"/>
+            <p:cNvSpPr/>
+            <p:nvPr/>
+          </p:nvSpPr>
+          <p:spPr>
+            <a:xfrm>
+              <a:off x="3635896" y="2895327"/>
+              <a:ext cx="432048" cy="389657"/>
+            </a:xfrm>
+            <a:prstGeom prst="rect">
+              <a:avLst/>
+            </a:prstGeom>
+            <a:solidFill>
+              <a:schemeClr val="bg1"/>
+            </a:solidFill>
+            <a:ln>
               <a:solidFill>
                 <a:schemeClr val="bg1"/>
               </a:solidFill>
-            </p:spPr>
-            <p:txBody>
-              <a:bodyPr wrap="square" rtlCol="0">
-                <a:spAutoFit/>
-              </a:bodyPr>
-              <a:lstStyle/>
-              <a:p>
-                <a14:m>
-                  <m:oMathPara xmlns:m="http://schemas.openxmlformats.org/officeDocument/2006/math">
-                    <m:oMathParaPr>
-                      <m:jc m:val="centerGroup"/>
-                    </m:oMathParaPr>
-                    <m:oMath xmlns:m="http://schemas.openxmlformats.org/officeDocument/2006/math">
-                      <m:r>
-                        <a:rPr lang="es-ES" sz="2000" b="1" i="1" smtClean="0">
-                          <a:latin typeface="Cambria Math"/>
-                        </a:rPr>
-                        <m:t>|</m:t>
-                      </m:r>
-                      <m:d>
-                        <m:dPr>
-                          <m:begChr m:val=""/>
-                          <m:endChr m:val="⟩"/>
-                          <m:ctrlPr>
-                            <a:rPr lang="es-ES" sz="2000" b="1" i="1" smtClean="0">
-                              <a:latin typeface="Cambria Math"/>
-                            </a:rPr>
-                          </m:ctrlPr>
-                        </m:dPr>
-                        <m:e>
-                          <m:r>
-                            <a:rPr lang="es-ES" sz="2000" b="1" i="1" smtClean="0">
-                              <a:latin typeface="Cambria Math"/>
-                            </a:rPr>
-                            <m:t>𝟏</m:t>
-                          </m:r>
-                        </m:e>
-                      </m:d>
-                    </m:oMath>
-                  </m:oMathPara>
-                </a14:m>
-                <a:endParaRPr lang="es-ES" sz="2000" b="1" dirty="0"/>
-              </a:p>
-            </p:txBody>
-          </p:sp>
-        </mc:Choice>
-        <mc:Fallback>
-          <p:sp>
-            <p:nvSpPr>
-              <p:cNvPr id="6" name="5 CuadroTexto"/>
-              <p:cNvSpPr txBox="1">
-                <a:spLocks noRot="1" noChangeAspect="1" noMove="1" noResize="1" noEditPoints="1" noAdjustHandles="1" noChangeArrowheads="1" noChangeShapeType="1" noTextEdit="1"/>
-              </p:cNvSpPr>
-              <p:nvPr/>
-            </p:nvSpPr>
-            <p:spPr>
-              <a:xfrm>
-                <a:off x="3779913" y="3460938"/>
-                <a:ext cx="432048" cy="400110"/>
-              </a:xfrm>
-              <a:prstGeom prst="rect">
-                <a:avLst/>
-              </a:prstGeom>
-              <a:blipFill rotWithShape="1">
-                <a:blip r:embed="rId3"/>
-                <a:stretch>
-                  <a:fillRect l="-32394" t="-124615" r="-139437" b="-186154"/>
-                </a:stretch>
-              </a:blipFill>
-            </p:spPr>
-            <p:txBody>
-              <a:bodyPr/>
-              <a:lstStyle/>
-              <a:p>
-                <a:r>
-                  <a:rPr lang="es-ES">
-                    <a:noFill/>
-                  </a:rPr>
-                  <a:t> </a:t>
-                </a:r>
-              </a:p>
-            </p:txBody>
-          </p:sp>
-        </mc:Fallback>
-      </mc:AlternateContent>
-      <p:sp>
-        <p:nvSpPr>
-          <p:cNvPr id="8" name="7 CuadroTexto"/>
-          <p:cNvSpPr txBox="1"/>
+            </a:ln>
+          </p:spPr>
+          <p:style>
+            <a:lnRef idx="2">
+              <a:schemeClr val="accent1">
+                <a:shade val="50000"/>
+              </a:schemeClr>
+            </a:lnRef>
+            <a:fillRef idx="1">
+              <a:schemeClr val="accent1"/>
+            </a:fillRef>
+            <a:effectRef idx="0">
+              <a:schemeClr val="accent1"/>
+            </a:effectRef>
+            <a:fontRef idx="minor">
+              <a:schemeClr val="lt1"/>
+            </a:fontRef>
+          </p:style>
+          <p:txBody>
+            <a:bodyPr rtlCol="0" anchor="ctr"/>
+            <a:lstStyle/>
+            <a:p>
+              <a:pPr algn="ctr"/>
+              <a:endParaRPr lang="es-ES"/>
+            </a:p>
+          </p:txBody>
+        </p:sp>
+        <mc:AlternateContent xmlns:mc="http://schemas.openxmlformats.org/markup-compatibility/2006">
+          <mc:Choice xmlns:a14="http://schemas.microsoft.com/office/drawing/2010/main" Requires="a14">
+            <p:sp>
+              <p:nvSpPr>
+                <p:cNvPr id="3" name="2 Rectángulo"/>
+                <p:cNvSpPr/>
+                <p:nvPr/>
+              </p:nvSpPr>
+              <p:spPr>
+                <a:xfrm>
+                  <a:off x="3563888" y="2852936"/>
+                  <a:ext cx="504056" cy="461665"/>
+                </a:xfrm>
+                <a:prstGeom prst="rect">
+                  <a:avLst/>
+                </a:prstGeom>
+                <a:noFill/>
+              </p:spPr>
+              <p:txBody>
+                <a:bodyPr wrap="square">
+                  <a:spAutoFit/>
+                </a:bodyPr>
+                <a:lstStyle/>
+                <a:p>
+                  <a:pPr/>
+                  <a14:m>
+                    <m:oMathPara xmlns:m="http://schemas.openxmlformats.org/officeDocument/2006/math">
+                      <m:oMathParaPr>
+                        <m:jc m:val="left"/>
+                      </m:oMathParaPr>
+                      <m:oMath xmlns:m="http://schemas.openxmlformats.org/officeDocument/2006/math">
+                        <m:r>
+                          <a:rPr lang="es-ES" sz="2400" b="1" i="1">
+                            <a:latin typeface="Cambria Math"/>
+                          </a:rPr>
+                          <m:t>|</m:t>
+                        </m:r>
+                        <m:d>
+                          <m:dPr>
+                            <m:begChr m:val=""/>
+                            <m:endChr m:val="⟩"/>
+                            <m:ctrlPr>
+                              <a:rPr lang="es-ES" sz="2400" b="1" i="1">
+                                <a:latin typeface="Cambria Math"/>
+                              </a:rPr>
+                            </m:ctrlPr>
+                          </m:dPr>
+                          <m:e>
+                            <m:r>
+                              <a:rPr lang="es-ES" sz="2400" b="1" i="1">
+                                <a:latin typeface="Cambria Math"/>
+                              </a:rPr>
+                              <m:t>𝟎</m:t>
+                            </m:r>
+                          </m:e>
+                        </m:d>
+                      </m:oMath>
+                    </m:oMathPara>
+                  </a14:m>
+                  <a:endParaRPr lang="es-ES" sz="2400" b="1" dirty="0"/>
+                </a:p>
+              </p:txBody>
+            </p:sp>
+          </mc:Choice>
+          <mc:Fallback>
+            <p:sp>
+              <p:nvSpPr>
+                <p:cNvPr id="3" name="2 Rectángulo"/>
+                <p:cNvSpPr>
+                  <a:spLocks noRot="1" noChangeAspect="1" noMove="1" noResize="1" noEditPoints="1" noAdjustHandles="1" noChangeArrowheads="1" noChangeShapeType="1" noTextEdit="1"/>
+                </p:cNvSpPr>
+                <p:nvPr/>
+              </p:nvSpPr>
+              <p:spPr>
+                <a:xfrm>
+                  <a:off x="3563888" y="2852936"/>
+                  <a:ext cx="504056" cy="461665"/>
+                </a:xfrm>
+                <a:prstGeom prst="rect">
+                  <a:avLst/>
+                </a:prstGeom>
+                <a:blipFill rotWithShape="1">
+                  <a:blip r:embed="rId3"/>
+                  <a:stretch>
+                    <a:fillRect l="-39024" t="-130263" r="-145122" b="-194737"/>
+                  </a:stretch>
+                </a:blipFill>
+              </p:spPr>
+              <p:txBody>
+                <a:bodyPr/>
+                <a:lstStyle/>
+                <a:p>
+                  <a:r>
+                    <a:rPr lang="es-ES">
+                      <a:noFill/>
+                    </a:rPr>
+                    <a:t> </a:t>
+                  </a:r>
+                </a:p>
+              </p:txBody>
+            </p:sp>
+          </mc:Fallback>
+        </mc:AlternateContent>
+      </p:grpSp>
+      <p:grpSp>
+        <p:nvGrpSpPr>
+          <p:cNvPr id="14" name="13 Grupo"/>
+          <p:cNvGrpSpPr/>
           <p:nvPr/>
-        </p:nvSpPr>
-        <p:spPr>
+        </p:nvGrpSpPr>
+        <p:grpSpPr>
           <a:xfrm>
-            <a:off x="5148064" y="3789040"/>
-            <a:ext cx="314510" cy="400110"/>
+            <a:off x="4319972" y="5790455"/>
+            <a:ext cx="504056" cy="461665"/>
+            <a:chOff x="3563888" y="2852936"/>
+            <a:chExt cx="504056" cy="461665"/>
           </a:xfrm>
-          <a:prstGeom prst="rect">
-            <a:avLst/>
-          </a:prstGeom>
-          <a:solidFill>
-            <a:schemeClr val="bg1"/>
-          </a:solidFill>
-        </p:spPr>
-        <p:txBody>
-          <a:bodyPr wrap="none" rtlCol="0">
-            <a:spAutoFit/>
-          </a:bodyPr>
-          <a:lstStyle/>
-          <a:p>
-            <a:r>
-              <a:rPr lang="es-ES" sz="2000" b="1" dirty="0" smtClean="0"/>
-              <a:t>0</a:t>
-            </a:r>
-            <a:endParaRPr lang="es-ES" sz="2000" b="1" dirty="0"/>
-          </a:p>
-        </p:txBody>
-      </p:sp>
-      <mc:AlternateContent xmlns:mc="http://schemas.openxmlformats.org/markup-compatibility/2006">
-        <mc:Choice xmlns:a14="http://schemas.microsoft.com/office/drawing/2010/main" Requires="a14">
-          <p:sp>
-            <p:nvSpPr>
-              <p:cNvPr id="9" name="8 CuadroTexto"/>
-              <p:cNvSpPr txBox="1"/>
-              <p:nvPr/>
-            </p:nvSpPr>
-            <p:spPr>
-              <a:xfrm>
-                <a:off x="5076056" y="3789040"/>
-                <a:ext cx="432048" cy="400110"/>
-              </a:xfrm>
-              <a:prstGeom prst="rect">
-                <a:avLst/>
-              </a:prstGeom>
+        </p:grpSpPr>
+        <p:sp>
+          <p:nvSpPr>
+            <p:cNvPr id="15" name="14 Rectángulo"/>
+            <p:cNvSpPr/>
+            <p:nvPr/>
+          </p:nvSpPr>
+          <p:spPr>
+            <a:xfrm>
+              <a:off x="3635896" y="2895327"/>
+              <a:ext cx="432048" cy="389657"/>
+            </a:xfrm>
+            <a:prstGeom prst="rect">
+              <a:avLst/>
+            </a:prstGeom>
+            <a:solidFill>
+              <a:schemeClr val="bg1"/>
+            </a:solidFill>
+            <a:ln>
               <a:solidFill>
                 <a:schemeClr val="bg1"/>
               </a:solidFill>
-            </p:spPr>
-            <p:txBody>
-              <a:bodyPr wrap="square" rtlCol="0">
-                <a:spAutoFit/>
-              </a:bodyPr>
-              <a:lstStyle/>
-              <a:p>
-                <a14:m>
-                  <m:oMathPara xmlns:m="http://schemas.openxmlformats.org/officeDocument/2006/math">
-                    <m:oMathParaPr>
-                      <m:jc m:val="centerGroup"/>
-                    </m:oMathParaPr>
-                    <m:oMath xmlns:m="http://schemas.openxmlformats.org/officeDocument/2006/math">
-                      <m:r>
-                        <a:rPr lang="es-ES" sz="2000" b="1" i="1" smtClean="0">
-                          <a:latin typeface="Cambria Math"/>
-                        </a:rPr>
-                        <m:t>|</m:t>
-                      </m:r>
-                      <m:d>
-                        <m:dPr>
-                          <m:begChr m:val=""/>
-                          <m:endChr m:val="⟩"/>
-                          <m:ctrlPr>
-                            <a:rPr lang="es-ES" sz="2000" b="1" i="1" smtClean="0">
-                              <a:latin typeface="Cambria Math"/>
-                            </a:rPr>
-                          </m:ctrlPr>
-                        </m:dPr>
-                        <m:e>
-                          <m:r>
-                            <a:rPr lang="es-ES" sz="2000" b="1" i="1" smtClean="0">
-                              <a:latin typeface="Cambria Math"/>
-                            </a:rPr>
-                            <m:t>𝟎</m:t>
-                          </m:r>
-                        </m:e>
-                      </m:d>
-                    </m:oMath>
-                  </m:oMathPara>
-                </a14:m>
-                <a:endParaRPr lang="es-ES" sz="2000" b="1" dirty="0"/>
-              </a:p>
-            </p:txBody>
-          </p:sp>
-        </mc:Choice>
-        <mc:Fallback>
-          <p:sp>
-            <p:nvSpPr>
-              <p:cNvPr id="9" name="8 CuadroTexto"/>
-              <p:cNvSpPr txBox="1">
-                <a:spLocks noRot="1" noChangeAspect="1" noMove="1" noResize="1" noEditPoints="1" noAdjustHandles="1" noChangeArrowheads="1" noChangeShapeType="1" noTextEdit="1"/>
-              </p:cNvSpPr>
-              <p:nvPr/>
-            </p:nvSpPr>
-            <p:spPr>
-              <a:xfrm>
-                <a:off x="5076056" y="3789040"/>
-                <a:ext cx="432048" cy="400110"/>
-              </a:xfrm>
-              <a:prstGeom prst="rect">
-                <a:avLst/>
-              </a:prstGeom>
-              <a:blipFill rotWithShape="1">
-                <a:blip r:embed="rId4"/>
-                <a:stretch>
-                  <a:fillRect l="-33803" t="-124615" r="-138028" b="-186154"/>
-                </a:stretch>
-              </a:blipFill>
-            </p:spPr>
-            <p:txBody>
-              <a:bodyPr/>
-              <a:lstStyle/>
-              <a:p>
-                <a:r>
-                  <a:rPr lang="es-ES">
-                    <a:noFill/>
-                  </a:rPr>
-                  <a:t> </a:t>
-                </a:r>
-              </a:p>
-            </p:txBody>
-          </p:sp>
-        </mc:Fallback>
-      </mc:AlternateContent>
+            </a:ln>
+          </p:spPr>
+          <p:style>
+            <a:lnRef idx="2">
+              <a:schemeClr val="accent1">
+                <a:shade val="50000"/>
+              </a:schemeClr>
+            </a:lnRef>
+            <a:fillRef idx="1">
+              <a:schemeClr val="accent1"/>
+            </a:fillRef>
+            <a:effectRef idx="0">
+              <a:schemeClr val="accent1"/>
+            </a:effectRef>
+            <a:fontRef idx="minor">
+              <a:schemeClr val="lt1"/>
+            </a:fontRef>
+          </p:style>
+          <p:txBody>
+            <a:bodyPr rtlCol="0" anchor="ctr"/>
+            <a:lstStyle/>
+            <a:p>
+              <a:pPr algn="ctr"/>
+              <a:endParaRPr lang="es-ES" b="1"/>
+            </a:p>
+          </p:txBody>
+        </p:sp>
+        <mc:AlternateContent xmlns:mc="http://schemas.openxmlformats.org/markup-compatibility/2006">
+          <mc:Choice xmlns:a14="http://schemas.microsoft.com/office/drawing/2010/main" Requires="a14">
+            <p:sp>
+              <p:nvSpPr>
+                <p:cNvPr id="16" name="15 Rectángulo"/>
+                <p:cNvSpPr/>
+                <p:nvPr/>
+              </p:nvSpPr>
+              <p:spPr>
+                <a:xfrm>
+                  <a:off x="3563888" y="2852936"/>
+                  <a:ext cx="504056" cy="461665"/>
+                </a:xfrm>
+                <a:prstGeom prst="rect">
+                  <a:avLst/>
+                </a:prstGeom>
+                <a:noFill/>
+              </p:spPr>
+              <p:txBody>
+                <a:bodyPr wrap="square">
+                  <a:spAutoFit/>
+                </a:bodyPr>
+                <a:lstStyle/>
+                <a:p>
+                  <a:pPr/>
+                  <a14:m>
+                    <m:oMathPara xmlns:m="http://schemas.openxmlformats.org/officeDocument/2006/math">
+                      <m:oMathParaPr>
+                        <m:jc m:val="left"/>
+                      </m:oMathParaPr>
+                      <m:oMath xmlns:m="http://schemas.openxmlformats.org/officeDocument/2006/math">
+                        <m:r>
+                          <a:rPr lang="es-ES" sz="2400" b="1" i="1" smtClean="0">
+                            <a:latin typeface="Cambria Math"/>
+                          </a:rPr>
+                          <m:t>|</m:t>
+                        </m:r>
+                        <m:d>
+                          <m:dPr>
+                            <m:begChr m:val=""/>
+                            <m:endChr m:val="⟩"/>
+                            <m:ctrlPr>
+                              <a:rPr lang="es-ES" sz="2400" b="1" i="1">
+                                <a:latin typeface="Cambria Math"/>
+                              </a:rPr>
+                            </m:ctrlPr>
+                          </m:dPr>
+                          <m:e>
+                            <m:r>
+                              <a:rPr lang="es-ES" sz="2400" b="1" i="1" smtClean="0">
+                                <a:latin typeface="Cambria Math"/>
+                              </a:rPr>
+                              <m:t>𝟏</m:t>
+                            </m:r>
+                          </m:e>
+                        </m:d>
+                      </m:oMath>
+                    </m:oMathPara>
+                  </a14:m>
+                  <a:endParaRPr lang="es-ES" sz="2400" b="1" dirty="0"/>
+                </a:p>
+              </p:txBody>
+            </p:sp>
+          </mc:Choice>
+          <mc:Fallback>
+            <p:sp>
+              <p:nvSpPr>
+                <p:cNvPr id="16" name="15 Rectángulo"/>
+                <p:cNvSpPr>
+                  <a:spLocks noRot="1" noChangeAspect="1" noMove="1" noResize="1" noEditPoints="1" noAdjustHandles="1" noChangeArrowheads="1" noChangeShapeType="1" noTextEdit="1"/>
+                </p:cNvSpPr>
+                <p:nvPr/>
+              </p:nvSpPr>
+              <p:spPr>
+                <a:xfrm>
+                  <a:off x="3563888" y="2852936"/>
+                  <a:ext cx="504056" cy="461665"/>
+                </a:xfrm>
+                <a:prstGeom prst="rect">
+                  <a:avLst/>
+                </a:prstGeom>
+                <a:blipFill rotWithShape="1">
+                  <a:blip r:embed="rId4"/>
+                  <a:stretch>
+                    <a:fillRect l="-39024" t="-130263" r="-145122" b="-194737"/>
+                  </a:stretch>
+                </a:blipFill>
+              </p:spPr>
+              <p:txBody>
+                <a:bodyPr/>
+                <a:lstStyle/>
+                <a:p>
+                  <a:r>
+                    <a:rPr lang="es-ES">
+                      <a:noFill/>
+                    </a:rPr>
+                    <a:t> </a:t>
+                  </a:r>
+                </a:p>
+              </p:txBody>
+            </p:sp>
+          </mc:Fallback>
+        </mc:AlternateContent>
+      </p:grpSp>
     </p:spTree>
     <p:extLst>
       <p:ext uri="{BB962C8B-B14F-4D97-AF65-F5344CB8AC3E}">

</xml_diff>

<commit_message>
Changes in the presentation. Added the Deutsch's algorithm circuit.
</commit_message>
<xml_diff>
--- a/qMIPS/doc/Presentacion PFC.pptx
+++ b/qMIPS/doc/Presentacion PFC.pptx
@@ -234,7 +234,7 @@
           <a:p>
             <a:fld id="{AB13600B-983D-4584-B53F-0B1CEA54138F}" type="datetimeFigureOut">
               <a:rPr lang="es-ES" smtClean="0"/>
-              <a:t>01/07/2013</a:t>
+              <a:t>02/07/2013</a:t>
             </a:fld>
             <a:endParaRPr lang="es-ES"/>
           </a:p>
@@ -774,7 +774,7 @@
           <a:p>
             <a:fld id="{C3967CDB-A549-494F-9200-E88BD12A88E7}" type="datetime1">
               <a:rPr lang="es-ES" smtClean="0"/>
-              <a:t>01/07/2013</a:t>
+              <a:t>02/07/2013</a:t>
             </a:fld>
             <a:endParaRPr lang="es-ES"/>
           </a:p>
@@ -974,7 +974,7 @@
           <a:p>
             <a:fld id="{2BFE0104-DA63-4337-BC31-D3B39945ADF4}" type="datetime1">
               <a:rPr lang="es-ES" smtClean="0"/>
-              <a:t>01/07/2013</a:t>
+              <a:t>02/07/2013</a:t>
             </a:fld>
             <a:endParaRPr lang="es-ES"/>
           </a:p>
@@ -1149,7 +1149,7 @@
           <a:p>
             <a:fld id="{33452893-1ECD-4E63-8225-107CA719C00F}" type="datetime1">
               <a:rPr lang="es-ES" smtClean="0"/>
-              <a:t>01/07/2013</a:t>
+              <a:t>02/07/2013</a:t>
             </a:fld>
             <a:endParaRPr lang="es-ES"/>
           </a:p>
@@ -1314,7 +1314,7 @@
           <a:p>
             <a:fld id="{1F2FD71C-4882-4477-BBE2-4BD67691D07E}" type="datetime1">
               <a:rPr lang="es-ES" smtClean="0"/>
-              <a:t>01/07/2013</a:t>
+              <a:t>02/07/2013</a:t>
             </a:fld>
             <a:endParaRPr lang="es-ES"/>
           </a:p>
@@ -1562,7 +1562,7 @@
           <a:p>
             <a:fld id="{C9B27F70-A1F2-4761-94FF-C34EC0B5C26B}" type="datetime1">
               <a:rPr lang="es-ES" smtClean="0"/>
-              <a:t>01/07/2013</a:t>
+              <a:t>02/07/2013</a:t>
             </a:fld>
             <a:endParaRPr lang="es-ES"/>
           </a:p>
@@ -1880,7 +1880,7 @@
           <a:p>
             <a:fld id="{835D4200-5903-4DD7-9F81-459CB121BC07}" type="datetime1">
               <a:rPr lang="es-ES" smtClean="0"/>
-              <a:t>01/07/2013</a:t>
+              <a:t>02/07/2013</a:t>
             </a:fld>
             <a:endParaRPr lang="es-ES"/>
           </a:p>
@@ -2346,7 +2346,7 @@
           <a:p>
             <a:fld id="{81D0FF4F-79FE-4538-B979-A2A984573A10}" type="datetime1">
               <a:rPr lang="es-ES" smtClean="0"/>
-              <a:t>01/07/2013</a:t>
+              <a:t>02/07/2013</a:t>
             </a:fld>
             <a:endParaRPr lang="es-ES"/>
           </a:p>
@@ -2494,7 +2494,7 @@
           <a:p>
             <a:fld id="{04AB70DA-4DFE-480B-8C7C-DD89595D65B0}" type="datetime1">
               <a:rPr lang="es-ES" smtClean="0"/>
-              <a:t>01/07/2013</a:t>
+              <a:t>02/07/2013</a:t>
             </a:fld>
             <a:endParaRPr lang="es-ES"/>
           </a:p>
@@ -2584,7 +2584,7 @@
           <a:p>
             <a:fld id="{E5AD5170-137E-4220-AAD9-09864698BDE0}" type="datetime1">
               <a:rPr lang="es-ES" smtClean="0"/>
-              <a:t>01/07/2013</a:t>
+              <a:t>02/07/2013</a:t>
             </a:fld>
             <a:endParaRPr lang="es-ES"/>
           </a:p>
@@ -2858,7 +2858,7 @@
           <a:p>
             <a:fld id="{006AF552-B44A-45CB-A9F6-1C1DCC86DB82}" type="datetime1">
               <a:rPr lang="es-ES" smtClean="0"/>
-              <a:t>01/07/2013</a:t>
+              <a:t>02/07/2013</a:t>
             </a:fld>
             <a:endParaRPr lang="es-ES"/>
           </a:p>
@@ -3163,7 +3163,7 @@
           <a:p>
             <a:fld id="{289BF707-9D58-4A85-9E77-4133DEF04B28}" type="datetime1">
               <a:rPr lang="es-ES" smtClean="0"/>
-              <a:t>01/07/2013</a:t>
+              <a:t>02/07/2013</a:t>
             </a:fld>
             <a:endParaRPr lang="es-ES"/>
           </a:p>
@@ -3461,7 +3461,7 @@
           <a:p>
             <a:fld id="{05DCF1C9-7720-4238-86A3-5AA26F77ADEA}" type="datetime1">
               <a:rPr lang="es-ES" smtClean="0"/>
-              <a:t>01/07/2013</a:t>
+              <a:t>02/07/2013</a:t>
             </a:fld>
             <a:endParaRPr lang="es-ES"/>
           </a:p>
@@ -3867,7 +3867,7 @@
         </p:nvSpPr>
         <p:spPr>
           <a:xfrm>
-            <a:off x="971600" y="1749326"/>
+            <a:off x="971600" y="1340768"/>
             <a:ext cx="7272808" cy="1323439"/>
           </a:xfrm>
           <a:prstGeom prst="rect">
@@ -3905,7 +3905,7 @@
         </p:nvSpPr>
         <p:spPr>
           <a:xfrm>
-            <a:off x="5436096" y="5805264"/>
+            <a:off x="5508104" y="5733200"/>
             <a:ext cx="3648435" cy="369332"/>
           </a:xfrm>
           <a:prstGeom prst="rect">
@@ -4036,7 +4036,7 @@
         </p:nvSpPr>
         <p:spPr>
           <a:xfrm>
-            <a:off x="6804248" y="6165304"/>
+            <a:off x="6871964" y="6471864"/>
             <a:ext cx="2248372" cy="369332"/>
           </a:xfrm>
           <a:prstGeom prst="rect">
@@ -4078,6 +4078,100 @@
               <a:t>1</a:t>
             </a:fld>
             <a:endParaRPr lang="es-ES"/>
+          </a:p>
+        </p:txBody>
+      </p:sp>
+      <p:sp>
+        <p:nvSpPr>
+          <p:cNvPr id="3" name="2 CuadroTexto"/>
+          <p:cNvSpPr txBox="1"/>
+          <p:nvPr/>
+        </p:nvSpPr>
+        <p:spPr>
+          <a:xfrm>
+            <a:off x="2987753" y="2789892"/>
+            <a:ext cx="3240502" cy="523220"/>
+          </a:xfrm>
+          <a:prstGeom prst="rect">
+            <a:avLst/>
+          </a:prstGeom>
+          <a:noFill/>
+        </p:spPr>
+        <p:txBody>
+          <a:bodyPr wrap="none" rtlCol="0">
+            <a:spAutoFit/>
+          </a:bodyPr>
+          <a:lstStyle/>
+          <a:p>
+            <a:r>
+              <a:rPr lang="es-ES" sz="2800" i="1" dirty="0" smtClean="0"/>
+              <a:t>Proyecto Informático</a:t>
+            </a:r>
+            <a:endParaRPr lang="es-ES" sz="2800" i="1" dirty="0"/>
+          </a:p>
+        </p:txBody>
+      </p:sp>
+      <p:sp>
+        <p:nvSpPr>
+          <p:cNvPr id="10" name="9 CuadroTexto"/>
+          <p:cNvSpPr txBox="1"/>
+          <p:nvPr/>
+        </p:nvSpPr>
+        <p:spPr>
+          <a:xfrm>
+            <a:off x="5680231" y="6102532"/>
+            <a:ext cx="3463769" cy="369332"/>
+          </a:xfrm>
+          <a:prstGeom prst="rect">
+            <a:avLst/>
+          </a:prstGeom>
+          <a:noFill/>
+        </p:spPr>
+        <p:txBody>
+          <a:bodyPr wrap="none" rtlCol="0">
+            <a:spAutoFit/>
+          </a:bodyPr>
+          <a:lstStyle/>
+          <a:p>
+            <a:r>
+              <a:rPr lang="es-ES" dirty="0" smtClean="0"/>
+              <a:t>Dirigido por José Luis Guisado </a:t>
+            </a:r>
+            <a:r>
+              <a:rPr lang="es-ES" dirty="0" err="1" smtClean="0"/>
+              <a:t>Lizar</a:t>
+            </a:r>
+            <a:endParaRPr lang="es-ES" dirty="0"/>
+          </a:p>
+        </p:txBody>
+      </p:sp>
+      <p:sp>
+        <p:nvSpPr>
+          <p:cNvPr id="9" name="8 CuadroTexto"/>
+          <p:cNvSpPr txBox="1"/>
+          <p:nvPr/>
+        </p:nvSpPr>
+        <p:spPr>
+          <a:xfrm>
+            <a:off x="3668483" y="6471864"/>
+            <a:ext cx="1879041" cy="369332"/>
+          </a:xfrm>
+          <a:prstGeom prst="rect">
+            <a:avLst/>
+          </a:prstGeom>
+          <a:noFill/>
+        </p:spPr>
+        <p:txBody>
+          <a:bodyPr wrap="none" rtlCol="0">
+            <a:spAutoFit/>
+          </a:bodyPr>
+          <a:lstStyle/>
+          <a:p>
+            <a:r>
+              <a:rPr lang="es-ES" b="1" dirty="0" smtClean="0"/>
+              <a:t>3 de Julio de 2013</a:t>
+            </a:r>
+            <a:endParaRPr lang="es-ES" b="1" dirty="0"/>
           </a:p>
         </p:txBody>
       </p:sp>
@@ -26604,7 +26698,7 @@
           <a:p>
             <a:r>
               <a:rPr lang="es-ES" dirty="0" smtClean="0"/>
-              <a:t>¿Partícula o onda?</a:t>
+              <a:t>¿Partícula u onda?</a:t>
             </a:r>
           </a:p>
         </p:txBody>
@@ -43444,8 +43538,8 @@
             </a:p>
           </p:txBody>
         </p:sp>
-        <mc:AlternateContent xmlns:mc="http://schemas.openxmlformats.org/markup-compatibility/2006">
-          <mc:Choice xmlns:a14="http://schemas.microsoft.com/office/drawing/2010/main" Requires="a14">
+        <mc:AlternateContent xmlns:mc="http://schemas.openxmlformats.org/markup-compatibility/2006" xmlns:a14="http://schemas.microsoft.com/office/drawing/2010/main">
+          <mc:Choice Requires="a14">
             <p:sp>
               <p:nvSpPr>
                 <p:cNvPr id="3" name="2 Rectángulo"/>
@@ -43508,7 +43602,7 @@
               </p:txBody>
             </p:sp>
           </mc:Choice>
-          <mc:Fallback>
+          <mc:Fallback xmlns="">
             <p:sp>
               <p:nvSpPr>
                 <p:cNvPr id="3" name="2 Rectángulo"/>
@@ -43610,8 +43704,8 @@
             </a:p>
           </p:txBody>
         </p:sp>
-        <mc:AlternateContent xmlns:mc="http://schemas.openxmlformats.org/markup-compatibility/2006">
-          <mc:Choice xmlns:a14="http://schemas.microsoft.com/office/drawing/2010/main" Requires="a14">
+        <mc:AlternateContent xmlns:mc="http://schemas.openxmlformats.org/markup-compatibility/2006" xmlns:a14="http://schemas.microsoft.com/office/drawing/2010/main">
+          <mc:Choice Requires="a14">
             <p:sp>
               <p:nvSpPr>
                 <p:cNvPr id="16" name="15 Rectángulo"/>
@@ -43674,7 +43768,7 @@
               </p:txBody>
             </p:sp>
           </mc:Choice>
-          <mc:Fallback>
+          <mc:Fallback xmlns="">
             <p:sp>
               <p:nvSpPr>
                 <p:cNvPr id="16" name="15 Rectángulo"/>

</xml_diff>